<commit_message>
updated the dev log to latest version
</commit_message>
<xml_diff>
--- a/dev log.pptx
+++ b/dev log.pptx
@@ -31,6 +31,13 @@
     <p:sldId id="279" r:id="rId25"/>
     <p:sldId id="280" r:id="rId26"/>
     <p:sldId id="281" r:id="rId27"/>
+    <p:sldId id="282" r:id="rId28"/>
+    <p:sldId id="283" r:id="rId29"/>
+    <p:sldId id="284" r:id="rId30"/>
+    <p:sldId id="285" r:id="rId31"/>
+    <p:sldId id="286" r:id="rId32"/>
+    <p:sldId id="287" r:id="rId33"/>
+    <p:sldId id="288" r:id="rId34"/>
   </p:sldIdLst>
   <p:sldSz cx="12192000" cy="6858000"/>
   <p:notesSz cx="6858000" cy="9144000"/>
@@ -176,6 +183,13 @@
             <p14:sldId id="279"/>
             <p14:sldId id="280"/>
             <p14:sldId id="281"/>
+            <p14:sldId id="282"/>
+            <p14:sldId id="283"/>
+            <p14:sldId id="284"/>
+            <p14:sldId id="285"/>
+            <p14:sldId id="286"/>
+            <p14:sldId id="287"/>
+            <p14:sldId id="288"/>
           </p14:sldIdLst>
         </p14:section>
       </p14:sectionLst>
@@ -336,7 +350,7 @@
           <a:p>
             <a:fld id="{95BB3272-C847-43E3-AE34-83B2109F1449}" type="datetimeFigureOut">
               <a:rPr lang="en-GB" smtClean="0"/>
-              <a:t>14/02/2020</a:t>
+              <a:t>27/02/2020</a:t>
             </a:fld>
             <a:endParaRPr lang="en-GB"/>
           </a:p>
@@ -536,7 +550,7 @@
           <a:p>
             <a:fld id="{95BB3272-C847-43E3-AE34-83B2109F1449}" type="datetimeFigureOut">
               <a:rPr lang="en-GB" smtClean="0"/>
-              <a:t>14/02/2020</a:t>
+              <a:t>27/02/2020</a:t>
             </a:fld>
             <a:endParaRPr lang="en-GB"/>
           </a:p>
@@ -746,7 +760,7 @@
           <a:p>
             <a:fld id="{95BB3272-C847-43E3-AE34-83B2109F1449}" type="datetimeFigureOut">
               <a:rPr lang="en-GB" smtClean="0"/>
-              <a:t>14/02/2020</a:t>
+              <a:t>27/02/2020</a:t>
             </a:fld>
             <a:endParaRPr lang="en-GB"/>
           </a:p>
@@ -946,7 +960,7 @@
           <a:p>
             <a:fld id="{95BB3272-C847-43E3-AE34-83B2109F1449}" type="datetimeFigureOut">
               <a:rPr lang="en-GB" smtClean="0"/>
-              <a:t>14/02/2020</a:t>
+              <a:t>27/02/2020</a:t>
             </a:fld>
             <a:endParaRPr lang="en-GB"/>
           </a:p>
@@ -1222,7 +1236,7 @@
           <a:p>
             <a:fld id="{95BB3272-C847-43E3-AE34-83B2109F1449}" type="datetimeFigureOut">
               <a:rPr lang="en-GB" smtClean="0"/>
-              <a:t>14/02/2020</a:t>
+              <a:t>27/02/2020</a:t>
             </a:fld>
             <a:endParaRPr lang="en-GB"/>
           </a:p>
@@ -1490,7 +1504,7 @@
           <a:p>
             <a:fld id="{95BB3272-C847-43E3-AE34-83B2109F1449}" type="datetimeFigureOut">
               <a:rPr lang="en-GB" smtClean="0"/>
-              <a:t>14/02/2020</a:t>
+              <a:t>27/02/2020</a:t>
             </a:fld>
             <a:endParaRPr lang="en-GB"/>
           </a:p>
@@ -1905,7 +1919,7 @@
           <a:p>
             <a:fld id="{95BB3272-C847-43E3-AE34-83B2109F1449}" type="datetimeFigureOut">
               <a:rPr lang="en-GB" smtClean="0"/>
-              <a:t>14/02/2020</a:t>
+              <a:t>27/02/2020</a:t>
             </a:fld>
             <a:endParaRPr lang="en-GB"/>
           </a:p>
@@ -2047,7 +2061,7 @@
           <a:p>
             <a:fld id="{95BB3272-C847-43E3-AE34-83B2109F1449}" type="datetimeFigureOut">
               <a:rPr lang="en-GB" smtClean="0"/>
-              <a:t>14/02/2020</a:t>
+              <a:t>27/02/2020</a:t>
             </a:fld>
             <a:endParaRPr lang="en-GB"/>
           </a:p>
@@ -2160,7 +2174,7 @@
           <a:p>
             <a:fld id="{95BB3272-C847-43E3-AE34-83B2109F1449}" type="datetimeFigureOut">
               <a:rPr lang="en-GB" smtClean="0"/>
-              <a:t>14/02/2020</a:t>
+              <a:t>27/02/2020</a:t>
             </a:fld>
             <a:endParaRPr lang="en-GB"/>
           </a:p>
@@ -2473,7 +2487,7 @@
           <a:p>
             <a:fld id="{95BB3272-C847-43E3-AE34-83B2109F1449}" type="datetimeFigureOut">
               <a:rPr lang="en-GB" smtClean="0"/>
-              <a:t>14/02/2020</a:t>
+              <a:t>27/02/2020</a:t>
             </a:fld>
             <a:endParaRPr lang="en-GB"/>
           </a:p>
@@ -2762,7 +2776,7 @@
           <a:p>
             <a:fld id="{95BB3272-C847-43E3-AE34-83B2109F1449}" type="datetimeFigureOut">
               <a:rPr lang="en-GB" smtClean="0"/>
-              <a:t>14/02/2020</a:t>
+              <a:t>27/02/2020</a:t>
             </a:fld>
             <a:endParaRPr lang="en-GB"/>
           </a:p>
@@ -3005,7 +3019,7 @@
           <a:p>
             <a:fld id="{95BB3272-C847-43E3-AE34-83B2109F1449}" type="datetimeFigureOut">
               <a:rPr lang="en-GB" smtClean="0"/>
-              <a:t>14/02/2020</a:t>
+              <a:t>27/02/2020</a:t>
             </a:fld>
             <a:endParaRPr lang="en-GB"/>
           </a:p>
@@ -4198,6 +4212,17 @@
               <a:t> from Player class so chips can be associated with a dynamic number of players</a:t>
             </a:r>
           </a:p>
+          <a:p>
+            <a:r>
+              <a:rPr lang="en-GB" dirty="0"/>
+              <a:t>Make sure to validate user inputs on raise etc, not a slider even though its better. Add some random validated fields such as a search etc and when entering chips or selecting a username maybe add a chat feature with validation </a:t>
+            </a:r>
+            <a:r>
+              <a:rPr lang="en-GB" dirty="0" err="1"/>
+              <a:t>aswell</a:t>
+            </a:r>
+            <a:endParaRPr lang="en-GB" dirty="0"/>
+          </a:p>
         </p:txBody>
       </p:sp>
     </p:spTree>
@@ -6103,6 +6128,429 @@
 </p:sld>
 </file>
 
+<file path=ppt/slides/slide27.xml><?xml version="1.0" encoding="utf-8"?>
+<p:sld xmlns:a="http://schemas.openxmlformats.org/drawingml/2006/main" xmlns:r="http://schemas.openxmlformats.org/officeDocument/2006/relationships" xmlns:p="http://schemas.openxmlformats.org/presentationml/2006/main">
+  <p:cSld>
+    <p:spTree>
+      <p:nvGrpSpPr>
+        <p:cNvPr id="1" name=""/>
+        <p:cNvGrpSpPr/>
+        <p:nvPr/>
+      </p:nvGrpSpPr>
+      <p:grpSpPr>
+        <a:xfrm>
+          <a:off x="0" y="0"/>
+          <a:ext cx="0" cy="0"/>
+          <a:chOff x="0" y="0"/>
+          <a:chExt cx="0" cy="0"/>
+        </a:xfrm>
+      </p:grpSpPr>
+      <p:sp>
+        <p:nvSpPr>
+          <p:cNvPr id="2" name="Title 1">
+            <a:extLst>
+              <a:ext uri="{FF2B5EF4-FFF2-40B4-BE49-F238E27FC236}">
+                <a16:creationId xmlns:a16="http://schemas.microsoft.com/office/drawing/2014/main" id="{8DC5C269-B48A-4C9A-8DED-683F519173ED}"/>
+              </a:ext>
+            </a:extLst>
+          </p:cNvPr>
+          <p:cNvSpPr>
+            <a:spLocks noGrp="1"/>
+          </p:cNvSpPr>
+          <p:nvPr>
+            <p:ph type="title"/>
+          </p:nvPr>
+        </p:nvSpPr>
+        <p:spPr/>
+        <p:txBody>
+          <a:bodyPr/>
+          <a:lstStyle/>
+          <a:p>
+            <a:r>
+              <a:rPr lang="en-GB" dirty="0"/>
+              <a:t>Check full testing before fix</a:t>
+            </a:r>
+          </a:p>
+        </p:txBody>
+      </p:sp>
+      <p:pic>
+        <p:nvPicPr>
+          <p:cNvPr id="7" name="Content Placeholder 6">
+            <a:extLst>
+              <a:ext uri="{FF2B5EF4-FFF2-40B4-BE49-F238E27FC236}">
+                <a16:creationId xmlns:a16="http://schemas.microsoft.com/office/drawing/2014/main" id="{40034E8B-AC72-49D1-9808-5B39EC3215A2}"/>
+              </a:ext>
+            </a:extLst>
+          </p:cNvPr>
+          <p:cNvPicPr>
+            <a:picLocks noGrp="1" noChangeAspect="1"/>
+          </p:cNvPicPr>
+          <p:nvPr>
+            <p:ph idx="1"/>
+          </p:nvPr>
+        </p:nvPicPr>
+        <p:blipFill>
+          <a:blip r:embed="rId2"/>
+          <a:stretch>
+            <a:fillRect/>
+          </a:stretch>
+        </p:blipFill>
+        <p:spPr>
+          <a:xfrm>
+            <a:off x="1269690" y="2023794"/>
+            <a:ext cx="7773485" cy="3334215"/>
+          </a:xfrm>
+          <a:prstGeom prst="rect">
+            <a:avLst/>
+          </a:prstGeom>
+        </p:spPr>
+      </p:pic>
+      <p:pic>
+        <p:nvPicPr>
+          <p:cNvPr id="4" name="Picture 3">
+            <a:extLst>
+              <a:ext uri="{FF2B5EF4-FFF2-40B4-BE49-F238E27FC236}">
+                <a16:creationId xmlns:a16="http://schemas.microsoft.com/office/drawing/2014/main" id="{06752EEA-D6DE-4277-B292-4CC3F690D367}"/>
+              </a:ext>
+            </a:extLst>
+          </p:cNvPr>
+          <p:cNvPicPr>
+            <a:picLocks noChangeAspect="1"/>
+          </p:cNvPicPr>
+          <p:nvPr/>
+        </p:nvPicPr>
+        <p:blipFill>
+          <a:blip r:embed="rId3"/>
+          <a:stretch>
+            <a:fillRect/>
+          </a:stretch>
+        </p:blipFill>
+        <p:spPr>
+          <a:xfrm>
+            <a:off x="5362063" y="2760663"/>
+            <a:ext cx="3581900" cy="2162477"/>
+          </a:xfrm>
+          <a:prstGeom prst="rect">
+            <a:avLst/>
+          </a:prstGeom>
+        </p:spPr>
+      </p:pic>
+    </p:spTree>
+    <p:extLst>
+      <p:ext uri="{BB962C8B-B14F-4D97-AF65-F5344CB8AC3E}">
+        <p14:creationId xmlns:p14="http://schemas.microsoft.com/office/powerpoint/2010/main" val="872354086"/>
+      </p:ext>
+    </p:extLst>
+  </p:cSld>
+  <p:clrMapOvr>
+    <a:masterClrMapping/>
+  </p:clrMapOvr>
+</p:sld>
+</file>
+
+<file path=ppt/slides/slide28.xml><?xml version="1.0" encoding="utf-8"?>
+<p:sld xmlns:a="http://schemas.openxmlformats.org/drawingml/2006/main" xmlns:r="http://schemas.openxmlformats.org/officeDocument/2006/relationships" xmlns:p="http://schemas.openxmlformats.org/presentationml/2006/main">
+  <p:cSld>
+    <p:spTree>
+      <p:nvGrpSpPr>
+        <p:cNvPr id="1" name=""/>
+        <p:cNvGrpSpPr/>
+        <p:nvPr/>
+      </p:nvGrpSpPr>
+      <p:grpSpPr>
+        <a:xfrm>
+          <a:off x="0" y="0"/>
+          <a:ext cx="0" cy="0"/>
+          <a:chOff x="0" y="0"/>
+          <a:chExt cx="0" cy="0"/>
+        </a:xfrm>
+      </p:grpSpPr>
+      <p:sp>
+        <p:nvSpPr>
+          <p:cNvPr id="2" name="Title 1">
+            <a:extLst>
+              <a:ext uri="{FF2B5EF4-FFF2-40B4-BE49-F238E27FC236}">
+                <a16:creationId xmlns:a16="http://schemas.microsoft.com/office/drawing/2014/main" id="{16CA1C2A-2BF7-4CED-99EE-BDED282E74C1}"/>
+              </a:ext>
+            </a:extLst>
+          </p:cNvPr>
+          <p:cNvSpPr>
+            <a:spLocks noGrp="1"/>
+          </p:cNvSpPr>
+          <p:nvPr>
+            <p:ph type="title"/>
+          </p:nvPr>
+        </p:nvSpPr>
+        <p:spPr>
+          <a:xfrm>
+            <a:off x="838200" y="365125"/>
+            <a:ext cx="10515600" cy="1144893"/>
+          </a:xfrm>
+        </p:spPr>
+        <p:txBody>
+          <a:bodyPr/>
+          <a:lstStyle/>
+          <a:p>
+            <a:r>
+              <a:rPr lang="en-GB" dirty="0"/>
+              <a:t>Check full first fix attempt</a:t>
+            </a:r>
+          </a:p>
+        </p:txBody>
+      </p:sp>
+      <p:pic>
+        <p:nvPicPr>
+          <p:cNvPr id="4" name="Content Placeholder 3">
+            <a:extLst>
+              <a:ext uri="{FF2B5EF4-FFF2-40B4-BE49-F238E27FC236}">
+                <a16:creationId xmlns:a16="http://schemas.microsoft.com/office/drawing/2014/main" id="{1D51B30A-979A-4AF5-A88C-C7849F02C6A1}"/>
+              </a:ext>
+            </a:extLst>
+          </p:cNvPr>
+          <p:cNvPicPr>
+            <a:picLocks noGrp="1" noChangeAspect="1"/>
+          </p:cNvPicPr>
+          <p:nvPr>
+            <p:ph idx="1"/>
+          </p:nvPr>
+        </p:nvPicPr>
+        <p:blipFill>
+          <a:blip r:embed="rId2"/>
+          <a:stretch>
+            <a:fillRect/>
+          </a:stretch>
+        </p:blipFill>
+        <p:spPr>
+          <a:xfrm>
+            <a:off x="319033" y="1209001"/>
+            <a:ext cx="5506218" cy="2958055"/>
+          </a:xfrm>
+          <a:prstGeom prst="rect">
+            <a:avLst/>
+          </a:prstGeom>
+        </p:spPr>
+      </p:pic>
+      <p:pic>
+        <p:nvPicPr>
+          <p:cNvPr id="5" name="Picture 4">
+            <a:extLst>
+              <a:ext uri="{FF2B5EF4-FFF2-40B4-BE49-F238E27FC236}">
+                <a16:creationId xmlns:a16="http://schemas.microsoft.com/office/drawing/2014/main" id="{676B1560-90E6-422E-B672-8A62B6C63AA5}"/>
+              </a:ext>
+            </a:extLst>
+          </p:cNvPr>
+          <p:cNvPicPr>
+            <a:picLocks noChangeAspect="1"/>
+          </p:cNvPicPr>
+          <p:nvPr/>
+        </p:nvPicPr>
+        <p:blipFill>
+          <a:blip r:embed="rId3"/>
+          <a:stretch>
+            <a:fillRect/>
+          </a:stretch>
+        </p:blipFill>
+        <p:spPr>
+          <a:xfrm>
+            <a:off x="7564742" y="2143693"/>
+            <a:ext cx="3572374" cy="2734057"/>
+          </a:xfrm>
+          <a:prstGeom prst="rect">
+            <a:avLst/>
+          </a:prstGeom>
+        </p:spPr>
+      </p:pic>
+      <p:pic>
+        <p:nvPicPr>
+          <p:cNvPr id="6" name="Picture 5">
+            <a:extLst>
+              <a:ext uri="{FF2B5EF4-FFF2-40B4-BE49-F238E27FC236}">
+                <a16:creationId xmlns:a16="http://schemas.microsoft.com/office/drawing/2014/main" id="{98A59516-CF4F-433B-84FB-E82949C693EF}"/>
+              </a:ext>
+            </a:extLst>
+          </p:cNvPr>
+          <p:cNvPicPr>
+            <a:picLocks noChangeAspect="1"/>
+          </p:cNvPicPr>
+          <p:nvPr/>
+        </p:nvPicPr>
+        <p:blipFill>
+          <a:blip r:embed="rId4"/>
+          <a:stretch>
+            <a:fillRect/>
+          </a:stretch>
+        </p:blipFill>
+        <p:spPr>
+          <a:xfrm>
+            <a:off x="319033" y="4167056"/>
+            <a:ext cx="5506218" cy="2619741"/>
+          </a:xfrm>
+          <a:prstGeom prst="rect">
+            <a:avLst/>
+          </a:prstGeom>
+        </p:spPr>
+      </p:pic>
+    </p:spTree>
+    <p:extLst>
+      <p:ext uri="{BB962C8B-B14F-4D97-AF65-F5344CB8AC3E}">
+        <p14:creationId xmlns:p14="http://schemas.microsoft.com/office/powerpoint/2010/main" val="4032863899"/>
+      </p:ext>
+    </p:extLst>
+  </p:cSld>
+  <p:clrMapOvr>
+    <a:masterClrMapping/>
+  </p:clrMapOvr>
+</p:sld>
+</file>
+
+<file path=ppt/slides/slide29.xml><?xml version="1.0" encoding="utf-8"?>
+<p:sld xmlns:a="http://schemas.openxmlformats.org/drawingml/2006/main" xmlns:r="http://schemas.openxmlformats.org/officeDocument/2006/relationships" xmlns:p="http://schemas.openxmlformats.org/presentationml/2006/main">
+  <p:cSld>
+    <p:spTree>
+      <p:nvGrpSpPr>
+        <p:cNvPr id="1" name=""/>
+        <p:cNvGrpSpPr/>
+        <p:nvPr/>
+      </p:nvGrpSpPr>
+      <p:grpSpPr>
+        <a:xfrm>
+          <a:off x="0" y="0"/>
+          <a:ext cx="0" cy="0"/>
+          <a:chOff x="0" y="0"/>
+          <a:chExt cx="0" cy="0"/>
+        </a:xfrm>
+      </p:grpSpPr>
+      <p:sp>
+        <p:nvSpPr>
+          <p:cNvPr id="2" name="Title 1">
+            <a:extLst>
+              <a:ext uri="{FF2B5EF4-FFF2-40B4-BE49-F238E27FC236}">
+                <a16:creationId xmlns:a16="http://schemas.microsoft.com/office/drawing/2014/main" id="{24C2AFB0-01A2-4DF5-B3FC-806D7A8B0C1D}"/>
+              </a:ext>
+            </a:extLst>
+          </p:cNvPr>
+          <p:cNvSpPr>
+            <a:spLocks noGrp="1"/>
+          </p:cNvSpPr>
+          <p:nvPr>
+            <p:ph type="title"/>
+          </p:nvPr>
+        </p:nvSpPr>
+        <p:spPr/>
+        <p:txBody>
+          <a:bodyPr/>
+          <a:lstStyle/>
+          <a:p>
+            <a:r>
+              <a:rPr lang="en-GB" dirty="0"/>
+              <a:t>Check full, full fix</a:t>
+            </a:r>
+          </a:p>
+        </p:txBody>
+      </p:sp>
+      <p:pic>
+        <p:nvPicPr>
+          <p:cNvPr id="4" name="Content Placeholder 3">
+            <a:extLst>
+              <a:ext uri="{FF2B5EF4-FFF2-40B4-BE49-F238E27FC236}">
+                <a16:creationId xmlns:a16="http://schemas.microsoft.com/office/drawing/2014/main" id="{B4799E56-D298-40D6-ABE6-4C5F98B61DFB}"/>
+              </a:ext>
+            </a:extLst>
+          </p:cNvPr>
+          <p:cNvPicPr>
+            <a:picLocks noGrp="1" noChangeAspect="1"/>
+          </p:cNvPicPr>
+          <p:nvPr>
+            <p:ph idx="1"/>
+          </p:nvPr>
+        </p:nvPicPr>
+        <p:blipFill rotWithShape="1">
+          <a:blip r:embed="rId2"/>
+          <a:srcRect r="40312"/>
+          <a:stretch/>
+        </p:blipFill>
+        <p:spPr>
+          <a:xfrm>
+            <a:off x="5788954" y="1443174"/>
+            <a:ext cx="5754298" cy="3153215"/>
+          </a:xfrm>
+          <a:prstGeom prst="rect">
+            <a:avLst/>
+          </a:prstGeom>
+        </p:spPr>
+      </p:pic>
+      <p:pic>
+        <p:nvPicPr>
+          <p:cNvPr id="5" name="Picture 4">
+            <a:extLst>
+              <a:ext uri="{FF2B5EF4-FFF2-40B4-BE49-F238E27FC236}">
+                <a16:creationId xmlns:a16="http://schemas.microsoft.com/office/drawing/2014/main" id="{C387C380-6E21-4401-8122-C9C4D238B7E6}"/>
+              </a:ext>
+            </a:extLst>
+          </p:cNvPr>
+          <p:cNvPicPr>
+            <a:picLocks noChangeAspect="1"/>
+          </p:cNvPicPr>
+          <p:nvPr/>
+        </p:nvPicPr>
+        <p:blipFill>
+          <a:blip r:embed="rId3"/>
+          <a:stretch>
+            <a:fillRect/>
+          </a:stretch>
+        </p:blipFill>
+        <p:spPr>
+          <a:xfrm>
+            <a:off x="7698966" y="5076808"/>
+            <a:ext cx="3572374" cy="1486107"/>
+          </a:xfrm>
+          <a:prstGeom prst="rect">
+            <a:avLst/>
+          </a:prstGeom>
+        </p:spPr>
+      </p:pic>
+      <p:pic>
+        <p:nvPicPr>
+          <p:cNvPr id="6" name="Picture 5">
+            <a:extLst>
+              <a:ext uri="{FF2B5EF4-FFF2-40B4-BE49-F238E27FC236}">
+                <a16:creationId xmlns:a16="http://schemas.microsoft.com/office/drawing/2014/main" id="{B3CAEC5D-EEE4-4C74-805D-BEEC36EFC4A9}"/>
+              </a:ext>
+            </a:extLst>
+          </p:cNvPr>
+          <p:cNvPicPr>
+            <a:picLocks noChangeAspect="1"/>
+          </p:cNvPicPr>
+          <p:nvPr/>
+        </p:nvPicPr>
+        <p:blipFill rotWithShape="1">
+          <a:blip r:embed="rId4"/>
+          <a:srcRect r="43363"/>
+          <a:stretch/>
+        </p:blipFill>
+        <p:spPr>
+          <a:xfrm>
+            <a:off x="920660" y="1888796"/>
+            <a:ext cx="4462051" cy="3667637"/>
+          </a:xfrm>
+          <a:prstGeom prst="rect">
+            <a:avLst/>
+          </a:prstGeom>
+        </p:spPr>
+      </p:pic>
+    </p:spTree>
+    <p:extLst>
+      <p:ext uri="{BB962C8B-B14F-4D97-AF65-F5344CB8AC3E}">
+        <p14:creationId xmlns:p14="http://schemas.microsoft.com/office/powerpoint/2010/main" val="464028385"/>
+      </p:ext>
+    </p:extLst>
+  </p:cSld>
+  <p:clrMapOvr>
+    <a:masterClrMapping/>
+  </p:clrMapOvr>
+</p:sld>
+</file>
+
 <file path=ppt/slides/slide3.xml><?xml version="1.0" encoding="utf-8"?>
 <p:sld xmlns:a="http://schemas.openxmlformats.org/drawingml/2006/main" xmlns:r="http://schemas.openxmlformats.org/officeDocument/2006/relationships" xmlns:p="http://schemas.openxmlformats.org/presentationml/2006/main">
   <p:cSld>
@@ -6180,6 +6628,549 @@
     <p:extLst>
       <p:ext uri="{BB962C8B-B14F-4D97-AF65-F5344CB8AC3E}">
         <p14:creationId xmlns:p14="http://schemas.microsoft.com/office/powerpoint/2010/main" val="610270681"/>
+      </p:ext>
+    </p:extLst>
+  </p:cSld>
+  <p:clrMapOvr>
+    <a:masterClrMapping/>
+  </p:clrMapOvr>
+</p:sld>
+</file>
+
+<file path=ppt/slides/slide30.xml><?xml version="1.0" encoding="utf-8"?>
+<p:sld xmlns:a="http://schemas.openxmlformats.org/drawingml/2006/main" xmlns:r="http://schemas.openxmlformats.org/officeDocument/2006/relationships" xmlns:p="http://schemas.openxmlformats.org/presentationml/2006/main">
+  <p:cSld>
+    <p:spTree>
+      <p:nvGrpSpPr>
+        <p:cNvPr id="1" name=""/>
+        <p:cNvGrpSpPr/>
+        <p:nvPr/>
+      </p:nvGrpSpPr>
+      <p:grpSpPr>
+        <a:xfrm>
+          <a:off x="0" y="0"/>
+          <a:ext cx="0" cy="0"/>
+          <a:chOff x="0" y="0"/>
+          <a:chExt cx="0" cy="0"/>
+        </a:xfrm>
+      </p:grpSpPr>
+      <p:sp>
+        <p:nvSpPr>
+          <p:cNvPr id="2" name="Title 1">
+            <a:extLst>
+              <a:ext uri="{FF2B5EF4-FFF2-40B4-BE49-F238E27FC236}">
+                <a16:creationId xmlns:a16="http://schemas.microsoft.com/office/drawing/2014/main" id="{78226959-3239-40E6-B2E8-70B5BED9826D}"/>
+              </a:ext>
+            </a:extLst>
+          </p:cNvPr>
+          <p:cNvSpPr>
+            <a:spLocks noGrp="1"/>
+          </p:cNvSpPr>
+          <p:nvPr>
+            <p:ph type="title"/>
+          </p:nvPr>
+        </p:nvSpPr>
+        <p:spPr/>
+        <p:txBody>
+          <a:bodyPr/>
+          <a:lstStyle/>
+          <a:p>
+            <a:r>
+              <a:rPr lang="en-GB" dirty="0"/>
+              <a:t>Making aces work </a:t>
+            </a:r>
+          </a:p>
+        </p:txBody>
+      </p:sp>
+      <p:sp>
+        <p:nvSpPr>
+          <p:cNvPr id="3" name="Content Placeholder 2">
+            <a:extLst>
+              <a:ext uri="{FF2B5EF4-FFF2-40B4-BE49-F238E27FC236}">
+                <a16:creationId xmlns:a16="http://schemas.microsoft.com/office/drawing/2014/main" id="{9A316842-D7F9-4054-9A32-539D9348EC83}"/>
+              </a:ext>
+            </a:extLst>
+          </p:cNvPr>
+          <p:cNvSpPr>
+            <a:spLocks noGrp="1"/>
+          </p:cNvSpPr>
+          <p:nvPr>
+            <p:ph idx="1"/>
+          </p:nvPr>
+        </p:nvSpPr>
+        <p:spPr>
+          <a:xfrm>
+            <a:off x="838200" y="1825625"/>
+            <a:ext cx="7041022" cy="3953014"/>
+          </a:xfrm>
+        </p:spPr>
+        <p:txBody>
+          <a:bodyPr>
+            <a:normAutofit fontScale="92500" lnSpcReduction="20000"/>
+          </a:bodyPr>
+          <a:lstStyle/>
+          <a:p>
+            <a:r>
+              <a:rPr lang="en-GB" dirty="0"/>
+              <a:t>The next problem to deal with before refactoring and polishing the main loop and check winners code was making aces function as both high and low but not simultaneously, I made aces high in the database and added a check for an ace low straight in the check straight function, this could cause confusion while iterative testing takes place but once there is a </a:t>
+            </a:r>
+            <a:r>
+              <a:rPr lang="en-GB" dirty="0" err="1"/>
+              <a:t>ui</a:t>
+            </a:r>
+            <a:r>
+              <a:rPr lang="en-GB" dirty="0"/>
+              <a:t> it will be fine as I can assign it a picture of an ace</a:t>
+            </a:r>
+          </a:p>
+          <a:p>
+            <a:r>
+              <a:rPr lang="en-GB" dirty="0"/>
+              <a:t>It was easier just to have a </a:t>
+            </a:r>
+            <a:r>
+              <a:rPr lang="en-GB" dirty="0" err="1"/>
+              <a:t>preset</a:t>
+            </a:r>
+            <a:r>
+              <a:rPr lang="en-GB" dirty="0"/>
+              <a:t> layout of what an ace low straight looks like than any other solution as this completely rules out any wrap around straight potential </a:t>
+            </a:r>
+          </a:p>
+        </p:txBody>
+      </p:sp>
+      <p:pic>
+        <p:nvPicPr>
+          <p:cNvPr id="4" name="Picture 3">
+            <a:extLst>
+              <a:ext uri="{FF2B5EF4-FFF2-40B4-BE49-F238E27FC236}">
+                <a16:creationId xmlns:a16="http://schemas.microsoft.com/office/drawing/2014/main" id="{B8E0B09A-A42C-429F-9DDE-5BA3CC02A49F}"/>
+              </a:ext>
+            </a:extLst>
+          </p:cNvPr>
+          <p:cNvPicPr>
+            <a:picLocks noChangeAspect="1"/>
+          </p:cNvPicPr>
+          <p:nvPr/>
+        </p:nvPicPr>
+        <p:blipFill>
+          <a:blip r:embed="rId2"/>
+          <a:stretch>
+            <a:fillRect/>
+          </a:stretch>
+        </p:blipFill>
+        <p:spPr>
+          <a:xfrm>
+            <a:off x="7946538" y="3835268"/>
+            <a:ext cx="3562847" cy="1943371"/>
+          </a:xfrm>
+          <a:prstGeom prst="rect">
+            <a:avLst/>
+          </a:prstGeom>
+        </p:spPr>
+      </p:pic>
+      <p:pic>
+        <p:nvPicPr>
+          <p:cNvPr id="6" name="Picture 5">
+            <a:extLst>
+              <a:ext uri="{FF2B5EF4-FFF2-40B4-BE49-F238E27FC236}">
+                <a16:creationId xmlns:a16="http://schemas.microsoft.com/office/drawing/2014/main" id="{CEE5F28D-EA7A-4B08-AA32-A68E3C65EAFF}"/>
+              </a:ext>
+            </a:extLst>
+          </p:cNvPr>
+          <p:cNvPicPr>
+            <a:picLocks noChangeAspect="1"/>
+          </p:cNvPicPr>
+          <p:nvPr/>
+        </p:nvPicPr>
+        <p:blipFill>
+          <a:blip r:embed="rId3"/>
+          <a:stretch>
+            <a:fillRect/>
+          </a:stretch>
+        </p:blipFill>
+        <p:spPr>
+          <a:xfrm>
+            <a:off x="649369" y="5778639"/>
+            <a:ext cx="10860016" cy="1000265"/>
+          </a:xfrm>
+          <a:prstGeom prst="rect">
+            <a:avLst/>
+          </a:prstGeom>
+        </p:spPr>
+      </p:pic>
+    </p:spTree>
+    <p:extLst>
+      <p:ext uri="{BB962C8B-B14F-4D97-AF65-F5344CB8AC3E}">
+        <p14:creationId xmlns:p14="http://schemas.microsoft.com/office/powerpoint/2010/main" val="502165898"/>
+      </p:ext>
+    </p:extLst>
+  </p:cSld>
+  <p:clrMapOvr>
+    <a:masterClrMapping/>
+  </p:clrMapOvr>
+</p:sld>
+</file>
+
+<file path=ppt/slides/slide31.xml><?xml version="1.0" encoding="utf-8"?>
+<p:sld xmlns:a="http://schemas.openxmlformats.org/drawingml/2006/main" xmlns:r="http://schemas.openxmlformats.org/officeDocument/2006/relationships" xmlns:p="http://schemas.openxmlformats.org/presentationml/2006/main">
+  <p:cSld>
+    <p:spTree>
+      <p:nvGrpSpPr>
+        <p:cNvPr id="1" name=""/>
+        <p:cNvGrpSpPr/>
+        <p:nvPr/>
+      </p:nvGrpSpPr>
+      <p:grpSpPr>
+        <a:xfrm>
+          <a:off x="0" y="0"/>
+          <a:ext cx="0" cy="0"/>
+          <a:chOff x="0" y="0"/>
+          <a:chExt cx="0" cy="0"/>
+        </a:xfrm>
+      </p:grpSpPr>
+      <p:sp>
+        <p:nvSpPr>
+          <p:cNvPr id="2" name="Title 1">
+            <a:extLst>
+              <a:ext uri="{FF2B5EF4-FFF2-40B4-BE49-F238E27FC236}">
+                <a16:creationId xmlns:a16="http://schemas.microsoft.com/office/drawing/2014/main" id="{B888FC47-9DA9-4EDC-885B-1E73471ABA77}"/>
+              </a:ext>
+            </a:extLst>
+          </p:cNvPr>
+          <p:cNvSpPr>
+            <a:spLocks noGrp="1"/>
+          </p:cNvSpPr>
+          <p:nvPr>
+            <p:ph type="title"/>
+          </p:nvPr>
+        </p:nvSpPr>
+        <p:spPr/>
+        <p:txBody>
+          <a:bodyPr/>
+          <a:lstStyle/>
+          <a:p>
+            <a:r>
+              <a:rPr lang="en-GB" dirty="0"/>
+              <a:t>Making it so raises start another round properly attempt 1</a:t>
+            </a:r>
+          </a:p>
+        </p:txBody>
+      </p:sp>
+      <p:pic>
+        <p:nvPicPr>
+          <p:cNvPr id="6" name="Content Placeholder 5">
+            <a:extLst>
+              <a:ext uri="{FF2B5EF4-FFF2-40B4-BE49-F238E27FC236}">
+                <a16:creationId xmlns:a16="http://schemas.microsoft.com/office/drawing/2014/main" id="{A3BFAD49-1A87-428B-9D5D-D7188CE2C68A}"/>
+              </a:ext>
+            </a:extLst>
+          </p:cNvPr>
+          <p:cNvPicPr>
+            <a:picLocks noGrp="1" noChangeAspect="1"/>
+          </p:cNvPicPr>
+          <p:nvPr>
+            <p:ph idx="1"/>
+          </p:nvPr>
+        </p:nvPicPr>
+        <p:blipFill>
+          <a:blip r:embed="rId2"/>
+          <a:stretch>
+            <a:fillRect/>
+          </a:stretch>
+        </p:blipFill>
+        <p:spPr>
+          <a:xfrm>
+            <a:off x="4772025" y="854579"/>
+            <a:ext cx="7273207" cy="4949663"/>
+          </a:xfrm>
+          <a:prstGeom prst="rect">
+            <a:avLst/>
+          </a:prstGeom>
+        </p:spPr>
+      </p:pic>
+      <p:sp>
+        <p:nvSpPr>
+          <p:cNvPr id="5" name="Text Placeholder 4">
+            <a:extLst>
+              <a:ext uri="{FF2B5EF4-FFF2-40B4-BE49-F238E27FC236}">
+                <a16:creationId xmlns:a16="http://schemas.microsoft.com/office/drawing/2014/main" id="{1783CC8F-E215-4C8C-B7C6-CF0F541443E1}"/>
+              </a:ext>
+            </a:extLst>
+          </p:cNvPr>
+          <p:cNvSpPr>
+            <a:spLocks noGrp="1"/>
+          </p:cNvSpPr>
+          <p:nvPr>
+            <p:ph type="body" sz="half" idx="2"/>
+          </p:nvPr>
+        </p:nvSpPr>
+        <p:spPr/>
+        <p:txBody>
+          <a:bodyPr/>
+          <a:lstStyle/>
+          <a:p>
+            <a:r>
+              <a:rPr lang="en-GB" dirty="0"/>
+              <a:t>This caused a problem that meant if you started another round because of a raise it would start a whole new loop of everyone meaning the original raiser is forced to have another action when they should not be able to. This needs fixing, this was an improvement on no solution at all but an extra condition where  </a:t>
+            </a:r>
+            <a:r>
+              <a:rPr lang="en-GB" dirty="0" err="1"/>
+              <a:t>i</a:t>
+            </a:r>
+            <a:r>
+              <a:rPr lang="en-GB" dirty="0"/>
+              <a:t> != raiser for the while loop</a:t>
+            </a:r>
+          </a:p>
+        </p:txBody>
+      </p:sp>
+    </p:spTree>
+    <p:extLst>
+      <p:ext uri="{BB962C8B-B14F-4D97-AF65-F5344CB8AC3E}">
+        <p14:creationId xmlns:p14="http://schemas.microsoft.com/office/powerpoint/2010/main" val="3512963820"/>
+      </p:ext>
+    </p:extLst>
+  </p:cSld>
+  <p:clrMapOvr>
+    <a:masterClrMapping/>
+  </p:clrMapOvr>
+</p:sld>
+</file>
+
+<file path=ppt/slides/slide32.xml><?xml version="1.0" encoding="utf-8"?>
+<p:sld xmlns:a="http://schemas.openxmlformats.org/drawingml/2006/main" xmlns:r="http://schemas.openxmlformats.org/officeDocument/2006/relationships" xmlns:p="http://schemas.openxmlformats.org/presentationml/2006/main">
+  <p:cSld>
+    <p:spTree>
+      <p:nvGrpSpPr>
+        <p:cNvPr id="1" name=""/>
+        <p:cNvGrpSpPr/>
+        <p:nvPr/>
+      </p:nvGrpSpPr>
+      <p:grpSpPr>
+        <a:xfrm>
+          <a:off x="0" y="0"/>
+          <a:ext cx="0" cy="0"/>
+          <a:chOff x="0" y="0"/>
+          <a:chExt cx="0" cy="0"/>
+        </a:xfrm>
+      </p:grpSpPr>
+      <p:sp>
+        <p:nvSpPr>
+          <p:cNvPr id="2" name="Title 1">
+            <a:extLst>
+              <a:ext uri="{FF2B5EF4-FFF2-40B4-BE49-F238E27FC236}">
+                <a16:creationId xmlns:a16="http://schemas.microsoft.com/office/drawing/2014/main" id="{01FB5F49-C197-4652-BA68-75C085264408}"/>
+              </a:ext>
+            </a:extLst>
+          </p:cNvPr>
+          <p:cNvSpPr>
+            <a:spLocks noGrp="1"/>
+          </p:cNvSpPr>
+          <p:nvPr>
+            <p:ph type="title"/>
+          </p:nvPr>
+        </p:nvSpPr>
+        <p:spPr/>
+        <p:txBody>
+          <a:bodyPr/>
+          <a:lstStyle/>
+          <a:p>
+            <a:r>
+              <a:rPr lang="en-GB" dirty="0"/>
+              <a:t>Making it so raises start another round properly attempt 1</a:t>
+            </a:r>
+          </a:p>
+        </p:txBody>
+      </p:sp>
+      <p:pic>
+        <p:nvPicPr>
+          <p:cNvPr id="5" name="Content Placeholder 4">
+            <a:extLst>
+              <a:ext uri="{FF2B5EF4-FFF2-40B4-BE49-F238E27FC236}">
+                <a16:creationId xmlns:a16="http://schemas.microsoft.com/office/drawing/2014/main" id="{0ED0ED9C-5919-4C78-9A89-FAEBA2E3EB64}"/>
+              </a:ext>
+            </a:extLst>
+          </p:cNvPr>
+          <p:cNvPicPr>
+            <a:picLocks noGrp="1" noChangeAspect="1"/>
+          </p:cNvPicPr>
+          <p:nvPr>
+            <p:ph idx="1"/>
+          </p:nvPr>
+        </p:nvPicPr>
+        <p:blipFill>
+          <a:blip r:embed="rId2"/>
+          <a:stretch>
+            <a:fillRect/>
+          </a:stretch>
+        </p:blipFill>
+        <p:spPr>
+          <a:xfrm>
+            <a:off x="5127478" y="217677"/>
+            <a:ext cx="6503348" cy="6203523"/>
+          </a:xfrm>
+          <a:prstGeom prst="rect">
+            <a:avLst/>
+          </a:prstGeom>
+        </p:spPr>
+      </p:pic>
+      <p:sp>
+        <p:nvSpPr>
+          <p:cNvPr id="4" name="Text Placeholder 3">
+            <a:extLst>
+              <a:ext uri="{FF2B5EF4-FFF2-40B4-BE49-F238E27FC236}">
+                <a16:creationId xmlns:a16="http://schemas.microsoft.com/office/drawing/2014/main" id="{C2CF2B76-583E-4944-8740-F98F28F8E6C6}"/>
+              </a:ext>
+            </a:extLst>
+          </p:cNvPr>
+          <p:cNvSpPr>
+            <a:spLocks noGrp="1"/>
+          </p:cNvSpPr>
+          <p:nvPr>
+            <p:ph type="body" sz="half" idx="2"/>
+          </p:nvPr>
+        </p:nvSpPr>
+        <p:spPr/>
+        <p:txBody>
+          <a:bodyPr/>
+          <a:lstStyle/>
+          <a:p>
+            <a:r>
+              <a:rPr lang="en-GB" dirty="0"/>
+              <a:t>This time I added a raiser variable set on the latest raises and I must be less than this as well as player length which removes the unintended double action bug that used to happen. This caused some issues as I needed to declare raiser before the while loop and the for loop and I needed a value, I chose to put it at the start of the function and gave it value of the length of the players dictionary so it would not change any behaviour until it is declared properly.</a:t>
+            </a:r>
+          </a:p>
+        </p:txBody>
+      </p:sp>
+    </p:spTree>
+    <p:extLst>
+      <p:ext uri="{BB962C8B-B14F-4D97-AF65-F5344CB8AC3E}">
+        <p14:creationId xmlns:p14="http://schemas.microsoft.com/office/powerpoint/2010/main" val="2647728290"/>
+      </p:ext>
+    </p:extLst>
+  </p:cSld>
+  <p:clrMapOvr>
+    <a:masterClrMapping/>
+  </p:clrMapOvr>
+</p:sld>
+</file>
+
+<file path=ppt/slides/slide33.xml><?xml version="1.0" encoding="utf-8"?>
+<p:sld xmlns:a="http://schemas.openxmlformats.org/drawingml/2006/main" xmlns:r="http://schemas.openxmlformats.org/officeDocument/2006/relationships" xmlns:p="http://schemas.openxmlformats.org/presentationml/2006/main">
+  <p:cSld>
+    <p:spTree>
+      <p:nvGrpSpPr>
+        <p:cNvPr id="1" name=""/>
+        <p:cNvGrpSpPr/>
+        <p:nvPr/>
+      </p:nvGrpSpPr>
+      <p:grpSpPr>
+        <a:xfrm>
+          <a:off x="0" y="0"/>
+          <a:ext cx="0" cy="0"/>
+          <a:chOff x="0" y="0"/>
+          <a:chExt cx="0" cy="0"/>
+        </a:xfrm>
+      </p:grpSpPr>
+      <p:sp>
+        <p:nvSpPr>
+          <p:cNvPr id="2" name="Title 1">
+            <a:extLst>
+              <a:ext uri="{FF2B5EF4-FFF2-40B4-BE49-F238E27FC236}">
+                <a16:creationId xmlns:a16="http://schemas.microsoft.com/office/drawing/2014/main" id="{3239AC58-37A8-4B5B-9286-FDFF02FCD028}"/>
+              </a:ext>
+            </a:extLst>
+          </p:cNvPr>
+          <p:cNvSpPr>
+            <a:spLocks noGrp="1"/>
+          </p:cNvSpPr>
+          <p:nvPr>
+            <p:ph type="title"/>
+          </p:nvPr>
+        </p:nvSpPr>
+        <p:spPr/>
+        <p:txBody>
+          <a:bodyPr/>
+          <a:lstStyle/>
+          <a:p>
+            <a:r>
+              <a:rPr lang="en-GB" dirty="0"/>
+              <a:t>Making the code work with split pots</a:t>
+            </a:r>
+          </a:p>
+        </p:txBody>
+      </p:sp>
+      <p:sp>
+        <p:nvSpPr>
+          <p:cNvPr id="3" name="Content Placeholder 2">
+            <a:extLst>
+              <a:ext uri="{FF2B5EF4-FFF2-40B4-BE49-F238E27FC236}">
+                <a16:creationId xmlns:a16="http://schemas.microsoft.com/office/drawing/2014/main" id="{81EE5F13-9102-4633-A019-5E6F7B4FB7C7}"/>
+              </a:ext>
+            </a:extLst>
+          </p:cNvPr>
+          <p:cNvSpPr>
+            <a:spLocks noGrp="1"/>
+          </p:cNvSpPr>
+          <p:nvPr>
+            <p:ph idx="1"/>
+          </p:nvPr>
+        </p:nvSpPr>
+        <p:spPr/>
+        <p:txBody>
+          <a:bodyPr/>
+          <a:lstStyle/>
+          <a:p>
+            <a:endParaRPr lang="en-GB"/>
+          </a:p>
+        </p:txBody>
+      </p:sp>
+      <p:sp>
+        <p:nvSpPr>
+          <p:cNvPr id="4" name="Text Placeholder 3">
+            <a:extLst>
+              <a:ext uri="{FF2B5EF4-FFF2-40B4-BE49-F238E27FC236}">
+                <a16:creationId xmlns:a16="http://schemas.microsoft.com/office/drawing/2014/main" id="{D1A24B18-D24E-4FAA-85BD-28AF6E02A5AC}"/>
+              </a:ext>
+            </a:extLst>
+          </p:cNvPr>
+          <p:cNvSpPr>
+            <a:spLocks noGrp="1"/>
+          </p:cNvSpPr>
+          <p:nvPr>
+            <p:ph type="body" sz="half" idx="2"/>
+          </p:nvPr>
+        </p:nvSpPr>
+        <p:spPr/>
+        <p:txBody>
+          <a:bodyPr/>
+          <a:lstStyle/>
+          <a:p>
+            <a:r>
+              <a:rPr lang="en-GB" dirty="0"/>
+              <a:t>To make split pots function with the method I have devised I now need to have the </a:t>
+            </a:r>
+            <a:r>
+              <a:rPr lang="en-GB" dirty="0" err="1"/>
+              <a:t>findwinner</a:t>
+            </a:r>
+            <a:r>
+              <a:rPr lang="en-GB" dirty="0"/>
+              <a:t> function return an ordered list of who won and how much they </a:t>
+            </a:r>
+            <a:r>
+              <a:rPr lang="en-GB" dirty="0" err="1"/>
+              <a:t>contriputed</a:t>
+            </a:r>
+            <a:endParaRPr lang="en-GB" dirty="0"/>
+          </a:p>
+        </p:txBody>
+      </p:sp>
+    </p:spTree>
+    <p:extLst>
+      <p:ext uri="{BB962C8B-B14F-4D97-AF65-F5344CB8AC3E}">
+        <p14:creationId xmlns:p14="http://schemas.microsoft.com/office/powerpoint/2010/main" val="967593404"/>
       </p:ext>
     </p:extLst>
   </p:cSld>

</xml_diff>

<commit_message>
updated dev log and laying foundations for mysql integration
don't really want to use mysql but having the foundation can't hurt
</commit_message>
<xml_diff>
--- a/dev log.pptx
+++ b/dev log.pptx
@@ -11,30 +11,31 @@
     <p:sldId id="258" r:id="rId5"/>
     <p:sldId id="265" r:id="rId6"/>
     <p:sldId id="267" r:id="rId7"/>
-    <p:sldId id="263" r:id="rId8"/>
-    <p:sldId id="259" r:id="rId9"/>
-    <p:sldId id="260" r:id="rId10"/>
-    <p:sldId id="261" r:id="rId11"/>
-    <p:sldId id="262" r:id="rId12"/>
-    <p:sldId id="272" r:id="rId13"/>
-    <p:sldId id="266" r:id="rId14"/>
-    <p:sldId id="268" r:id="rId15"/>
-    <p:sldId id="269" r:id="rId16"/>
-    <p:sldId id="270" r:id="rId17"/>
-    <p:sldId id="271" r:id="rId18"/>
-    <p:sldId id="273" r:id="rId19"/>
-    <p:sldId id="274" r:id="rId20"/>
-    <p:sldId id="275" r:id="rId21"/>
-    <p:sldId id="276" r:id="rId22"/>
-    <p:sldId id="277" r:id="rId23"/>
-    <p:sldId id="278" r:id="rId24"/>
-    <p:sldId id="279" r:id="rId25"/>
-    <p:sldId id="280" r:id="rId26"/>
-    <p:sldId id="281" r:id="rId27"/>
-    <p:sldId id="282" r:id="rId28"/>
-    <p:sldId id="283" r:id="rId29"/>
-    <p:sldId id="284" r:id="rId30"/>
-    <p:sldId id="285" r:id="rId31"/>
+    <p:sldId id="286" r:id="rId8"/>
+    <p:sldId id="263" r:id="rId9"/>
+    <p:sldId id="259" r:id="rId10"/>
+    <p:sldId id="260" r:id="rId11"/>
+    <p:sldId id="261" r:id="rId12"/>
+    <p:sldId id="262" r:id="rId13"/>
+    <p:sldId id="272" r:id="rId14"/>
+    <p:sldId id="284" r:id="rId15"/>
+    <p:sldId id="285" r:id="rId16"/>
+    <p:sldId id="266" r:id="rId17"/>
+    <p:sldId id="268" r:id="rId18"/>
+    <p:sldId id="269" r:id="rId19"/>
+    <p:sldId id="270" r:id="rId20"/>
+    <p:sldId id="271" r:id="rId21"/>
+    <p:sldId id="273" r:id="rId22"/>
+    <p:sldId id="274" r:id="rId23"/>
+    <p:sldId id="275" r:id="rId24"/>
+    <p:sldId id="276" r:id="rId25"/>
+    <p:sldId id="277" r:id="rId26"/>
+    <p:sldId id="278" r:id="rId27"/>
+    <p:sldId id="279" r:id="rId28"/>
+    <p:sldId id="280" r:id="rId29"/>
+    <p:sldId id="281" r:id="rId30"/>
+    <p:sldId id="282" r:id="rId31"/>
+    <p:sldId id="283" r:id="rId32"/>
   </p:sldIdLst>
   <p:sldSz cx="12192000" cy="6858000"/>
   <p:notesSz cx="6858000" cy="9144000"/>
@@ -148,6 +149,7 @@
             <p14:sldId id="258"/>
             <p14:sldId id="265"/>
             <p14:sldId id="267"/>
+            <p14:sldId id="286"/>
             <p14:sldId id="263"/>
           </p14:sldIdLst>
         </p14:section>
@@ -157,11 +159,13 @@
             <p14:sldId id="260"/>
           </p14:sldIdLst>
         </p14:section>
-        <p14:section name="Patient backend" id="{4917E628-EF76-4611-BE58-D69F773E488C}">
+        <p14:section name="User backend" id="{4917E628-EF76-4611-BE58-D69F773E488C}">
           <p14:sldIdLst>
             <p14:sldId id="261"/>
             <p14:sldId id="262"/>
             <p14:sldId id="272"/>
+            <p14:sldId id="284"/>
+            <p14:sldId id="285"/>
           </p14:sldIdLst>
         </p14:section>
         <p14:section name="misc notes not permanent" id="{F00C4E39-598D-4B77-B90D-154C8F41F1DD}">
@@ -182,8 +186,6 @@
             <p14:sldId id="281"/>
             <p14:sldId id="282"/>
             <p14:sldId id="283"/>
-            <p14:sldId id="284"/>
-            <p14:sldId id="285"/>
           </p14:sldIdLst>
         </p14:section>
       </p14:sectionLst>
@@ -344,7 +346,7 @@
           <a:p>
             <a:fld id="{95BB3272-C847-43E3-AE34-83B2109F1449}" type="datetimeFigureOut">
               <a:rPr lang="en-GB" smtClean="0"/>
-              <a:t>03/04/2020</a:t>
+              <a:t>05/04/2020</a:t>
             </a:fld>
             <a:endParaRPr lang="en-GB"/>
           </a:p>
@@ -544,7 +546,7 @@
           <a:p>
             <a:fld id="{95BB3272-C847-43E3-AE34-83B2109F1449}" type="datetimeFigureOut">
               <a:rPr lang="en-GB" smtClean="0"/>
-              <a:t>03/04/2020</a:t>
+              <a:t>05/04/2020</a:t>
             </a:fld>
             <a:endParaRPr lang="en-GB"/>
           </a:p>
@@ -754,7 +756,7 @@
           <a:p>
             <a:fld id="{95BB3272-C847-43E3-AE34-83B2109F1449}" type="datetimeFigureOut">
               <a:rPr lang="en-GB" smtClean="0"/>
-              <a:t>03/04/2020</a:t>
+              <a:t>05/04/2020</a:t>
             </a:fld>
             <a:endParaRPr lang="en-GB"/>
           </a:p>
@@ -954,7 +956,7 @@
           <a:p>
             <a:fld id="{95BB3272-C847-43E3-AE34-83B2109F1449}" type="datetimeFigureOut">
               <a:rPr lang="en-GB" smtClean="0"/>
-              <a:t>03/04/2020</a:t>
+              <a:t>05/04/2020</a:t>
             </a:fld>
             <a:endParaRPr lang="en-GB"/>
           </a:p>
@@ -1230,7 +1232,7 @@
           <a:p>
             <a:fld id="{95BB3272-C847-43E3-AE34-83B2109F1449}" type="datetimeFigureOut">
               <a:rPr lang="en-GB" smtClean="0"/>
-              <a:t>03/04/2020</a:t>
+              <a:t>05/04/2020</a:t>
             </a:fld>
             <a:endParaRPr lang="en-GB"/>
           </a:p>
@@ -1498,7 +1500,7 @@
           <a:p>
             <a:fld id="{95BB3272-C847-43E3-AE34-83B2109F1449}" type="datetimeFigureOut">
               <a:rPr lang="en-GB" smtClean="0"/>
-              <a:t>03/04/2020</a:t>
+              <a:t>05/04/2020</a:t>
             </a:fld>
             <a:endParaRPr lang="en-GB"/>
           </a:p>
@@ -1913,7 +1915,7 @@
           <a:p>
             <a:fld id="{95BB3272-C847-43E3-AE34-83B2109F1449}" type="datetimeFigureOut">
               <a:rPr lang="en-GB" smtClean="0"/>
-              <a:t>03/04/2020</a:t>
+              <a:t>05/04/2020</a:t>
             </a:fld>
             <a:endParaRPr lang="en-GB"/>
           </a:p>
@@ -2055,7 +2057,7 @@
           <a:p>
             <a:fld id="{95BB3272-C847-43E3-AE34-83B2109F1449}" type="datetimeFigureOut">
               <a:rPr lang="en-GB" smtClean="0"/>
-              <a:t>03/04/2020</a:t>
+              <a:t>05/04/2020</a:t>
             </a:fld>
             <a:endParaRPr lang="en-GB"/>
           </a:p>
@@ -2168,7 +2170,7 @@
           <a:p>
             <a:fld id="{95BB3272-C847-43E3-AE34-83B2109F1449}" type="datetimeFigureOut">
               <a:rPr lang="en-GB" smtClean="0"/>
-              <a:t>03/04/2020</a:t>
+              <a:t>05/04/2020</a:t>
             </a:fld>
             <a:endParaRPr lang="en-GB"/>
           </a:p>
@@ -2481,7 +2483,7 @@
           <a:p>
             <a:fld id="{95BB3272-C847-43E3-AE34-83B2109F1449}" type="datetimeFigureOut">
               <a:rPr lang="en-GB" smtClean="0"/>
-              <a:t>03/04/2020</a:t>
+              <a:t>05/04/2020</a:t>
             </a:fld>
             <a:endParaRPr lang="en-GB"/>
           </a:p>
@@ -2770,7 +2772,7 @@
           <a:p>
             <a:fld id="{95BB3272-C847-43E3-AE34-83B2109F1449}" type="datetimeFigureOut">
               <a:rPr lang="en-GB" smtClean="0"/>
-              <a:t>03/04/2020</a:t>
+              <a:t>05/04/2020</a:t>
             </a:fld>
             <a:endParaRPr lang="en-GB"/>
           </a:p>
@@ -3013,7 +3015,7 @@
           <a:p>
             <a:fld id="{95BB3272-C847-43E3-AE34-83B2109F1449}" type="datetimeFigureOut">
               <a:rPr lang="en-GB" smtClean="0"/>
-              <a:t>03/04/2020</a:t>
+              <a:t>05/04/2020</a:t>
             </a:fld>
             <a:endParaRPr lang="en-GB"/>
           </a:p>
@@ -3518,10 +3520,10 @@
       </p:grpSpPr>
       <p:sp>
         <p:nvSpPr>
-          <p:cNvPr id="2" name="Title 1">
-            <a:extLst>
-              <a:ext uri="{FF2B5EF4-FFF2-40B4-BE49-F238E27FC236}">
-                <a16:creationId xmlns:a16="http://schemas.microsoft.com/office/drawing/2014/main" id="{7B5EE842-2FDD-4DEC-8C72-6456BF9C5133}"/>
+          <p:cNvPr id="4" name="Title 3">
+            <a:extLst>
+              <a:ext uri="{FF2B5EF4-FFF2-40B4-BE49-F238E27FC236}">
+                <a16:creationId xmlns:a16="http://schemas.microsoft.com/office/drawing/2014/main" id="{8A0F5D17-B085-40EF-BF68-E055EA9DBF1E}"/>
               </a:ext>
             </a:extLst>
           </p:cNvPr>
@@ -3539,43 +3541,61 @@
           <a:p>
             <a:r>
               <a:rPr lang="en-GB" dirty="0"/>
-              <a:t>User backend</a:t>
-            </a:r>
-          </a:p>
-        </p:txBody>
-      </p:sp>
-      <p:sp>
-        <p:nvSpPr>
-          <p:cNvPr id="3" name="Text Placeholder 2">
-            <a:extLst>
-              <a:ext uri="{FF2B5EF4-FFF2-40B4-BE49-F238E27FC236}">
-                <a16:creationId xmlns:a16="http://schemas.microsoft.com/office/drawing/2014/main" id="{DE37422E-DFC5-43D8-B903-2CB431F068FC}"/>
-              </a:ext>
-            </a:extLst>
-          </p:cNvPr>
-          <p:cNvSpPr>
-            <a:spLocks noGrp="1"/>
-          </p:cNvSpPr>
-          <p:nvPr>
-            <p:ph type="body" idx="1"/>
-          </p:nvPr>
-        </p:nvSpPr>
-        <p:spPr/>
-        <p:txBody>
-          <a:bodyPr/>
-          <a:lstStyle/>
-          <a:p>
-            <a:r>
-              <a:rPr lang="en-GB" dirty="0"/>
-              <a:t>A library that includes all the backend functions accessible when logged in with an account</a:t>
-            </a:r>
+              <a:t>Necessary network functions</a:t>
+            </a:r>
+          </a:p>
+        </p:txBody>
+      </p:sp>
+      <p:sp>
+        <p:nvSpPr>
+          <p:cNvPr id="5" name="Content Placeholder 4">
+            <a:extLst>
+              <a:ext uri="{FF2B5EF4-FFF2-40B4-BE49-F238E27FC236}">
+                <a16:creationId xmlns:a16="http://schemas.microsoft.com/office/drawing/2014/main" id="{FAFDD41F-9689-4CA5-9A67-C5F3B3E28E5F}"/>
+              </a:ext>
+            </a:extLst>
+          </p:cNvPr>
+          <p:cNvSpPr>
+            <a:spLocks noGrp="1"/>
+          </p:cNvSpPr>
+          <p:nvPr>
+            <p:ph idx="1"/>
+          </p:nvPr>
+        </p:nvSpPr>
+        <p:spPr/>
+        <p:txBody>
+          <a:bodyPr/>
+          <a:lstStyle/>
+          <a:p>
+            <a:r>
+              <a:rPr lang="en-GB" dirty="0"/>
+              <a:t>Be able to verify/add new hashed usernames and passwords using the sql module I wrote</a:t>
+            </a:r>
+          </a:p>
+          <a:p>
+            <a:r>
+              <a:rPr lang="en-GB" dirty="0"/>
+              <a:t>Connect peer to peer networking for games, one host one client. Therefore Server &amp; client code will be needed in each install</a:t>
+            </a:r>
+          </a:p>
+          <a:p>
+            <a:r>
+              <a:rPr lang="en-GB" dirty="0"/>
+              <a:t>Potential server browser if time permits</a:t>
+            </a:r>
+          </a:p>
+          <a:p>
+            <a:pPr marL="0" indent="0">
+              <a:buNone/>
+            </a:pPr>
+            <a:endParaRPr lang="en-GB" dirty="0"/>
           </a:p>
         </p:txBody>
       </p:sp>
     </p:spTree>
     <p:extLst>
       <p:ext uri="{BB962C8B-B14F-4D97-AF65-F5344CB8AC3E}">
-        <p14:creationId xmlns:p14="http://schemas.microsoft.com/office/powerpoint/2010/main" val="2287663386"/>
+        <p14:creationId xmlns:p14="http://schemas.microsoft.com/office/powerpoint/2010/main" val="89662862"/>
       </p:ext>
     </p:extLst>
   </p:cSld>
@@ -3607,7 +3627,7 @@
           <p:cNvPr id="2" name="Title 1">
             <a:extLst>
               <a:ext uri="{FF2B5EF4-FFF2-40B4-BE49-F238E27FC236}">
-                <a16:creationId xmlns:a16="http://schemas.microsoft.com/office/drawing/2014/main" id="{EF8AA7A4-9FDA-42EC-960A-661F68D6C0CC}"/>
+                <a16:creationId xmlns:a16="http://schemas.microsoft.com/office/drawing/2014/main" id="{7B5EE842-2FDD-4DEC-8C72-6456BF9C5133}"/>
               </a:ext>
             </a:extLst>
           </p:cNvPr>
@@ -3625,65 +3645,35 @@
           <a:p>
             <a:r>
               <a:rPr lang="en-GB" dirty="0"/>
-              <a:t>Necessary user functions</a:t>
-            </a:r>
-          </a:p>
-        </p:txBody>
-      </p:sp>
-      <p:sp>
-        <p:nvSpPr>
-          <p:cNvPr id="3" name="Content Placeholder 2">
-            <a:extLst>
-              <a:ext uri="{FF2B5EF4-FFF2-40B4-BE49-F238E27FC236}">
-                <a16:creationId xmlns:a16="http://schemas.microsoft.com/office/drawing/2014/main" id="{F6BB918B-6819-4478-B0CD-ED27E47326ED}"/>
-              </a:ext>
-            </a:extLst>
-          </p:cNvPr>
-          <p:cNvSpPr>
-            <a:spLocks noGrp="1"/>
-          </p:cNvSpPr>
-          <p:nvPr>
-            <p:ph idx="1"/>
-          </p:nvPr>
-        </p:nvSpPr>
-        <p:spPr/>
-        <p:txBody>
-          <a:bodyPr/>
-          <a:lstStyle/>
-          <a:p>
-            <a:r>
-              <a:rPr lang="en-GB" dirty="0"/>
-              <a:t>View past games(maybe replay functionality)</a:t>
-            </a:r>
-          </a:p>
-          <a:p>
-            <a:r>
-              <a:rPr lang="en-GB" dirty="0"/>
-              <a:t>View their lifetime &amp; recent statistics with graphs+ extrapolation</a:t>
-            </a:r>
-          </a:p>
-          <a:p>
-            <a:r>
-              <a:rPr lang="en-GB" dirty="0"/>
-              <a:t>Update payroll</a:t>
-            </a:r>
-          </a:p>
-          <a:p>
-            <a:r>
-              <a:rPr lang="en-GB" dirty="0"/>
-              <a:t>A preliminary test before booking an appointment to get an early diagnosis</a:t>
-            </a:r>
-          </a:p>
-          <a:p>
-            <a:r>
-              <a:rPr lang="en-GB" dirty="0"/>
-              <a:t>Host/join a game</a:t>
-            </a:r>
-          </a:p>
-          <a:p>
-            <a:r>
-              <a:rPr lang="en-GB" dirty="0"/>
-              <a:t>Add friends for easier game access</a:t>
+              <a:t>User backend</a:t>
+            </a:r>
+          </a:p>
+        </p:txBody>
+      </p:sp>
+      <p:sp>
+        <p:nvSpPr>
+          <p:cNvPr id="3" name="Text Placeholder 2">
+            <a:extLst>
+              <a:ext uri="{FF2B5EF4-FFF2-40B4-BE49-F238E27FC236}">
+                <a16:creationId xmlns:a16="http://schemas.microsoft.com/office/drawing/2014/main" id="{DE37422E-DFC5-43D8-B903-2CB431F068FC}"/>
+              </a:ext>
+            </a:extLst>
+          </p:cNvPr>
+          <p:cNvSpPr>
+            <a:spLocks noGrp="1"/>
+          </p:cNvSpPr>
+          <p:nvPr>
+            <p:ph type="body" idx="1"/>
+          </p:nvPr>
+        </p:nvSpPr>
+        <p:spPr/>
+        <p:txBody>
+          <a:bodyPr/>
+          <a:lstStyle/>
+          <a:p>
+            <a:r>
+              <a:rPr lang="en-GB" dirty="0"/>
+              <a:t>A library that includes all the backend functions accessible when logged in with an account</a:t>
             </a:r>
           </a:p>
         </p:txBody>
@@ -3691,7 +3681,7 @@
     </p:spTree>
     <p:extLst>
       <p:ext uri="{BB962C8B-B14F-4D97-AF65-F5344CB8AC3E}">
-        <p14:creationId xmlns:p14="http://schemas.microsoft.com/office/powerpoint/2010/main" val="3128323718"/>
+        <p14:creationId xmlns:p14="http://schemas.microsoft.com/office/powerpoint/2010/main" val="2287663386"/>
       </p:ext>
     </p:extLst>
   </p:cSld>
@@ -3723,7 +3713,7 @@
           <p:cNvPr id="2" name="Title 1">
             <a:extLst>
               <a:ext uri="{FF2B5EF4-FFF2-40B4-BE49-F238E27FC236}">
-                <a16:creationId xmlns:a16="http://schemas.microsoft.com/office/drawing/2014/main" id="{790527AB-E460-46A4-B7B4-3C1BFC1DD286}"/>
+                <a16:creationId xmlns:a16="http://schemas.microsoft.com/office/drawing/2014/main" id="{EF8AA7A4-9FDA-42EC-960A-661F68D6C0CC}"/>
               </a:ext>
             </a:extLst>
           </p:cNvPr>
@@ -3741,7 +3731,7 @@
           <a:p>
             <a:r>
               <a:rPr lang="en-GB" dirty="0"/>
-              <a:t>Split pot calculations</a:t>
+              <a:t>Necessary user functions</a:t>
             </a:r>
           </a:p>
         </p:txBody>
@@ -3751,7 +3741,7 @@
           <p:cNvPr id="3" name="Content Placeholder 2">
             <a:extLst>
               <a:ext uri="{FF2B5EF4-FFF2-40B4-BE49-F238E27FC236}">
-                <a16:creationId xmlns:a16="http://schemas.microsoft.com/office/drawing/2014/main" id="{FA08A01C-A3F7-4D41-8FAD-98DF9EA7B96D}"/>
+                <a16:creationId xmlns:a16="http://schemas.microsoft.com/office/drawing/2014/main" id="{F6BB918B-6819-4478-B0CD-ED27E47326ED}"/>
               </a:ext>
             </a:extLst>
           </p:cNvPr>
@@ -3769,19 +3759,45 @@
           <a:p>
             <a:r>
               <a:rPr lang="en-GB" dirty="0"/>
-              <a:t>One challenging part of the game logic will be calculating split pots</a:t>
-            </a:r>
-          </a:p>
-          <a:p>
-            <a:pPr lvl="1"/>
-            <a:endParaRPr lang="en-GB" dirty="0"/>
+              <a:t>View past games(maybe replay functionality)</a:t>
+            </a:r>
+          </a:p>
+          <a:p>
+            <a:r>
+              <a:rPr lang="en-GB" dirty="0"/>
+              <a:t>View their lifetime &amp; recent statistics with graphs+ extrapolation</a:t>
+            </a:r>
+          </a:p>
+          <a:p>
+            <a:r>
+              <a:rPr lang="en-GB" dirty="0"/>
+              <a:t>Update payroll</a:t>
+            </a:r>
+          </a:p>
+          <a:p>
+            <a:r>
+              <a:rPr lang="en-GB" dirty="0"/>
+              <a:t>A preliminary test before booking an appointment to get an early diagnosis</a:t>
+            </a:r>
+          </a:p>
+          <a:p>
+            <a:r>
+              <a:rPr lang="en-GB" dirty="0"/>
+              <a:t>Host/join a game</a:t>
+            </a:r>
+          </a:p>
+          <a:p>
+            <a:r>
+              <a:rPr lang="en-GB" dirty="0"/>
+              <a:t>Add friends for easier game access</a:t>
+            </a:r>
           </a:p>
         </p:txBody>
       </p:sp>
     </p:spTree>
     <p:extLst>
       <p:ext uri="{BB962C8B-B14F-4D97-AF65-F5344CB8AC3E}">
-        <p14:creationId xmlns:p14="http://schemas.microsoft.com/office/powerpoint/2010/main" val="1191071722"/>
+        <p14:creationId xmlns:p14="http://schemas.microsoft.com/office/powerpoint/2010/main" val="3128323718"/>
       </p:ext>
     </p:extLst>
   </p:cSld>
@@ -3813,7 +3829,7 @@
           <p:cNvPr id="2" name="Title 1">
             <a:extLst>
               <a:ext uri="{FF2B5EF4-FFF2-40B4-BE49-F238E27FC236}">
-                <a16:creationId xmlns:a16="http://schemas.microsoft.com/office/drawing/2014/main" id="{E978F30E-70B8-4C4B-956E-77EA0447200E}"/>
+                <a16:creationId xmlns:a16="http://schemas.microsoft.com/office/drawing/2014/main" id="{790527AB-E460-46A4-B7B4-3C1BFC1DD286}"/>
               </a:ext>
             </a:extLst>
           </p:cNvPr>
@@ -3831,7 +3847,7 @@
           <a:p>
             <a:r>
               <a:rPr lang="en-GB" dirty="0"/>
-              <a:t>Useful links crypto</a:t>
+              <a:t>Split pot calculations</a:t>
             </a:r>
           </a:p>
         </p:txBody>
@@ -3841,7 +3857,7 @@
           <p:cNvPr id="3" name="Content Placeholder 2">
             <a:extLst>
               <a:ext uri="{FF2B5EF4-FFF2-40B4-BE49-F238E27FC236}">
-                <a16:creationId xmlns:a16="http://schemas.microsoft.com/office/drawing/2014/main" id="{04CB57B1-98C8-45E2-AFC8-F27A2A0BE441}"/>
+                <a16:creationId xmlns:a16="http://schemas.microsoft.com/office/drawing/2014/main" id="{FA08A01C-A3F7-4D41-8FAD-98DF9EA7B96D}"/>
               </a:ext>
             </a:extLst>
           </p:cNvPr>
@@ -3858,41 +3874,12 @@
           <a:lstStyle/>
           <a:p>
             <a:r>
-              <a:rPr lang="en-GB" dirty="0">
-                <a:hlinkClick r:id="rId2"/>
-              </a:rPr>
-              <a:t>https://en.wikipedia.org/wiki/RSA_(cryptosystem)#Key_generation</a:t>
-            </a:r>
-            <a:endParaRPr lang="en-GB" dirty="0"/>
-          </a:p>
-          <a:p>
-            <a:r>
-              <a:rPr lang="en-GB" dirty="0">
-                <a:hlinkClick r:id="rId3"/>
-              </a:rPr>
-              <a:t>https://cryptography.io/en/latest/hazmat/primitives/asymmetric/rsa/</a:t>
-            </a:r>
-            <a:endParaRPr lang="en-GB" dirty="0"/>
-          </a:p>
-          <a:p>
-            <a:r>
-              <a:rPr lang="en-GB" dirty="0">
-                <a:hlinkClick r:id="rId4"/>
-              </a:rPr>
-              <a:t>https://cryptography.io/en/latest/hazmat/primitives/asymmetric/</a:t>
-            </a:r>
-            <a:endParaRPr lang="en-GB" dirty="0"/>
-          </a:p>
-          <a:p>
-            <a:r>
-              <a:rPr lang="en-GB" dirty="0">
-                <a:hlinkClick r:id="rId5"/>
-              </a:rPr>
-              <a:t>https://security.stackexchange.com/questions/5096/rsa-vs-dsa-for-ssh-authentication-keys</a:t>
-            </a:r>
-            <a:endParaRPr lang="en-GB" dirty="0"/>
-          </a:p>
-          <a:p>
+              <a:rPr lang="en-GB" dirty="0"/>
+              <a:t>One challenging part of the game logic will be calculating split pots</a:t>
+            </a:r>
+          </a:p>
+          <a:p>
+            <a:pPr lvl="1"/>
             <a:endParaRPr lang="en-GB" dirty="0"/>
           </a:p>
         </p:txBody>
@@ -3900,7 +3887,7 @@
     </p:spTree>
     <p:extLst>
       <p:ext uri="{BB962C8B-B14F-4D97-AF65-F5344CB8AC3E}">
-        <p14:creationId xmlns:p14="http://schemas.microsoft.com/office/powerpoint/2010/main" val="3309908080"/>
+        <p14:creationId xmlns:p14="http://schemas.microsoft.com/office/powerpoint/2010/main" val="1191071722"/>
       </p:ext>
     </p:extLst>
   </p:cSld>
@@ -3932,7 +3919,7 @@
           <p:cNvPr id="2" name="Title 1">
             <a:extLst>
               <a:ext uri="{FF2B5EF4-FFF2-40B4-BE49-F238E27FC236}">
-                <a16:creationId xmlns:a16="http://schemas.microsoft.com/office/drawing/2014/main" id="{76B61AC1-EA1A-43B0-BF64-56FF385255B4}"/>
+                <a16:creationId xmlns:a16="http://schemas.microsoft.com/office/drawing/2014/main" id="{76D7B618-33EA-4285-BC95-74EBA3A9CE4B}"/>
               </a:ext>
             </a:extLst>
           </p:cNvPr>
@@ -3950,67 +3937,82 @@
           <a:p>
             <a:r>
               <a:rPr lang="en-GB" dirty="0"/>
-              <a:t>Useful links networking</a:t>
-            </a:r>
-          </a:p>
-        </p:txBody>
-      </p:sp>
-      <p:sp>
-        <p:nvSpPr>
-          <p:cNvPr id="3" name="Content Placeholder 2">
-            <a:extLst>
-              <a:ext uri="{FF2B5EF4-FFF2-40B4-BE49-F238E27FC236}">
-                <a16:creationId xmlns:a16="http://schemas.microsoft.com/office/drawing/2014/main" id="{DD2AB15A-FBF2-4686-A1B3-E5CBB3E3ABFC}"/>
-              </a:ext>
-            </a:extLst>
-          </p:cNvPr>
-          <p:cNvSpPr>
-            <a:spLocks noGrp="1"/>
-          </p:cNvSpPr>
+              <a:t>Serialising arrays for data transfer</a:t>
+            </a:r>
+          </a:p>
+        </p:txBody>
+      </p:sp>
+      <p:pic>
+        <p:nvPicPr>
+          <p:cNvPr id="4" name="Content Placeholder 3">
+            <a:extLst>
+              <a:ext uri="{FF2B5EF4-FFF2-40B4-BE49-F238E27FC236}">
+                <a16:creationId xmlns:a16="http://schemas.microsoft.com/office/drawing/2014/main" id="{1A3286E0-E11A-4FE9-B2E3-7E8C1F2A6689}"/>
+              </a:ext>
+            </a:extLst>
+          </p:cNvPr>
+          <p:cNvPicPr>
+            <a:picLocks noGrp="1" noChangeAspect="1"/>
+          </p:cNvPicPr>
           <p:nvPr>
             <p:ph idx="1"/>
           </p:nvPr>
-        </p:nvSpPr>
-        <p:spPr/>
-        <p:txBody>
-          <a:bodyPr/>
-          <a:lstStyle/>
-          <a:p>
-            <a:r>
-              <a:rPr lang="en-GB" dirty="0">
-                <a:hlinkClick r:id="rId2"/>
-              </a:rPr>
-              <a:t>https://www.tutorialspoint.com/python/python_networking.htm</a:t>
-            </a:r>
-            <a:endParaRPr lang="en-GB" dirty="0"/>
-          </a:p>
-          <a:p>
-            <a:r>
-              <a:rPr lang="en-GB" dirty="0">
-                <a:hlinkClick r:id="rId3"/>
-              </a:rPr>
-              <a:t>https://www.w3schools.in/python-tutorial/network-programming/</a:t>
-            </a:r>
-            <a:endParaRPr lang="en-GB" dirty="0"/>
-          </a:p>
-          <a:p>
-            <a:r>
-              <a:rPr lang="en-GB" dirty="0">
-                <a:hlinkClick r:id="rId4"/>
-              </a:rPr>
-              <a:t>https://stackoverflow.com/questions/34653875/python-how-to-send-data-over-tcp</a:t>
-            </a:r>
-            <a:endParaRPr lang="en-GB" dirty="0"/>
-          </a:p>
-          <a:p>
-            <a:endParaRPr lang="en-GB" dirty="0"/>
+        </p:nvPicPr>
+        <p:blipFill>
+          <a:blip r:embed="rId2"/>
+          <a:stretch>
+            <a:fillRect/>
+          </a:stretch>
+        </p:blipFill>
+        <p:spPr>
+          <a:xfrm>
+            <a:off x="718706" y="1690688"/>
+            <a:ext cx="6182588" cy="1914792"/>
+          </a:xfrm>
+          <a:prstGeom prst="rect">
+            <a:avLst/>
+          </a:prstGeom>
+        </p:spPr>
+      </p:pic>
+      <p:sp>
+        <p:nvSpPr>
+          <p:cNvPr id="5" name="TextBox 4">
+            <a:extLst>
+              <a:ext uri="{FF2B5EF4-FFF2-40B4-BE49-F238E27FC236}">
+                <a16:creationId xmlns:a16="http://schemas.microsoft.com/office/drawing/2014/main" id="{BC3B7363-8C1F-46B9-814C-93393E0B8081}"/>
+              </a:ext>
+            </a:extLst>
+          </p:cNvPr>
+          <p:cNvSpPr txBox="1"/>
+          <p:nvPr/>
+        </p:nvSpPr>
+        <p:spPr>
+          <a:xfrm>
+            <a:off x="7458075" y="1690688"/>
+            <a:ext cx="4371975" cy="1754326"/>
+          </a:xfrm>
+          <a:prstGeom prst="rect">
+            <a:avLst/>
+          </a:prstGeom>
+          <a:noFill/>
+        </p:spPr>
+        <p:txBody>
+          <a:bodyPr wrap="square" rtlCol="0">
+            <a:spAutoFit/>
+          </a:bodyPr>
+          <a:lstStyle/>
+          <a:p>
+            <a:r>
+              <a:rPr lang="en-GB" dirty="0"/>
+              <a:t>When attempting to send database tables across the network as python lists, I ran into a problem where I couldn’t encode the array to send it via socket. To fix this I will need to use some form of serialisation, this meant I needed to decide between pickle and json</a:t>
+            </a:r>
           </a:p>
         </p:txBody>
       </p:sp>
     </p:spTree>
     <p:extLst>
       <p:ext uri="{BB962C8B-B14F-4D97-AF65-F5344CB8AC3E}">
-        <p14:creationId xmlns:p14="http://schemas.microsoft.com/office/powerpoint/2010/main" val="4186440119"/>
+        <p14:creationId xmlns:p14="http://schemas.microsoft.com/office/powerpoint/2010/main" val="1795613777"/>
       </p:ext>
     </p:extLst>
   </p:cSld>
@@ -4039,10 +4041,10 @@
       </p:grpSpPr>
       <p:sp>
         <p:nvSpPr>
-          <p:cNvPr id="2" name="Title 1">
-            <a:extLst>
-              <a:ext uri="{FF2B5EF4-FFF2-40B4-BE49-F238E27FC236}">
-                <a16:creationId xmlns:a16="http://schemas.microsoft.com/office/drawing/2014/main" id="{103886FA-BC70-43F1-8492-3D2BD6D73654}"/>
+          <p:cNvPr id="4" name="Title 3">
+            <a:extLst>
+              <a:ext uri="{FF2B5EF4-FFF2-40B4-BE49-F238E27FC236}">
+                <a16:creationId xmlns:a16="http://schemas.microsoft.com/office/drawing/2014/main" id="{9A0C13EF-555C-49BA-8A54-6EF26B900BA7}"/>
               </a:ext>
             </a:extLst>
           </p:cNvPr>
@@ -4060,56 +4062,247 @@
           <a:p>
             <a:r>
               <a:rPr lang="en-GB" dirty="0"/>
-              <a:t>notes</a:t>
-            </a:r>
-          </a:p>
-        </p:txBody>
-      </p:sp>
-      <p:sp>
-        <p:nvSpPr>
-          <p:cNvPr id="3" name="Content Placeholder 2">
-            <a:extLst>
-              <a:ext uri="{FF2B5EF4-FFF2-40B4-BE49-F238E27FC236}">
-                <a16:creationId xmlns:a16="http://schemas.microsoft.com/office/drawing/2014/main" id="{5A02EDD2-E34D-4469-BDA7-CE646653E7DE}"/>
-              </a:ext>
-            </a:extLst>
-          </p:cNvPr>
-          <p:cNvSpPr>
-            <a:spLocks noGrp="1"/>
-          </p:cNvSpPr>
-          <p:nvPr>
-            <p:ph idx="1"/>
-          </p:nvPr>
-        </p:nvSpPr>
-        <p:spPr/>
-        <p:txBody>
-          <a:bodyPr/>
-          <a:lstStyle/>
-          <a:p>
+              <a:t>Serialisation comparison</a:t>
+            </a:r>
+          </a:p>
+        </p:txBody>
+      </p:sp>
+      <p:sp>
+        <p:nvSpPr>
+          <p:cNvPr id="5" name="Text Placeholder 4">
+            <a:extLst>
+              <a:ext uri="{FF2B5EF4-FFF2-40B4-BE49-F238E27FC236}">
+                <a16:creationId xmlns:a16="http://schemas.microsoft.com/office/drawing/2014/main" id="{212CED7E-A6E7-4335-BA7C-50C64F0157BE}"/>
+              </a:ext>
+            </a:extLst>
+          </p:cNvPr>
+          <p:cNvSpPr>
+            <a:spLocks noGrp="1"/>
+          </p:cNvSpPr>
+          <p:nvPr>
+            <p:ph type="body" idx="1"/>
+          </p:nvPr>
+        </p:nvSpPr>
+        <p:spPr>
+          <a:xfrm>
+            <a:off x="836612" y="1223486"/>
+            <a:ext cx="5157787" cy="823912"/>
+          </a:xfrm>
+        </p:spPr>
+        <p:txBody>
+          <a:bodyPr/>
+          <a:lstStyle/>
+          <a:p>
+            <a:r>
+              <a:rPr lang="en-GB" dirty="0"/>
+              <a:t>JSON</a:t>
+            </a:r>
+          </a:p>
+        </p:txBody>
+      </p:sp>
+      <p:sp>
+        <p:nvSpPr>
+          <p:cNvPr id="6" name="Content Placeholder 5">
+            <a:extLst>
+              <a:ext uri="{FF2B5EF4-FFF2-40B4-BE49-F238E27FC236}">
+                <a16:creationId xmlns:a16="http://schemas.microsoft.com/office/drawing/2014/main" id="{611325CE-52BE-4D7F-A26F-8F7FB9C3FF44}"/>
+              </a:ext>
+            </a:extLst>
+          </p:cNvPr>
+          <p:cNvSpPr>
+            <a:spLocks noGrp="1"/>
+          </p:cNvSpPr>
+          <p:nvPr>
+            <p:ph sz="half" idx="2"/>
+          </p:nvPr>
+        </p:nvSpPr>
+        <p:spPr>
+          <a:xfrm>
+            <a:off x="836612" y="2109310"/>
+            <a:ext cx="5157787" cy="3662840"/>
+          </a:xfrm>
+        </p:spPr>
+        <p:txBody>
+          <a:bodyPr>
+            <a:normAutofit fontScale="77500" lnSpcReduction="20000"/>
+          </a:bodyPr>
+          <a:lstStyle/>
+          <a:p>
+            <a:r>
+              <a:rPr lang="en-GB" dirty="0"/>
+              <a:t>Human readable</a:t>
+            </a:r>
+          </a:p>
+          <a:p>
+            <a:r>
+              <a:rPr lang="en-GB" dirty="0"/>
+              <a:t>Cross language, don’t plan on using multiple</a:t>
+            </a:r>
+          </a:p>
+          <a:p>
+            <a:r>
+              <a:rPr lang="en-GB" dirty="0"/>
+              <a:t>Industry standard, better documented and supported</a:t>
+            </a:r>
+          </a:p>
+          <a:p>
+            <a:r>
+              <a:rPr lang="en-GB" dirty="0"/>
+              <a:t>Much more safe, as I’m passing </a:t>
+            </a:r>
             <a:r>
               <a:rPr lang="en-GB" dirty="0" err="1"/>
               <a:t>ip</a:t>
             </a:r>
             <a:r>
               <a:rPr lang="en-GB" dirty="0"/>
-              <a:t> is allocated to username for 24 hours or until the account is logged out of,</a:t>
-            </a:r>
-          </a:p>
-          <a:p>
-            <a:r>
-              <a:rPr lang="en-GB" dirty="0"/>
-              <a:t>Classes = UI, client, manager</a:t>
+              <a:t> addresses etc may be an advantage</a:t>
+            </a:r>
+          </a:p>
+          <a:p>
+            <a:r>
+              <a:rPr lang="en-GB" dirty="0"/>
+              <a:t>Cant deal with tuples etc and makes non string keys in dictionaries into strings, this causes issues with my mainloop.py using integer keys on a dictionary</a:t>
             </a:r>
           </a:p>
           <a:p>
             <a:endParaRPr lang="en-GB" dirty="0"/>
+          </a:p>
+        </p:txBody>
+      </p:sp>
+      <p:sp>
+        <p:nvSpPr>
+          <p:cNvPr id="7" name="Text Placeholder 6">
+            <a:extLst>
+              <a:ext uri="{FF2B5EF4-FFF2-40B4-BE49-F238E27FC236}">
+                <a16:creationId xmlns:a16="http://schemas.microsoft.com/office/drawing/2014/main" id="{DC1B5B73-6C08-4506-BB0E-0EBC69919EB2}"/>
+              </a:ext>
+            </a:extLst>
+          </p:cNvPr>
+          <p:cNvSpPr>
+            <a:spLocks noGrp="1"/>
+          </p:cNvSpPr>
+          <p:nvPr>
+            <p:ph type="body" sz="quarter" idx="3"/>
+          </p:nvPr>
+        </p:nvSpPr>
+        <p:spPr>
+          <a:xfrm>
+            <a:off x="6169024" y="1223486"/>
+            <a:ext cx="5183188" cy="823912"/>
+          </a:xfrm>
+        </p:spPr>
+        <p:txBody>
+          <a:bodyPr/>
+          <a:lstStyle/>
+          <a:p>
+            <a:r>
+              <a:rPr lang="en-GB" dirty="0"/>
+              <a:t>Pickle</a:t>
+            </a:r>
+          </a:p>
+        </p:txBody>
+      </p:sp>
+      <p:sp>
+        <p:nvSpPr>
+          <p:cNvPr id="8" name="Content Placeholder 7">
+            <a:extLst>
+              <a:ext uri="{FF2B5EF4-FFF2-40B4-BE49-F238E27FC236}">
+                <a16:creationId xmlns:a16="http://schemas.microsoft.com/office/drawing/2014/main" id="{A01C3724-C00E-4D83-8E7C-E0A80D306A2E}"/>
+              </a:ext>
+            </a:extLst>
+          </p:cNvPr>
+          <p:cNvSpPr>
+            <a:spLocks noGrp="1"/>
+          </p:cNvSpPr>
+          <p:nvPr>
+            <p:ph sz="quarter" idx="4"/>
+          </p:nvPr>
+        </p:nvSpPr>
+        <p:spPr>
+          <a:xfrm>
+            <a:off x="6169024" y="2047398"/>
+            <a:ext cx="5183188" cy="3209925"/>
+          </a:xfrm>
+        </p:spPr>
+        <p:txBody>
+          <a:bodyPr>
+            <a:normAutofit fontScale="77500" lnSpcReduction="20000"/>
+          </a:bodyPr>
+          <a:lstStyle/>
+          <a:p>
+            <a:r>
+              <a:rPr lang="en-GB" dirty="0"/>
+              <a:t>Faster</a:t>
+            </a:r>
+          </a:p>
+          <a:p>
+            <a:r>
+              <a:rPr lang="en-GB" dirty="0"/>
+              <a:t>Can send classes etc which may be useful later down the line to have more flexibility don’t want to import this and json</a:t>
+            </a:r>
+          </a:p>
+          <a:p>
+            <a:r>
+              <a:rPr lang="en-GB" dirty="0"/>
+              <a:t>Allows for data serialization of more data types and better support for pythonic use cases</a:t>
+            </a:r>
+          </a:p>
+          <a:p>
+            <a:r>
+              <a:rPr lang="en-GB" dirty="0"/>
+              <a:t>Could be faster using </a:t>
+            </a:r>
+            <a:r>
+              <a:rPr lang="en-GB" dirty="0" err="1"/>
+              <a:t>cpickle</a:t>
+            </a:r>
+            <a:r>
+              <a:rPr lang="en-GB" dirty="0"/>
+              <a:t> but this is not supported in python 3.x yet</a:t>
+            </a:r>
+          </a:p>
+        </p:txBody>
+      </p:sp>
+      <p:sp>
+        <p:nvSpPr>
+          <p:cNvPr id="2" name="TextBox 1">
+            <a:extLst>
+              <a:ext uri="{FF2B5EF4-FFF2-40B4-BE49-F238E27FC236}">
+                <a16:creationId xmlns:a16="http://schemas.microsoft.com/office/drawing/2014/main" id="{A12778BE-AF43-4579-82D8-5CB2F5D50C53}"/>
+              </a:ext>
+            </a:extLst>
+          </p:cNvPr>
+          <p:cNvSpPr txBox="1"/>
+          <p:nvPr/>
+        </p:nvSpPr>
+        <p:spPr>
+          <a:xfrm>
+            <a:off x="700881" y="5538768"/>
+            <a:ext cx="10790237" cy="954107"/>
+          </a:xfrm>
+          <a:prstGeom prst="rect">
+            <a:avLst/>
+          </a:prstGeom>
+          <a:noFill/>
+        </p:spPr>
+        <p:txBody>
+          <a:bodyPr wrap="square" rtlCol="0">
+            <a:spAutoFit/>
+          </a:bodyPr>
+          <a:lstStyle/>
+          <a:p>
+            <a:r>
+              <a:rPr lang="en-GB" sz="2800" dirty="0"/>
+              <a:t>Due to the issues with json and the python specific design of pickle I have decided to use pickle.</a:t>
+            </a:r>
           </a:p>
         </p:txBody>
       </p:sp>
     </p:spTree>
     <p:extLst>
       <p:ext uri="{BB962C8B-B14F-4D97-AF65-F5344CB8AC3E}">
-        <p14:creationId xmlns:p14="http://schemas.microsoft.com/office/powerpoint/2010/main" val="2517001702"/>
+        <p14:creationId xmlns:p14="http://schemas.microsoft.com/office/powerpoint/2010/main" val="743699574"/>
       </p:ext>
     </p:extLst>
   </p:cSld>
@@ -4141,6 +4334,334 @@
           <p:cNvPr id="2" name="Title 1">
             <a:extLst>
               <a:ext uri="{FF2B5EF4-FFF2-40B4-BE49-F238E27FC236}">
+                <a16:creationId xmlns:a16="http://schemas.microsoft.com/office/drawing/2014/main" id="{E978F30E-70B8-4C4B-956E-77EA0447200E}"/>
+              </a:ext>
+            </a:extLst>
+          </p:cNvPr>
+          <p:cNvSpPr>
+            <a:spLocks noGrp="1"/>
+          </p:cNvSpPr>
+          <p:nvPr>
+            <p:ph type="title"/>
+          </p:nvPr>
+        </p:nvSpPr>
+        <p:spPr/>
+        <p:txBody>
+          <a:bodyPr/>
+          <a:lstStyle/>
+          <a:p>
+            <a:r>
+              <a:rPr lang="en-GB" dirty="0"/>
+              <a:t>Useful links crypto</a:t>
+            </a:r>
+          </a:p>
+        </p:txBody>
+      </p:sp>
+      <p:sp>
+        <p:nvSpPr>
+          <p:cNvPr id="3" name="Content Placeholder 2">
+            <a:extLst>
+              <a:ext uri="{FF2B5EF4-FFF2-40B4-BE49-F238E27FC236}">
+                <a16:creationId xmlns:a16="http://schemas.microsoft.com/office/drawing/2014/main" id="{04CB57B1-98C8-45E2-AFC8-F27A2A0BE441}"/>
+              </a:ext>
+            </a:extLst>
+          </p:cNvPr>
+          <p:cNvSpPr>
+            <a:spLocks noGrp="1"/>
+          </p:cNvSpPr>
+          <p:nvPr>
+            <p:ph idx="1"/>
+          </p:nvPr>
+        </p:nvSpPr>
+        <p:spPr/>
+        <p:txBody>
+          <a:bodyPr/>
+          <a:lstStyle/>
+          <a:p>
+            <a:r>
+              <a:rPr lang="en-GB" dirty="0">
+                <a:hlinkClick r:id="rId2"/>
+              </a:rPr>
+              <a:t>https://en.wikipedia.org/wiki/RSA_(cryptosystem)#Key_generation</a:t>
+            </a:r>
+            <a:endParaRPr lang="en-GB" dirty="0"/>
+          </a:p>
+          <a:p>
+            <a:r>
+              <a:rPr lang="en-GB" dirty="0">
+                <a:hlinkClick r:id="rId3"/>
+              </a:rPr>
+              <a:t>https://cryptography.io/en/latest/hazmat/primitives/asymmetric/rsa/</a:t>
+            </a:r>
+            <a:endParaRPr lang="en-GB" dirty="0"/>
+          </a:p>
+          <a:p>
+            <a:r>
+              <a:rPr lang="en-GB" dirty="0">
+                <a:hlinkClick r:id="rId4"/>
+              </a:rPr>
+              <a:t>https://cryptography.io/en/latest/hazmat/primitives/asymmetric/</a:t>
+            </a:r>
+            <a:endParaRPr lang="en-GB" dirty="0"/>
+          </a:p>
+          <a:p>
+            <a:r>
+              <a:rPr lang="en-GB" dirty="0">
+                <a:hlinkClick r:id="rId5"/>
+              </a:rPr>
+              <a:t>https://security.stackexchange.com/questions/5096/rsa-vs-dsa-for-ssh-authentication-keys</a:t>
+            </a:r>
+            <a:endParaRPr lang="en-GB" dirty="0"/>
+          </a:p>
+          <a:p>
+            <a:endParaRPr lang="en-GB" dirty="0"/>
+          </a:p>
+        </p:txBody>
+      </p:sp>
+    </p:spTree>
+    <p:extLst>
+      <p:ext uri="{BB962C8B-B14F-4D97-AF65-F5344CB8AC3E}">
+        <p14:creationId xmlns:p14="http://schemas.microsoft.com/office/powerpoint/2010/main" val="3309908080"/>
+      </p:ext>
+    </p:extLst>
+  </p:cSld>
+  <p:clrMapOvr>
+    <a:masterClrMapping/>
+  </p:clrMapOvr>
+</p:sld>
+</file>
+
+<file path=ppt/slides/slide17.xml><?xml version="1.0" encoding="utf-8"?>
+<p:sld xmlns:a="http://schemas.openxmlformats.org/drawingml/2006/main" xmlns:r="http://schemas.openxmlformats.org/officeDocument/2006/relationships" xmlns:p="http://schemas.openxmlformats.org/presentationml/2006/main">
+  <p:cSld>
+    <p:spTree>
+      <p:nvGrpSpPr>
+        <p:cNvPr id="1" name=""/>
+        <p:cNvGrpSpPr/>
+        <p:nvPr/>
+      </p:nvGrpSpPr>
+      <p:grpSpPr>
+        <a:xfrm>
+          <a:off x="0" y="0"/>
+          <a:ext cx="0" cy="0"/>
+          <a:chOff x="0" y="0"/>
+          <a:chExt cx="0" cy="0"/>
+        </a:xfrm>
+      </p:grpSpPr>
+      <p:sp>
+        <p:nvSpPr>
+          <p:cNvPr id="2" name="Title 1">
+            <a:extLst>
+              <a:ext uri="{FF2B5EF4-FFF2-40B4-BE49-F238E27FC236}">
+                <a16:creationId xmlns:a16="http://schemas.microsoft.com/office/drawing/2014/main" id="{76B61AC1-EA1A-43B0-BF64-56FF385255B4}"/>
+              </a:ext>
+            </a:extLst>
+          </p:cNvPr>
+          <p:cNvSpPr>
+            <a:spLocks noGrp="1"/>
+          </p:cNvSpPr>
+          <p:nvPr>
+            <p:ph type="title"/>
+          </p:nvPr>
+        </p:nvSpPr>
+        <p:spPr/>
+        <p:txBody>
+          <a:bodyPr/>
+          <a:lstStyle/>
+          <a:p>
+            <a:r>
+              <a:rPr lang="en-GB" dirty="0"/>
+              <a:t>Useful links networking</a:t>
+            </a:r>
+          </a:p>
+        </p:txBody>
+      </p:sp>
+      <p:sp>
+        <p:nvSpPr>
+          <p:cNvPr id="3" name="Content Placeholder 2">
+            <a:extLst>
+              <a:ext uri="{FF2B5EF4-FFF2-40B4-BE49-F238E27FC236}">
+                <a16:creationId xmlns:a16="http://schemas.microsoft.com/office/drawing/2014/main" id="{DD2AB15A-FBF2-4686-A1B3-E5CBB3E3ABFC}"/>
+              </a:ext>
+            </a:extLst>
+          </p:cNvPr>
+          <p:cNvSpPr>
+            <a:spLocks noGrp="1"/>
+          </p:cNvSpPr>
+          <p:nvPr>
+            <p:ph idx="1"/>
+          </p:nvPr>
+        </p:nvSpPr>
+        <p:spPr/>
+        <p:txBody>
+          <a:bodyPr/>
+          <a:lstStyle/>
+          <a:p>
+            <a:r>
+              <a:rPr lang="en-GB" dirty="0">
+                <a:hlinkClick r:id="rId2"/>
+              </a:rPr>
+              <a:t>https://www.tutorialspoint.com/python/python_networking.htm</a:t>
+            </a:r>
+            <a:endParaRPr lang="en-GB" dirty="0"/>
+          </a:p>
+          <a:p>
+            <a:r>
+              <a:rPr lang="en-GB" dirty="0">
+                <a:hlinkClick r:id="rId3"/>
+              </a:rPr>
+              <a:t>https://www.w3schools.in/python-tutorial/network-programming/</a:t>
+            </a:r>
+            <a:endParaRPr lang="en-GB" dirty="0"/>
+          </a:p>
+          <a:p>
+            <a:r>
+              <a:rPr lang="en-GB" dirty="0">
+                <a:hlinkClick r:id="rId4"/>
+              </a:rPr>
+              <a:t>https://stackoverflow.com/questions/34653875/python-how-to-send-data-over-tcp</a:t>
+            </a:r>
+            <a:endParaRPr lang="en-GB" dirty="0"/>
+          </a:p>
+          <a:p>
+            <a:endParaRPr lang="en-GB" dirty="0"/>
+          </a:p>
+        </p:txBody>
+      </p:sp>
+    </p:spTree>
+    <p:extLst>
+      <p:ext uri="{BB962C8B-B14F-4D97-AF65-F5344CB8AC3E}">
+        <p14:creationId xmlns:p14="http://schemas.microsoft.com/office/powerpoint/2010/main" val="4186440119"/>
+      </p:ext>
+    </p:extLst>
+  </p:cSld>
+  <p:clrMapOvr>
+    <a:masterClrMapping/>
+  </p:clrMapOvr>
+</p:sld>
+</file>
+
+<file path=ppt/slides/slide18.xml><?xml version="1.0" encoding="utf-8"?>
+<p:sld xmlns:a="http://schemas.openxmlformats.org/drawingml/2006/main" xmlns:r="http://schemas.openxmlformats.org/officeDocument/2006/relationships" xmlns:p="http://schemas.openxmlformats.org/presentationml/2006/main">
+  <p:cSld>
+    <p:spTree>
+      <p:nvGrpSpPr>
+        <p:cNvPr id="1" name=""/>
+        <p:cNvGrpSpPr/>
+        <p:nvPr/>
+      </p:nvGrpSpPr>
+      <p:grpSpPr>
+        <a:xfrm>
+          <a:off x="0" y="0"/>
+          <a:ext cx="0" cy="0"/>
+          <a:chOff x="0" y="0"/>
+          <a:chExt cx="0" cy="0"/>
+        </a:xfrm>
+      </p:grpSpPr>
+      <p:sp>
+        <p:nvSpPr>
+          <p:cNvPr id="2" name="Title 1">
+            <a:extLst>
+              <a:ext uri="{FF2B5EF4-FFF2-40B4-BE49-F238E27FC236}">
+                <a16:creationId xmlns:a16="http://schemas.microsoft.com/office/drawing/2014/main" id="{103886FA-BC70-43F1-8492-3D2BD6D73654}"/>
+              </a:ext>
+            </a:extLst>
+          </p:cNvPr>
+          <p:cNvSpPr>
+            <a:spLocks noGrp="1"/>
+          </p:cNvSpPr>
+          <p:nvPr>
+            <p:ph type="title"/>
+          </p:nvPr>
+        </p:nvSpPr>
+        <p:spPr/>
+        <p:txBody>
+          <a:bodyPr/>
+          <a:lstStyle/>
+          <a:p>
+            <a:r>
+              <a:rPr lang="en-GB" dirty="0"/>
+              <a:t>notes</a:t>
+            </a:r>
+          </a:p>
+        </p:txBody>
+      </p:sp>
+      <p:sp>
+        <p:nvSpPr>
+          <p:cNvPr id="3" name="Content Placeholder 2">
+            <a:extLst>
+              <a:ext uri="{FF2B5EF4-FFF2-40B4-BE49-F238E27FC236}">
+                <a16:creationId xmlns:a16="http://schemas.microsoft.com/office/drawing/2014/main" id="{5A02EDD2-E34D-4469-BDA7-CE646653E7DE}"/>
+              </a:ext>
+            </a:extLst>
+          </p:cNvPr>
+          <p:cNvSpPr>
+            <a:spLocks noGrp="1"/>
+          </p:cNvSpPr>
+          <p:nvPr>
+            <p:ph idx="1"/>
+          </p:nvPr>
+        </p:nvSpPr>
+        <p:spPr/>
+        <p:txBody>
+          <a:bodyPr/>
+          <a:lstStyle/>
+          <a:p>
+            <a:r>
+              <a:rPr lang="en-GB" dirty="0" err="1"/>
+              <a:t>ip</a:t>
+            </a:r>
+            <a:r>
+              <a:rPr lang="en-GB" dirty="0"/>
+              <a:t> is allocated to username for 24 hours or until the account is logged out of,</a:t>
+            </a:r>
+          </a:p>
+          <a:p>
+            <a:r>
+              <a:rPr lang="en-GB" dirty="0"/>
+              <a:t>Classes = UI, client, manager</a:t>
+            </a:r>
+          </a:p>
+          <a:p>
+            <a:endParaRPr lang="en-GB" dirty="0"/>
+          </a:p>
+        </p:txBody>
+      </p:sp>
+    </p:spTree>
+    <p:extLst>
+      <p:ext uri="{BB962C8B-B14F-4D97-AF65-F5344CB8AC3E}">
+        <p14:creationId xmlns:p14="http://schemas.microsoft.com/office/powerpoint/2010/main" val="2517001702"/>
+      </p:ext>
+    </p:extLst>
+  </p:cSld>
+  <p:clrMapOvr>
+    <a:masterClrMapping/>
+  </p:clrMapOvr>
+</p:sld>
+</file>
+
+<file path=ppt/slides/slide19.xml><?xml version="1.0" encoding="utf-8"?>
+<p:sld xmlns:a="http://schemas.openxmlformats.org/drawingml/2006/main" xmlns:r="http://schemas.openxmlformats.org/officeDocument/2006/relationships" xmlns:p="http://schemas.openxmlformats.org/presentationml/2006/main">
+  <p:cSld>
+    <p:spTree>
+      <p:nvGrpSpPr>
+        <p:cNvPr id="1" name=""/>
+        <p:cNvGrpSpPr/>
+        <p:nvPr/>
+      </p:nvGrpSpPr>
+      <p:grpSpPr>
+        <a:xfrm>
+          <a:off x="0" y="0"/>
+          <a:ext cx="0" cy="0"/>
+          <a:chOff x="0" y="0"/>
+          <a:chExt cx="0" cy="0"/>
+        </a:xfrm>
+      </p:grpSpPr>
+      <p:sp>
+        <p:nvSpPr>
+          <p:cNvPr id="2" name="Title 1">
+            <a:extLst>
+              <a:ext uri="{FF2B5EF4-FFF2-40B4-BE49-F238E27FC236}">
                 <a16:creationId xmlns:a16="http://schemas.microsoft.com/office/drawing/2014/main" id="{376C1C6D-BF07-4179-85B6-5EE59A4476C2}"/>
               </a:ext>
             </a:extLst>
@@ -4221,7 +4742,93 @@
 </p:sld>
 </file>
 
-<file path=ppt/slides/slide17.xml><?xml version="1.0" encoding="utf-8"?>
+<file path=ppt/slides/slide2.xml><?xml version="1.0" encoding="utf-8"?>
+<p:sld xmlns:a="http://schemas.openxmlformats.org/drawingml/2006/main" xmlns:r="http://schemas.openxmlformats.org/officeDocument/2006/relationships" xmlns:p="http://schemas.openxmlformats.org/presentationml/2006/main">
+  <p:cSld>
+    <p:spTree>
+      <p:nvGrpSpPr>
+        <p:cNvPr id="1" name=""/>
+        <p:cNvGrpSpPr/>
+        <p:nvPr/>
+      </p:nvGrpSpPr>
+      <p:grpSpPr>
+        <a:xfrm>
+          <a:off x="0" y="0"/>
+          <a:ext cx="0" cy="0"/>
+          <a:chOff x="0" y="0"/>
+          <a:chExt cx="0" cy="0"/>
+        </a:xfrm>
+      </p:grpSpPr>
+      <p:sp>
+        <p:nvSpPr>
+          <p:cNvPr id="2" name="Title 1">
+            <a:extLst>
+              <a:ext uri="{FF2B5EF4-FFF2-40B4-BE49-F238E27FC236}">
+                <a16:creationId xmlns:a16="http://schemas.microsoft.com/office/drawing/2014/main" id="{F722E029-FB26-4478-BC57-0DEA092F4981}"/>
+              </a:ext>
+            </a:extLst>
+          </p:cNvPr>
+          <p:cNvSpPr>
+            <a:spLocks noGrp="1"/>
+          </p:cNvSpPr>
+          <p:nvPr>
+            <p:ph type="title"/>
+          </p:nvPr>
+        </p:nvSpPr>
+        <p:spPr/>
+        <p:txBody>
+          <a:bodyPr/>
+          <a:lstStyle/>
+          <a:p>
+            <a:r>
+              <a:rPr lang="en-GB" dirty="0"/>
+              <a:t>Project explanation</a:t>
+            </a:r>
+          </a:p>
+        </p:txBody>
+      </p:sp>
+      <p:sp>
+        <p:nvSpPr>
+          <p:cNvPr id="3" name="Content Placeholder 2">
+            <a:extLst>
+              <a:ext uri="{FF2B5EF4-FFF2-40B4-BE49-F238E27FC236}">
+                <a16:creationId xmlns:a16="http://schemas.microsoft.com/office/drawing/2014/main" id="{5CCFD396-2721-40AC-A346-4BF9FCCB1A48}"/>
+              </a:ext>
+            </a:extLst>
+          </p:cNvPr>
+          <p:cNvSpPr>
+            <a:spLocks noGrp="1"/>
+          </p:cNvSpPr>
+          <p:nvPr>
+            <p:ph idx="1"/>
+          </p:nvPr>
+        </p:nvSpPr>
+        <p:spPr/>
+        <p:txBody>
+          <a:bodyPr/>
+          <a:lstStyle/>
+          <a:p>
+            <a:r>
+              <a:rPr lang="en-GB" dirty="0"/>
+              <a:t>A booking management system with network access and separate client/owner environments</a:t>
+            </a:r>
+          </a:p>
+        </p:txBody>
+      </p:sp>
+    </p:spTree>
+    <p:extLst>
+      <p:ext uri="{BB962C8B-B14F-4D97-AF65-F5344CB8AC3E}">
+        <p14:creationId xmlns:p14="http://schemas.microsoft.com/office/powerpoint/2010/main" val="3066858734"/>
+      </p:ext>
+    </p:extLst>
+  </p:cSld>
+  <p:clrMapOvr>
+    <a:masterClrMapping/>
+  </p:clrMapOvr>
+</p:sld>
+</file>
+
+<file path=ppt/slides/slide20.xml><?xml version="1.0" encoding="utf-8"?>
 <p:sld xmlns:a="http://schemas.openxmlformats.org/drawingml/2006/main" xmlns:r="http://schemas.openxmlformats.org/officeDocument/2006/relationships" xmlns:p="http://schemas.openxmlformats.org/presentationml/2006/main">
   <p:cSld>
     <p:spTree>
@@ -4600,7 +5207,7 @@
 </p:sld>
 </file>
 
-<file path=ppt/slides/slide18.xml><?xml version="1.0" encoding="utf-8"?>
+<file path=ppt/slides/slide21.xml><?xml version="1.0" encoding="utf-8"?>
 <p:sld xmlns:a="http://schemas.openxmlformats.org/drawingml/2006/main" xmlns:r="http://schemas.openxmlformats.org/officeDocument/2006/relationships" xmlns:p="http://schemas.openxmlformats.org/presentationml/2006/main">
   <p:cSld>
     <p:spTree>
@@ -4778,7 +5385,7 @@
 </p:sld>
 </file>
 
-<file path=ppt/slides/slide19.xml><?xml version="1.0" encoding="utf-8"?>
+<file path=ppt/slides/slide22.xml><?xml version="1.0" encoding="utf-8"?>
 <p:sld xmlns:a="http://schemas.openxmlformats.org/drawingml/2006/main" xmlns:r="http://schemas.openxmlformats.org/officeDocument/2006/relationships" xmlns:p="http://schemas.openxmlformats.org/presentationml/2006/main">
   <p:cSld>
     <p:bg>
@@ -5038,93 +5645,7 @@
 </p:sld>
 </file>
 
-<file path=ppt/slides/slide2.xml><?xml version="1.0" encoding="utf-8"?>
-<p:sld xmlns:a="http://schemas.openxmlformats.org/drawingml/2006/main" xmlns:r="http://schemas.openxmlformats.org/officeDocument/2006/relationships" xmlns:p="http://schemas.openxmlformats.org/presentationml/2006/main">
-  <p:cSld>
-    <p:spTree>
-      <p:nvGrpSpPr>
-        <p:cNvPr id="1" name=""/>
-        <p:cNvGrpSpPr/>
-        <p:nvPr/>
-      </p:nvGrpSpPr>
-      <p:grpSpPr>
-        <a:xfrm>
-          <a:off x="0" y="0"/>
-          <a:ext cx="0" cy="0"/>
-          <a:chOff x="0" y="0"/>
-          <a:chExt cx="0" cy="0"/>
-        </a:xfrm>
-      </p:grpSpPr>
-      <p:sp>
-        <p:nvSpPr>
-          <p:cNvPr id="2" name="Title 1">
-            <a:extLst>
-              <a:ext uri="{FF2B5EF4-FFF2-40B4-BE49-F238E27FC236}">
-                <a16:creationId xmlns:a16="http://schemas.microsoft.com/office/drawing/2014/main" id="{F722E029-FB26-4478-BC57-0DEA092F4981}"/>
-              </a:ext>
-            </a:extLst>
-          </p:cNvPr>
-          <p:cNvSpPr>
-            <a:spLocks noGrp="1"/>
-          </p:cNvSpPr>
-          <p:nvPr>
-            <p:ph type="title"/>
-          </p:nvPr>
-        </p:nvSpPr>
-        <p:spPr/>
-        <p:txBody>
-          <a:bodyPr/>
-          <a:lstStyle/>
-          <a:p>
-            <a:r>
-              <a:rPr lang="en-GB" dirty="0"/>
-              <a:t>Project explanation</a:t>
-            </a:r>
-          </a:p>
-        </p:txBody>
-      </p:sp>
-      <p:sp>
-        <p:nvSpPr>
-          <p:cNvPr id="3" name="Content Placeholder 2">
-            <a:extLst>
-              <a:ext uri="{FF2B5EF4-FFF2-40B4-BE49-F238E27FC236}">
-                <a16:creationId xmlns:a16="http://schemas.microsoft.com/office/drawing/2014/main" id="{5CCFD396-2721-40AC-A346-4BF9FCCB1A48}"/>
-              </a:ext>
-            </a:extLst>
-          </p:cNvPr>
-          <p:cNvSpPr>
-            <a:spLocks noGrp="1"/>
-          </p:cNvSpPr>
-          <p:nvPr>
-            <p:ph idx="1"/>
-          </p:nvPr>
-        </p:nvSpPr>
-        <p:spPr/>
-        <p:txBody>
-          <a:bodyPr/>
-          <a:lstStyle/>
-          <a:p>
-            <a:r>
-              <a:rPr lang="en-GB" dirty="0"/>
-              <a:t>A booking management system with network access and separate client/owner environments</a:t>
-            </a:r>
-          </a:p>
-        </p:txBody>
-      </p:sp>
-    </p:spTree>
-    <p:extLst>
-      <p:ext uri="{BB962C8B-B14F-4D97-AF65-F5344CB8AC3E}">
-        <p14:creationId xmlns:p14="http://schemas.microsoft.com/office/powerpoint/2010/main" val="3066858734"/>
-      </p:ext>
-    </p:extLst>
-  </p:cSld>
-  <p:clrMapOvr>
-    <a:masterClrMapping/>
-  </p:clrMapOvr>
-</p:sld>
-</file>
-
-<file path=ppt/slides/slide20.xml><?xml version="1.0" encoding="utf-8"?>
+<file path=ppt/slides/slide23.xml><?xml version="1.0" encoding="utf-8"?>
 <p:sld xmlns:a="http://schemas.openxmlformats.org/drawingml/2006/main" xmlns:r="http://schemas.openxmlformats.org/officeDocument/2006/relationships" xmlns:p="http://schemas.openxmlformats.org/presentationml/2006/main">
   <p:cSld>
     <p:spTree>
@@ -5244,7 +5765,7 @@
 </p:sld>
 </file>
 
-<file path=ppt/slides/slide21.xml><?xml version="1.0" encoding="utf-8"?>
+<file path=ppt/slides/slide24.xml><?xml version="1.0" encoding="utf-8"?>
 <p:sld xmlns:a="http://schemas.openxmlformats.org/drawingml/2006/main" xmlns:r="http://schemas.openxmlformats.org/officeDocument/2006/relationships" xmlns:p="http://schemas.openxmlformats.org/presentationml/2006/main">
   <p:cSld>
     <p:spTree>
@@ -5424,7 +5945,7 @@
 </p:sld>
 </file>
 
-<file path=ppt/slides/slide22.xml><?xml version="1.0" encoding="utf-8"?>
+<file path=ppt/slides/slide25.xml><?xml version="1.0" encoding="utf-8"?>
 <p:sld xmlns:a="http://schemas.openxmlformats.org/drawingml/2006/main" xmlns:r="http://schemas.openxmlformats.org/officeDocument/2006/relationships" xmlns:p="http://schemas.openxmlformats.org/presentationml/2006/main">
   <p:cSld>
     <p:spTree>
@@ -5542,7 +6063,7 @@
 </p:sld>
 </file>
 
-<file path=ppt/slides/slide23.xml><?xml version="1.0" encoding="utf-8"?>
+<file path=ppt/slides/slide26.xml><?xml version="1.0" encoding="utf-8"?>
 <p:sld xmlns:a="http://schemas.openxmlformats.org/drawingml/2006/main" xmlns:r="http://schemas.openxmlformats.org/officeDocument/2006/relationships" xmlns:p="http://schemas.openxmlformats.org/presentationml/2006/main">
   <p:cSld>
     <p:spTree>
@@ -5661,7 +6182,7 @@
 </p:sld>
 </file>
 
-<file path=ppt/slides/slide24.xml><?xml version="1.0" encoding="utf-8"?>
+<file path=ppt/slides/slide27.xml><?xml version="1.0" encoding="utf-8"?>
 <p:sld xmlns:a="http://schemas.openxmlformats.org/drawingml/2006/main" xmlns:r="http://schemas.openxmlformats.org/officeDocument/2006/relationships" xmlns:p="http://schemas.openxmlformats.org/presentationml/2006/main">
   <p:cSld>
     <p:spTree>
@@ -5841,7 +6362,7 @@
 </p:sld>
 </file>
 
-<file path=ppt/slides/slide25.xml><?xml version="1.0" encoding="utf-8"?>
+<file path=ppt/slides/slide28.xml><?xml version="1.0" encoding="utf-8"?>
 <p:sld xmlns:a="http://schemas.openxmlformats.org/drawingml/2006/main" xmlns:r="http://schemas.openxmlformats.org/officeDocument/2006/relationships" xmlns:p="http://schemas.openxmlformats.org/presentationml/2006/main">
   <p:cSld>
     <p:spTree>
@@ -5991,7 +6512,7 @@
 </p:sld>
 </file>
 
-<file path=ppt/slides/slide26.xml><?xml version="1.0" encoding="utf-8"?>
+<file path=ppt/slides/slide29.xml><?xml version="1.0" encoding="utf-8"?>
 <p:sld xmlns:a="http://schemas.openxmlformats.org/drawingml/2006/main" xmlns:r="http://schemas.openxmlformats.org/officeDocument/2006/relationships" xmlns:p="http://schemas.openxmlformats.org/presentationml/2006/main">
   <p:cSld>
     <p:spTree>
@@ -6111,7 +6632,93 @@
 </p:sld>
 </file>
 
-<file path=ppt/slides/slide27.xml><?xml version="1.0" encoding="utf-8"?>
+<file path=ppt/slides/slide3.xml><?xml version="1.0" encoding="utf-8"?>
+<p:sld xmlns:a="http://schemas.openxmlformats.org/drawingml/2006/main" xmlns:r="http://schemas.openxmlformats.org/officeDocument/2006/relationships" xmlns:p="http://schemas.openxmlformats.org/presentationml/2006/main">
+  <p:cSld>
+    <p:spTree>
+      <p:nvGrpSpPr>
+        <p:cNvPr id="1" name=""/>
+        <p:cNvGrpSpPr/>
+        <p:nvPr/>
+      </p:nvGrpSpPr>
+      <p:grpSpPr>
+        <a:xfrm>
+          <a:off x="0" y="0"/>
+          <a:ext cx="0" cy="0"/>
+          <a:chOff x="0" y="0"/>
+          <a:chExt cx="0" cy="0"/>
+        </a:xfrm>
+      </p:grpSpPr>
+      <p:sp>
+        <p:nvSpPr>
+          <p:cNvPr id="2" name="Title 1">
+            <a:extLst>
+              <a:ext uri="{FF2B5EF4-FFF2-40B4-BE49-F238E27FC236}">
+                <a16:creationId xmlns:a16="http://schemas.microsoft.com/office/drawing/2014/main" id="{36A26063-9DEE-47DD-AA93-D1D3D71CA0FF}"/>
+              </a:ext>
+            </a:extLst>
+          </p:cNvPr>
+          <p:cNvSpPr>
+            <a:spLocks noGrp="1"/>
+          </p:cNvSpPr>
+          <p:nvPr>
+            <p:ph type="title"/>
+          </p:nvPr>
+        </p:nvSpPr>
+        <p:spPr/>
+        <p:txBody>
+          <a:bodyPr/>
+          <a:lstStyle/>
+          <a:p>
+            <a:r>
+              <a:rPr lang="en-GB" dirty="0"/>
+              <a:t>SQL reading/writing library</a:t>
+            </a:r>
+          </a:p>
+        </p:txBody>
+      </p:sp>
+      <p:sp>
+        <p:nvSpPr>
+          <p:cNvPr id="3" name="Text Placeholder 2">
+            <a:extLst>
+              <a:ext uri="{FF2B5EF4-FFF2-40B4-BE49-F238E27FC236}">
+                <a16:creationId xmlns:a16="http://schemas.microsoft.com/office/drawing/2014/main" id="{18C34F09-ABB6-4180-AD27-5DC3F3439AE0}"/>
+              </a:ext>
+            </a:extLst>
+          </p:cNvPr>
+          <p:cNvSpPr>
+            <a:spLocks noGrp="1"/>
+          </p:cNvSpPr>
+          <p:nvPr>
+            <p:ph type="body" idx="1"/>
+          </p:nvPr>
+        </p:nvSpPr>
+        <p:spPr/>
+        <p:txBody>
+          <a:bodyPr/>
+          <a:lstStyle/>
+          <a:p>
+            <a:r>
+              <a:rPr lang="en-GB" dirty="0"/>
+              <a:t>Creating a custom library to be used on the central server that contains all the necessary code to read from and write to an sql database to keep my final project neater with less code repetition.</a:t>
+            </a:r>
+          </a:p>
+        </p:txBody>
+      </p:sp>
+    </p:spTree>
+    <p:extLst>
+      <p:ext uri="{BB962C8B-B14F-4D97-AF65-F5344CB8AC3E}">
+        <p14:creationId xmlns:p14="http://schemas.microsoft.com/office/powerpoint/2010/main" val="610270681"/>
+      </p:ext>
+    </p:extLst>
+  </p:cSld>
+  <p:clrMapOvr>
+    <a:masterClrMapping/>
+  </p:clrMapOvr>
+</p:sld>
+</file>
+
+<file path=ppt/slides/slide30.xml><?xml version="1.0" encoding="utf-8"?>
 <p:sld xmlns:a="http://schemas.openxmlformats.org/drawingml/2006/main" xmlns:r="http://schemas.openxmlformats.org/officeDocument/2006/relationships" xmlns:p="http://schemas.openxmlformats.org/presentationml/2006/main">
   <p:cSld>
     <p:spTree>
@@ -6261,7 +6868,7 @@
 </p:sld>
 </file>
 
-<file path=ppt/slides/slide28.xml><?xml version="1.0" encoding="utf-8"?>
+<file path=ppt/slides/slide31.xml><?xml version="1.0" encoding="utf-8"?>
 <p:sld xmlns:a="http://schemas.openxmlformats.org/drawingml/2006/main" xmlns:r="http://schemas.openxmlformats.org/officeDocument/2006/relationships" xmlns:p="http://schemas.openxmlformats.org/presentationml/2006/main">
   <p:cSld>
     <p:spTree>
@@ -6393,381 +7000,6 @@
     <p:extLst>
       <p:ext uri="{BB962C8B-B14F-4D97-AF65-F5344CB8AC3E}">
         <p14:creationId xmlns:p14="http://schemas.microsoft.com/office/powerpoint/2010/main" val="3488845831"/>
-      </p:ext>
-    </p:extLst>
-  </p:cSld>
-  <p:clrMapOvr>
-    <a:masterClrMapping/>
-  </p:clrMapOvr>
-</p:sld>
-</file>
-
-<file path=ppt/slides/slide29.xml><?xml version="1.0" encoding="utf-8"?>
-<p:sld xmlns:a="http://schemas.openxmlformats.org/drawingml/2006/main" xmlns:r="http://schemas.openxmlformats.org/officeDocument/2006/relationships" xmlns:p="http://schemas.openxmlformats.org/presentationml/2006/main">
-  <p:cSld>
-    <p:spTree>
-      <p:nvGrpSpPr>
-        <p:cNvPr id="1" name=""/>
-        <p:cNvGrpSpPr/>
-        <p:nvPr/>
-      </p:nvGrpSpPr>
-      <p:grpSpPr>
-        <a:xfrm>
-          <a:off x="0" y="0"/>
-          <a:ext cx="0" cy="0"/>
-          <a:chOff x="0" y="0"/>
-          <a:chExt cx="0" cy="0"/>
-        </a:xfrm>
-      </p:grpSpPr>
-      <p:sp>
-        <p:nvSpPr>
-          <p:cNvPr id="2" name="Title 1">
-            <a:extLst>
-              <a:ext uri="{FF2B5EF4-FFF2-40B4-BE49-F238E27FC236}">
-                <a16:creationId xmlns:a16="http://schemas.microsoft.com/office/drawing/2014/main" id="{76D7B618-33EA-4285-BC95-74EBA3A9CE4B}"/>
-              </a:ext>
-            </a:extLst>
-          </p:cNvPr>
-          <p:cNvSpPr>
-            <a:spLocks noGrp="1"/>
-          </p:cNvSpPr>
-          <p:nvPr>
-            <p:ph type="title"/>
-          </p:nvPr>
-        </p:nvSpPr>
-        <p:spPr/>
-        <p:txBody>
-          <a:bodyPr/>
-          <a:lstStyle/>
-          <a:p>
-            <a:r>
-              <a:rPr lang="en-GB" dirty="0"/>
-              <a:t>Serialising arrays for data transfer</a:t>
-            </a:r>
-          </a:p>
-        </p:txBody>
-      </p:sp>
-      <p:pic>
-        <p:nvPicPr>
-          <p:cNvPr id="4" name="Content Placeholder 3">
-            <a:extLst>
-              <a:ext uri="{FF2B5EF4-FFF2-40B4-BE49-F238E27FC236}">
-                <a16:creationId xmlns:a16="http://schemas.microsoft.com/office/drawing/2014/main" id="{1A3286E0-E11A-4FE9-B2E3-7E8C1F2A6689}"/>
-              </a:ext>
-            </a:extLst>
-          </p:cNvPr>
-          <p:cNvPicPr>
-            <a:picLocks noGrp="1" noChangeAspect="1"/>
-          </p:cNvPicPr>
-          <p:nvPr>
-            <p:ph idx="1"/>
-          </p:nvPr>
-        </p:nvPicPr>
-        <p:blipFill>
-          <a:blip r:embed="rId2"/>
-          <a:stretch>
-            <a:fillRect/>
-          </a:stretch>
-        </p:blipFill>
-        <p:spPr>
-          <a:xfrm>
-            <a:off x="718706" y="1690688"/>
-            <a:ext cx="6182588" cy="1914792"/>
-          </a:xfrm>
-          <a:prstGeom prst="rect">
-            <a:avLst/>
-          </a:prstGeom>
-        </p:spPr>
-      </p:pic>
-      <p:sp>
-        <p:nvSpPr>
-          <p:cNvPr id="5" name="TextBox 4">
-            <a:extLst>
-              <a:ext uri="{FF2B5EF4-FFF2-40B4-BE49-F238E27FC236}">
-                <a16:creationId xmlns:a16="http://schemas.microsoft.com/office/drawing/2014/main" id="{BC3B7363-8C1F-46B9-814C-93393E0B8081}"/>
-              </a:ext>
-            </a:extLst>
-          </p:cNvPr>
-          <p:cNvSpPr txBox="1"/>
-          <p:nvPr/>
-        </p:nvSpPr>
-        <p:spPr>
-          <a:xfrm>
-            <a:off x="7458075" y="1690688"/>
-            <a:ext cx="4371975" cy="1754326"/>
-          </a:xfrm>
-          <a:prstGeom prst="rect">
-            <a:avLst/>
-          </a:prstGeom>
-          <a:noFill/>
-        </p:spPr>
-        <p:txBody>
-          <a:bodyPr wrap="square" rtlCol="0">
-            <a:spAutoFit/>
-          </a:bodyPr>
-          <a:lstStyle/>
-          <a:p>
-            <a:r>
-              <a:rPr lang="en-GB" dirty="0"/>
-              <a:t>When attempting to send database tables across the network as python lists, I ran into a problem where I couldn’t encode the array to send it via socket. To fix this I will need to use some form of serialisation, this meant I needed to decide between pickle and json</a:t>
-            </a:r>
-          </a:p>
-        </p:txBody>
-      </p:sp>
-    </p:spTree>
-    <p:extLst>
-      <p:ext uri="{BB962C8B-B14F-4D97-AF65-F5344CB8AC3E}">
-        <p14:creationId xmlns:p14="http://schemas.microsoft.com/office/powerpoint/2010/main" val="1795613777"/>
-      </p:ext>
-    </p:extLst>
-  </p:cSld>
-  <p:clrMapOvr>
-    <a:masterClrMapping/>
-  </p:clrMapOvr>
-</p:sld>
-</file>
-
-<file path=ppt/slides/slide3.xml><?xml version="1.0" encoding="utf-8"?>
-<p:sld xmlns:a="http://schemas.openxmlformats.org/drawingml/2006/main" xmlns:r="http://schemas.openxmlformats.org/officeDocument/2006/relationships" xmlns:p="http://schemas.openxmlformats.org/presentationml/2006/main">
-  <p:cSld>
-    <p:spTree>
-      <p:nvGrpSpPr>
-        <p:cNvPr id="1" name=""/>
-        <p:cNvGrpSpPr/>
-        <p:nvPr/>
-      </p:nvGrpSpPr>
-      <p:grpSpPr>
-        <a:xfrm>
-          <a:off x="0" y="0"/>
-          <a:ext cx="0" cy="0"/>
-          <a:chOff x="0" y="0"/>
-          <a:chExt cx="0" cy="0"/>
-        </a:xfrm>
-      </p:grpSpPr>
-      <p:sp>
-        <p:nvSpPr>
-          <p:cNvPr id="2" name="Title 1">
-            <a:extLst>
-              <a:ext uri="{FF2B5EF4-FFF2-40B4-BE49-F238E27FC236}">
-                <a16:creationId xmlns:a16="http://schemas.microsoft.com/office/drawing/2014/main" id="{36A26063-9DEE-47DD-AA93-D1D3D71CA0FF}"/>
-              </a:ext>
-            </a:extLst>
-          </p:cNvPr>
-          <p:cNvSpPr>
-            <a:spLocks noGrp="1"/>
-          </p:cNvSpPr>
-          <p:nvPr>
-            <p:ph type="title"/>
-          </p:nvPr>
-        </p:nvSpPr>
-        <p:spPr/>
-        <p:txBody>
-          <a:bodyPr/>
-          <a:lstStyle/>
-          <a:p>
-            <a:r>
-              <a:rPr lang="en-GB" dirty="0"/>
-              <a:t>SQL reading/writing library</a:t>
-            </a:r>
-          </a:p>
-        </p:txBody>
-      </p:sp>
-      <p:sp>
-        <p:nvSpPr>
-          <p:cNvPr id="3" name="Text Placeholder 2">
-            <a:extLst>
-              <a:ext uri="{FF2B5EF4-FFF2-40B4-BE49-F238E27FC236}">
-                <a16:creationId xmlns:a16="http://schemas.microsoft.com/office/drawing/2014/main" id="{18C34F09-ABB6-4180-AD27-5DC3F3439AE0}"/>
-              </a:ext>
-            </a:extLst>
-          </p:cNvPr>
-          <p:cNvSpPr>
-            <a:spLocks noGrp="1"/>
-          </p:cNvSpPr>
-          <p:nvPr>
-            <p:ph type="body" idx="1"/>
-          </p:nvPr>
-        </p:nvSpPr>
-        <p:spPr/>
-        <p:txBody>
-          <a:bodyPr/>
-          <a:lstStyle/>
-          <a:p>
-            <a:r>
-              <a:rPr lang="en-GB" dirty="0"/>
-              <a:t>Creating a custom library to be used on the central server that contains all the necessary code to read from and write to an sql database to keep my final project neater with less code repetition.</a:t>
-            </a:r>
-          </a:p>
-        </p:txBody>
-      </p:sp>
-    </p:spTree>
-    <p:extLst>
-      <p:ext uri="{BB962C8B-B14F-4D97-AF65-F5344CB8AC3E}">
-        <p14:creationId xmlns:p14="http://schemas.microsoft.com/office/powerpoint/2010/main" val="610270681"/>
-      </p:ext>
-    </p:extLst>
-  </p:cSld>
-  <p:clrMapOvr>
-    <a:masterClrMapping/>
-  </p:clrMapOvr>
-</p:sld>
-</file>
-
-<file path=ppt/slides/slide30.xml><?xml version="1.0" encoding="utf-8"?>
-<p:sld xmlns:a="http://schemas.openxmlformats.org/drawingml/2006/main" xmlns:r="http://schemas.openxmlformats.org/officeDocument/2006/relationships" xmlns:p="http://schemas.openxmlformats.org/presentationml/2006/main">
-  <p:cSld>
-    <p:spTree>
-      <p:nvGrpSpPr>
-        <p:cNvPr id="1" name=""/>
-        <p:cNvGrpSpPr/>
-        <p:nvPr/>
-      </p:nvGrpSpPr>
-      <p:grpSpPr>
-        <a:xfrm>
-          <a:off x="0" y="0"/>
-          <a:ext cx="0" cy="0"/>
-          <a:chOff x="0" y="0"/>
-          <a:chExt cx="0" cy="0"/>
-        </a:xfrm>
-      </p:grpSpPr>
-      <p:sp>
-        <p:nvSpPr>
-          <p:cNvPr id="4" name="Title 3">
-            <a:extLst>
-              <a:ext uri="{FF2B5EF4-FFF2-40B4-BE49-F238E27FC236}">
-                <a16:creationId xmlns:a16="http://schemas.microsoft.com/office/drawing/2014/main" id="{9A0C13EF-555C-49BA-8A54-6EF26B900BA7}"/>
-              </a:ext>
-            </a:extLst>
-          </p:cNvPr>
-          <p:cNvSpPr>
-            <a:spLocks noGrp="1"/>
-          </p:cNvSpPr>
-          <p:nvPr>
-            <p:ph type="title"/>
-          </p:nvPr>
-        </p:nvSpPr>
-        <p:spPr/>
-        <p:txBody>
-          <a:bodyPr/>
-          <a:lstStyle/>
-          <a:p>
-            <a:r>
-              <a:rPr lang="en-GB" dirty="0"/>
-              <a:t>Serialisation comparison</a:t>
-            </a:r>
-          </a:p>
-        </p:txBody>
-      </p:sp>
-      <p:sp>
-        <p:nvSpPr>
-          <p:cNvPr id="5" name="Text Placeholder 4">
-            <a:extLst>
-              <a:ext uri="{FF2B5EF4-FFF2-40B4-BE49-F238E27FC236}">
-                <a16:creationId xmlns:a16="http://schemas.microsoft.com/office/drawing/2014/main" id="{212CED7E-A6E7-4335-BA7C-50C64F0157BE}"/>
-              </a:ext>
-            </a:extLst>
-          </p:cNvPr>
-          <p:cNvSpPr>
-            <a:spLocks noGrp="1"/>
-          </p:cNvSpPr>
-          <p:nvPr>
-            <p:ph type="body" idx="1"/>
-          </p:nvPr>
-        </p:nvSpPr>
-        <p:spPr/>
-        <p:txBody>
-          <a:bodyPr/>
-          <a:lstStyle/>
-          <a:p>
-            <a:r>
-              <a:rPr lang="en-GB" dirty="0"/>
-              <a:t>JSON</a:t>
-            </a:r>
-          </a:p>
-        </p:txBody>
-      </p:sp>
-      <p:sp>
-        <p:nvSpPr>
-          <p:cNvPr id="6" name="Content Placeholder 5">
-            <a:extLst>
-              <a:ext uri="{FF2B5EF4-FFF2-40B4-BE49-F238E27FC236}">
-                <a16:creationId xmlns:a16="http://schemas.microsoft.com/office/drawing/2014/main" id="{611325CE-52BE-4D7F-A26F-8F7FB9C3FF44}"/>
-              </a:ext>
-            </a:extLst>
-          </p:cNvPr>
-          <p:cNvSpPr>
-            <a:spLocks noGrp="1"/>
-          </p:cNvSpPr>
-          <p:nvPr>
-            <p:ph sz="half" idx="2"/>
-          </p:nvPr>
-        </p:nvSpPr>
-        <p:spPr/>
-        <p:txBody>
-          <a:bodyPr/>
-          <a:lstStyle/>
-          <a:p>
-            <a:endParaRPr lang="en-GB"/>
-          </a:p>
-        </p:txBody>
-      </p:sp>
-      <p:sp>
-        <p:nvSpPr>
-          <p:cNvPr id="7" name="Text Placeholder 6">
-            <a:extLst>
-              <a:ext uri="{FF2B5EF4-FFF2-40B4-BE49-F238E27FC236}">
-                <a16:creationId xmlns:a16="http://schemas.microsoft.com/office/drawing/2014/main" id="{DC1B5B73-6C08-4506-BB0E-0EBC69919EB2}"/>
-              </a:ext>
-            </a:extLst>
-          </p:cNvPr>
-          <p:cNvSpPr>
-            <a:spLocks noGrp="1"/>
-          </p:cNvSpPr>
-          <p:nvPr>
-            <p:ph type="body" sz="quarter" idx="3"/>
-          </p:nvPr>
-        </p:nvSpPr>
-        <p:spPr/>
-        <p:txBody>
-          <a:bodyPr/>
-          <a:lstStyle/>
-          <a:p>
-            <a:r>
-              <a:rPr lang="en-GB" dirty="0"/>
-              <a:t>Pickle</a:t>
-            </a:r>
-          </a:p>
-        </p:txBody>
-      </p:sp>
-      <p:sp>
-        <p:nvSpPr>
-          <p:cNvPr id="8" name="Content Placeholder 7">
-            <a:extLst>
-              <a:ext uri="{FF2B5EF4-FFF2-40B4-BE49-F238E27FC236}">
-                <a16:creationId xmlns:a16="http://schemas.microsoft.com/office/drawing/2014/main" id="{A01C3724-C00E-4D83-8E7C-E0A80D306A2E}"/>
-              </a:ext>
-            </a:extLst>
-          </p:cNvPr>
-          <p:cNvSpPr>
-            <a:spLocks noGrp="1"/>
-          </p:cNvSpPr>
-          <p:nvPr>
-            <p:ph sz="quarter" idx="4"/>
-          </p:nvPr>
-        </p:nvSpPr>
-        <p:spPr/>
-        <p:txBody>
-          <a:bodyPr/>
-          <a:lstStyle/>
-          <a:p>
-            <a:endParaRPr lang="en-GB"/>
-          </a:p>
-        </p:txBody>
-      </p:sp>
-    </p:spTree>
-    <p:extLst>
-      <p:ext uri="{BB962C8B-B14F-4D97-AF65-F5344CB8AC3E}">
-        <p14:creationId xmlns:p14="http://schemas.microsoft.com/office/powerpoint/2010/main" val="743699574"/>
       </p:ext>
     </p:extLst>
   </p:cSld>
@@ -7136,6 +7368,324 @@
 </file>
 
 <file path=ppt/slides/slide7.xml><?xml version="1.0" encoding="utf-8"?>
+<p:sld xmlns:a="http://schemas.openxmlformats.org/drawingml/2006/main" xmlns:r="http://schemas.openxmlformats.org/officeDocument/2006/relationships" xmlns:p="http://schemas.openxmlformats.org/presentationml/2006/main">
+  <p:cSld>
+    <p:spTree>
+      <p:nvGrpSpPr>
+        <p:cNvPr id="1" name=""/>
+        <p:cNvGrpSpPr/>
+        <p:nvPr/>
+      </p:nvGrpSpPr>
+      <p:grpSpPr>
+        <a:xfrm>
+          <a:off x="0" y="0"/>
+          <a:ext cx="0" cy="0"/>
+          <a:chOff x="0" y="0"/>
+          <a:chExt cx="0" cy="0"/>
+        </a:xfrm>
+      </p:grpSpPr>
+      <p:sp>
+        <p:nvSpPr>
+          <p:cNvPr id="9" name="Title 8">
+            <a:extLst>
+              <a:ext uri="{FF2B5EF4-FFF2-40B4-BE49-F238E27FC236}">
+                <a16:creationId xmlns:a16="http://schemas.microsoft.com/office/drawing/2014/main" id="{EB7C4FB5-384D-4716-BF41-74C4896D2413}"/>
+              </a:ext>
+            </a:extLst>
+          </p:cNvPr>
+          <p:cNvSpPr>
+            <a:spLocks noGrp="1"/>
+          </p:cNvSpPr>
+          <p:nvPr>
+            <p:ph type="title"/>
+          </p:nvPr>
+        </p:nvSpPr>
+        <p:spPr/>
+        <p:txBody>
+          <a:bodyPr/>
+          <a:lstStyle/>
+          <a:p>
+            <a:r>
+              <a:rPr lang="en-GB" dirty="0"/>
+              <a:t>Db </a:t>
+            </a:r>
+            <a:r>
+              <a:rPr lang="en-GB"/>
+              <a:t>manager comparison</a:t>
+            </a:r>
+            <a:endParaRPr lang="en-GB" dirty="0"/>
+          </a:p>
+        </p:txBody>
+      </p:sp>
+      <p:sp>
+        <p:nvSpPr>
+          <p:cNvPr id="10" name="Text Placeholder 9">
+            <a:extLst>
+              <a:ext uri="{FF2B5EF4-FFF2-40B4-BE49-F238E27FC236}">
+                <a16:creationId xmlns:a16="http://schemas.microsoft.com/office/drawing/2014/main" id="{24DEF8A9-66FC-42C8-9AC3-C191C7C75645}"/>
+              </a:ext>
+            </a:extLst>
+          </p:cNvPr>
+          <p:cNvSpPr>
+            <a:spLocks noGrp="1"/>
+          </p:cNvSpPr>
+          <p:nvPr>
+            <p:ph type="body" idx="1"/>
+          </p:nvPr>
+        </p:nvSpPr>
+        <p:spPr>
+          <a:xfrm>
+            <a:off x="839788" y="1681163"/>
+            <a:ext cx="5157787" cy="590550"/>
+          </a:xfrm>
+        </p:spPr>
+        <p:txBody>
+          <a:bodyPr/>
+          <a:lstStyle/>
+          <a:p>
+            <a:r>
+              <a:rPr lang="en-GB" dirty="0" err="1"/>
+              <a:t>mySQL</a:t>
+            </a:r>
+            <a:endParaRPr lang="en-GB" dirty="0"/>
+          </a:p>
+        </p:txBody>
+      </p:sp>
+      <p:sp>
+        <p:nvSpPr>
+          <p:cNvPr id="11" name="Content Placeholder 10">
+            <a:extLst>
+              <a:ext uri="{FF2B5EF4-FFF2-40B4-BE49-F238E27FC236}">
+                <a16:creationId xmlns:a16="http://schemas.microsoft.com/office/drawing/2014/main" id="{7972A163-2521-4098-B848-6A9E7AFB7A94}"/>
+              </a:ext>
+            </a:extLst>
+          </p:cNvPr>
+          <p:cNvSpPr>
+            <a:spLocks noGrp="1"/>
+          </p:cNvSpPr>
+          <p:nvPr>
+            <p:ph sz="half" idx="2"/>
+          </p:nvPr>
+        </p:nvSpPr>
+        <p:spPr>
+          <a:xfrm>
+            <a:off x="927100" y="2271713"/>
+            <a:ext cx="5157787" cy="3684588"/>
+          </a:xfrm>
+        </p:spPr>
+        <p:txBody>
+          <a:bodyPr>
+            <a:normAutofit fontScale="85000" lnSpcReduction="20000"/>
+          </a:bodyPr>
+          <a:lstStyle/>
+          <a:p>
+            <a:r>
+              <a:rPr lang="en-GB" dirty="0"/>
+              <a:t>Industry standard, very well documented and supported</a:t>
+            </a:r>
+          </a:p>
+          <a:p>
+            <a:r>
+              <a:rPr lang="en-GB" dirty="0"/>
+              <a:t>Allows multiple simultaneous edits which may be useful but due to my limited use of the threading module its use case is limited</a:t>
+            </a:r>
+          </a:p>
+          <a:p>
+            <a:r>
+              <a:rPr lang="en-GB" dirty="0"/>
+              <a:t>Cross language making it useful as a skill to learn and be familiar with</a:t>
+            </a:r>
+          </a:p>
+          <a:p>
+            <a:r>
+              <a:rPr lang="en-GB" dirty="0"/>
+              <a:t>More advanced and flexible</a:t>
+            </a:r>
+          </a:p>
+          <a:p>
+            <a:r>
+              <a:rPr lang="en-GB" dirty="0"/>
+              <a:t>Inbuilt server capabilities</a:t>
+            </a:r>
+          </a:p>
+        </p:txBody>
+      </p:sp>
+      <p:sp>
+        <p:nvSpPr>
+          <p:cNvPr id="12" name="Text Placeholder 11">
+            <a:extLst>
+              <a:ext uri="{FF2B5EF4-FFF2-40B4-BE49-F238E27FC236}">
+                <a16:creationId xmlns:a16="http://schemas.microsoft.com/office/drawing/2014/main" id="{7F4BF926-7960-4464-8F67-B9B09567F0E5}"/>
+              </a:ext>
+            </a:extLst>
+          </p:cNvPr>
+          <p:cNvSpPr>
+            <a:spLocks noGrp="1"/>
+          </p:cNvSpPr>
+          <p:nvPr>
+            <p:ph type="body" sz="quarter" idx="3"/>
+          </p:nvPr>
+        </p:nvSpPr>
+        <p:spPr>
+          <a:xfrm>
+            <a:off x="6172200" y="1681163"/>
+            <a:ext cx="5183188" cy="590550"/>
+          </a:xfrm>
+        </p:spPr>
+        <p:txBody>
+          <a:bodyPr/>
+          <a:lstStyle/>
+          <a:p>
+            <a:r>
+              <a:rPr lang="en-GB" dirty="0"/>
+              <a:t>SQLite</a:t>
+            </a:r>
+          </a:p>
+        </p:txBody>
+      </p:sp>
+      <p:sp>
+        <p:nvSpPr>
+          <p:cNvPr id="13" name="Content Placeholder 12">
+            <a:extLst>
+              <a:ext uri="{FF2B5EF4-FFF2-40B4-BE49-F238E27FC236}">
+                <a16:creationId xmlns:a16="http://schemas.microsoft.com/office/drawing/2014/main" id="{1947A7F8-0307-44B1-85FE-59EF27CD0BDA}"/>
+              </a:ext>
+            </a:extLst>
+          </p:cNvPr>
+          <p:cNvSpPr>
+            <a:spLocks noGrp="1"/>
+          </p:cNvSpPr>
+          <p:nvPr>
+            <p:ph sz="quarter" idx="4"/>
+          </p:nvPr>
+        </p:nvSpPr>
+        <p:spPr>
+          <a:xfrm>
+            <a:off x="6172200" y="2271713"/>
+            <a:ext cx="5183188" cy="3143250"/>
+          </a:xfrm>
+        </p:spPr>
+        <p:txBody>
+          <a:bodyPr>
+            <a:normAutofit fontScale="85000" lnSpcReduction="20000"/>
+          </a:bodyPr>
+          <a:lstStyle/>
+          <a:p>
+            <a:r>
+              <a:rPr lang="en-GB" dirty="0"/>
+              <a:t>I am already intimately familiar with the </a:t>
+            </a:r>
+            <a:r>
+              <a:rPr lang="en-GB" dirty="0" err="1"/>
+              <a:t>sqlite</a:t>
+            </a:r>
+            <a:r>
+              <a:rPr lang="en-GB" dirty="0"/>
+              <a:t> browser and python module</a:t>
+            </a:r>
+          </a:p>
+          <a:p>
+            <a:r>
+              <a:rPr lang="en-GB" dirty="0" err="1"/>
+              <a:t>Sqlite</a:t>
+            </a:r>
+            <a:r>
+              <a:rPr lang="en-GB" dirty="0"/>
+              <a:t> is, as the name implies, very lightweight and simple which is very useful with the time limitations and scope of this project</a:t>
+            </a:r>
+          </a:p>
+          <a:p>
+            <a:r>
+              <a:rPr lang="en-GB" dirty="0"/>
+              <a:t>I have already written useful code I can simply reuse</a:t>
+            </a:r>
+          </a:p>
+          <a:p>
+            <a:r>
+              <a:rPr lang="en-GB" dirty="0"/>
+              <a:t>I have to hack a server together using subpar techniques</a:t>
+            </a:r>
+          </a:p>
+        </p:txBody>
+      </p:sp>
+      <p:sp>
+        <p:nvSpPr>
+          <p:cNvPr id="14" name="TextBox 13">
+            <a:extLst>
+              <a:ext uri="{FF2B5EF4-FFF2-40B4-BE49-F238E27FC236}">
+                <a16:creationId xmlns:a16="http://schemas.microsoft.com/office/drawing/2014/main" id="{4A4B1BC5-B909-440E-A538-4CB6B0FEFD8D}"/>
+              </a:ext>
+            </a:extLst>
+          </p:cNvPr>
+          <p:cNvSpPr txBox="1"/>
+          <p:nvPr/>
+        </p:nvSpPr>
+        <p:spPr>
+          <a:xfrm>
+            <a:off x="901699" y="5557838"/>
+            <a:ext cx="10871201" cy="923330"/>
+          </a:xfrm>
+          <a:prstGeom prst="rect">
+            <a:avLst/>
+          </a:prstGeom>
+          <a:noFill/>
+        </p:spPr>
+        <p:txBody>
+          <a:bodyPr wrap="square" rtlCol="0">
+            <a:spAutoFit/>
+          </a:bodyPr>
+          <a:lstStyle/>
+          <a:p>
+            <a:r>
+              <a:rPr lang="en-GB" dirty="0"/>
+              <a:t>Due to my familiarity and already completed work I have decided to keep using </a:t>
+            </a:r>
+            <a:r>
+              <a:rPr lang="en-GB" dirty="0" err="1"/>
+              <a:t>sqlite</a:t>
+            </a:r>
+            <a:r>
+              <a:rPr lang="en-GB" dirty="0"/>
+              <a:t> using python socket and pickle serialisation to create the server functionality of </a:t>
+            </a:r>
+            <a:r>
+              <a:rPr lang="en-GB" dirty="0" err="1"/>
+              <a:t>mysql</a:t>
+            </a:r>
+            <a:r>
+              <a:rPr lang="en-GB" dirty="0"/>
+              <a:t>, given more time for this project maybe I would have considered learning </a:t>
+            </a:r>
+            <a:r>
+              <a:rPr lang="en-GB" dirty="0" err="1"/>
+              <a:t>mySQL</a:t>
+            </a:r>
+            <a:r>
+              <a:rPr lang="en-GB" dirty="0"/>
+              <a:t> but with the deadline looming and much more to do I have decided to stick with </a:t>
+            </a:r>
+            <a:r>
+              <a:rPr lang="en-GB" dirty="0" err="1"/>
+              <a:t>sqlite</a:t>
+            </a:r>
+            <a:endParaRPr lang="en-GB" dirty="0"/>
+          </a:p>
+        </p:txBody>
+      </p:sp>
+    </p:spTree>
+    <p:extLst>
+      <p:ext uri="{BB962C8B-B14F-4D97-AF65-F5344CB8AC3E}">
+        <p14:creationId xmlns:p14="http://schemas.microsoft.com/office/powerpoint/2010/main" val="1362493920"/>
+      </p:ext>
+    </p:extLst>
+  </p:cSld>
+  <p:clrMapOvr>
+    <a:masterClrMapping/>
+  </p:clrMapOvr>
+</p:sld>
+</file>
+
+<file path=ppt/slides/slide8.xml><?xml version="1.0" encoding="utf-8"?>
 <p:sld xmlns:a="http://schemas.openxmlformats.org/drawingml/2006/main" xmlns:r="http://schemas.openxmlformats.org/officeDocument/2006/relationships" xmlns:p="http://schemas.openxmlformats.org/presentationml/2006/main">
   <p:cSld>
     <p:spTree>
@@ -7455,92 +8005,6 @@
 </p:sld>
 </file>
 
-<file path=ppt/slides/slide8.xml><?xml version="1.0" encoding="utf-8"?>
-<p:sld xmlns:a="http://schemas.openxmlformats.org/drawingml/2006/main" xmlns:r="http://schemas.openxmlformats.org/officeDocument/2006/relationships" xmlns:p="http://schemas.openxmlformats.org/presentationml/2006/main">
-  <p:cSld>
-    <p:spTree>
-      <p:nvGrpSpPr>
-        <p:cNvPr id="1" name=""/>
-        <p:cNvGrpSpPr/>
-        <p:nvPr/>
-      </p:nvGrpSpPr>
-      <p:grpSpPr>
-        <a:xfrm>
-          <a:off x="0" y="0"/>
-          <a:ext cx="0" cy="0"/>
-          <a:chOff x="0" y="0"/>
-          <a:chExt cx="0" cy="0"/>
-        </a:xfrm>
-      </p:grpSpPr>
-      <p:sp>
-        <p:nvSpPr>
-          <p:cNvPr id="2" name="Title 1">
-            <a:extLst>
-              <a:ext uri="{FF2B5EF4-FFF2-40B4-BE49-F238E27FC236}">
-                <a16:creationId xmlns:a16="http://schemas.microsoft.com/office/drawing/2014/main" id="{6BD3AD9C-D270-4E30-95FE-E14614327A02}"/>
-              </a:ext>
-            </a:extLst>
-          </p:cNvPr>
-          <p:cNvSpPr>
-            <a:spLocks noGrp="1"/>
-          </p:cNvSpPr>
-          <p:nvPr>
-            <p:ph type="title"/>
-          </p:nvPr>
-        </p:nvSpPr>
-        <p:spPr/>
-        <p:txBody>
-          <a:bodyPr/>
-          <a:lstStyle/>
-          <a:p>
-            <a:r>
-              <a:rPr lang="en-GB" dirty="0"/>
-              <a:t>Networking</a:t>
-            </a:r>
-          </a:p>
-        </p:txBody>
-      </p:sp>
-      <p:sp>
-        <p:nvSpPr>
-          <p:cNvPr id="3" name="Text Placeholder 2">
-            <a:extLst>
-              <a:ext uri="{FF2B5EF4-FFF2-40B4-BE49-F238E27FC236}">
-                <a16:creationId xmlns:a16="http://schemas.microsoft.com/office/drawing/2014/main" id="{702946CF-5518-42B0-93C6-362248B987A1}"/>
-              </a:ext>
-            </a:extLst>
-          </p:cNvPr>
-          <p:cNvSpPr>
-            <a:spLocks noGrp="1"/>
-          </p:cNvSpPr>
-          <p:nvPr>
-            <p:ph type="body" idx="1"/>
-          </p:nvPr>
-        </p:nvSpPr>
-        <p:spPr/>
-        <p:txBody>
-          <a:bodyPr/>
-          <a:lstStyle/>
-          <a:p>
-            <a:r>
-              <a:rPr lang="en-GB" dirty="0"/>
-              <a:t>Creating a python host server that has sole access to the username/password database and private key</a:t>
-            </a:r>
-          </a:p>
-        </p:txBody>
-      </p:sp>
-    </p:spTree>
-    <p:extLst>
-      <p:ext uri="{BB962C8B-B14F-4D97-AF65-F5344CB8AC3E}">
-        <p14:creationId xmlns:p14="http://schemas.microsoft.com/office/powerpoint/2010/main" val="2967788988"/>
-      </p:ext>
-    </p:extLst>
-  </p:cSld>
-  <p:clrMapOvr>
-    <a:masterClrMapping/>
-  </p:clrMapOvr>
-</p:sld>
-</file>
-
 <file path=ppt/slides/slide9.xml><?xml version="1.0" encoding="utf-8"?>
 <p:sld xmlns:a="http://schemas.openxmlformats.org/drawingml/2006/main" xmlns:r="http://schemas.openxmlformats.org/officeDocument/2006/relationships" xmlns:p="http://schemas.openxmlformats.org/presentationml/2006/main">
   <p:cSld>
@@ -7560,10 +8024,10 @@
       </p:grpSpPr>
       <p:sp>
         <p:nvSpPr>
-          <p:cNvPr id="4" name="Title 3">
-            <a:extLst>
-              <a:ext uri="{FF2B5EF4-FFF2-40B4-BE49-F238E27FC236}">
-                <a16:creationId xmlns:a16="http://schemas.microsoft.com/office/drawing/2014/main" id="{8A0F5D17-B085-40EF-BF68-E055EA9DBF1E}"/>
+          <p:cNvPr id="2" name="Title 1">
+            <a:extLst>
+              <a:ext uri="{FF2B5EF4-FFF2-40B4-BE49-F238E27FC236}">
+                <a16:creationId xmlns:a16="http://schemas.microsoft.com/office/drawing/2014/main" id="{6BD3AD9C-D270-4E30-95FE-E14614327A02}"/>
               </a:ext>
             </a:extLst>
           </p:cNvPr>
@@ -7581,61 +8045,43 @@
           <a:p>
             <a:r>
               <a:rPr lang="en-GB" dirty="0"/>
-              <a:t>Necessary network functions</a:t>
-            </a:r>
-          </a:p>
-        </p:txBody>
-      </p:sp>
-      <p:sp>
-        <p:nvSpPr>
-          <p:cNvPr id="5" name="Content Placeholder 4">
-            <a:extLst>
-              <a:ext uri="{FF2B5EF4-FFF2-40B4-BE49-F238E27FC236}">
-                <a16:creationId xmlns:a16="http://schemas.microsoft.com/office/drawing/2014/main" id="{FAFDD41F-9689-4CA5-9A67-C5F3B3E28E5F}"/>
-              </a:ext>
-            </a:extLst>
-          </p:cNvPr>
-          <p:cNvSpPr>
-            <a:spLocks noGrp="1"/>
-          </p:cNvSpPr>
-          <p:nvPr>
-            <p:ph idx="1"/>
-          </p:nvPr>
-        </p:nvSpPr>
-        <p:spPr/>
-        <p:txBody>
-          <a:bodyPr/>
-          <a:lstStyle/>
-          <a:p>
-            <a:r>
-              <a:rPr lang="en-GB" dirty="0"/>
-              <a:t>Be able to verify/add new hashed usernames and passwords using the sql module I wrote</a:t>
-            </a:r>
-          </a:p>
-          <a:p>
-            <a:r>
-              <a:rPr lang="en-GB" dirty="0"/>
-              <a:t>Connect peer to peer networking for games, one host one client. Therefore Server &amp; client code will be needed in each install</a:t>
-            </a:r>
-          </a:p>
-          <a:p>
-            <a:r>
-              <a:rPr lang="en-GB" dirty="0"/>
-              <a:t>Potential server browser if time permits</a:t>
-            </a:r>
-          </a:p>
-          <a:p>
-            <a:pPr marL="0" indent="0">
-              <a:buNone/>
-            </a:pPr>
-            <a:endParaRPr lang="en-GB" dirty="0"/>
+              <a:t>Networking</a:t>
+            </a:r>
+          </a:p>
+        </p:txBody>
+      </p:sp>
+      <p:sp>
+        <p:nvSpPr>
+          <p:cNvPr id="3" name="Text Placeholder 2">
+            <a:extLst>
+              <a:ext uri="{FF2B5EF4-FFF2-40B4-BE49-F238E27FC236}">
+                <a16:creationId xmlns:a16="http://schemas.microsoft.com/office/drawing/2014/main" id="{702946CF-5518-42B0-93C6-362248B987A1}"/>
+              </a:ext>
+            </a:extLst>
+          </p:cNvPr>
+          <p:cNvSpPr>
+            <a:spLocks noGrp="1"/>
+          </p:cNvSpPr>
+          <p:nvPr>
+            <p:ph type="body" idx="1"/>
+          </p:nvPr>
+        </p:nvSpPr>
+        <p:spPr/>
+        <p:txBody>
+          <a:bodyPr/>
+          <a:lstStyle/>
+          <a:p>
+            <a:r>
+              <a:rPr lang="en-GB" dirty="0"/>
+              <a:t>Creating a python host server that has sole access to the username/password database and private key</a:t>
+            </a:r>
           </a:p>
         </p:txBody>
       </p:sp>
     </p:spTree>
     <p:extLst>
       <p:ext uri="{BB962C8B-B14F-4D97-AF65-F5344CB8AC3E}">
-        <p14:creationId xmlns:p14="http://schemas.microsoft.com/office/powerpoint/2010/main" val="89662862"/>
+        <p14:creationId xmlns:p14="http://schemas.microsoft.com/office/powerpoint/2010/main" val="2967788988"/>
       </p:ext>
     </p:extLst>
   </p:cSld>

</xml_diff>

<commit_message>
pickle integraion for view sList
</commit_message>
<xml_diff>
--- a/dev log.pptx
+++ b/dev log.pptx
@@ -36,6 +36,7 @@
     <p:sldId id="281" r:id="rId30"/>
     <p:sldId id="282" r:id="rId31"/>
     <p:sldId id="283" r:id="rId32"/>
+    <p:sldId id="287" r:id="rId33"/>
   </p:sldIdLst>
   <p:sldSz cx="12192000" cy="6858000"/>
   <p:notesSz cx="6858000" cy="9144000"/>
@@ -186,6 +187,7 @@
             <p14:sldId id="281"/>
             <p14:sldId id="282"/>
             <p14:sldId id="283"/>
+            <p14:sldId id="287"/>
           </p14:sldIdLst>
         </p14:section>
       </p14:sectionLst>
@@ -7009,6 +7011,126 @@
 </p:sld>
 </file>
 
+<file path=ppt/slides/slide32.xml><?xml version="1.0" encoding="utf-8"?>
+<p:sld xmlns:a="http://schemas.openxmlformats.org/drawingml/2006/main" xmlns:r="http://schemas.openxmlformats.org/officeDocument/2006/relationships" xmlns:p="http://schemas.openxmlformats.org/presentationml/2006/main">
+  <p:cSld>
+    <p:spTree>
+      <p:nvGrpSpPr>
+        <p:cNvPr id="1" name=""/>
+        <p:cNvGrpSpPr/>
+        <p:nvPr/>
+      </p:nvGrpSpPr>
+      <p:grpSpPr>
+        <a:xfrm>
+          <a:off x="0" y="0"/>
+          <a:ext cx="0" cy="0"/>
+          <a:chOff x="0" y="0"/>
+          <a:chExt cx="0" cy="0"/>
+        </a:xfrm>
+      </p:grpSpPr>
+      <p:sp>
+        <p:nvSpPr>
+          <p:cNvPr id="2" name="Title 1">
+            <a:extLst>
+              <a:ext uri="{FF2B5EF4-FFF2-40B4-BE49-F238E27FC236}">
+                <a16:creationId xmlns:a16="http://schemas.microsoft.com/office/drawing/2014/main" id="{63C97884-30CD-49BC-9C29-214CA981A2D8}"/>
+              </a:ext>
+            </a:extLst>
+          </p:cNvPr>
+          <p:cNvSpPr>
+            <a:spLocks noGrp="1"/>
+          </p:cNvSpPr>
+          <p:nvPr>
+            <p:ph type="title"/>
+          </p:nvPr>
+        </p:nvSpPr>
+        <p:spPr/>
+        <p:txBody>
+          <a:bodyPr/>
+          <a:lstStyle/>
+          <a:p>
+            <a:r>
+              <a:rPr lang="en-GB" dirty="0"/>
+              <a:t>Data transmission tests</a:t>
+            </a:r>
+          </a:p>
+        </p:txBody>
+      </p:sp>
+      <p:pic>
+        <p:nvPicPr>
+          <p:cNvPr id="4" name="Content Placeholder 3">
+            <a:extLst>
+              <a:ext uri="{FF2B5EF4-FFF2-40B4-BE49-F238E27FC236}">
+                <a16:creationId xmlns:a16="http://schemas.microsoft.com/office/drawing/2014/main" id="{A94C3429-3725-4184-8C00-5A24F20B3B1B}"/>
+              </a:ext>
+            </a:extLst>
+          </p:cNvPr>
+          <p:cNvPicPr>
+            <a:picLocks noGrp="1" noChangeAspect="1"/>
+          </p:cNvPicPr>
+          <p:nvPr>
+            <p:ph idx="1"/>
+          </p:nvPr>
+        </p:nvPicPr>
+        <p:blipFill>
+          <a:blip r:embed="rId2"/>
+          <a:stretch>
+            <a:fillRect/>
+          </a:stretch>
+        </p:blipFill>
+        <p:spPr>
+          <a:xfrm>
+            <a:off x="326622" y="1411288"/>
+            <a:ext cx="5452279" cy="4351338"/>
+          </a:xfrm>
+          <a:prstGeom prst="rect">
+            <a:avLst/>
+          </a:prstGeom>
+        </p:spPr>
+      </p:pic>
+      <p:pic>
+        <p:nvPicPr>
+          <p:cNvPr id="5" name="Picture 4">
+            <a:extLst>
+              <a:ext uri="{FF2B5EF4-FFF2-40B4-BE49-F238E27FC236}">
+                <a16:creationId xmlns:a16="http://schemas.microsoft.com/office/drawing/2014/main" id="{D9CB3470-2D04-4952-88A3-520FE1B03DFA}"/>
+              </a:ext>
+            </a:extLst>
+          </p:cNvPr>
+          <p:cNvPicPr>
+            <a:picLocks noChangeAspect="1"/>
+          </p:cNvPicPr>
+          <p:nvPr/>
+        </p:nvPicPr>
+        <p:blipFill>
+          <a:blip r:embed="rId3"/>
+          <a:stretch>
+            <a:fillRect/>
+          </a:stretch>
+        </p:blipFill>
+        <p:spPr>
+          <a:xfrm>
+            <a:off x="1380944" y="5698104"/>
+            <a:ext cx="2600688" cy="1086002"/>
+          </a:xfrm>
+          <a:prstGeom prst="rect">
+            <a:avLst/>
+          </a:prstGeom>
+        </p:spPr>
+      </p:pic>
+    </p:spTree>
+    <p:extLst>
+      <p:ext uri="{BB962C8B-B14F-4D97-AF65-F5344CB8AC3E}">
+        <p14:creationId xmlns:p14="http://schemas.microsoft.com/office/powerpoint/2010/main" val="152125242"/>
+      </p:ext>
+    </p:extLst>
+  </p:cSld>
+  <p:clrMapOvr>
+    <a:masterClrMapping/>
+  </p:clrMapOvr>
+</p:sld>
+</file>
+
 <file path=ppt/slides/slide4.xml><?xml version="1.0" encoding="utf-8"?>
 <p:sld xmlns:a="http://schemas.openxmlformats.org/drawingml/2006/main" xmlns:r="http://schemas.openxmlformats.org/officeDocument/2006/relationships" xmlns:p="http://schemas.openxmlformats.org/presentationml/2006/main">
   <p:cSld>
@@ -7407,13 +7529,8 @@
           <a:p>
             <a:r>
               <a:rPr lang="en-GB" dirty="0"/>
-              <a:t>Db </a:t>
-            </a:r>
-            <a:r>
-              <a:rPr lang="en-GB"/>
-              <a:t>manager comparison</a:t>
-            </a:r>
-            <a:endParaRPr lang="en-GB" dirty="0"/>
+              <a:t>Db manager comparison</a:t>
+            </a:r>
           </a:p>
         </p:txBody>
       </p:sp>
@@ -7444,10 +7561,9 @@
           <a:lstStyle/>
           <a:p>
             <a:r>
-              <a:rPr lang="en-GB" dirty="0" err="1"/>
+              <a:rPr lang="en-GB" dirty="0"/>
               <a:t>mySQL</a:t>
             </a:r>
-            <a:endParaRPr lang="en-GB" dirty="0"/>
           </a:p>
         </p:txBody>
       </p:sp>
@@ -7475,7 +7591,7 @@
         </p:spPr>
         <p:txBody>
           <a:bodyPr>
-            <a:normAutofit fontScale="85000" lnSpcReduction="20000"/>
+            <a:normAutofit fontScale="77500" lnSpcReduction="20000"/>
           </a:bodyPr>
           <a:lstStyle/>
           <a:p>
@@ -7567,31 +7683,19 @@
         </p:spPr>
         <p:txBody>
           <a:bodyPr>
-            <a:normAutofit fontScale="85000" lnSpcReduction="20000"/>
+            <a:normAutofit fontScale="77500" lnSpcReduction="20000"/>
           </a:bodyPr>
           <a:lstStyle/>
           <a:p>
             <a:r>
               <a:rPr lang="en-GB" dirty="0"/>
-              <a:t>I am already intimately familiar with the </a:t>
-            </a:r>
-            <a:r>
-              <a:rPr lang="en-GB" dirty="0" err="1"/>
-              <a:t>sqlite</a:t>
-            </a:r>
-            <a:r>
-              <a:rPr lang="en-GB" dirty="0"/>
-              <a:t> browser and python module</a:t>
-            </a:r>
-          </a:p>
-          <a:p>
-            <a:r>
-              <a:rPr lang="en-GB" dirty="0" err="1"/>
-              <a:t>Sqlite</a:t>
-            </a:r>
-            <a:r>
-              <a:rPr lang="en-GB" dirty="0"/>
-              <a:t> is, as the name implies, very lightweight and simple which is very useful with the time limitations and scope of this project</a:t>
+              <a:t>I am already intimately familiar with the SQLite browser and python module</a:t>
+            </a:r>
+          </a:p>
+          <a:p>
+            <a:r>
+              <a:rPr lang="en-GB" dirty="0"/>
+              <a:t>SQLite is, as the name implies, very lightweight and simple which is very useful with the time limitations and scope of this project</a:t>
             </a:r>
           </a:p>
           <a:p>
@@ -7623,7 +7727,7 @@
         <p:spPr>
           <a:xfrm>
             <a:off x="901699" y="5557838"/>
-            <a:ext cx="10871201" cy="923330"/>
+            <a:ext cx="10871201" cy="1200329"/>
           </a:xfrm>
           <a:prstGeom prst="rect">
             <a:avLst/>
@@ -7638,37 +7742,8 @@
           <a:p>
             <a:r>
               <a:rPr lang="en-GB" dirty="0"/>
-              <a:t>Due to my familiarity and already completed work I have decided to keep using </a:t>
-            </a:r>
-            <a:r>
-              <a:rPr lang="en-GB" dirty="0" err="1"/>
-              <a:t>sqlite</a:t>
-            </a:r>
-            <a:r>
-              <a:rPr lang="en-GB" dirty="0"/>
-              <a:t> using python socket and pickle serialisation to create the server functionality of </a:t>
-            </a:r>
-            <a:r>
-              <a:rPr lang="en-GB" dirty="0" err="1"/>
-              <a:t>mysql</a:t>
-            </a:r>
-            <a:r>
-              <a:rPr lang="en-GB" dirty="0"/>
-              <a:t>, given more time for this project maybe I would have considered learning </a:t>
-            </a:r>
-            <a:r>
-              <a:rPr lang="en-GB" dirty="0" err="1"/>
-              <a:t>mySQL</a:t>
-            </a:r>
-            <a:r>
-              <a:rPr lang="en-GB" dirty="0"/>
-              <a:t> but with the deadline looming and much more to do I have decided to stick with </a:t>
-            </a:r>
-            <a:r>
-              <a:rPr lang="en-GB" dirty="0" err="1"/>
-              <a:t>sqlite</a:t>
-            </a:r>
-            <a:endParaRPr lang="en-GB" dirty="0"/>
+              <a:t>Due to my familiarity and already completed work I have decided to keep using SQLite using python socket and pickle serialisation to create the server functionality of mySQL, given more time for this project maybe I would have considered learning mySQL but with the deadline looming and much more to do I have decided to stick with SQLite</a:t>
+            </a:r>
           </a:p>
         </p:txBody>
       </p:sp>

</xml_diff>

<commit_message>
remove mySQL support and update doc
</commit_message>
<xml_diff>
--- a/dev log.pptx
+++ b/dev log.pptx
@@ -358,7 +358,7 @@
           <a:p>
             <a:fld id="{95BB3272-C847-43E3-AE34-83B2109F1449}" type="datetimeFigureOut">
               <a:rPr lang="en-GB" smtClean="0"/>
-              <a:t>05/05/2020</a:t>
+              <a:t>06/05/2020</a:t>
             </a:fld>
             <a:endParaRPr lang="en-GB"/>
           </a:p>
@@ -558,7 +558,7 @@
           <a:p>
             <a:fld id="{95BB3272-C847-43E3-AE34-83B2109F1449}" type="datetimeFigureOut">
               <a:rPr lang="en-GB" smtClean="0"/>
-              <a:t>05/05/2020</a:t>
+              <a:t>06/05/2020</a:t>
             </a:fld>
             <a:endParaRPr lang="en-GB"/>
           </a:p>
@@ -768,7 +768,7 @@
           <a:p>
             <a:fld id="{95BB3272-C847-43E3-AE34-83B2109F1449}" type="datetimeFigureOut">
               <a:rPr lang="en-GB" smtClean="0"/>
-              <a:t>05/05/2020</a:t>
+              <a:t>06/05/2020</a:t>
             </a:fld>
             <a:endParaRPr lang="en-GB"/>
           </a:p>
@@ -968,7 +968,7 @@
           <a:p>
             <a:fld id="{95BB3272-C847-43E3-AE34-83B2109F1449}" type="datetimeFigureOut">
               <a:rPr lang="en-GB" smtClean="0"/>
-              <a:t>05/05/2020</a:t>
+              <a:t>06/05/2020</a:t>
             </a:fld>
             <a:endParaRPr lang="en-GB"/>
           </a:p>
@@ -1244,7 +1244,7 @@
           <a:p>
             <a:fld id="{95BB3272-C847-43E3-AE34-83B2109F1449}" type="datetimeFigureOut">
               <a:rPr lang="en-GB" smtClean="0"/>
-              <a:t>05/05/2020</a:t>
+              <a:t>06/05/2020</a:t>
             </a:fld>
             <a:endParaRPr lang="en-GB"/>
           </a:p>
@@ -1512,7 +1512,7 @@
           <a:p>
             <a:fld id="{95BB3272-C847-43E3-AE34-83B2109F1449}" type="datetimeFigureOut">
               <a:rPr lang="en-GB" smtClean="0"/>
-              <a:t>05/05/2020</a:t>
+              <a:t>06/05/2020</a:t>
             </a:fld>
             <a:endParaRPr lang="en-GB"/>
           </a:p>
@@ -1927,7 +1927,7 @@
           <a:p>
             <a:fld id="{95BB3272-C847-43E3-AE34-83B2109F1449}" type="datetimeFigureOut">
               <a:rPr lang="en-GB" smtClean="0"/>
-              <a:t>05/05/2020</a:t>
+              <a:t>06/05/2020</a:t>
             </a:fld>
             <a:endParaRPr lang="en-GB"/>
           </a:p>
@@ -2069,7 +2069,7 @@
           <a:p>
             <a:fld id="{95BB3272-C847-43E3-AE34-83B2109F1449}" type="datetimeFigureOut">
               <a:rPr lang="en-GB" smtClean="0"/>
-              <a:t>05/05/2020</a:t>
+              <a:t>06/05/2020</a:t>
             </a:fld>
             <a:endParaRPr lang="en-GB"/>
           </a:p>
@@ -2182,7 +2182,7 @@
           <a:p>
             <a:fld id="{95BB3272-C847-43E3-AE34-83B2109F1449}" type="datetimeFigureOut">
               <a:rPr lang="en-GB" smtClean="0"/>
-              <a:t>05/05/2020</a:t>
+              <a:t>06/05/2020</a:t>
             </a:fld>
             <a:endParaRPr lang="en-GB"/>
           </a:p>
@@ -2495,7 +2495,7 @@
           <a:p>
             <a:fld id="{95BB3272-C847-43E3-AE34-83B2109F1449}" type="datetimeFigureOut">
               <a:rPr lang="en-GB" smtClean="0"/>
-              <a:t>05/05/2020</a:t>
+              <a:t>06/05/2020</a:t>
             </a:fld>
             <a:endParaRPr lang="en-GB"/>
           </a:p>
@@ -2784,7 +2784,7 @@
           <a:p>
             <a:fld id="{95BB3272-C847-43E3-AE34-83B2109F1449}" type="datetimeFigureOut">
               <a:rPr lang="en-GB" smtClean="0"/>
-              <a:t>05/05/2020</a:t>
+              <a:t>06/05/2020</a:t>
             </a:fld>
             <a:endParaRPr lang="en-GB"/>
           </a:p>
@@ -3027,7 +3027,7 @@
           <a:p>
             <a:fld id="{95BB3272-C847-43E3-AE34-83B2109F1449}" type="datetimeFigureOut">
               <a:rPr lang="en-GB" smtClean="0"/>
-              <a:t>05/05/2020</a:t>
+              <a:t>06/05/2020</a:t>
             </a:fld>
             <a:endParaRPr lang="en-GB"/>
           </a:p>
@@ -3680,7 +3680,9 @@
         </p:nvSpPr>
         <p:spPr/>
         <p:txBody>
-          <a:bodyPr/>
+          <a:bodyPr>
+            <a:normAutofit lnSpcReduction="10000"/>
+          </a:bodyPr>
           <a:lstStyle/>
           <a:p>
             <a:r>
@@ -3693,6 +3695,18 @@
               </a:rPr>
               <a:t>https://en.wikipedia.org/wiki/Hole_punching_(networking)</a:t>
             </a:r>
+            <a:endParaRPr lang="en-GB" dirty="0"/>
+          </a:p>
+          <a:p>
+            <a:r>
+              <a:rPr lang="en-GB" dirty="0">
+                <a:hlinkClick r:id="rId3"/>
+              </a:rPr>
+              <a:t>https://bford.info/pub/net/p2pnat/</a:t>
+            </a:r>
+            <a:endParaRPr lang="en-GB" dirty="0"/>
+          </a:p>
+          <a:p>
             <a:endParaRPr lang="en-GB" dirty="0"/>
           </a:p>
           <a:p>

</xml_diff>

<commit_message>
ipv6 to the rescue
</commit_message>
<xml_diff>
--- a/dev log.pptx
+++ b/dev log.pptx
@@ -16,30 +16,33 @@
     <p:sldId id="259" r:id="rId10"/>
     <p:sldId id="260" r:id="rId11"/>
     <p:sldId id="291" r:id="rId12"/>
-    <p:sldId id="261" r:id="rId13"/>
-    <p:sldId id="262" r:id="rId14"/>
-    <p:sldId id="272" r:id="rId15"/>
-    <p:sldId id="284" r:id="rId16"/>
-    <p:sldId id="285" r:id="rId17"/>
-    <p:sldId id="266" r:id="rId18"/>
-    <p:sldId id="268" r:id="rId19"/>
-    <p:sldId id="269" r:id="rId20"/>
-    <p:sldId id="270" r:id="rId21"/>
-    <p:sldId id="271" r:id="rId22"/>
-    <p:sldId id="273" r:id="rId23"/>
-    <p:sldId id="274" r:id="rId24"/>
-    <p:sldId id="275" r:id="rId25"/>
-    <p:sldId id="276" r:id="rId26"/>
-    <p:sldId id="277" r:id="rId27"/>
-    <p:sldId id="278" r:id="rId28"/>
-    <p:sldId id="279" r:id="rId29"/>
-    <p:sldId id="280" r:id="rId30"/>
-    <p:sldId id="281" r:id="rId31"/>
-    <p:sldId id="282" r:id="rId32"/>
-    <p:sldId id="283" r:id="rId33"/>
-    <p:sldId id="287" r:id="rId34"/>
-    <p:sldId id="290" r:id="rId35"/>
-    <p:sldId id="289" r:id="rId36"/>
+    <p:sldId id="292" r:id="rId13"/>
+    <p:sldId id="293" r:id="rId14"/>
+    <p:sldId id="294" r:id="rId15"/>
+    <p:sldId id="261" r:id="rId16"/>
+    <p:sldId id="262" r:id="rId17"/>
+    <p:sldId id="272" r:id="rId18"/>
+    <p:sldId id="284" r:id="rId19"/>
+    <p:sldId id="285" r:id="rId20"/>
+    <p:sldId id="266" r:id="rId21"/>
+    <p:sldId id="268" r:id="rId22"/>
+    <p:sldId id="269" r:id="rId23"/>
+    <p:sldId id="270" r:id="rId24"/>
+    <p:sldId id="271" r:id="rId25"/>
+    <p:sldId id="273" r:id="rId26"/>
+    <p:sldId id="274" r:id="rId27"/>
+    <p:sldId id="275" r:id="rId28"/>
+    <p:sldId id="276" r:id="rId29"/>
+    <p:sldId id="277" r:id="rId30"/>
+    <p:sldId id="278" r:id="rId31"/>
+    <p:sldId id="279" r:id="rId32"/>
+    <p:sldId id="280" r:id="rId33"/>
+    <p:sldId id="281" r:id="rId34"/>
+    <p:sldId id="282" r:id="rId35"/>
+    <p:sldId id="283" r:id="rId36"/>
+    <p:sldId id="287" r:id="rId37"/>
+    <p:sldId id="290" r:id="rId38"/>
+    <p:sldId id="289" r:id="rId39"/>
   </p:sldIdLst>
   <p:sldSz cx="12192000" cy="6858000"/>
   <p:notesSz cx="6858000" cy="9144000"/>
@@ -162,6 +165,9 @@
             <p14:sldId id="259"/>
             <p14:sldId id="260"/>
             <p14:sldId id="291"/>
+            <p14:sldId id="292"/>
+            <p14:sldId id="293"/>
+            <p14:sldId id="294"/>
           </p14:sldIdLst>
         </p14:section>
         <p14:section name="User backend" id="{4917E628-EF76-4611-BE58-D69F773E488C}">
@@ -358,7 +364,7 @@
           <a:p>
             <a:fld id="{95BB3272-C847-43E3-AE34-83B2109F1449}" type="datetimeFigureOut">
               <a:rPr lang="en-GB" smtClean="0"/>
-              <a:t>06/05/2020</a:t>
+              <a:t>07/05/2020</a:t>
             </a:fld>
             <a:endParaRPr lang="en-GB"/>
           </a:p>
@@ -558,7 +564,7 @@
           <a:p>
             <a:fld id="{95BB3272-C847-43E3-AE34-83B2109F1449}" type="datetimeFigureOut">
               <a:rPr lang="en-GB" smtClean="0"/>
-              <a:t>06/05/2020</a:t>
+              <a:t>07/05/2020</a:t>
             </a:fld>
             <a:endParaRPr lang="en-GB"/>
           </a:p>
@@ -768,7 +774,7 @@
           <a:p>
             <a:fld id="{95BB3272-C847-43E3-AE34-83B2109F1449}" type="datetimeFigureOut">
               <a:rPr lang="en-GB" smtClean="0"/>
-              <a:t>06/05/2020</a:t>
+              <a:t>07/05/2020</a:t>
             </a:fld>
             <a:endParaRPr lang="en-GB"/>
           </a:p>
@@ -968,7 +974,7 @@
           <a:p>
             <a:fld id="{95BB3272-C847-43E3-AE34-83B2109F1449}" type="datetimeFigureOut">
               <a:rPr lang="en-GB" smtClean="0"/>
-              <a:t>06/05/2020</a:t>
+              <a:t>07/05/2020</a:t>
             </a:fld>
             <a:endParaRPr lang="en-GB"/>
           </a:p>
@@ -1244,7 +1250,7 @@
           <a:p>
             <a:fld id="{95BB3272-C847-43E3-AE34-83B2109F1449}" type="datetimeFigureOut">
               <a:rPr lang="en-GB" smtClean="0"/>
-              <a:t>06/05/2020</a:t>
+              <a:t>07/05/2020</a:t>
             </a:fld>
             <a:endParaRPr lang="en-GB"/>
           </a:p>
@@ -1512,7 +1518,7 @@
           <a:p>
             <a:fld id="{95BB3272-C847-43E3-AE34-83B2109F1449}" type="datetimeFigureOut">
               <a:rPr lang="en-GB" smtClean="0"/>
-              <a:t>06/05/2020</a:t>
+              <a:t>07/05/2020</a:t>
             </a:fld>
             <a:endParaRPr lang="en-GB"/>
           </a:p>
@@ -1927,7 +1933,7 @@
           <a:p>
             <a:fld id="{95BB3272-C847-43E3-AE34-83B2109F1449}" type="datetimeFigureOut">
               <a:rPr lang="en-GB" smtClean="0"/>
-              <a:t>06/05/2020</a:t>
+              <a:t>07/05/2020</a:t>
             </a:fld>
             <a:endParaRPr lang="en-GB"/>
           </a:p>
@@ -2069,7 +2075,7 @@
           <a:p>
             <a:fld id="{95BB3272-C847-43E3-AE34-83B2109F1449}" type="datetimeFigureOut">
               <a:rPr lang="en-GB" smtClean="0"/>
-              <a:t>06/05/2020</a:t>
+              <a:t>07/05/2020</a:t>
             </a:fld>
             <a:endParaRPr lang="en-GB"/>
           </a:p>
@@ -2182,7 +2188,7 @@
           <a:p>
             <a:fld id="{95BB3272-C847-43E3-AE34-83B2109F1449}" type="datetimeFigureOut">
               <a:rPr lang="en-GB" smtClean="0"/>
-              <a:t>06/05/2020</a:t>
+              <a:t>07/05/2020</a:t>
             </a:fld>
             <a:endParaRPr lang="en-GB"/>
           </a:p>
@@ -2495,7 +2501,7 @@
           <a:p>
             <a:fld id="{95BB3272-C847-43E3-AE34-83B2109F1449}" type="datetimeFigureOut">
               <a:rPr lang="en-GB" smtClean="0"/>
-              <a:t>06/05/2020</a:t>
+              <a:t>07/05/2020</a:t>
             </a:fld>
             <a:endParaRPr lang="en-GB"/>
           </a:p>
@@ -2784,7 +2790,7 @@
           <a:p>
             <a:fld id="{95BB3272-C847-43E3-AE34-83B2109F1449}" type="datetimeFigureOut">
               <a:rPr lang="en-GB" smtClean="0"/>
-              <a:t>06/05/2020</a:t>
+              <a:t>07/05/2020</a:t>
             </a:fld>
             <a:endParaRPr lang="en-GB"/>
           </a:p>
@@ -3027,7 +3033,7 @@
           <a:p>
             <a:fld id="{95BB3272-C847-43E3-AE34-83B2109F1449}" type="datetimeFigureOut">
               <a:rPr lang="en-GB" smtClean="0"/>
-              <a:t>06/05/2020</a:t>
+              <a:t>07/05/2020</a:t>
             </a:fld>
             <a:endParaRPr lang="en-GB"/>
           </a:p>
@@ -3749,7 +3755,7 @@
           <p:cNvPr id="2" name="Title 1">
             <a:extLst>
               <a:ext uri="{FF2B5EF4-FFF2-40B4-BE49-F238E27FC236}">
-                <a16:creationId xmlns:a16="http://schemas.microsoft.com/office/drawing/2014/main" id="{7B5EE842-2FDD-4DEC-8C72-6456BF9C5133}"/>
+                <a16:creationId xmlns:a16="http://schemas.microsoft.com/office/drawing/2014/main" id="{6D739944-F56B-4A9D-A01C-27D1F4E5C51B}"/>
               </a:ext>
             </a:extLst>
           </p:cNvPr>
@@ -3767,25 +3773,25 @@
           <a:p>
             <a:r>
               <a:rPr lang="en-GB" dirty="0"/>
-              <a:t>User backend</a:t>
-            </a:r>
-          </a:p>
-        </p:txBody>
-      </p:sp>
-      <p:sp>
-        <p:nvSpPr>
-          <p:cNvPr id="3" name="Text Placeholder 2">
-            <a:extLst>
-              <a:ext uri="{FF2B5EF4-FFF2-40B4-BE49-F238E27FC236}">
-                <a16:creationId xmlns:a16="http://schemas.microsoft.com/office/drawing/2014/main" id="{DE37422E-DFC5-43D8-B903-2CB431F068FC}"/>
-              </a:ext>
-            </a:extLst>
-          </p:cNvPr>
-          <p:cNvSpPr>
-            <a:spLocks noGrp="1"/>
-          </p:cNvSpPr>
-          <p:nvPr>
-            <p:ph type="body" idx="1"/>
+              <a:t>The NAT problem solution? ipv6 to the rescue?</a:t>
+            </a:r>
+          </a:p>
+        </p:txBody>
+      </p:sp>
+      <p:sp>
+        <p:nvSpPr>
+          <p:cNvPr id="3" name="Content Placeholder 2">
+            <a:extLst>
+              <a:ext uri="{FF2B5EF4-FFF2-40B4-BE49-F238E27FC236}">
+                <a16:creationId xmlns:a16="http://schemas.microsoft.com/office/drawing/2014/main" id="{5F88AC6A-D34A-425F-A2CF-D6E23835C8B1}"/>
+              </a:ext>
+            </a:extLst>
+          </p:cNvPr>
+          <p:cNvSpPr>
+            <a:spLocks noGrp="1"/>
+          </p:cNvSpPr>
+          <p:nvPr>
+            <p:ph idx="1"/>
           </p:nvPr>
         </p:nvSpPr>
         <p:spPr/>
@@ -3795,7 +3801,19 @@
           <a:p>
             <a:r>
               <a:rPr lang="en-GB" dirty="0"/>
-              <a:t>A library that includes all the backend functions accessible when logged in with an account</a:t>
+              <a:t>Ipv6 doesn’t need NAT, so I’m going to be looking at using ipv6 for my peer to peer network</a:t>
+            </a:r>
+          </a:p>
+          <a:p>
+            <a:endParaRPr lang="en-GB" dirty="0"/>
+          </a:p>
+          <a:p>
+            <a:pPr marL="0" indent="0">
+              <a:buNone/>
+            </a:pPr>
+            <a:r>
+              <a:rPr lang="en-GB" dirty="0"/>
+              <a:t>Testing</a:t>
             </a:r>
           </a:p>
         </p:txBody>
@@ -3803,7 +3821,7 @@
     </p:spTree>
     <p:extLst>
       <p:ext uri="{BB962C8B-B14F-4D97-AF65-F5344CB8AC3E}">
-        <p14:creationId xmlns:p14="http://schemas.microsoft.com/office/powerpoint/2010/main" val="2287663386"/>
+        <p14:creationId xmlns:p14="http://schemas.microsoft.com/office/powerpoint/2010/main" val="2027971408"/>
       </p:ext>
     </p:extLst>
   </p:cSld>
@@ -3835,7 +3853,7 @@
           <p:cNvPr id="2" name="Title 1">
             <a:extLst>
               <a:ext uri="{FF2B5EF4-FFF2-40B4-BE49-F238E27FC236}">
-                <a16:creationId xmlns:a16="http://schemas.microsoft.com/office/drawing/2014/main" id="{EF8AA7A4-9FDA-42EC-960A-661F68D6C0CC}"/>
+                <a16:creationId xmlns:a16="http://schemas.microsoft.com/office/drawing/2014/main" id="{416910F7-C4A0-457F-BE3A-7E015C49D222}"/>
               </a:ext>
             </a:extLst>
           </p:cNvPr>
@@ -3853,7 +3871,7 @@
           <a:p>
             <a:r>
               <a:rPr lang="en-GB" dirty="0"/>
-              <a:t>Necessary user functions</a:t>
+              <a:t>Testing ipv6</a:t>
             </a:r>
           </a:p>
         </p:txBody>
@@ -3863,7 +3881,7 @@
           <p:cNvPr id="3" name="Content Placeholder 2">
             <a:extLst>
               <a:ext uri="{FF2B5EF4-FFF2-40B4-BE49-F238E27FC236}">
-                <a16:creationId xmlns:a16="http://schemas.microsoft.com/office/drawing/2014/main" id="{F6BB918B-6819-4478-B0CD-ED27E47326ED}"/>
+                <a16:creationId xmlns:a16="http://schemas.microsoft.com/office/drawing/2014/main" id="{92581CC9-3162-4955-96FA-557C7948D3EC}"/>
               </a:ext>
             </a:extLst>
           </p:cNvPr>
@@ -3881,37 +3899,29 @@
           <a:p>
             <a:r>
               <a:rPr lang="en-GB" dirty="0"/>
-              <a:t>View past games(maybe replay functionality)</a:t>
-            </a:r>
-          </a:p>
-          <a:p>
-            <a:r>
-              <a:rPr lang="en-GB" dirty="0"/>
-              <a:t>View their lifetime &amp; recent statistics with graphs+ extrapolation</a:t>
-            </a:r>
-          </a:p>
-          <a:p>
-            <a:r>
-              <a:rPr lang="en-GB" dirty="0"/>
-              <a:t>Update payroll</a:t>
-            </a:r>
-          </a:p>
-          <a:p>
-            <a:r>
-              <a:rPr lang="en-GB" dirty="0"/>
-              <a:t>A preliminary test before booking an appointment to get an early diagnosis</a:t>
-            </a:r>
-          </a:p>
-          <a:p>
-            <a:r>
-              <a:rPr lang="en-GB" dirty="0"/>
-              <a:t>Host/join a game</a:t>
-            </a:r>
-          </a:p>
-          <a:p>
-            <a:r>
-              <a:rPr lang="en-GB" dirty="0"/>
-              <a:t>Add friends for easier game access</a:t>
+              <a:t>Using a socket program I knew worked with ipv4 I tested what changes needed making for ipv6 integration, note that this file will </a:t>
+            </a:r>
+            <a:r>
+              <a:rPr lang="en-GB" dirty="0" err="1"/>
+              <a:t>likel</a:t>
+            </a:r>
+            <a:r>
+              <a:rPr lang="en-GB" dirty="0"/>
+              <a:t> be reverted to ipv4 for mass compatibility and tournament games will also likely use ipv4 for the same reason</a:t>
+            </a:r>
+          </a:p>
+          <a:p>
+            <a:r>
+              <a:rPr lang="en-GB" dirty="0"/>
+              <a:t>I tested these changes with and without a </a:t>
+            </a:r>
+            <a:r>
+              <a:rPr lang="en-GB" dirty="0" err="1"/>
+              <a:t>vpn</a:t>
+            </a:r>
+            <a:r>
+              <a:rPr lang="en-GB" dirty="0"/>
+              <a:t> on the client to try and simulate an external router, I will still need to trial the real deal at some point though this may be hard as my mobile hotspot doesn’t fully support ipv6 and had some issues(even with ipv4 socket programming)</a:t>
             </a:r>
           </a:p>
         </p:txBody>
@@ -3919,7 +3929,7 @@
     </p:spTree>
     <p:extLst>
       <p:ext uri="{BB962C8B-B14F-4D97-AF65-F5344CB8AC3E}">
-        <p14:creationId xmlns:p14="http://schemas.microsoft.com/office/powerpoint/2010/main" val="3128323718"/>
+        <p14:creationId xmlns:p14="http://schemas.microsoft.com/office/powerpoint/2010/main" val="3971953565"/>
       </p:ext>
     </p:extLst>
   </p:cSld>
@@ -3951,7 +3961,7 @@
           <p:cNvPr id="2" name="Title 1">
             <a:extLst>
               <a:ext uri="{FF2B5EF4-FFF2-40B4-BE49-F238E27FC236}">
-                <a16:creationId xmlns:a16="http://schemas.microsoft.com/office/drawing/2014/main" id="{790527AB-E460-46A4-B7B4-3C1BFC1DD286}"/>
+                <a16:creationId xmlns:a16="http://schemas.microsoft.com/office/drawing/2014/main" id="{8B106867-88FA-49FC-BEB4-021348CE7581}"/>
               </a:ext>
             </a:extLst>
           </p:cNvPr>
@@ -3968,48 +3978,218 @@
           <a:lstStyle/>
           <a:p>
             <a:r>
-              <a:rPr lang="en-GB" dirty="0"/>
-              <a:t>Split pot calculations</a:t>
-            </a:r>
-          </a:p>
-        </p:txBody>
-      </p:sp>
-      <p:sp>
-        <p:nvSpPr>
-          <p:cNvPr id="3" name="Content Placeholder 2">
-            <a:extLst>
-              <a:ext uri="{FF2B5EF4-FFF2-40B4-BE49-F238E27FC236}">
-                <a16:creationId xmlns:a16="http://schemas.microsoft.com/office/drawing/2014/main" id="{FA08A01C-A3F7-4D41-8FAD-98DF9EA7B96D}"/>
-              </a:ext>
-            </a:extLst>
-          </p:cNvPr>
-          <p:cNvSpPr>
-            <a:spLocks noGrp="1"/>
-          </p:cNvSpPr>
+              <a:rPr lang="en-GB" dirty="0" err="1"/>
+              <a:t>Tetsing</a:t>
+            </a:r>
+            <a:r>
+              <a:rPr lang="en-GB" dirty="0"/>
+              <a:t> ipv6, host changes/output</a:t>
+            </a:r>
+          </a:p>
+        </p:txBody>
+      </p:sp>
+      <p:pic>
+        <p:nvPicPr>
+          <p:cNvPr id="4" name="Content Placeholder 3">
+            <a:extLst>
+              <a:ext uri="{FF2B5EF4-FFF2-40B4-BE49-F238E27FC236}">
+                <a16:creationId xmlns:a16="http://schemas.microsoft.com/office/drawing/2014/main" id="{FBFEE09F-7B97-4CC1-A22A-45C1233FAB4B}"/>
+              </a:ext>
+            </a:extLst>
+          </p:cNvPr>
+          <p:cNvPicPr>
+            <a:picLocks noGrp="1" noChangeAspect="1"/>
+          </p:cNvPicPr>
           <p:nvPr>
             <p:ph idx="1"/>
           </p:nvPr>
-        </p:nvSpPr>
-        <p:spPr/>
-        <p:txBody>
-          <a:bodyPr/>
-          <a:lstStyle/>
-          <a:p>
-            <a:r>
-              <a:rPr lang="en-GB" dirty="0"/>
-              <a:t>One challenging part of the game logic will be calculating split pots</a:t>
-            </a:r>
-          </a:p>
-          <a:p>
-            <a:pPr lvl="1"/>
-            <a:endParaRPr lang="en-GB" dirty="0"/>
-          </a:p>
-        </p:txBody>
-      </p:sp>
+        </p:nvPicPr>
+        <p:blipFill>
+          <a:blip r:embed="rId2"/>
+          <a:stretch>
+            <a:fillRect/>
+          </a:stretch>
+        </p:blipFill>
+        <p:spPr>
+          <a:xfrm>
+            <a:off x="838200" y="1323804"/>
+            <a:ext cx="10515600" cy="1211267"/>
+          </a:xfrm>
+          <a:prstGeom prst="rect">
+            <a:avLst/>
+          </a:prstGeom>
+        </p:spPr>
+      </p:pic>
+      <p:sp>
+        <p:nvSpPr>
+          <p:cNvPr id="6" name="Title 1">
+            <a:extLst>
+              <a:ext uri="{FF2B5EF4-FFF2-40B4-BE49-F238E27FC236}">
+                <a16:creationId xmlns:a16="http://schemas.microsoft.com/office/drawing/2014/main" id="{E58C0894-B8DB-4877-B1B8-0A49ADF5ABE6}"/>
+              </a:ext>
+            </a:extLst>
+          </p:cNvPr>
+          <p:cNvSpPr txBox="1">
+            <a:spLocks/>
+          </p:cNvSpPr>
+          <p:nvPr/>
+        </p:nvSpPr>
+        <p:spPr>
+          <a:xfrm>
+            <a:off x="838200" y="3501853"/>
+            <a:ext cx="10515600" cy="1325563"/>
+          </a:xfrm>
+          <a:prstGeom prst="rect">
+            <a:avLst/>
+          </a:prstGeom>
+        </p:spPr>
+        <p:txBody>
+          <a:bodyPr vert="horz" lIns="91440" tIns="45720" rIns="91440" bIns="45720" rtlCol="0" anchor="ctr">
+            <a:normAutofit/>
+          </a:bodyPr>
+          <a:lstStyle>
+            <a:lvl1pPr algn="l" defTabSz="914400" rtl="0" eaLnBrk="1" latinLnBrk="0" hangingPunct="1">
+              <a:lnSpc>
+                <a:spcPct val="90000"/>
+              </a:lnSpc>
+              <a:spcBef>
+                <a:spcPct val="0"/>
+              </a:spcBef>
+              <a:buNone/>
+              <a:defRPr sz="4400" kern="1200">
+                <a:solidFill>
+                  <a:schemeClr val="tx1"/>
+                </a:solidFill>
+                <a:latin typeface="+mj-lt"/>
+                <a:ea typeface="+mj-ea"/>
+                <a:cs typeface="+mj-cs"/>
+              </a:defRPr>
+            </a:lvl1pPr>
+          </a:lstStyle>
+          <a:p>
+            <a:r>
+              <a:rPr lang="en-GB" dirty="0" err="1"/>
+              <a:t>Tetsing</a:t>
+            </a:r>
+            <a:r>
+              <a:rPr lang="en-GB" dirty="0"/>
+              <a:t> ipv6, client changes/output</a:t>
+            </a:r>
+          </a:p>
+        </p:txBody>
+      </p:sp>
+      <p:pic>
+        <p:nvPicPr>
+          <p:cNvPr id="7" name="Picture 6">
+            <a:extLst>
+              <a:ext uri="{FF2B5EF4-FFF2-40B4-BE49-F238E27FC236}">
+                <a16:creationId xmlns:a16="http://schemas.microsoft.com/office/drawing/2014/main" id="{59EA7DD1-8086-498E-9FA0-F9394B22683A}"/>
+              </a:ext>
+            </a:extLst>
+          </p:cNvPr>
+          <p:cNvPicPr/>
+          <p:nvPr/>
+        </p:nvPicPr>
+        <p:blipFill>
+          <a:blip r:embed="rId3" r:link="rId4">
+            <a:extLst>
+              <a:ext uri="{28A0092B-C50C-407E-A947-70E740481C1C}">
+                <a14:useLocalDpi xmlns:a14="http://schemas.microsoft.com/office/drawing/2010/main" val="0"/>
+              </a:ext>
+            </a:extLst>
+          </a:blip>
+          <a:srcRect/>
+          <a:stretch>
+            <a:fillRect/>
+          </a:stretch>
+        </p:blipFill>
+        <p:spPr bwMode="auto">
+          <a:xfrm>
+            <a:off x="180975" y="4505496"/>
+            <a:ext cx="5915025" cy="990600"/>
+          </a:xfrm>
+          <a:prstGeom prst="rect">
+            <a:avLst/>
+          </a:prstGeom>
+          <a:noFill/>
+          <a:ln>
+            <a:noFill/>
+          </a:ln>
+        </p:spPr>
+      </p:pic>
+      <p:pic>
+        <p:nvPicPr>
+          <p:cNvPr id="8" name="Picture 7">
+            <a:extLst>
+              <a:ext uri="{FF2B5EF4-FFF2-40B4-BE49-F238E27FC236}">
+                <a16:creationId xmlns:a16="http://schemas.microsoft.com/office/drawing/2014/main" id="{D4C6CF8A-A824-45C0-BF10-4BA0332FF036}"/>
+              </a:ext>
+            </a:extLst>
+          </p:cNvPr>
+          <p:cNvPicPr/>
+          <p:nvPr/>
+        </p:nvPicPr>
+        <p:blipFill>
+          <a:blip r:embed="rId5" r:link="rId6">
+            <a:extLst>
+              <a:ext uri="{28A0092B-C50C-407E-A947-70E740481C1C}">
+                <a14:useLocalDpi xmlns:a14="http://schemas.microsoft.com/office/drawing/2010/main" val="0"/>
+              </a:ext>
+            </a:extLst>
+          </a:blip>
+          <a:srcRect/>
+          <a:stretch>
+            <a:fillRect/>
+          </a:stretch>
+        </p:blipFill>
+        <p:spPr bwMode="auto">
+          <a:xfrm>
+            <a:off x="6263005" y="4543596"/>
+            <a:ext cx="5400675" cy="914400"/>
+          </a:xfrm>
+          <a:prstGeom prst="rect">
+            <a:avLst/>
+          </a:prstGeom>
+          <a:noFill/>
+          <a:ln>
+            <a:noFill/>
+          </a:ln>
+        </p:spPr>
+      </p:pic>
+      <p:pic>
+        <p:nvPicPr>
+          <p:cNvPr id="9" name="Picture 8">
+            <a:extLst>
+              <a:ext uri="{FF2B5EF4-FFF2-40B4-BE49-F238E27FC236}">
+                <a16:creationId xmlns:a16="http://schemas.microsoft.com/office/drawing/2014/main" id="{DDF20141-6F51-4C3C-8A0E-DC3A461BF802}"/>
+              </a:ext>
+            </a:extLst>
+          </p:cNvPr>
+          <p:cNvPicPr>
+            <a:picLocks noChangeAspect="1"/>
+          </p:cNvPicPr>
+          <p:nvPr/>
+        </p:nvPicPr>
+        <p:blipFill>
+          <a:blip r:embed="rId7"/>
+          <a:stretch>
+            <a:fillRect/>
+          </a:stretch>
+        </p:blipFill>
+        <p:spPr>
+          <a:xfrm>
+            <a:off x="2613990" y="2666610"/>
+            <a:ext cx="4363059" cy="666843"/>
+          </a:xfrm>
+          <a:prstGeom prst="rect">
+            <a:avLst/>
+          </a:prstGeom>
+        </p:spPr>
+      </p:pic>
     </p:spTree>
     <p:extLst>
       <p:ext uri="{BB962C8B-B14F-4D97-AF65-F5344CB8AC3E}">
-        <p14:creationId xmlns:p14="http://schemas.microsoft.com/office/powerpoint/2010/main" val="1191071722"/>
+        <p14:creationId xmlns:p14="http://schemas.microsoft.com/office/powerpoint/2010/main" val="4082246404"/>
       </p:ext>
     </p:extLst>
   </p:cSld>
@@ -4041,7 +4221,7 @@
           <p:cNvPr id="2" name="Title 1">
             <a:extLst>
               <a:ext uri="{FF2B5EF4-FFF2-40B4-BE49-F238E27FC236}">
-                <a16:creationId xmlns:a16="http://schemas.microsoft.com/office/drawing/2014/main" id="{76D7B618-33EA-4285-BC95-74EBA3A9CE4B}"/>
+                <a16:creationId xmlns:a16="http://schemas.microsoft.com/office/drawing/2014/main" id="{7B5EE842-2FDD-4DEC-8C72-6456BF9C5133}"/>
               </a:ext>
             </a:extLst>
           </p:cNvPr>
@@ -4059,74 +4239,35 @@
           <a:p>
             <a:r>
               <a:rPr lang="en-GB" dirty="0"/>
-              <a:t>Serialising arrays for data transfer</a:t>
-            </a:r>
-          </a:p>
-        </p:txBody>
-      </p:sp>
-      <p:pic>
-        <p:nvPicPr>
-          <p:cNvPr id="4" name="Content Placeholder 3">
-            <a:extLst>
-              <a:ext uri="{FF2B5EF4-FFF2-40B4-BE49-F238E27FC236}">
-                <a16:creationId xmlns:a16="http://schemas.microsoft.com/office/drawing/2014/main" id="{1A3286E0-E11A-4FE9-B2E3-7E8C1F2A6689}"/>
-              </a:ext>
-            </a:extLst>
-          </p:cNvPr>
-          <p:cNvPicPr>
-            <a:picLocks noGrp="1" noChangeAspect="1"/>
-          </p:cNvPicPr>
-          <p:nvPr>
-            <p:ph idx="1"/>
-          </p:nvPr>
-        </p:nvPicPr>
-        <p:blipFill>
-          <a:blip r:embed="rId2"/>
-          <a:stretch>
-            <a:fillRect/>
-          </a:stretch>
-        </p:blipFill>
-        <p:spPr>
-          <a:xfrm>
-            <a:off x="718706" y="1690688"/>
-            <a:ext cx="6182588" cy="1914792"/>
-          </a:xfrm>
-          <a:prstGeom prst="rect">
-            <a:avLst/>
-          </a:prstGeom>
-        </p:spPr>
-      </p:pic>
-      <p:sp>
-        <p:nvSpPr>
-          <p:cNvPr id="5" name="TextBox 4">
-            <a:extLst>
-              <a:ext uri="{FF2B5EF4-FFF2-40B4-BE49-F238E27FC236}">
-                <a16:creationId xmlns:a16="http://schemas.microsoft.com/office/drawing/2014/main" id="{BC3B7363-8C1F-46B9-814C-93393E0B8081}"/>
-              </a:ext>
-            </a:extLst>
-          </p:cNvPr>
-          <p:cNvSpPr txBox="1"/>
-          <p:nvPr/>
-        </p:nvSpPr>
-        <p:spPr>
-          <a:xfrm>
-            <a:off x="7458075" y="1690688"/>
-            <a:ext cx="4371975" cy="1754326"/>
-          </a:xfrm>
-          <a:prstGeom prst="rect">
-            <a:avLst/>
-          </a:prstGeom>
-          <a:noFill/>
-        </p:spPr>
-        <p:txBody>
-          <a:bodyPr wrap="square" rtlCol="0">
-            <a:spAutoFit/>
-          </a:bodyPr>
-          <a:lstStyle/>
-          <a:p>
-            <a:r>
-              <a:rPr lang="en-GB" dirty="0"/>
-              <a:t>When attempting to send database tables across the network as python lists, I ran into a problem where I couldn’t encode the array to send it via socket. To fix this I will need to use some form of serialisation, this meant I needed to decide between pickle and json</a:t>
+              <a:t>User backend</a:t>
+            </a:r>
+          </a:p>
+        </p:txBody>
+      </p:sp>
+      <p:sp>
+        <p:nvSpPr>
+          <p:cNvPr id="3" name="Text Placeholder 2">
+            <a:extLst>
+              <a:ext uri="{FF2B5EF4-FFF2-40B4-BE49-F238E27FC236}">
+                <a16:creationId xmlns:a16="http://schemas.microsoft.com/office/drawing/2014/main" id="{DE37422E-DFC5-43D8-B903-2CB431F068FC}"/>
+              </a:ext>
+            </a:extLst>
+          </p:cNvPr>
+          <p:cNvSpPr>
+            <a:spLocks noGrp="1"/>
+          </p:cNvSpPr>
+          <p:nvPr>
+            <p:ph type="body" idx="1"/>
+          </p:nvPr>
+        </p:nvSpPr>
+        <p:spPr/>
+        <p:txBody>
+          <a:bodyPr/>
+          <a:lstStyle/>
+          <a:p>
+            <a:r>
+              <a:rPr lang="en-GB" dirty="0"/>
+              <a:t>A library that includes all the backend functions accessible when logged in with an account</a:t>
             </a:r>
           </a:p>
         </p:txBody>
@@ -4134,7 +4275,7 @@
     </p:spTree>
     <p:extLst>
       <p:ext uri="{BB962C8B-B14F-4D97-AF65-F5344CB8AC3E}">
-        <p14:creationId xmlns:p14="http://schemas.microsoft.com/office/powerpoint/2010/main" val="1795613777"/>
+        <p14:creationId xmlns:p14="http://schemas.microsoft.com/office/powerpoint/2010/main" val="2287663386"/>
       </p:ext>
     </p:extLst>
   </p:cSld>
@@ -4163,10 +4304,10 @@
       </p:grpSpPr>
       <p:sp>
         <p:nvSpPr>
-          <p:cNvPr id="4" name="Title 3">
-            <a:extLst>
-              <a:ext uri="{FF2B5EF4-FFF2-40B4-BE49-F238E27FC236}">
-                <a16:creationId xmlns:a16="http://schemas.microsoft.com/office/drawing/2014/main" id="{9A0C13EF-555C-49BA-8A54-6EF26B900BA7}"/>
+          <p:cNvPr id="2" name="Title 1">
+            <a:extLst>
+              <a:ext uri="{FF2B5EF4-FFF2-40B4-BE49-F238E27FC236}">
+                <a16:creationId xmlns:a16="http://schemas.microsoft.com/office/drawing/2014/main" id="{EF8AA7A4-9FDA-42EC-960A-661F68D6C0CC}"/>
               </a:ext>
             </a:extLst>
           </p:cNvPr>
@@ -4184,239 +4325,65 @@
           <a:p>
             <a:r>
               <a:rPr lang="en-GB" dirty="0"/>
-              <a:t>Serialisation comparison</a:t>
-            </a:r>
-          </a:p>
-        </p:txBody>
-      </p:sp>
-      <p:sp>
-        <p:nvSpPr>
-          <p:cNvPr id="5" name="Text Placeholder 4">
-            <a:extLst>
-              <a:ext uri="{FF2B5EF4-FFF2-40B4-BE49-F238E27FC236}">
-                <a16:creationId xmlns:a16="http://schemas.microsoft.com/office/drawing/2014/main" id="{212CED7E-A6E7-4335-BA7C-50C64F0157BE}"/>
-              </a:ext>
-            </a:extLst>
-          </p:cNvPr>
-          <p:cNvSpPr>
-            <a:spLocks noGrp="1"/>
-          </p:cNvSpPr>
-          <p:nvPr>
-            <p:ph type="body" idx="1"/>
-          </p:nvPr>
-        </p:nvSpPr>
-        <p:spPr>
-          <a:xfrm>
-            <a:off x="836612" y="1223486"/>
-            <a:ext cx="5157787" cy="823912"/>
-          </a:xfrm>
-        </p:spPr>
-        <p:txBody>
-          <a:bodyPr/>
-          <a:lstStyle/>
-          <a:p>
-            <a:r>
-              <a:rPr lang="en-GB" dirty="0"/>
-              <a:t>JSON</a:t>
-            </a:r>
-          </a:p>
-        </p:txBody>
-      </p:sp>
-      <p:sp>
-        <p:nvSpPr>
-          <p:cNvPr id="6" name="Content Placeholder 5">
-            <a:extLst>
-              <a:ext uri="{FF2B5EF4-FFF2-40B4-BE49-F238E27FC236}">
-                <a16:creationId xmlns:a16="http://schemas.microsoft.com/office/drawing/2014/main" id="{611325CE-52BE-4D7F-A26F-8F7FB9C3FF44}"/>
-              </a:ext>
-            </a:extLst>
-          </p:cNvPr>
-          <p:cNvSpPr>
-            <a:spLocks noGrp="1"/>
-          </p:cNvSpPr>
-          <p:nvPr>
-            <p:ph sz="half" idx="2"/>
-          </p:nvPr>
-        </p:nvSpPr>
-        <p:spPr>
-          <a:xfrm>
-            <a:off x="836612" y="2109310"/>
-            <a:ext cx="5157787" cy="3662840"/>
-          </a:xfrm>
-        </p:spPr>
-        <p:txBody>
-          <a:bodyPr>
-            <a:normAutofit fontScale="77500" lnSpcReduction="20000"/>
-          </a:bodyPr>
-          <a:lstStyle/>
-          <a:p>
-            <a:r>
-              <a:rPr lang="en-GB" dirty="0"/>
-              <a:t>Human readable</a:t>
-            </a:r>
-          </a:p>
-          <a:p>
-            <a:r>
-              <a:rPr lang="en-GB" dirty="0"/>
-              <a:t>Cross language, don’t plan on using multiple</a:t>
-            </a:r>
-          </a:p>
-          <a:p>
-            <a:r>
-              <a:rPr lang="en-GB" dirty="0"/>
-              <a:t>Industry standard, better documented and supported</a:t>
-            </a:r>
-          </a:p>
-          <a:p>
-            <a:r>
-              <a:rPr lang="en-GB" dirty="0"/>
-              <a:t>Much more safe, as I’m passing </a:t>
-            </a:r>
-            <a:r>
-              <a:rPr lang="en-GB" dirty="0" err="1"/>
-              <a:t>ip</a:t>
-            </a:r>
-            <a:r>
-              <a:rPr lang="en-GB" dirty="0"/>
-              <a:t> addresses etc may be an advantage</a:t>
-            </a:r>
-          </a:p>
-          <a:p>
-            <a:r>
-              <a:rPr lang="en-GB" dirty="0"/>
-              <a:t>Cant deal with tuples etc and makes non string keys in dictionaries into strings, this causes issues with my mainloop.py using integer keys on a dictionary</a:t>
-            </a:r>
-          </a:p>
-          <a:p>
-            <a:endParaRPr lang="en-GB" dirty="0"/>
-          </a:p>
-        </p:txBody>
-      </p:sp>
-      <p:sp>
-        <p:nvSpPr>
-          <p:cNvPr id="7" name="Text Placeholder 6">
-            <a:extLst>
-              <a:ext uri="{FF2B5EF4-FFF2-40B4-BE49-F238E27FC236}">
-                <a16:creationId xmlns:a16="http://schemas.microsoft.com/office/drawing/2014/main" id="{DC1B5B73-6C08-4506-BB0E-0EBC69919EB2}"/>
-              </a:ext>
-            </a:extLst>
-          </p:cNvPr>
-          <p:cNvSpPr>
-            <a:spLocks noGrp="1"/>
-          </p:cNvSpPr>
-          <p:nvPr>
-            <p:ph type="body" sz="quarter" idx="3"/>
-          </p:nvPr>
-        </p:nvSpPr>
-        <p:spPr>
-          <a:xfrm>
-            <a:off x="6169024" y="1223486"/>
-            <a:ext cx="5183188" cy="823912"/>
-          </a:xfrm>
-        </p:spPr>
-        <p:txBody>
-          <a:bodyPr/>
-          <a:lstStyle/>
-          <a:p>
-            <a:r>
-              <a:rPr lang="en-GB" dirty="0"/>
-              <a:t>Pickle</a:t>
-            </a:r>
-          </a:p>
-        </p:txBody>
-      </p:sp>
-      <p:sp>
-        <p:nvSpPr>
-          <p:cNvPr id="8" name="Content Placeholder 7">
-            <a:extLst>
-              <a:ext uri="{FF2B5EF4-FFF2-40B4-BE49-F238E27FC236}">
-                <a16:creationId xmlns:a16="http://schemas.microsoft.com/office/drawing/2014/main" id="{A01C3724-C00E-4D83-8E7C-E0A80D306A2E}"/>
-              </a:ext>
-            </a:extLst>
-          </p:cNvPr>
-          <p:cNvSpPr>
-            <a:spLocks noGrp="1"/>
-          </p:cNvSpPr>
-          <p:nvPr>
-            <p:ph sz="quarter" idx="4"/>
-          </p:nvPr>
-        </p:nvSpPr>
-        <p:spPr>
-          <a:xfrm>
-            <a:off x="6169024" y="2047398"/>
-            <a:ext cx="5183188" cy="3209925"/>
-          </a:xfrm>
-        </p:spPr>
-        <p:txBody>
-          <a:bodyPr>
-            <a:normAutofit fontScale="77500" lnSpcReduction="20000"/>
-          </a:bodyPr>
-          <a:lstStyle/>
-          <a:p>
-            <a:r>
-              <a:rPr lang="en-GB" dirty="0"/>
-              <a:t>Faster</a:t>
-            </a:r>
-          </a:p>
-          <a:p>
-            <a:r>
-              <a:rPr lang="en-GB" dirty="0"/>
-              <a:t>Can send classes etc which may be useful later down the line to have more flexibility don’t want to import this and json</a:t>
-            </a:r>
-          </a:p>
-          <a:p>
-            <a:r>
-              <a:rPr lang="en-GB" dirty="0"/>
-              <a:t>Allows for data serialization of more data types and better support for pythonic use cases</a:t>
-            </a:r>
-          </a:p>
-          <a:p>
-            <a:r>
-              <a:rPr lang="en-GB" dirty="0"/>
-              <a:t>Could be faster using </a:t>
-            </a:r>
-            <a:r>
-              <a:rPr lang="en-GB" dirty="0" err="1"/>
-              <a:t>cpickle</a:t>
-            </a:r>
-            <a:r>
-              <a:rPr lang="en-GB" dirty="0"/>
-              <a:t> but this is not supported in python 3.x yet</a:t>
-            </a:r>
-          </a:p>
-        </p:txBody>
-      </p:sp>
-      <p:sp>
-        <p:nvSpPr>
-          <p:cNvPr id="2" name="TextBox 1">
-            <a:extLst>
-              <a:ext uri="{FF2B5EF4-FFF2-40B4-BE49-F238E27FC236}">
-                <a16:creationId xmlns:a16="http://schemas.microsoft.com/office/drawing/2014/main" id="{A12778BE-AF43-4579-82D8-5CB2F5D50C53}"/>
-              </a:ext>
-            </a:extLst>
-          </p:cNvPr>
-          <p:cNvSpPr txBox="1"/>
-          <p:nvPr/>
-        </p:nvSpPr>
-        <p:spPr>
-          <a:xfrm>
-            <a:off x="700881" y="5538768"/>
-            <a:ext cx="10790237" cy="954107"/>
-          </a:xfrm>
-          <a:prstGeom prst="rect">
-            <a:avLst/>
-          </a:prstGeom>
-          <a:noFill/>
-        </p:spPr>
-        <p:txBody>
-          <a:bodyPr wrap="square" rtlCol="0">
-            <a:spAutoFit/>
-          </a:bodyPr>
-          <a:lstStyle/>
-          <a:p>
-            <a:r>
-              <a:rPr lang="en-GB" sz="2800" dirty="0"/>
-              <a:t>Due to the issues with json and the python specific design of pickle I have decided to use pickle.</a:t>
+              <a:t>Necessary user functions</a:t>
+            </a:r>
+          </a:p>
+        </p:txBody>
+      </p:sp>
+      <p:sp>
+        <p:nvSpPr>
+          <p:cNvPr id="3" name="Content Placeholder 2">
+            <a:extLst>
+              <a:ext uri="{FF2B5EF4-FFF2-40B4-BE49-F238E27FC236}">
+                <a16:creationId xmlns:a16="http://schemas.microsoft.com/office/drawing/2014/main" id="{F6BB918B-6819-4478-B0CD-ED27E47326ED}"/>
+              </a:ext>
+            </a:extLst>
+          </p:cNvPr>
+          <p:cNvSpPr>
+            <a:spLocks noGrp="1"/>
+          </p:cNvSpPr>
+          <p:nvPr>
+            <p:ph idx="1"/>
+          </p:nvPr>
+        </p:nvSpPr>
+        <p:spPr/>
+        <p:txBody>
+          <a:bodyPr/>
+          <a:lstStyle/>
+          <a:p>
+            <a:r>
+              <a:rPr lang="en-GB" dirty="0"/>
+              <a:t>View past games(maybe replay functionality)</a:t>
+            </a:r>
+          </a:p>
+          <a:p>
+            <a:r>
+              <a:rPr lang="en-GB" dirty="0"/>
+              <a:t>View their lifetime &amp; recent statistics with graphs+ extrapolation</a:t>
+            </a:r>
+          </a:p>
+          <a:p>
+            <a:r>
+              <a:rPr lang="en-GB" dirty="0"/>
+              <a:t>Update payroll</a:t>
+            </a:r>
+          </a:p>
+          <a:p>
+            <a:r>
+              <a:rPr lang="en-GB" dirty="0"/>
+              <a:t>A preliminary test before booking an appointment to get an early diagnosis</a:t>
+            </a:r>
+          </a:p>
+          <a:p>
+            <a:r>
+              <a:rPr lang="en-GB" dirty="0"/>
+              <a:t>Host/join a game</a:t>
+            </a:r>
+          </a:p>
+          <a:p>
+            <a:r>
+              <a:rPr lang="en-GB" dirty="0"/>
+              <a:t>Add friends for easier game access</a:t>
             </a:r>
           </a:p>
         </p:txBody>
@@ -4424,7 +4391,7 @@
     </p:spTree>
     <p:extLst>
       <p:ext uri="{BB962C8B-B14F-4D97-AF65-F5344CB8AC3E}">
-        <p14:creationId xmlns:p14="http://schemas.microsoft.com/office/powerpoint/2010/main" val="743699574"/>
+        <p14:creationId xmlns:p14="http://schemas.microsoft.com/office/powerpoint/2010/main" val="3128323718"/>
       </p:ext>
     </p:extLst>
   </p:cSld>
@@ -4456,7 +4423,7 @@
           <p:cNvPr id="2" name="Title 1">
             <a:extLst>
               <a:ext uri="{FF2B5EF4-FFF2-40B4-BE49-F238E27FC236}">
-                <a16:creationId xmlns:a16="http://schemas.microsoft.com/office/drawing/2014/main" id="{E978F30E-70B8-4C4B-956E-77EA0447200E}"/>
+                <a16:creationId xmlns:a16="http://schemas.microsoft.com/office/drawing/2014/main" id="{790527AB-E460-46A4-B7B4-3C1BFC1DD286}"/>
               </a:ext>
             </a:extLst>
           </p:cNvPr>
@@ -4474,7 +4441,7 @@
           <a:p>
             <a:r>
               <a:rPr lang="en-GB" dirty="0"/>
-              <a:t>Useful links crypto</a:t>
+              <a:t>Split pot calculations</a:t>
             </a:r>
           </a:p>
         </p:txBody>
@@ -4484,7 +4451,7 @@
           <p:cNvPr id="3" name="Content Placeholder 2">
             <a:extLst>
               <a:ext uri="{FF2B5EF4-FFF2-40B4-BE49-F238E27FC236}">
-                <a16:creationId xmlns:a16="http://schemas.microsoft.com/office/drawing/2014/main" id="{04CB57B1-98C8-45E2-AFC8-F27A2A0BE441}"/>
+                <a16:creationId xmlns:a16="http://schemas.microsoft.com/office/drawing/2014/main" id="{FA08A01C-A3F7-4D41-8FAD-98DF9EA7B96D}"/>
               </a:ext>
             </a:extLst>
           </p:cNvPr>
@@ -4501,41 +4468,12 @@
           <a:lstStyle/>
           <a:p>
             <a:r>
-              <a:rPr lang="en-GB" dirty="0">
-                <a:hlinkClick r:id="rId2"/>
-              </a:rPr>
-              <a:t>https://en.wikipedia.org/wiki/RSA_(cryptosystem)#Key_generation</a:t>
-            </a:r>
-            <a:endParaRPr lang="en-GB" dirty="0"/>
-          </a:p>
-          <a:p>
-            <a:r>
-              <a:rPr lang="en-GB" dirty="0">
-                <a:hlinkClick r:id="rId3"/>
-              </a:rPr>
-              <a:t>https://cryptography.io/en/latest/hazmat/primitives/asymmetric/rsa/</a:t>
-            </a:r>
-            <a:endParaRPr lang="en-GB" dirty="0"/>
-          </a:p>
-          <a:p>
-            <a:r>
-              <a:rPr lang="en-GB" dirty="0">
-                <a:hlinkClick r:id="rId4"/>
-              </a:rPr>
-              <a:t>https://cryptography.io/en/latest/hazmat/primitives/asymmetric/</a:t>
-            </a:r>
-            <a:endParaRPr lang="en-GB" dirty="0"/>
-          </a:p>
-          <a:p>
-            <a:r>
-              <a:rPr lang="en-GB" dirty="0">
-                <a:hlinkClick r:id="rId5"/>
-              </a:rPr>
-              <a:t>https://security.stackexchange.com/questions/5096/rsa-vs-dsa-for-ssh-authentication-keys</a:t>
-            </a:r>
-            <a:endParaRPr lang="en-GB" dirty="0"/>
-          </a:p>
-          <a:p>
+              <a:rPr lang="en-GB" dirty="0"/>
+              <a:t>One challenging part of the game logic will be calculating split pots</a:t>
+            </a:r>
+          </a:p>
+          <a:p>
+            <a:pPr lvl="1"/>
             <a:endParaRPr lang="en-GB" dirty="0"/>
           </a:p>
         </p:txBody>
@@ -4543,7 +4481,7 @@
     </p:spTree>
     <p:extLst>
       <p:ext uri="{BB962C8B-B14F-4D97-AF65-F5344CB8AC3E}">
-        <p14:creationId xmlns:p14="http://schemas.microsoft.com/office/powerpoint/2010/main" val="3309908080"/>
+        <p14:creationId xmlns:p14="http://schemas.microsoft.com/office/powerpoint/2010/main" val="1191071722"/>
       </p:ext>
     </p:extLst>
   </p:cSld>
@@ -4575,7 +4513,7 @@
           <p:cNvPr id="2" name="Title 1">
             <a:extLst>
               <a:ext uri="{FF2B5EF4-FFF2-40B4-BE49-F238E27FC236}">
-                <a16:creationId xmlns:a16="http://schemas.microsoft.com/office/drawing/2014/main" id="{76B61AC1-EA1A-43B0-BF64-56FF385255B4}"/>
+                <a16:creationId xmlns:a16="http://schemas.microsoft.com/office/drawing/2014/main" id="{76D7B618-33EA-4285-BC95-74EBA3A9CE4B}"/>
               </a:ext>
             </a:extLst>
           </p:cNvPr>
@@ -4593,67 +4531,82 @@
           <a:p>
             <a:r>
               <a:rPr lang="en-GB" dirty="0"/>
-              <a:t>Useful links networking</a:t>
-            </a:r>
-          </a:p>
-        </p:txBody>
-      </p:sp>
-      <p:sp>
-        <p:nvSpPr>
-          <p:cNvPr id="3" name="Content Placeholder 2">
-            <a:extLst>
-              <a:ext uri="{FF2B5EF4-FFF2-40B4-BE49-F238E27FC236}">
-                <a16:creationId xmlns:a16="http://schemas.microsoft.com/office/drawing/2014/main" id="{DD2AB15A-FBF2-4686-A1B3-E5CBB3E3ABFC}"/>
-              </a:ext>
-            </a:extLst>
-          </p:cNvPr>
-          <p:cNvSpPr>
-            <a:spLocks noGrp="1"/>
-          </p:cNvSpPr>
+              <a:t>Serialising arrays for data transfer</a:t>
+            </a:r>
+          </a:p>
+        </p:txBody>
+      </p:sp>
+      <p:pic>
+        <p:nvPicPr>
+          <p:cNvPr id="4" name="Content Placeholder 3">
+            <a:extLst>
+              <a:ext uri="{FF2B5EF4-FFF2-40B4-BE49-F238E27FC236}">
+                <a16:creationId xmlns:a16="http://schemas.microsoft.com/office/drawing/2014/main" id="{1A3286E0-E11A-4FE9-B2E3-7E8C1F2A6689}"/>
+              </a:ext>
+            </a:extLst>
+          </p:cNvPr>
+          <p:cNvPicPr>
+            <a:picLocks noGrp="1" noChangeAspect="1"/>
+          </p:cNvPicPr>
           <p:nvPr>
             <p:ph idx="1"/>
           </p:nvPr>
-        </p:nvSpPr>
-        <p:spPr/>
-        <p:txBody>
-          <a:bodyPr/>
-          <a:lstStyle/>
-          <a:p>
-            <a:r>
-              <a:rPr lang="en-GB" dirty="0">
-                <a:hlinkClick r:id="rId2"/>
-              </a:rPr>
-              <a:t>https://www.tutorialspoint.com/python/python_networking.htm</a:t>
-            </a:r>
-            <a:endParaRPr lang="en-GB" dirty="0"/>
-          </a:p>
-          <a:p>
-            <a:r>
-              <a:rPr lang="en-GB" dirty="0">
-                <a:hlinkClick r:id="rId3"/>
-              </a:rPr>
-              <a:t>https://www.w3schools.in/python-tutorial/network-programming/</a:t>
-            </a:r>
-            <a:endParaRPr lang="en-GB" dirty="0"/>
-          </a:p>
-          <a:p>
-            <a:r>
-              <a:rPr lang="en-GB" dirty="0">
-                <a:hlinkClick r:id="rId4"/>
-              </a:rPr>
-              <a:t>https://stackoverflow.com/questions/34653875/python-how-to-send-data-over-tcp</a:t>
-            </a:r>
-            <a:endParaRPr lang="en-GB" dirty="0"/>
-          </a:p>
-          <a:p>
-            <a:endParaRPr lang="en-GB" dirty="0"/>
+        </p:nvPicPr>
+        <p:blipFill>
+          <a:blip r:embed="rId2"/>
+          <a:stretch>
+            <a:fillRect/>
+          </a:stretch>
+        </p:blipFill>
+        <p:spPr>
+          <a:xfrm>
+            <a:off x="718706" y="1690688"/>
+            <a:ext cx="6182588" cy="1914792"/>
+          </a:xfrm>
+          <a:prstGeom prst="rect">
+            <a:avLst/>
+          </a:prstGeom>
+        </p:spPr>
+      </p:pic>
+      <p:sp>
+        <p:nvSpPr>
+          <p:cNvPr id="5" name="TextBox 4">
+            <a:extLst>
+              <a:ext uri="{FF2B5EF4-FFF2-40B4-BE49-F238E27FC236}">
+                <a16:creationId xmlns:a16="http://schemas.microsoft.com/office/drawing/2014/main" id="{BC3B7363-8C1F-46B9-814C-93393E0B8081}"/>
+              </a:ext>
+            </a:extLst>
+          </p:cNvPr>
+          <p:cNvSpPr txBox="1"/>
+          <p:nvPr/>
+        </p:nvSpPr>
+        <p:spPr>
+          <a:xfrm>
+            <a:off x="7458075" y="1690688"/>
+            <a:ext cx="4371975" cy="1754326"/>
+          </a:xfrm>
+          <a:prstGeom prst="rect">
+            <a:avLst/>
+          </a:prstGeom>
+          <a:noFill/>
+        </p:spPr>
+        <p:txBody>
+          <a:bodyPr wrap="square" rtlCol="0">
+            <a:spAutoFit/>
+          </a:bodyPr>
+          <a:lstStyle/>
+          <a:p>
+            <a:r>
+              <a:rPr lang="en-GB" dirty="0"/>
+              <a:t>When attempting to send database tables across the network as python lists, I ran into a problem where I couldn’t encode the array to send it via socket. To fix this I will need to use some form of serialisation, this meant I needed to decide between pickle and json</a:t>
+            </a:r>
           </a:p>
         </p:txBody>
       </p:sp>
     </p:spTree>
     <p:extLst>
       <p:ext uri="{BB962C8B-B14F-4D97-AF65-F5344CB8AC3E}">
-        <p14:creationId xmlns:p14="http://schemas.microsoft.com/office/powerpoint/2010/main" val="4186440119"/>
+        <p14:creationId xmlns:p14="http://schemas.microsoft.com/office/powerpoint/2010/main" val="1795613777"/>
       </p:ext>
     </p:extLst>
   </p:cSld>
@@ -4682,10 +4635,10 @@
       </p:grpSpPr>
       <p:sp>
         <p:nvSpPr>
-          <p:cNvPr id="2" name="Title 1">
-            <a:extLst>
-              <a:ext uri="{FF2B5EF4-FFF2-40B4-BE49-F238E27FC236}">
-                <a16:creationId xmlns:a16="http://schemas.microsoft.com/office/drawing/2014/main" id="{103886FA-BC70-43F1-8492-3D2BD6D73654}"/>
+          <p:cNvPr id="4" name="Title 3">
+            <a:extLst>
+              <a:ext uri="{FF2B5EF4-FFF2-40B4-BE49-F238E27FC236}">
+                <a16:creationId xmlns:a16="http://schemas.microsoft.com/office/drawing/2014/main" id="{9A0C13EF-555C-49BA-8A54-6EF26B900BA7}"/>
               </a:ext>
             </a:extLst>
           </p:cNvPr>
@@ -4703,56 +4656,247 @@
           <a:p>
             <a:r>
               <a:rPr lang="en-GB" dirty="0"/>
-              <a:t>notes</a:t>
-            </a:r>
-          </a:p>
-        </p:txBody>
-      </p:sp>
-      <p:sp>
-        <p:nvSpPr>
-          <p:cNvPr id="3" name="Content Placeholder 2">
-            <a:extLst>
-              <a:ext uri="{FF2B5EF4-FFF2-40B4-BE49-F238E27FC236}">
-                <a16:creationId xmlns:a16="http://schemas.microsoft.com/office/drawing/2014/main" id="{5A02EDD2-E34D-4469-BDA7-CE646653E7DE}"/>
-              </a:ext>
-            </a:extLst>
-          </p:cNvPr>
-          <p:cNvSpPr>
-            <a:spLocks noGrp="1"/>
-          </p:cNvSpPr>
-          <p:nvPr>
-            <p:ph idx="1"/>
-          </p:nvPr>
-        </p:nvSpPr>
-        <p:spPr/>
-        <p:txBody>
-          <a:bodyPr/>
-          <a:lstStyle/>
-          <a:p>
+              <a:t>Serialisation comparison</a:t>
+            </a:r>
+          </a:p>
+        </p:txBody>
+      </p:sp>
+      <p:sp>
+        <p:nvSpPr>
+          <p:cNvPr id="5" name="Text Placeholder 4">
+            <a:extLst>
+              <a:ext uri="{FF2B5EF4-FFF2-40B4-BE49-F238E27FC236}">
+                <a16:creationId xmlns:a16="http://schemas.microsoft.com/office/drawing/2014/main" id="{212CED7E-A6E7-4335-BA7C-50C64F0157BE}"/>
+              </a:ext>
+            </a:extLst>
+          </p:cNvPr>
+          <p:cNvSpPr>
+            <a:spLocks noGrp="1"/>
+          </p:cNvSpPr>
+          <p:nvPr>
+            <p:ph type="body" idx="1"/>
+          </p:nvPr>
+        </p:nvSpPr>
+        <p:spPr>
+          <a:xfrm>
+            <a:off x="836612" y="1223486"/>
+            <a:ext cx="5157787" cy="823912"/>
+          </a:xfrm>
+        </p:spPr>
+        <p:txBody>
+          <a:bodyPr/>
+          <a:lstStyle/>
+          <a:p>
+            <a:r>
+              <a:rPr lang="en-GB" dirty="0"/>
+              <a:t>JSON</a:t>
+            </a:r>
+          </a:p>
+        </p:txBody>
+      </p:sp>
+      <p:sp>
+        <p:nvSpPr>
+          <p:cNvPr id="6" name="Content Placeholder 5">
+            <a:extLst>
+              <a:ext uri="{FF2B5EF4-FFF2-40B4-BE49-F238E27FC236}">
+                <a16:creationId xmlns:a16="http://schemas.microsoft.com/office/drawing/2014/main" id="{611325CE-52BE-4D7F-A26F-8F7FB9C3FF44}"/>
+              </a:ext>
+            </a:extLst>
+          </p:cNvPr>
+          <p:cNvSpPr>
+            <a:spLocks noGrp="1"/>
+          </p:cNvSpPr>
+          <p:nvPr>
+            <p:ph sz="half" idx="2"/>
+          </p:nvPr>
+        </p:nvSpPr>
+        <p:spPr>
+          <a:xfrm>
+            <a:off x="836612" y="2109310"/>
+            <a:ext cx="5157787" cy="3662840"/>
+          </a:xfrm>
+        </p:spPr>
+        <p:txBody>
+          <a:bodyPr>
+            <a:normAutofit fontScale="77500" lnSpcReduction="20000"/>
+          </a:bodyPr>
+          <a:lstStyle/>
+          <a:p>
+            <a:r>
+              <a:rPr lang="en-GB" dirty="0"/>
+              <a:t>Human readable</a:t>
+            </a:r>
+          </a:p>
+          <a:p>
+            <a:r>
+              <a:rPr lang="en-GB" dirty="0"/>
+              <a:t>Cross language, don’t plan on using multiple</a:t>
+            </a:r>
+          </a:p>
+          <a:p>
+            <a:r>
+              <a:rPr lang="en-GB" dirty="0"/>
+              <a:t>Industry standard, better documented and supported</a:t>
+            </a:r>
+          </a:p>
+          <a:p>
+            <a:r>
+              <a:rPr lang="en-GB" dirty="0"/>
+              <a:t>Much more safe, as I’m passing </a:t>
+            </a:r>
             <a:r>
               <a:rPr lang="en-GB" dirty="0" err="1"/>
               <a:t>ip</a:t>
             </a:r>
             <a:r>
               <a:rPr lang="en-GB" dirty="0"/>
-              <a:t> is allocated to username for 24 hours or until the account is logged out of,</a:t>
-            </a:r>
-          </a:p>
-          <a:p>
-            <a:r>
-              <a:rPr lang="en-GB" dirty="0"/>
-              <a:t>Classes = UI, client, manager</a:t>
+              <a:t> addresses etc may be an advantage</a:t>
+            </a:r>
+          </a:p>
+          <a:p>
+            <a:r>
+              <a:rPr lang="en-GB" dirty="0"/>
+              <a:t>Cant deal with tuples etc and makes non string keys in dictionaries into strings, this causes issues with my mainloop.py using integer keys on a dictionary</a:t>
             </a:r>
           </a:p>
           <a:p>
             <a:endParaRPr lang="en-GB" dirty="0"/>
+          </a:p>
+        </p:txBody>
+      </p:sp>
+      <p:sp>
+        <p:nvSpPr>
+          <p:cNvPr id="7" name="Text Placeholder 6">
+            <a:extLst>
+              <a:ext uri="{FF2B5EF4-FFF2-40B4-BE49-F238E27FC236}">
+                <a16:creationId xmlns:a16="http://schemas.microsoft.com/office/drawing/2014/main" id="{DC1B5B73-6C08-4506-BB0E-0EBC69919EB2}"/>
+              </a:ext>
+            </a:extLst>
+          </p:cNvPr>
+          <p:cNvSpPr>
+            <a:spLocks noGrp="1"/>
+          </p:cNvSpPr>
+          <p:nvPr>
+            <p:ph type="body" sz="quarter" idx="3"/>
+          </p:nvPr>
+        </p:nvSpPr>
+        <p:spPr>
+          <a:xfrm>
+            <a:off x="6169024" y="1223486"/>
+            <a:ext cx="5183188" cy="823912"/>
+          </a:xfrm>
+        </p:spPr>
+        <p:txBody>
+          <a:bodyPr/>
+          <a:lstStyle/>
+          <a:p>
+            <a:r>
+              <a:rPr lang="en-GB" dirty="0"/>
+              <a:t>Pickle</a:t>
+            </a:r>
+          </a:p>
+        </p:txBody>
+      </p:sp>
+      <p:sp>
+        <p:nvSpPr>
+          <p:cNvPr id="8" name="Content Placeholder 7">
+            <a:extLst>
+              <a:ext uri="{FF2B5EF4-FFF2-40B4-BE49-F238E27FC236}">
+                <a16:creationId xmlns:a16="http://schemas.microsoft.com/office/drawing/2014/main" id="{A01C3724-C00E-4D83-8E7C-E0A80D306A2E}"/>
+              </a:ext>
+            </a:extLst>
+          </p:cNvPr>
+          <p:cNvSpPr>
+            <a:spLocks noGrp="1"/>
+          </p:cNvSpPr>
+          <p:nvPr>
+            <p:ph sz="quarter" idx="4"/>
+          </p:nvPr>
+        </p:nvSpPr>
+        <p:spPr>
+          <a:xfrm>
+            <a:off x="6169024" y="2047398"/>
+            <a:ext cx="5183188" cy="3209925"/>
+          </a:xfrm>
+        </p:spPr>
+        <p:txBody>
+          <a:bodyPr>
+            <a:normAutofit fontScale="77500" lnSpcReduction="20000"/>
+          </a:bodyPr>
+          <a:lstStyle/>
+          <a:p>
+            <a:r>
+              <a:rPr lang="en-GB" dirty="0"/>
+              <a:t>Faster</a:t>
+            </a:r>
+          </a:p>
+          <a:p>
+            <a:r>
+              <a:rPr lang="en-GB" dirty="0"/>
+              <a:t>Can send classes etc which may be useful later down the line to have more flexibility don’t want to import this and json</a:t>
+            </a:r>
+          </a:p>
+          <a:p>
+            <a:r>
+              <a:rPr lang="en-GB" dirty="0"/>
+              <a:t>Allows for data serialization of more data types and better support for pythonic use cases</a:t>
+            </a:r>
+          </a:p>
+          <a:p>
+            <a:r>
+              <a:rPr lang="en-GB" dirty="0"/>
+              <a:t>Could be faster using </a:t>
+            </a:r>
+            <a:r>
+              <a:rPr lang="en-GB" dirty="0" err="1"/>
+              <a:t>cpickle</a:t>
+            </a:r>
+            <a:r>
+              <a:rPr lang="en-GB" dirty="0"/>
+              <a:t> but this is not supported in python 3.x yet</a:t>
+            </a:r>
+          </a:p>
+        </p:txBody>
+      </p:sp>
+      <p:sp>
+        <p:nvSpPr>
+          <p:cNvPr id="2" name="TextBox 1">
+            <a:extLst>
+              <a:ext uri="{FF2B5EF4-FFF2-40B4-BE49-F238E27FC236}">
+                <a16:creationId xmlns:a16="http://schemas.microsoft.com/office/drawing/2014/main" id="{A12778BE-AF43-4579-82D8-5CB2F5D50C53}"/>
+              </a:ext>
+            </a:extLst>
+          </p:cNvPr>
+          <p:cNvSpPr txBox="1"/>
+          <p:nvPr/>
+        </p:nvSpPr>
+        <p:spPr>
+          <a:xfrm>
+            <a:off x="700881" y="5538768"/>
+            <a:ext cx="10790237" cy="954107"/>
+          </a:xfrm>
+          <a:prstGeom prst="rect">
+            <a:avLst/>
+          </a:prstGeom>
+          <a:noFill/>
+        </p:spPr>
+        <p:txBody>
+          <a:bodyPr wrap="square" rtlCol="0">
+            <a:spAutoFit/>
+          </a:bodyPr>
+          <a:lstStyle/>
+          <a:p>
+            <a:r>
+              <a:rPr lang="en-GB" sz="2800" dirty="0"/>
+              <a:t>Due to the issues with json and the python specific design of pickle I have decided to use pickle.</a:t>
+            </a:r>
           </a:p>
         </p:txBody>
       </p:sp>
     </p:spTree>
     <p:extLst>
       <p:ext uri="{BB962C8B-B14F-4D97-AF65-F5344CB8AC3E}">
-        <p14:creationId xmlns:p14="http://schemas.microsoft.com/office/powerpoint/2010/main" val="2517001702"/>
+        <p14:creationId xmlns:p14="http://schemas.microsoft.com/office/powerpoint/2010/main" val="743699574"/>
       </p:ext>
     </p:extLst>
   </p:cSld>
@@ -4870,6 +5014,334 @@
           <p:cNvPr id="2" name="Title 1">
             <a:extLst>
               <a:ext uri="{FF2B5EF4-FFF2-40B4-BE49-F238E27FC236}">
+                <a16:creationId xmlns:a16="http://schemas.microsoft.com/office/drawing/2014/main" id="{E978F30E-70B8-4C4B-956E-77EA0447200E}"/>
+              </a:ext>
+            </a:extLst>
+          </p:cNvPr>
+          <p:cNvSpPr>
+            <a:spLocks noGrp="1"/>
+          </p:cNvSpPr>
+          <p:nvPr>
+            <p:ph type="title"/>
+          </p:nvPr>
+        </p:nvSpPr>
+        <p:spPr/>
+        <p:txBody>
+          <a:bodyPr/>
+          <a:lstStyle/>
+          <a:p>
+            <a:r>
+              <a:rPr lang="en-GB" dirty="0"/>
+              <a:t>Useful links crypto</a:t>
+            </a:r>
+          </a:p>
+        </p:txBody>
+      </p:sp>
+      <p:sp>
+        <p:nvSpPr>
+          <p:cNvPr id="3" name="Content Placeholder 2">
+            <a:extLst>
+              <a:ext uri="{FF2B5EF4-FFF2-40B4-BE49-F238E27FC236}">
+                <a16:creationId xmlns:a16="http://schemas.microsoft.com/office/drawing/2014/main" id="{04CB57B1-98C8-45E2-AFC8-F27A2A0BE441}"/>
+              </a:ext>
+            </a:extLst>
+          </p:cNvPr>
+          <p:cNvSpPr>
+            <a:spLocks noGrp="1"/>
+          </p:cNvSpPr>
+          <p:nvPr>
+            <p:ph idx="1"/>
+          </p:nvPr>
+        </p:nvSpPr>
+        <p:spPr/>
+        <p:txBody>
+          <a:bodyPr/>
+          <a:lstStyle/>
+          <a:p>
+            <a:r>
+              <a:rPr lang="en-GB" dirty="0">
+                <a:hlinkClick r:id="rId2"/>
+              </a:rPr>
+              <a:t>https://en.wikipedia.org/wiki/RSA_(cryptosystem)#Key_generation</a:t>
+            </a:r>
+            <a:endParaRPr lang="en-GB" dirty="0"/>
+          </a:p>
+          <a:p>
+            <a:r>
+              <a:rPr lang="en-GB" dirty="0">
+                <a:hlinkClick r:id="rId3"/>
+              </a:rPr>
+              <a:t>https://cryptography.io/en/latest/hazmat/primitives/asymmetric/rsa/</a:t>
+            </a:r>
+            <a:endParaRPr lang="en-GB" dirty="0"/>
+          </a:p>
+          <a:p>
+            <a:r>
+              <a:rPr lang="en-GB" dirty="0">
+                <a:hlinkClick r:id="rId4"/>
+              </a:rPr>
+              <a:t>https://cryptography.io/en/latest/hazmat/primitives/asymmetric/</a:t>
+            </a:r>
+            <a:endParaRPr lang="en-GB" dirty="0"/>
+          </a:p>
+          <a:p>
+            <a:r>
+              <a:rPr lang="en-GB" dirty="0">
+                <a:hlinkClick r:id="rId5"/>
+              </a:rPr>
+              <a:t>https://security.stackexchange.com/questions/5096/rsa-vs-dsa-for-ssh-authentication-keys</a:t>
+            </a:r>
+            <a:endParaRPr lang="en-GB" dirty="0"/>
+          </a:p>
+          <a:p>
+            <a:endParaRPr lang="en-GB" dirty="0"/>
+          </a:p>
+        </p:txBody>
+      </p:sp>
+    </p:spTree>
+    <p:extLst>
+      <p:ext uri="{BB962C8B-B14F-4D97-AF65-F5344CB8AC3E}">
+        <p14:creationId xmlns:p14="http://schemas.microsoft.com/office/powerpoint/2010/main" val="3309908080"/>
+      </p:ext>
+    </p:extLst>
+  </p:cSld>
+  <p:clrMapOvr>
+    <a:masterClrMapping/>
+  </p:clrMapOvr>
+</p:sld>
+</file>
+
+<file path=ppt/slides/slide21.xml><?xml version="1.0" encoding="utf-8"?>
+<p:sld xmlns:a="http://schemas.openxmlformats.org/drawingml/2006/main" xmlns:r="http://schemas.openxmlformats.org/officeDocument/2006/relationships" xmlns:p="http://schemas.openxmlformats.org/presentationml/2006/main">
+  <p:cSld>
+    <p:spTree>
+      <p:nvGrpSpPr>
+        <p:cNvPr id="1" name=""/>
+        <p:cNvGrpSpPr/>
+        <p:nvPr/>
+      </p:nvGrpSpPr>
+      <p:grpSpPr>
+        <a:xfrm>
+          <a:off x="0" y="0"/>
+          <a:ext cx="0" cy="0"/>
+          <a:chOff x="0" y="0"/>
+          <a:chExt cx="0" cy="0"/>
+        </a:xfrm>
+      </p:grpSpPr>
+      <p:sp>
+        <p:nvSpPr>
+          <p:cNvPr id="2" name="Title 1">
+            <a:extLst>
+              <a:ext uri="{FF2B5EF4-FFF2-40B4-BE49-F238E27FC236}">
+                <a16:creationId xmlns:a16="http://schemas.microsoft.com/office/drawing/2014/main" id="{76B61AC1-EA1A-43B0-BF64-56FF385255B4}"/>
+              </a:ext>
+            </a:extLst>
+          </p:cNvPr>
+          <p:cNvSpPr>
+            <a:spLocks noGrp="1"/>
+          </p:cNvSpPr>
+          <p:nvPr>
+            <p:ph type="title"/>
+          </p:nvPr>
+        </p:nvSpPr>
+        <p:spPr/>
+        <p:txBody>
+          <a:bodyPr/>
+          <a:lstStyle/>
+          <a:p>
+            <a:r>
+              <a:rPr lang="en-GB" dirty="0"/>
+              <a:t>Useful links networking</a:t>
+            </a:r>
+          </a:p>
+        </p:txBody>
+      </p:sp>
+      <p:sp>
+        <p:nvSpPr>
+          <p:cNvPr id="3" name="Content Placeholder 2">
+            <a:extLst>
+              <a:ext uri="{FF2B5EF4-FFF2-40B4-BE49-F238E27FC236}">
+                <a16:creationId xmlns:a16="http://schemas.microsoft.com/office/drawing/2014/main" id="{DD2AB15A-FBF2-4686-A1B3-E5CBB3E3ABFC}"/>
+              </a:ext>
+            </a:extLst>
+          </p:cNvPr>
+          <p:cNvSpPr>
+            <a:spLocks noGrp="1"/>
+          </p:cNvSpPr>
+          <p:nvPr>
+            <p:ph idx="1"/>
+          </p:nvPr>
+        </p:nvSpPr>
+        <p:spPr/>
+        <p:txBody>
+          <a:bodyPr/>
+          <a:lstStyle/>
+          <a:p>
+            <a:r>
+              <a:rPr lang="en-GB" dirty="0">
+                <a:hlinkClick r:id="rId2"/>
+              </a:rPr>
+              <a:t>https://www.tutorialspoint.com/python/python_networking.htm</a:t>
+            </a:r>
+            <a:endParaRPr lang="en-GB" dirty="0"/>
+          </a:p>
+          <a:p>
+            <a:r>
+              <a:rPr lang="en-GB" dirty="0">
+                <a:hlinkClick r:id="rId3"/>
+              </a:rPr>
+              <a:t>https://www.w3schools.in/python-tutorial/network-programming/</a:t>
+            </a:r>
+            <a:endParaRPr lang="en-GB" dirty="0"/>
+          </a:p>
+          <a:p>
+            <a:r>
+              <a:rPr lang="en-GB" dirty="0">
+                <a:hlinkClick r:id="rId4"/>
+              </a:rPr>
+              <a:t>https://stackoverflow.com/questions/34653875/python-how-to-send-data-over-tcp</a:t>
+            </a:r>
+            <a:endParaRPr lang="en-GB" dirty="0"/>
+          </a:p>
+          <a:p>
+            <a:endParaRPr lang="en-GB" dirty="0"/>
+          </a:p>
+        </p:txBody>
+      </p:sp>
+    </p:spTree>
+    <p:extLst>
+      <p:ext uri="{BB962C8B-B14F-4D97-AF65-F5344CB8AC3E}">
+        <p14:creationId xmlns:p14="http://schemas.microsoft.com/office/powerpoint/2010/main" val="4186440119"/>
+      </p:ext>
+    </p:extLst>
+  </p:cSld>
+  <p:clrMapOvr>
+    <a:masterClrMapping/>
+  </p:clrMapOvr>
+</p:sld>
+</file>
+
+<file path=ppt/slides/slide22.xml><?xml version="1.0" encoding="utf-8"?>
+<p:sld xmlns:a="http://schemas.openxmlformats.org/drawingml/2006/main" xmlns:r="http://schemas.openxmlformats.org/officeDocument/2006/relationships" xmlns:p="http://schemas.openxmlformats.org/presentationml/2006/main">
+  <p:cSld>
+    <p:spTree>
+      <p:nvGrpSpPr>
+        <p:cNvPr id="1" name=""/>
+        <p:cNvGrpSpPr/>
+        <p:nvPr/>
+      </p:nvGrpSpPr>
+      <p:grpSpPr>
+        <a:xfrm>
+          <a:off x="0" y="0"/>
+          <a:ext cx="0" cy="0"/>
+          <a:chOff x="0" y="0"/>
+          <a:chExt cx="0" cy="0"/>
+        </a:xfrm>
+      </p:grpSpPr>
+      <p:sp>
+        <p:nvSpPr>
+          <p:cNvPr id="2" name="Title 1">
+            <a:extLst>
+              <a:ext uri="{FF2B5EF4-FFF2-40B4-BE49-F238E27FC236}">
+                <a16:creationId xmlns:a16="http://schemas.microsoft.com/office/drawing/2014/main" id="{103886FA-BC70-43F1-8492-3D2BD6D73654}"/>
+              </a:ext>
+            </a:extLst>
+          </p:cNvPr>
+          <p:cNvSpPr>
+            <a:spLocks noGrp="1"/>
+          </p:cNvSpPr>
+          <p:nvPr>
+            <p:ph type="title"/>
+          </p:nvPr>
+        </p:nvSpPr>
+        <p:spPr/>
+        <p:txBody>
+          <a:bodyPr/>
+          <a:lstStyle/>
+          <a:p>
+            <a:r>
+              <a:rPr lang="en-GB" dirty="0"/>
+              <a:t>notes</a:t>
+            </a:r>
+          </a:p>
+        </p:txBody>
+      </p:sp>
+      <p:sp>
+        <p:nvSpPr>
+          <p:cNvPr id="3" name="Content Placeholder 2">
+            <a:extLst>
+              <a:ext uri="{FF2B5EF4-FFF2-40B4-BE49-F238E27FC236}">
+                <a16:creationId xmlns:a16="http://schemas.microsoft.com/office/drawing/2014/main" id="{5A02EDD2-E34D-4469-BDA7-CE646653E7DE}"/>
+              </a:ext>
+            </a:extLst>
+          </p:cNvPr>
+          <p:cNvSpPr>
+            <a:spLocks noGrp="1"/>
+          </p:cNvSpPr>
+          <p:nvPr>
+            <p:ph idx="1"/>
+          </p:nvPr>
+        </p:nvSpPr>
+        <p:spPr/>
+        <p:txBody>
+          <a:bodyPr/>
+          <a:lstStyle/>
+          <a:p>
+            <a:r>
+              <a:rPr lang="en-GB" dirty="0" err="1"/>
+              <a:t>ip</a:t>
+            </a:r>
+            <a:r>
+              <a:rPr lang="en-GB" dirty="0"/>
+              <a:t> is allocated to username for 24 hours or until the account is logged out of,</a:t>
+            </a:r>
+          </a:p>
+          <a:p>
+            <a:r>
+              <a:rPr lang="en-GB" dirty="0"/>
+              <a:t>Classes = UI, client, manager</a:t>
+            </a:r>
+          </a:p>
+          <a:p>
+            <a:endParaRPr lang="en-GB" dirty="0"/>
+          </a:p>
+        </p:txBody>
+      </p:sp>
+    </p:spTree>
+    <p:extLst>
+      <p:ext uri="{BB962C8B-B14F-4D97-AF65-F5344CB8AC3E}">
+        <p14:creationId xmlns:p14="http://schemas.microsoft.com/office/powerpoint/2010/main" val="2517001702"/>
+      </p:ext>
+    </p:extLst>
+  </p:cSld>
+  <p:clrMapOvr>
+    <a:masterClrMapping/>
+  </p:clrMapOvr>
+</p:sld>
+</file>
+
+<file path=ppt/slides/slide23.xml><?xml version="1.0" encoding="utf-8"?>
+<p:sld xmlns:a="http://schemas.openxmlformats.org/drawingml/2006/main" xmlns:r="http://schemas.openxmlformats.org/officeDocument/2006/relationships" xmlns:p="http://schemas.openxmlformats.org/presentationml/2006/main">
+  <p:cSld>
+    <p:spTree>
+      <p:nvGrpSpPr>
+        <p:cNvPr id="1" name=""/>
+        <p:cNvGrpSpPr/>
+        <p:nvPr/>
+      </p:nvGrpSpPr>
+      <p:grpSpPr>
+        <a:xfrm>
+          <a:off x="0" y="0"/>
+          <a:ext cx="0" cy="0"/>
+          <a:chOff x="0" y="0"/>
+          <a:chExt cx="0" cy="0"/>
+        </a:xfrm>
+      </p:grpSpPr>
+      <p:sp>
+        <p:nvSpPr>
+          <p:cNvPr id="2" name="Title 1">
+            <a:extLst>
+              <a:ext uri="{FF2B5EF4-FFF2-40B4-BE49-F238E27FC236}">
                 <a16:creationId xmlns:a16="http://schemas.microsoft.com/office/drawing/2014/main" id="{376C1C6D-BF07-4179-85B6-5EE59A4476C2}"/>
               </a:ext>
             </a:extLst>
@@ -4950,7 +5422,7 @@
 </p:sld>
 </file>
 
-<file path=ppt/slides/slide21.xml><?xml version="1.0" encoding="utf-8"?>
+<file path=ppt/slides/slide24.xml><?xml version="1.0" encoding="utf-8"?>
 <p:sld xmlns:a="http://schemas.openxmlformats.org/drawingml/2006/main" xmlns:r="http://schemas.openxmlformats.org/officeDocument/2006/relationships" xmlns:p="http://schemas.openxmlformats.org/presentationml/2006/main">
   <p:cSld>
     <p:spTree>
@@ -5329,7 +5801,7 @@
 </p:sld>
 </file>
 
-<file path=ppt/slides/slide22.xml><?xml version="1.0" encoding="utf-8"?>
+<file path=ppt/slides/slide25.xml><?xml version="1.0" encoding="utf-8"?>
 <p:sld xmlns:a="http://schemas.openxmlformats.org/drawingml/2006/main" xmlns:r="http://schemas.openxmlformats.org/officeDocument/2006/relationships" xmlns:p="http://schemas.openxmlformats.org/presentationml/2006/main">
   <p:cSld>
     <p:spTree>
@@ -5507,7 +5979,7 @@
 </p:sld>
 </file>
 
-<file path=ppt/slides/slide23.xml><?xml version="1.0" encoding="utf-8"?>
+<file path=ppt/slides/slide26.xml><?xml version="1.0" encoding="utf-8"?>
 <p:sld xmlns:a="http://schemas.openxmlformats.org/drawingml/2006/main" xmlns:r="http://schemas.openxmlformats.org/officeDocument/2006/relationships" xmlns:p="http://schemas.openxmlformats.org/presentationml/2006/main">
   <p:cSld>
     <p:bg>
@@ -5767,7 +6239,7 @@
 </p:sld>
 </file>
 
-<file path=ppt/slides/slide24.xml><?xml version="1.0" encoding="utf-8"?>
+<file path=ppt/slides/slide27.xml><?xml version="1.0" encoding="utf-8"?>
 <p:sld xmlns:a="http://schemas.openxmlformats.org/drawingml/2006/main" xmlns:r="http://schemas.openxmlformats.org/officeDocument/2006/relationships" xmlns:p="http://schemas.openxmlformats.org/presentationml/2006/main">
   <p:cSld>
     <p:spTree>
@@ -5887,7 +6359,7 @@
 </p:sld>
 </file>
 
-<file path=ppt/slides/slide25.xml><?xml version="1.0" encoding="utf-8"?>
+<file path=ppt/slides/slide28.xml><?xml version="1.0" encoding="utf-8"?>
 <p:sld xmlns:a="http://schemas.openxmlformats.org/drawingml/2006/main" xmlns:r="http://schemas.openxmlformats.org/officeDocument/2006/relationships" xmlns:p="http://schemas.openxmlformats.org/presentationml/2006/main">
   <p:cSld>
     <p:spTree>
@@ -6067,7 +6539,7 @@
 </p:sld>
 </file>
 
-<file path=ppt/slides/slide26.xml><?xml version="1.0" encoding="utf-8"?>
+<file path=ppt/slides/slide29.xml><?xml version="1.0" encoding="utf-8"?>
 <p:sld xmlns:a="http://schemas.openxmlformats.org/drawingml/2006/main" xmlns:r="http://schemas.openxmlformats.org/officeDocument/2006/relationships" xmlns:p="http://schemas.openxmlformats.org/presentationml/2006/main">
   <p:cSld>
     <p:spTree>
@@ -6185,7 +6657,111 @@
 </p:sld>
 </file>
 
-<file path=ppt/slides/slide27.xml><?xml version="1.0" encoding="utf-8"?>
+<file path=ppt/slides/slide3.xml><?xml version="1.0" encoding="utf-8"?>
+<p:sld xmlns:a="http://schemas.openxmlformats.org/drawingml/2006/main" xmlns:r="http://schemas.openxmlformats.org/officeDocument/2006/relationships" xmlns:p="http://schemas.openxmlformats.org/presentationml/2006/main">
+  <p:cSld>
+    <p:spTree>
+      <p:nvGrpSpPr>
+        <p:cNvPr id="1" name=""/>
+        <p:cNvGrpSpPr/>
+        <p:nvPr/>
+      </p:nvGrpSpPr>
+      <p:grpSpPr>
+        <a:xfrm>
+          <a:off x="0" y="0"/>
+          <a:ext cx="0" cy="0"/>
+          <a:chOff x="0" y="0"/>
+          <a:chExt cx="0" cy="0"/>
+        </a:xfrm>
+      </p:grpSpPr>
+      <p:sp>
+        <p:nvSpPr>
+          <p:cNvPr id="2" name="Title 1">
+            <a:extLst>
+              <a:ext uri="{FF2B5EF4-FFF2-40B4-BE49-F238E27FC236}">
+                <a16:creationId xmlns:a16="http://schemas.microsoft.com/office/drawing/2014/main" id="{5B300700-0880-4077-B80F-475798E36F00}"/>
+              </a:ext>
+            </a:extLst>
+          </p:cNvPr>
+          <p:cNvSpPr>
+            <a:spLocks noGrp="1"/>
+          </p:cNvSpPr>
+          <p:nvPr>
+            <p:ph type="title"/>
+          </p:nvPr>
+        </p:nvSpPr>
+        <p:spPr/>
+        <p:txBody>
+          <a:bodyPr/>
+          <a:lstStyle/>
+          <a:p>
+            <a:r>
+              <a:rPr lang="en-GB" dirty="0"/>
+              <a:t>Necessary sql functions</a:t>
+            </a:r>
+          </a:p>
+        </p:txBody>
+      </p:sp>
+      <p:sp>
+        <p:nvSpPr>
+          <p:cNvPr id="3" name="Content Placeholder 2">
+            <a:extLst>
+              <a:ext uri="{FF2B5EF4-FFF2-40B4-BE49-F238E27FC236}">
+                <a16:creationId xmlns:a16="http://schemas.microsoft.com/office/drawing/2014/main" id="{5A5C7EDF-33B9-4F78-A9D2-E5948F942BD3}"/>
+              </a:ext>
+            </a:extLst>
+          </p:cNvPr>
+          <p:cNvSpPr>
+            <a:spLocks noGrp="1"/>
+          </p:cNvSpPr>
+          <p:nvPr>
+            <p:ph idx="1"/>
+          </p:nvPr>
+        </p:nvSpPr>
+        <p:spPr/>
+        <p:txBody>
+          <a:bodyPr/>
+          <a:lstStyle/>
+          <a:p>
+            <a:r>
+              <a:rPr lang="en-GB" dirty="0"/>
+              <a:t>Append a new value/record to the database as a tuple to prevent sql injection</a:t>
+            </a:r>
+          </a:p>
+          <a:p>
+            <a:r>
+              <a:rPr lang="en-GB" dirty="0"/>
+              <a:t>Replace/overwrite entries when given the new value and the one to be replaced</a:t>
+            </a:r>
+          </a:p>
+          <a:p>
+            <a:r>
+              <a:rPr lang="en-GB" dirty="0"/>
+              <a:t>Read and return a set of records as a 2d array when given the sql code to be executed</a:t>
+            </a:r>
+          </a:p>
+          <a:p>
+            <a:r>
+              <a:rPr lang="en-GB" dirty="0"/>
+              <a:t>Read and write encrypted entries for password security using asymmetrical encryption where a single server has access to the private key</a:t>
+            </a:r>
+          </a:p>
+        </p:txBody>
+      </p:sp>
+    </p:spTree>
+    <p:extLst>
+      <p:ext uri="{BB962C8B-B14F-4D97-AF65-F5344CB8AC3E}">
+        <p14:creationId xmlns:p14="http://schemas.microsoft.com/office/powerpoint/2010/main" val="515096534"/>
+      </p:ext>
+    </p:extLst>
+  </p:cSld>
+  <p:clrMapOvr>
+    <a:masterClrMapping/>
+  </p:clrMapOvr>
+</p:sld>
+</file>
+
+<file path=ppt/slides/slide30.xml><?xml version="1.0" encoding="utf-8"?>
 <p:sld xmlns:a="http://schemas.openxmlformats.org/drawingml/2006/main" xmlns:r="http://schemas.openxmlformats.org/officeDocument/2006/relationships" xmlns:p="http://schemas.openxmlformats.org/presentationml/2006/main">
   <p:cSld>
     <p:spTree>
@@ -6304,7 +6880,7 @@
 </p:sld>
 </file>
 
-<file path=ppt/slides/slide28.xml><?xml version="1.0" encoding="utf-8"?>
+<file path=ppt/slides/slide31.xml><?xml version="1.0" encoding="utf-8"?>
 <p:sld xmlns:a="http://schemas.openxmlformats.org/drawingml/2006/main" xmlns:r="http://schemas.openxmlformats.org/officeDocument/2006/relationships" xmlns:p="http://schemas.openxmlformats.org/presentationml/2006/main">
   <p:cSld>
     <p:spTree>
@@ -6484,7 +7060,7 @@
 </p:sld>
 </file>
 
-<file path=ppt/slides/slide29.xml><?xml version="1.0" encoding="utf-8"?>
+<file path=ppt/slides/slide32.xml><?xml version="1.0" encoding="utf-8"?>
 <p:sld xmlns:a="http://schemas.openxmlformats.org/drawingml/2006/main" xmlns:r="http://schemas.openxmlformats.org/officeDocument/2006/relationships" xmlns:p="http://schemas.openxmlformats.org/presentationml/2006/main">
   <p:cSld>
     <p:spTree>
@@ -6634,111 +7210,7 @@
 </p:sld>
 </file>
 
-<file path=ppt/slides/slide3.xml><?xml version="1.0" encoding="utf-8"?>
-<p:sld xmlns:a="http://schemas.openxmlformats.org/drawingml/2006/main" xmlns:r="http://schemas.openxmlformats.org/officeDocument/2006/relationships" xmlns:p="http://schemas.openxmlformats.org/presentationml/2006/main">
-  <p:cSld>
-    <p:spTree>
-      <p:nvGrpSpPr>
-        <p:cNvPr id="1" name=""/>
-        <p:cNvGrpSpPr/>
-        <p:nvPr/>
-      </p:nvGrpSpPr>
-      <p:grpSpPr>
-        <a:xfrm>
-          <a:off x="0" y="0"/>
-          <a:ext cx="0" cy="0"/>
-          <a:chOff x="0" y="0"/>
-          <a:chExt cx="0" cy="0"/>
-        </a:xfrm>
-      </p:grpSpPr>
-      <p:sp>
-        <p:nvSpPr>
-          <p:cNvPr id="2" name="Title 1">
-            <a:extLst>
-              <a:ext uri="{FF2B5EF4-FFF2-40B4-BE49-F238E27FC236}">
-                <a16:creationId xmlns:a16="http://schemas.microsoft.com/office/drawing/2014/main" id="{5B300700-0880-4077-B80F-475798E36F00}"/>
-              </a:ext>
-            </a:extLst>
-          </p:cNvPr>
-          <p:cNvSpPr>
-            <a:spLocks noGrp="1"/>
-          </p:cNvSpPr>
-          <p:nvPr>
-            <p:ph type="title"/>
-          </p:nvPr>
-        </p:nvSpPr>
-        <p:spPr/>
-        <p:txBody>
-          <a:bodyPr/>
-          <a:lstStyle/>
-          <a:p>
-            <a:r>
-              <a:rPr lang="en-GB" dirty="0"/>
-              <a:t>Necessary sql functions</a:t>
-            </a:r>
-          </a:p>
-        </p:txBody>
-      </p:sp>
-      <p:sp>
-        <p:nvSpPr>
-          <p:cNvPr id="3" name="Content Placeholder 2">
-            <a:extLst>
-              <a:ext uri="{FF2B5EF4-FFF2-40B4-BE49-F238E27FC236}">
-                <a16:creationId xmlns:a16="http://schemas.microsoft.com/office/drawing/2014/main" id="{5A5C7EDF-33B9-4F78-A9D2-E5948F942BD3}"/>
-              </a:ext>
-            </a:extLst>
-          </p:cNvPr>
-          <p:cNvSpPr>
-            <a:spLocks noGrp="1"/>
-          </p:cNvSpPr>
-          <p:nvPr>
-            <p:ph idx="1"/>
-          </p:nvPr>
-        </p:nvSpPr>
-        <p:spPr/>
-        <p:txBody>
-          <a:bodyPr/>
-          <a:lstStyle/>
-          <a:p>
-            <a:r>
-              <a:rPr lang="en-GB" dirty="0"/>
-              <a:t>Append a new value/record to the database as a tuple to prevent sql injection</a:t>
-            </a:r>
-          </a:p>
-          <a:p>
-            <a:r>
-              <a:rPr lang="en-GB" dirty="0"/>
-              <a:t>Replace/overwrite entries when given the new value and the one to be replaced</a:t>
-            </a:r>
-          </a:p>
-          <a:p>
-            <a:r>
-              <a:rPr lang="en-GB" dirty="0"/>
-              <a:t>Read and return a set of records as a 2d array when given the sql code to be executed</a:t>
-            </a:r>
-          </a:p>
-          <a:p>
-            <a:r>
-              <a:rPr lang="en-GB" dirty="0"/>
-              <a:t>Read and write encrypted entries for password security using asymmetrical encryption where a single server has access to the private key</a:t>
-            </a:r>
-          </a:p>
-        </p:txBody>
-      </p:sp>
-    </p:spTree>
-    <p:extLst>
-      <p:ext uri="{BB962C8B-B14F-4D97-AF65-F5344CB8AC3E}">
-        <p14:creationId xmlns:p14="http://schemas.microsoft.com/office/powerpoint/2010/main" val="515096534"/>
-      </p:ext>
-    </p:extLst>
-  </p:cSld>
-  <p:clrMapOvr>
-    <a:masterClrMapping/>
-  </p:clrMapOvr>
-</p:sld>
-</file>
-
-<file path=ppt/slides/slide30.xml><?xml version="1.0" encoding="utf-8"?>
+<file path=ppt/slides/slide33.xml><?xml version="1.0" encoding="utf-8"?>
 <p:sld xmlns:a="http://schemas.openxmlformats.org/drawingml/2006/main" xmlns:r="http://schemas.openxmlformats.org/officeDocument/2006/relationships" xmlns:p="http://schemas.openxmlformats.org/presentationml/2006/main">
   <p:cSld>
     <p:spTree>
@@ -6858,7 +7330,7 @@
 </p:sld>
 </file>
 
-<file path=ppt/slides/slide31.xml><?xml version="1.0" encoding="utf-8"?>
+<file path=ppt/slides/slide34.xml><?xml version="1.0" encoding="utf-8"?>
 <p:sld xmlns:a="http://schemas.openxmlformats.org/drawingml/2006/main" xmlns:r="http://schemas.openxmlformats.org/officeDocument/2006/relationships" xmlns:p="http://schemas.openxmlformats.org/presentationml/2006/main">
   <p:cSld>
     <p:spTree>
@@ -7008,7 +7480,7 @@
 </p:sld>
 </file>
 
-<file path=ppt/slides/slide32.xml><?xml version="1.0" encoding="utf-8"?>
+<file path=ppt/slides/slide35.xml><?xml version="1.0" encoding="utf-8"?>
 <p:sld xmlns:a="http://schemas.openxmlformats.org/drawingml/2006/main" xmlns:r="http://schemas.openxmlformats.org/officeDocument/2006/relationships" xmlns:p="http://schemas.openxmlformats.org/presentationml/2006/main">
   <p:cSld>
     <p:spTree>
@@ -7149,7 +7621,7 @@
 </p:sld>
 </file>
 
-<file path=ppt/slides/slide33.xml><?xml version="1.0" encoding="utf-8"?>
+<file path=ppt/slides/slide36.xml><?xml version="1.0" encoding="utf-8"?>
 <p:sld xmlns:a="http://schemas.openxmlformats.org/drawingml/2006/main" xmlns:r="http://schemas.openxmlformats.org/officeDocument/2006/relationships" xmlns:p="http://schemas.openxmlformats.org/presentationml/2006/main">
   <p:cSld>
     <p:spTree>
@@ -7388,7 +7860,7 @@
 </p:sld>
 </file>
 
-<file path=ppt/slides/slide34.xml><?xml version="1.0" encoding="utf-8"?>
+<file path=ppt/slides/slide37.xml><?xml version="1.0" encoding="utf-8"?>
 <p:sld xmlns:a="http://schemas.openxmlformats.org/drawingml/2006/main" xmlns:r="http://schemas.openxmlformats.org/officeDocument/2006/relationships" xmlns:p="http://schemas.openxmlformats.org/presentationml/2006/main">
   <p:cSld>
     <p:spTree>
@@ -7611,7 +8083,7 @@
 </p:sld>
 </file>
 
-<file path=ppt/slides/slide35.xml><?xml version="1.0" encoding="utf-8"?>
+<file path=ppt/slides/slide38.xml><?xml version="1.0" encoding="utf-8"?>
 <p:sld xmlns:a="http://schemas.openxmlformats.org/drawingml/2006/main" xmlns:r="http://schemas.openxmlformats.org/officeDocument/2006/relationships" xmlns:p="http://schemas.openxmlformats.org/presentationml/2006/main">
   <p:cSld>
     <p:spTree>

</xml_diff>

<commit_message>
added feedback from holepunching test
added images from test+some analyis
</commit_message>
<xml_diff>
--- a/dev log.pptx
+++ b/dev log.pptx
@@ -21,30 +21,32 @@
     <p:sldId id="294" r:id="rId15"/>
     <p:sldId id="295" r:id="rId16"/>
     <p:sldId id="296" r:id="rId17"/>
-    <p:sldId id="261" r:id="rId18"/>
-    <p:sldId id="262" r:id="rId19"/>
-    <p:sldId id="272" r:id="rId20"/>
-    <p:sldId id="284" r:id="rId21"/>
-    <p:sldId id="285" r:id="rId22"/>
-    <p:sldId id="266" r:id="rId23"/>
-    <p:sldId id="268" r:id="rId24"/>
-    <p:sldId id="269" r:id="rId25"/>
-    <p:sldId id="270" r:id="rId26"/>
-    <p:sldId id="271" r:id="rId27"/>
-    <p:sldId id="273" r:id="rId28"/>
-    <p:sldId id="274" r:id="rId29"/>
-    <p:sldId id="275" r:id="rId30"/>
-    <p:sldId id="276" r:id="rId31"/>
-    <p:sldId id="277" r:id="rId32"/>
-    <p:sldId id="278" r:id="rId33"/>
-    <p:sldId id="279" r:id="rId34"/>
-    <p:sldId id="280" r:id="rId35"/>
-    <p:sldId id="281" r:id="rId36"/>
-    <p:sldId id="282" r:id="rId37"/>
-    <p:sldId id="283" r:id="rId38"/>
-    <p:sldId id="287" r:id="rId39"/>
-    <p:sldId id="290" r:id="rId40"/>
-    <p:sldId id="289" r:id="rId41"/>
+    <p:sldId id="297" r:id="rId18"/>
+    <p:sldId id="298" r:id="rId19"/>
+    <p:sldId id="261" r:id="rId20"/>
+    <p:sldId id="262" r:id="rId21"/>
+    <p:sldId id="272" r:id="rId22"/>
+    <p:sldId id="284" r:id="rId23"/>
+    <p:sldId id="285" r:id="rId24"/>
+    <p:sldId id="266" r:id="rId25"/>
+    <p:sldId id="268" r:id="rId26"/>
+    <p:sldId id="269" r:id="rId27"/>
+    <p:sldId id="270" r:id="rId28"/>
+    <p:sldId id="271" r:id="rId29"/>
+    <p:sldId id="273" r:id="rId30"/>
+    <p:sldId id="274" r:id="rId31"/>
+    <p:sldId id="275" r:id="rId32"/>
+    <p:sldId id="276" r:id="rId33"/>
+    <p:sldId id="277" r:id="rId34"/>
+    <p:sldId id="278" r:id="rId35"/>
+    <p:sldId id="279" r:id="rId36"/>
+    <p:sldId id="280" r:id="rId37"/>
+    <p:sldId id="281" r:id="rId38"/>
+    <p:sldId id="282" r:id="rId39"/>
+    <p:sldId id="283" r:id="rId40"/>
+    <p:sldId id="287" r:id="rId41"/>
+    <p:sldId id="290" r:id="rId42"/>
+    <p:sldId id="289" r:id="rId43"/>
   </p:sldIdLst>
   <p:sldSz cx="12192000" cy="6858000"/>
   <p:notesSz cx="6858000" cy="9144000"/>
@@ -172,6 +174,8 @@
             <p14:sldId id="294"/>
             <p14:sldId id="295"/>
             <p14:sldId id="296"/>
+            <p14:sldId id="297"/>
+            <p14:sldId id="298"/>
           </p14:sldIdLst>
         </p14:section>
         <p14:section name="User backend" id="{4917E628-EF76-4611-BE58-D69F773E488C}">
@@ -368,7 +372,7 @@
           <a:p>
             <a:fld id="{95BB3272-C847-43E3-AE34-83B2109F1449}" type="datetimeFigureOut">
               <a:rPr lang="en-GB" smtClean="0"/>
-              <a:t>12/05/2020</a:t>
+              <a:t>13/05/2020</a:t>
             </a:fld>
             <a:endParaRPr lang="en-GB"/>
           </a:p>
@@ -568,7 +572,7 @@
           <a:p>
             <a:fld id="{95BB3272-C847-43E3-AE34-83B2109F1449}" type="datetimeFigureOut">
               <a:rPr lang="en-GB" smtClean="0"/>
-              <a:t>12/05/2020</a:t>
+              <a:t>13/05/2020</a:t>
             </a:fld>
             <a:endParaRPr lang="en-GB"/>
           </a:p>
@@ -778,7 +782,7 @@
           <a:p>
             <a:fld id="{95BB3272-C847-43E3-AE34-83B2109F1449}" type="datetimeFigureOut">
               <a:rPr lang="en-GB" smtClean="0"/>
-              <a:t>12/05/2020</a:t>
+              <a:t>13/05/2020</a:t>
             </a:fld>
             <a:endParaRPr lang="en-GB"/>
           </a:p>
@@ -978,7 +982,7 @@
           <a:p>
             <a:fld id="{95BB3272-C847-43E3-AE34-83B2109F1449}" type="datetimeFigureOut">
               <a:rPr lang="en-GB" smtClean="0"/>
-              <a:t>12/05/2020</a:t>
+              <a:t>13/05/2020</a:t>
             </a:fld>
             <a:endParaRPr lang="en-GB"/>
           </a:p>
@@ -1254,7 +1258,7 @@
           <a:p>
             <a:fld id="{95BB3272-C847-43E3-AE34-83B2109F1449}" type="datetimeFigureOut">
               <a:rPr lang="en-GB" smtClean="0"/>
-              <a:t>12/05/2020</a:t>
+              <a:t>13/05/2020</a:t>
             </a:fld>
             <a:endParaRPr lang="en-GB"/>
           </a:p>
@@ -1522,7 +1526,7 @@
           <a:p>
             <a:fld id="{95BB3272-C847-43E3-AE34-83B2109F1449}" type="datetimeFigureOut">
               <a:rPr lang="en-GB" smtClean="0"/>
-              <a:t>12/05/2020</a:t>
+              <a:t>13/05/2020</a:t>
             </a:fld>
             <a:endParaRPr lang="en-GB"/>
           </a:p>
@@ -1937,7 +1941,7 @@
           <a:p>
             <a:fld id="{95BB3272-C847-43E3-AE34-83B2109F1449}" type="datetimeFigureOut">
               <a:rPr lang="en-GB" smtClean="0"/>
-              <a:t>12/05/2020</a:t>
+              <a:t>13/05/2020</a:t>
             </a:fld>
             <a:endParaRPr lang="en-GB"/>
           </a:p>
@@ -2079,7 +2083,7 @@
           <a:p>
             <a:fld id="{95BB3272-C847-43E3-AE34-83B2109F1449}" type="datetimeFigureOut">
               <a:rPr lang="en-GB" smtClean="0"/>
-              <a:t>12/05/2020</a:t>
+              <a:t>13/05/2020</a:t>
             </a:fld>
             <a:endParaRPr lang="en-GB"/>
           </a:p>
@@ -2192,7 +2196,7 @@
           <a:p>
             <a:fld id="{95BB3272-C847-43E3-AE34-83B2109F1449}" type="datetimeFigureOut">
               <a:rPr lang="en-GB" smtClean="0"/>
-              <a:t>12/05/2020</a:t>
+              <a:t>13/05/2020</a:t>
             </a:fld>
             <a:endParaRPr lang="en-GB"/>
           </a:p>
@@ -2505,7 +2509,7 @@
           <a:p>
             <a:fld id="{95BB3272-C847-43E3-AE34-83B2109F1449}" type="datetimeFigureOut">
               <a:rPr lang="en-GB" smtClean="0"/>
-              <a:t>12/05/2020</a:t>
+              <a:t>13/05/2020</a:t>
             </a:fld>
             <a:endParaRPr lang="en-GB"/>
           </a:p>
@@ -2794,7 +2798,7 @@
           <a:p>
             <a:fld id="{95BB3272-C847-43E3-AE34-83B2109F1449}" type="datetimeFigureOut">
               <a:rPr lang="en-GB" smtClean="0"/>
-              <a:t>12/05/2020</a:t>
+              <a:t>13/05/2020</a:t>
             </a:fld>
             <a:endParaRPr lang="en-GB"/>
           </a:p>
@@ -3037,7 +3041,7 @@
           <a:p>
             <a:fld id="{95BB3272-C847-43E3-AE34-83B2109F1449}" type="datetimeFigureOut">
               <a:rPr lang="en-GB" smtClean="0"/>
-              <a:t>12/05/2020</a:t>
+              <a:t>13/05/2020</a:t>
             </a:fld>
             <a:endParaRPr lang="en-GB"/>
           </a:p>
@@ -4378,7 +4382,12 @@
             <p:ph idx="1"/>
           </p:nvPr>
         </p:nvSpPr>
-        <p:spPr/>
+        <p:spPr>
+          <a:xfrm>
+            <a:off x="38242" y="1690688"/>
+            <a:ext cx="10515600" cy="4351338"/>
+          </a:xfrm>
+        </p:spPr>
         <p:txBody>
           <a:bodyPr/>
           <a:lstStyle/>
@@ -4429,12 +4438,147 @@
           <a:chExt cx="0" cy="0"/>
         </a:xfrm>
       </p:grpSpPr>
+      <p:pic>
+        <p:nvPicPr>
+          <p:cNvPr id="4" name="Picture 3">
+            <a:extLst>
+              <a:ext uri="{FF2B5EF4-FFF2-40B4-BE49-F238E27FC236}">
+                <a16:creationId xmlns:a16="http://schemas.microsoft.com/office/drawing/2014/main" id="{59C2C1C4-9421-4C1D-AD49-92E7A1442613}"/>
+              </a:ext>
+            </a:extLst>
+          </p:cNvPr>
+          <p:cNvPicPr>
+            <a:picLocks noChangeAspect="1"/>
+          </p:cNvPicPr>
+          <p:nvPr/>
+        </p:nvPicPr>
+        <p:blipFill>
+          <a:blip r:embed="rId2">
+            <a:extLst>
+              <a:ext uri="{28A0092B-C50C-407E-A947-70E740481C1C}">
+                <a14:useLocalDpi xmlns:a14="http://schemas.microsoft.com/office/drawing/2010/main" val="0"/>
+              </a:ext>
+            </a:extLst>
+          </a:blip>
+          <a:stretch>
+            <a:fillRect/>
+          </a:stretch>
+        </p:blipFill>
+        <p:spPr>
+          <a:xfrm>
+            <a:off x="0" y="3753134"/>
+            <a:ext cx="6095444" cy="3104867"/>
+          </a:xfrm>
+          <a:prstGeom prst="rect">
+            <a:avLst/>
+          </a:prstGeom>
+        </p:spPr>
+      </p:pic>
+      <p:pic>
+        <p:nvPicPr>
+          <p:cNvPr id="5" name="Picture 4">
+            <a:extLst>
+              <a:ext uri="{FF2B5EF4-FFF2-40B4-BE49-F238E27FC236}">
+                <a16:creationId xmlns:a16="http://schemas.microsoft.com/office/drawing/2014/main" id="{3728B527-BD0D-4726-B83C-34E64349611B}"/>
+              </a:ext>
+            </a:extLst>
+          </p:cNvPr>
+          <p:cNvPicPr>
+            <a:picLocks noChangeAspect="1"/>
+          </p:cNvPicPr>
+          <p:nvPr/>
+        </p:nvPicPr>
+        <p:blipFill>
+          <a:blip r:embed="rId3">
+            <a:extLst>
+              <a:ext uri="{28A0092B-C50C-407E-A947-70E740481C1C}">
+                <a14:useLocalDpi xmlns:a14="http://schemas.microsoft.com/office/drawing/2010/main" val="0"/>
+              </a:ext>
+            </a:extLst>
+          </a:blip>
+          <a:stretch>
+            <a:fillRect/>
+          </a:stretch>
+        </p:blipFill>
+        <p:spPr>
+          <a:xfrm>
+            <a:off x="6052356" y="841920"/>
+            <a:ext cx="6101402" cy="3020396"/>
+          </a:xfrm>
+          <a:prstGeom prst="rect">
+            <a:avLst/>
+          </a:prstGeom>
+        </p:spPr>
+      </p:pic>
+      <p:pic>
+        <p:nvPicPr>
+          <p:cNvPr id="6" name="Picture 5">
+            <a:extLst>
+              <a:ext uri="{FF2B5EF4-FFF2-40B4-BE49-F238E27FC236}">
+                <a16:creationId xmlns:a16="http://schemas.microsoft.com/office/drawing/2014/main" id="{FCAA77CC-3837-4848-9C6B-C03AD0C963DC}"/>
+              </a:ext>
+            </a:extLst>
+          </p:cNvPr>
+          <p:cNvPicPr>
+            <a:picLocks noChangeAspect="1"/>
+          </p:cNvPicPr>
+          <p:nvPr/>
+        </p:nvPicPr>
+        <p:blipFill>
+          <a:blip r:embed="rId4"/>
+          <a:stretch>
+            <a:fillRect/>
+          </a:stretch>
+        </p:blipFill>
+        <p:spPr>
+          <a:xfrm>
+            <a:off x="6139645" y="3862316"/>
+            <a:ext cx="6052355" cy="2838832"/>
+          </a:xfrm>
+          <a:prstGeom prst="rect">
+            <a:avLst/>
+          </a:prstGeom>
+        </p:spPr>
+      </p:pic>
+      <p:sp>
+        <p:nvSpPr>
+          <p:cNvPr id="3" name="Content Placeholder 2">
+            <a:extLst>
+              <a:ext uri="{FF2B5EF4-FFF2-40B4-BE49-F238E27FC236}">
+                <a16:creationId xmlns:a16="http://schemas.microsoft.com/office/drawing/2014/main" id="{184A50E5-B8BF-4292-8C4E-08390B83FC81}"/>
+              </a:ext>
+            </a:extLst>
+          </p:cNvPr>
+          <p:cNvSpPr>
+            <a:spLocks noGrp="1"/>
+          </p:cNvSpPr>
+          <p:nvPr>
+            <p:ph idx="1"/>
+          </p:nvPr>
+        </p:nvSpPr>
+        <p:spPr/>
+        <p:txBody>
+          <a:bodyPr/>
+          <a:lstStyle/>
+          <a:p>
+            <a:r>
+              <a:rPr lang="en-GB" dirty="0"/>
+              <a:t>This code worked and is a good prototype I can now work into integrating this system into my code, the only problem being the relay server will have to run simultaneous with my logon/primary server, I will look into using threading as a solution to </a:t>
+            </a:r>
+            <a:r>
+              <a:rPr lang="en-GB"/>
+              <a:t>this problem</a:t>
+            </a:r>
+            <a:endParaRPr lang="en-GB" dirty="0"/>
+          </a:p>
+        </p:txBody>
+      </p:sp>
       <p:sp>
         <p:nvSpPr>
           <p:cNvPr id="2" name="Title 1">
             <a:extLst>
               <a:ext uri="{FF2B5EF4-FFF2-40B4-BE49-F238E27FC236}">
-                <a16:creationId xmlns:a16="http://schemas.microsoft.com/office/drawing/2014/main" id="{7B5EE842-2FDD-4DEC-8C72-6456BF9C5133}"/>
+                <a16:creationId xmlns:a16="http://schemas.microsoft.com/office/drawing/2014/main" id="{5EC19546-3FA1-4F15-88D0-5CADE962049D}"/>
               </a:ext>
             </a:extLst>
           </p:cNvPr>
@@ -4447,40 +4591,30 @@
         </p:nvSpPr>
         <p:spPr/>
         <p:txBody>
-          <a:bodyPr/>
-          <a:lstStyle/>
-          <a:p>
-            <a:r>
-              <a:rPr lang="en-GB" dirty="0"/>
-              <a:t>User backend</a:t>
-            </a:r>
-          </a:p>
-        </p:txBody>
-      </p:sp>
-      <p:sp>
-        <p:nvSpPr>
-          <p:cNvPr id="3" name="Text Placeholder 2">
-            <a:extLst>
-              <a:ext uri="{FF2B5EF4-FFF2-40B4-BE49-F238E27FC236}">
-                <a16:creationId xmlns:a16="http://schemas.microsoft.com/office/drawing/2014/main" id="{DE37422E-DFC5-43D8-B903-2CB431F068FC}"/>
-              </a:ext>
-            </a:extLst>
-          </p:cNvPr>
-          <p:cNvSpPr>
-            <a:spLocks noGrp="1"/>
-          </p:cNvSpPr>
-          <p:nvPr>
-            <p:ph type="body" idx="1"/>
-          </p:nvPr>
-        </p:nvSpPr>
-        <p:spPr/>
-        <p:txBody>
-          <a:bodyPr/>
-          <a:lstStyle/>
-          <a:p>
-            <a:r>
-              <a:rPr lang="en-GB" dirty="0"/>
-              <a:t>A library that includes all the backend functions accessible when logged in with an account</a:t>
+          <a:bodyPr>
+            <a:normAutofit fontScale="90000"/>
+          </a:bodyPr>
+          <a:lstStyle/>
+          <a:p>
+            <a:r>
+              <a:rPr lang="en-GB" dirty="0"/>
+              <a:t>Using and adapting the code from </a:t>
+            </a:r>
+            <a:r>
+              <a:rPr lang="en-GB" dirty="0" err="1"/>
+              <a:t>youtube</a:t>
+            </a:r>
+            <a:r>
+              <a:rPr lang="en-GB" dirty="0"/>
+              <a:t> I got 2 peers to communicate with one on a </a:t>
+            </a:r>
+            <a:r>
+              <a:rPr lang="en-GB" dirty="0" err="1"/>
+              <a:t>vpn</a:t>
+            </a:r>
+            <a:r>
+              <a:rPr lang="en-GB" dirty="0"/>
+              <a:t> to simulate a different LAN/NAT</a:t>
             </a:r>
           </a:p>
         </p:txBody>
@@ -4488,7 +4622,7 @@
     </p:spTree>
     <p:extLst>
       <p:ext uri="{BB962C8B-B14F-4D97-AF65-F5344CB8AC3E}">
-        <p14:creationId xmlns:p14="http://schemas.microsoft.com/office/powerpoint/2010/main" val="2287663386"/>
+        <p14:creationId xmlns:p14="http://schemas.microsoft.com/office/powerpoint/2010/main" val="2499726861"/>
       </p:ext>
     </p:extLst>
   </p:cSld>
@@ -4520,7 +4654,7 @@
           <p:cNvPr id="2" name="Title 1">
             <a:extLst>
               <a:ext uri="{FF2B5EF4-FFF2-40B4-BE49-F238E27FC236}">
-                <a16:creationId xmlns:a16="http://schemas.microsoft.com/office/drawing/2014/main" id="{EF8AA7A4-9FDA-42EC-960A-661F68D6C0CC}"/>
+                <a16:creationId xmlns:a16="http://schemas.microsoft.com/office/drawing/2014/main" id="{679C1CB7-D458-4AB6-9ABC-5DA6C8DE25B8}"/>
               </a:ext>
             </a:extLst>
           </p:cNvPr>
@@ -4533,70 +4667,136 @@
         </p:nvSpPr>
         <p:spPr/>
         <p:txBody>
-          <a:bodyPr/>
-          <a:lstStyle/>
-          <a:p>
-            <a:r>
-              <a:rPr lang="en-GB" dirty="0"/>
-              <a:t>Necessary user functions</a:t>
-            </a:r>
-          </a:p>
-        </p:txBody>
-      </p:sp>
-      <p:sp>
-        <p:nvSpPr>
-          <p:cNvPr id="3" name="Content Placeholder 2">
-            <a:extLst>
-              <a:ext uri="{FF2B5EF4-FFF2-40B4-BE49-F238E27FC236}">
-                <a16:creationId xmlns:a16="http://schemas.microsoft.com/office/drawing/2014/main" id="{F6BB918B-6819-4478-B0CD-ED27E47326ED}"/>
-              </a:ext>
-            </a:extLst>
-          </p:cNvPr>
-          <p:cNvSpPr>
-            <a:spLocks noGrp="1"/>
-          </p:cNvSpPr>
+          <a:bodyPr>
+            <a:normAutofit/>
+          </a:bodyPr>
+          <a:lstStyle/>
+          <a:p>
+            <a:r>
+              <a:rPr lang="en-GB" dirty="0"/>
+              <a:t>Test analysis</a:t>
+            </a:r>
+          </a:p>
+        </p:txBody>
+      </p:sp>
+      <p:pic>
+        <p:nvPicPr>
+          <p:cNvPr id="5" name="Content Placeholder 4">
+            <a:extLst>
+              <a:ext uri="{FF2B5EF4-FFF2-40B4-BE49-F238E27FC236}">
+                <a16:creationId xmlns:a16="http://schemas.microsoft.com/office/drawing/2014/main" id="{271E8939-F475-4BD7-A94B-CD603E7F827D}"/>
+              </a:ext>
+            </a:extLst>
+          </p:cNvPr>
+          <p:cNvPicPr>
+            <a:picLocks noGrp="1" noChangeAspect="1"/>
+          </p:cNvPicPr>
           <p:nvPr>
             <p:ph idx="1"/>
           </p:nvPr>
-        </p:nvSpPr>
-        <p:spPr/>
-        <p:txBody>
-          <a:bodyPr/>
-          <a:lstStyle/>
-          <a:p>
-            <a:r>
-              <a:rPr lang="en-GB" dirty="0"/>
-              <a:t>View past games(maybe replay functionality)</a:t>
-            </a:r>
-          </a:p>
-          <a:p>
-            <a:r>
-              <a:rPr lang="en-GB" dirty="0"/>
-              <a:t>View their lifetime &amp; recent statistics with graphs+ extrapolation</a:t>
-            </a:r>
-          </a:p>
-          <a:p>
-            <a:r>
-              <a:rPr lang="en-GB" dirty="0"/>
-              <a:t>Update payroll</a:t>
-            </a:r>
-          </a:p>
-          <a:p>
-            <a:r>
-              <a:rPr lang="en-GB" dirty="0"/>
-              <a:t>A preliminary test before booking an appointment to get an early diagnosis</a:t>
-            </a:r>
-          </a:p>
-          <a:p>
-            <a:r>
-              <a:rPr lang="en-GB" dirty="0"/>
-              <a:t>Host/join a game</a:t>
-            </a:r>
-          </a:p>
-          <a:p>
-            <a:r>
-              <a:rPr lang="en-GB" dirty="0"/>
-              <a:t>Add friends for easier game access</a:t>
+        </p:nvPicPr>
+        <p:blipFill>
+          <a:blip r:embed="rId2">
+            <a:extLst>
+              <a:ext uri="{28A0092B-C50C-407E-A947-70E740481C1C}">
+                <a14:useLocalDpi xmlns:a14="http://schemas.microsoft.com/office/drawing/2010/main" val="0"/>
+              </a:ext>
+            </a:extLst>
+          </a:blip>
+          <a:stretch>
+            <a:fillRect/>
+          </a:stretch>
+        </p:blipFill>
+        <p:spPr>
+          <a:xfrm>
+            <a:off x="1747530" y="5005624"/>
+            <a:ext cx="7468642" cy="857370"/>
+          </a:xfrm>
+        </p:spPr>
+      </p:pic>
+      <p:sp>
+        <p:nvSpPr>
+          <p:cNvPr id="6" name="Oval 5">
+            <a:extLst>
+              <a:ext uri="{FF2B5EF4-FFF2-40B4-BE49-F238E27FC236}">
+                <a16:creationId xmlns:a16="http://schemas.microsoft.com/office/drawing/2014/main" id="{5C658DAC-DA92-475A-80E5-5D5AB6965BC8}"/>
+              </a:ext>
+            </a:extLst>
+          </p:cNvPr>
+          <p:cNvSpPr/>
+          <p:nvPr/>
+        </p:nvSpPr>
+        <p:spPr>
+          <a:xfrm>
+            <a:off x="7519916" y="5005624"/>
+            <a:ext cx="532263" cy="221469"/>
+          </a:xfrm>
+          <a:prstGeom prst="ellipse">
+            <a:avLst/>
+          </a:prstGeom>
+          <a:noFill/>
+          <a:ln>
+            <a:solidFill>
+              <a:srgbClr val="FF0000"/>
+            </a:solidFill>
+          </a:ln>
+        </p:spPr>
+        <p:style>
+          <a:lnRef idx="2">
+            <a:schemeClr val="accent1">
+              <a:shade val="50000"/>
+            </a:schemeClr>
+          </a:lnRef>
+          <a:fillRef idx="1">
+            <a:schemeClr val="accent1"/>
+          </a:fillRef>
+          <a:effectRef idx="0">
+            <a:schemeClr val="accent1"/>
+          </a:effectRef>
+          <a:fontRef idx="minor">
+            <a:schemeClr val="lt1"/>
+          </a:fontRef>
+        </p:style>
+        <p:txBody>
+          <a:bodyPr rtlCol="0" anchor="ctr"/>
+          <a:lstStyle/>
+          <a:p>
+            <a:pPr algn="ctr"/>
+            <a:endParaRPr lang="en-GB"/>
+          </a:p>
+        </p:txBody>
+      </p:sp>
+      <p:sp>
+        <p:nvSpPr>
+          <p:cNvPr id="7" name="TextBox 6">
+            <a:extLst>
+              <a:ext uri="{FF2B5EF4-FFF2-40B4-BE49-F238E27FC236}">
+                <a16:creationId xmlns:a16="http://schemas.microsoft.com/office/drawing/2014/main" id="{8CAA8261-8D6E-4C28-9AF8-D6547766C818}"/>
+              </a:ext>
+            </a:extLst>
+          </p:cNvPr>
+          <p:cNvSpPr txBox="1"/>
+          <p:nvPr/>
+        </p:nvSpPr>
+        <p:spPr>
+          <a:xfrm>
+            <a:off x="1064525" y="1690688"/>
+            <a:ext cx="8884693" cy="646331"/>
+          </a:xfrm>
+          <a:prstGeom prst="rect">
+            <a:avLst/>
+          </a:prstGeom>
+          <a:noFill/>
+        </p:spPr>
+        <p:txBody>
+          <a:bodyPr wrap="square" rtlCol="0">
+            <a:spAutoFit/>
+          </a:bodyPr>
+          <a:lstStyle/>
+          <a:p>
+            <a:r>
+              <a:rPr lang="en-GB" dirty="0"/>
+              <a:t>As you can see here all 100 transmissions were received, this means I may be able to use this technique for single transmissions back and forth as intended</a:t>
             </a:r>
           </a:p>
         </p:txBody>
@@ -4604,7 +4804,7 @@
     </p:spTree>
     <p:extLst>
       <p:ext uri="{BB962C8B-B14F-4D97-AF65-F5344CB8AC3E}">
-        <p14:creationId xmlns:p14="http://schemas.microsoft.com/office/powerpoint/2010/main" val="3128323718"/>
+        <p14:creationId xmlns:p14="http://schemas.microsoft.com/office/powerpoint/2010/main" val="773291799"/>
       </p:ext>
     </p:extLst>
   </p:cSld>
@@ -4636,7 +4836,7 @@
           <p:cNvPr id="2" name="Title 1">
             <a:extLst>
               <a:ext uri="{FF2B5EF4-FFF2-40B4-BE49-F238E27FC236}">
-                <a16:creationId xmlns:a16="http://schemas.microsoft.com/office/drawing/2014/main" id="{790527AB-E460-46A4-B7B4-3C1BFC1DD286}"/>
+                <a16:creationId xmlns:a16="http://schemas.microsoft.com/office/drawing/2014/main" id="{7B5EE842-2FDD-4DEC-8C72-6456BF9C5133}"/>
               </a:ext>
             </a:extLst>
           </p:cNvPr>
@@ -4654,25 +4854,25 @@
           <a:p>
             <a:r>
               <a:rPr lang="en-GB" dirty="0"/>
-              <a:t>Split pot calculations</a:t>
-            </a:r>
-          </a:p>
-        </p:txBody>
-      </p:sp>
-      <p:sp>
-        <p:nvSpPr>
-          <p:cNvPr id="3" name="Content Placeholder 2">
-            <a:extLst>
-              <a:ext uri="{FF2B5EF4-FFF2-40B4-BE49-F238E27FC236}">
-                <a16:creationId xmlns:a16="http://schemas.microsoft.com/office/drawing/2014/main" id="{FA08A01C-A3F7-4D41-8FAD-98DF9EA7B96D}"/>
-              </a:ext>
-            </a:extLst>
-          </p:cNvPr>
-          <p:cNvSpPr>
-            <a:spLocks noGrp="1"/>
-          </p:cNvSpPr>
-          <p:nvPr>
-            <p:ph idx="1"/>
+              <a:t>User backend</a:t>
+            </a:r>
+          </a:p>
+        </p:txBody>
+      </p:sp>
+      <p:sp>
+        <p:nvSpPr>
+          <p:cNvPr id="3" name="Text Placeholder 2">
+            <a:extLst>
+              <a:ext uri="{FF2B5EF4-FFF2-40B4-BE49-F238E27FC236}">
+                <a16:creationId xmlns:a16="http://schemas.microsoft.com/office/drawing/2014/main" id="{DE37422E-DFC5-43D8-B903-2CB431F068FC}"/>
+              </a:ext>
+            </a:extLst>
+          </p:cNvPr>
+          <p:cNvSpPr>
+            <a:spLocks noGrp="1"/>
+          </p:cNvSpPr>
+          <p:nvPr>
+            <p:ph type="body" idx="1"/>
           </p:nvPr>
         </p:nvSpPr>
         <p:spPr/>
@@ -4682,19 +4882,15 @@
           <a:p>
             <a:r>
               <a:rPr lang="en-GB" dirty="0"/>
-              <a:t>One challenging part of the game logic will be calculating split pots</a:t>
-            </a:r>
-          </a:p>
-          <a:p>
-            <a:pPr lvl="1"/>
-            <a:endParaRPr lang="en-GB" dirty="0"/>
+              <a:t>A library that includes all the backend functions accessible when logged in with an account</a:t>
+            </a:r>
           </a:p>
         </p:txBody>
       </p:sp>
     </p:spTree>
     <p:extLst>
       <p:ext uri="{BB962C8B-B14F-4D97-AF65-F5344CB8AC3E}">
-        <p14:creationId xmlns:p14="http://schemas.microsoft.com/office/powerpoint/2010/main" val="1191071722"/>
+        <p14:creationId xmlns:p14="http://schemas.microsoft.com/office/powerpoint/2010/main" val="2287663386"/>
       </p:ext>
     </p:extLst>
   </p:cSld>
@@ -4812,7 +5008,7 @@
           <p:cNvPr id="2" name="Title 1">
             <a:extLst>
               <a:ext uri="{FF2B5EF4-FFF2-40B4-BE49-F238E27FC236}">
-                <a16:creationId xmlns:a16="http://schemas.microsoft.com/office/drawing/2014/main" id="{76D7B618-33EA-4285-BC95-74EBA3A9CE4B}"/>
+                <a16:creationId xmlns:a16="http://schemas.microsoft.com/office/drawing/2014/main" id="{EF8AA7A4-9FDA-42EC-960A-661F68D6C0CC}"/>
               </a:ext>
             </a:extLst>
           </p:cNvPr>
@@ -4830,74 +5026,65 @@
           <a:p>
             <a:r>
               <a:rPr lang="en-GB" dirty="0"/>
-              <a:t>Serialising arrays for data transfer</a:t>
-            </a:r>
-          </a:p>
-        </p:txBody>
-      </p:sp>
-      <p:pic>
-        <p:nvPicPr>
-          <p:cNvPr id="4" name="Content Placeholder 3">
-            <a:extLst>
-              <a:ext uri="{FF2B5EF4-FFF2-40B4-BE49-F238E27FC236}">
-                <a16:creationId xmlns:a16="http://schemas.microsoft.com/office/drawing/2014/main" id="{1A3286E0-E11A-4FE9-B2E3-7E8C1F2A6689}"/>
-              </a:ext>
-            </a:extLst>
-          </p:cNvPr>
-          <p:cNvPicPr>
-            <a:picLocks noGrp="1" noChangeAspect="1"/>
-          </p:cNvPicPr>
+              <a:t>Necessary user functions</a:t>
+            </a:r>
+          </a:p>
+        </p:txBody>
+      </p:sp>
+      <p:sp>
+        <p:nvSpPr>
+          <p:cNvPr id="3" name="Content Placeholder 2">
+            <a:extLst>
+              <a:ext uri="{FF2B5EF4-FFF2-40B4-BE49-F238E27FC236}">
+                <a16:creationId xmlns:a16="http://schemas.microsoft.com/office/drawing/2014/main" id="{F6BB918B-6819-4478-B0CD-ED27E47326ED}"/>
+              </a:ext>
+            </a:extLst>
+          </p:cNvPr>
+          <p:cNvSpPr>
+            <a:spLocks noGrp="1"/>
+          </p:cNvSpPr>
           <p:nvPr>
             <p:ph idx="1"/>
           </p:nvPr>
-        </p:nvPicPr>
-        <p:blipFill>
-          <a:blip r:embed="rId2"/>
-          <a:stretch>
-            <a:fillRect/>
-          </a:stretch>
-        </p:blipFill>
-        <p:spPr>
-          <a:xfrm>
-            <a:off x="718706" y="1690688"/>
-            <a:ext cx="6182588" cy="1914792"/>
-          </a:xfrm>
-          <a:prstGeom prst="rect">
-            <a:avLst/>
-          </a:prstGeom>
-        </p:spPr>
-      </p:pic>
-      <p:sp>
-        <p:nvSpPr>
-          <p:cNvPr id="5" name="TextBox 4">
-            <a:extLst>
-              <a:ext uri="{FF2B5EF4-FFF2-40B4-BE49-F238E27FC236}">
-                <a16:creationId xmlns:a16="http://schemas.microsoft.com/office/drawing/2014/main" id="{BC3B7363-8C1F-46B9-814C-93393E0B8081}"/>
-              </a:ext>
-            </a:extLst>
-          </p:cNvPr>
-          <p:cNvSpPr txBox="1"/>
-          <p:nvPr/>
-        </p:nvSpPr>
-        <p:spPr>
-          <a:xfrm>
-            <a:off x="7458075" y="1690688"/>
-            <a:ext cx="4371975" cy="1754326"/>
-          </a:xfrm>
-          <a:prstGeom prst="rect">
-            <a:avLst/>
-          </a:prstGeom>
-          <a:noFill/>
-        </p:spPr>
-        <p:txBody>
-          <a:bodyPr wrap="square" rtlCol="0">
-            <a:spAutoFit/>
-          </a:bodyPr>
-          <a:lstStyle/>
-          <a:p>
-            <a:r>
-              <a:rPr lang="en-GB" dirty="0"/>
-              <a:t>When attempting to send database tables across the network as python lists, I ran into a problem where I couldn’t encode the array to send it via socket. To fix this I will need to use some form of serialisation, this meant I needed to decide between pickle and json</a:t>
+        </p:nvSpPr>
+        <p:spPr/>
+        <p:txBody>
+          <a:bodyPr/>
+          <a:lstStyle/>
+          <a:p>
+            <a:r>
+              <a:rPr lang="en-GB" dirty="0"/>
+              <a:t>View past games(maybe replay functionality)</a:t>
+            </a:r>
+          </a:p>
+          <a:p>
+            <a:r>
+              <a:rPr lang="en-GB" dirty="0"/>
+              <a:t>View their lifetime &amp; recent statistics with graphs+ extrapolation</a:t>
+            </a:r>
+          </a:p>
+          <a:p>
+            <a:r>
+              <a:rPr lang="en-GB" dirty="0"/>
+              <a:t>Update payroll</a:t>
+            </a:r>
+          </a:p>
+          <a:p>
+            <a:r>
+              <a:rPr lang="en-GB" dirty="0"/>
+              <a:t>A preliminary test before booking an appointment to get an early diagnosis</a:t>
+            </a:r>
+          </a:p>
+          <a:p>
+            <a:r>
+              <a:rPr lang="en-GB" dirty="0"/>
+              <a:t>Host/join a game</a:t>
+            </a:r>
+          </a:p>
+          <a:p>
+            <a:r>
+              <a:rPr lang="en-GB" dirty="0"/>
+              <a:t>Add friends for easier game access</a:t>
             </a:r>
           </a:p>
         </p:txBody>
@@ -4905,7 +5092,7 @@
     </p:spTree>
     <p:extLst>
       <p:ext uri="{BB962C8B-B14F-4D97-AF65-F5344CB8AC3E}">
-        <p14:creationId xmlns:p14="http://schemas.microsoft.com/office/powerpoint/2010/main" val="1795613777"/>
+        <p14:creationId xmlns:p14="http://schemas.microsoft.com/office/powerpoint/2010/main" val="3128323718"/>
       </p:ext>
     </p:extLst>
   </p:cSld>
@@ -4934,10 +5121,10 @@
       </p:grpSpPr>
       <p:sp>
         <p:nvSpPr>
-          <p:cNvPr id="4" name="Title 3">
-            <a:extLst>
-              <a:ext uri="{FF2B5EF4-FFF2-40B4-BE49-F238E27FC236}">
-                <a16:creationId xmlns:a16="http://schemas.microsoft.com/office/drawing/2014/main" id="{9A0C13EF-555C-49BA-8A54-6EF26B900BA7}"/>
+          <p:cNvPr id="2" name="Title 1">
+            <a:extLst>
+              <a:ext uri="{FF2B5EF4-FFF2-40B4-BE49-F238E27FC236}">
+                <a16:creationId xmlns:a16="http://schemas.microsoft.com/office/drawing/2014/main" id="{790527AB-E460-46A4-B7B4-3C1BFC1DD286}"/>
               </a:ext>
             </a:extLst>
           </p:cNvPr>
@@ -4955,247 +5142,47 @@
           <a:p>
             <a:r>
               <a:rPr lang="en-GB" dirty="0"/>
-              <a:t>Serialisation comparison</a:t>
-            </a:r>
-          </a:p>
-        </p:txBody>
-      </p:sp>
-      <p:sp>
-        <p:nvSpPr>
-          <p:cNvPr id="5" name="Text Placeholder 4">
-            <a:extLst>
-              <a:ext uri="{FF2B5EF4-FFF2-40B4-BE49-F238E27FC236}">
-                <a16:creationId xmlns:a16="http://schemas.microsoft.com/office/drawing/2014/main" id="{212CED7E-A6E7-4335-BA7C-50C64F0157BE}"/>
-              </a:ext>
-            </a:extLst>
-          </p:cNvPr>
-          <p:cNvSpPr>
-            <a:spLocks noGrp="1"/>
-          </p:cNvSpPr>
-          <p:nvPr>
-            <p:ph type="body" idx="1"/>
-          </p:nvPr>
-        </p:nvSpPr>
-        <p:spPr>
-          <a:xfrm>
-            <a:off x="836612" y="1223486"/>
-            <a:ext cx="5157787" cy="823912"/>
-          </a:xfrm>
-        </p:spPr>
-        <p:txBody>
-          <a:bodyPr/>
-          <a:lstStyle/>
-          <a:p>
-            <a:r>
-              <a:rPr lang="en-GB" dirty="0"/>
-              <a:t>JSON</a:t>
-            </a:r>
-          </a:p>
-        </p:txBody>
-      </p:sp>
-      <p:sp>
-        <p:nvSpPr>
-          <p:cNvPr id="6" name="Content Placeholder 5">
-            <a:extLst>
-              <a:ext uri="{FF2B5EF4-FFF2-40B4-BE49-F238E27FC236}">
-                <a16:creationId xmlns:a16="http://schemas.microsoft.com/office/drawing/2014/main" id="{611325CE-52BE-4D7F-A26F-8F7FB9C3FF44}"/>
-              </a:ext>
-            </a:extLst>
-          </p:cNvPr>
-          <p:cNvSpPr>
-            <a:spLocks noGrp="1"/>
-          </p:cNvSpPr>
-          <p:nvPr>
-            <p:ph sz="half" idx="2"/>
-          </p:nvPr>
-        </p:nvSpPr>
-        <p:spPr>
-          <a:xfrm>
-            <a:off x="836612" y="2109310"/>
-            <a:ext cx="5157787" cy="3662840"/>
-          </a:xfrm>
-        </p:spPr>
-        <p:txBody>
-          <a:bodyPr>
-            <a:normAutofit fontScale="77500" lnSpcReduction="20000"/>
-          </a:bodyPr>
-          <a:lstStyle/>
-          <a:p>
-            <a:r>
-              <a:rPr lang="en-GB" dirty="0"/>
-              <a:t>Human readable</a:t>
-            </a:r>
-          </a:p>
-          <a:p>
-            <a:r>
-              <a:rPr lang="en-GB" dirty="0"/>
-              <a:t>Cross language, don’t plan on using multiple</a:t>
-            </a:r>
-          </a:p>
-          <a:p>
-            <a:r>
-              <a:rPr lang="en-GB" dirty="0"/>
-              <a:t>Industry standard, better documented and supported</a:t>
-            </a:r>
-          </a:p>
-          <a:p>
-            <a:r>
-              <a:rPr lang="en-GB" dirty="0"/>
-              <a:t>Much more safe, as I’m passing </a:t>
-            </a:r>
-            <a:r>
-              <a:rPr lang="en-GB" dirty="0" err="1"/>
-              <a:t>ip</a:t>
-            </a:r>
-            <a:r>
-              <a:rPr lang="en-GB" dirty="0"/>
-              <a:t> addresses etc may be an advantage</a:t>
-            </a:r>
-          </a:p>
-          <a:p>
-            <a:r>
-              <a:rPr lang="en-GB" dirty="0"/>
-              <a:t>Cant deal with tuples etc and makes non string keys in dictionaries into strings, this causes issues with my mainloop.py using integer keys on a dictionary</a:t>
-            </a:r>
-          </a:p>
-          <a:p>
+              <a:t>Split pot calculations</a:t>
+            </a:r>
+          </a:p>
+        </p:txBody>
+      </p:sp>
+      <p:sp>
+        <p:nvSpPr>
+          <p:cNvPr id="3" name="Content Placeholder 2">
+            <a:extLst>
+              <a:ext uri="{FF2B5EF4-FFF2-40B4-BE49-F238E27FC236}">
+                <a16:creationId xmlns:a16="http://schemas.microsoft.com/office/drawing/2014/main" id="{FA08A01C-A3F7-4D41-8FAD-98DF9EA7B96D}"/>
+              </a:ext>
+            </a:extLst>
+          </p:cNvPr>
+          <p:cNvSpPr>
+            <a:spLocks noGrp="1"/>
+          </p:cNvSpPr>
+          <p:nvPr>
+            <p:ph idx="1"/>
+          </p:nvPr>
+        </p:nvSpPr>
+        <p:spPr/>
+        <p:txBody>
+          <a:bodyPr/>
+          <a:lstStyle/>
+          <a:p>
+            <a:r>
+              <a:rPr lang="en-GB" dirty="0"/>
+              <a:t>One challenging part of the game logic will be calculating split pots</a:t>
+            </a:r>
+          </a:p>
+          <a:p>
+            <a:pPr lvl="1"/>
             <a:endParaRPr lang="en-GB" dirty="0"/>
-          </a:p>
-        </p:txBody>
-      </p:sp>
-      <p:sp>
-        <p:nvSpPr>
-          <p:cNvPr id="7" name="Text Placeholder 6">
-            <a:extLst>
-              <a:ext uri="{FF2B5EF4-FFF2-40B4-BE49-F238E27FC236}">
-                <a16:creationId xmlns:a16="http://schemas.microsoft.com/office/drawing/2014/main" id="{DC1B5B73-6C08-4506-BB0E-0EBC69919EB2}"/>
-              </a:ext>
-            </a:extLst>
-          </p:cNvPr>
-          <p:cNvSpPr>
-            <a:spLocks noGrp="1"/>
-          </p:cNvSpPr>
-          <p:nvPr>
-            <p:ph type="body" sz="quarter" idx="3"/>
-          </p:nvPr>
-        </p:nvSpPr>
-        <p:spPr>
-          <a:xfrm>
-            <a:off x="6169024" y="1223486"/>
-            <a:ext cx="5183188" cy="823912"/>
-          </a:xfrm>
-        </p:spPr>
-        <p:txBody>
-          <a:bodyPr/>
-          <a:lstStyle/>
-          <a:p>
-            <a:r>
-              <a:rPr lang="en-GB" dirty="0"/>
-              <a:t>Pickle</a:t>
-            </a:r>
-          </a:p>
-        </p:txBody>
-      </p:sp>
-      <p:sp>
-        <p:nvSpPr>
-          <p:cNvPr id="8" name="Content Placeholder 7">
-            <a:extLst>
-              <a:ext uri="{FF2B5EF4-FFF2-40B4-BE49-F238E27FC236}">
-                <a16:creationId xmlns:a16="http://schemas.microsoft.com/office/drawing/2014/main" id="{A01C3724-C00E-4D83-8E7C-E0A80D306A2E}"/>
-              </a:ext>
-            </a:extLst>
-          </p:cNvPr>
-          <p:cNvSpPr>
-            <a:spLocks noGrp="1"/>
-          </p:cNvSpPr>
-          <p:nvPr>
-            <p:ph sz="quarter" idx="4"/>
-          </p:nvPr>
-        </p:nvSpPr>
-        <p:spPr>
-          <a:xfrm>
-            <a:off x="6169024" y="2047398"/>
-            <a:ext cx="5183188" cy="3209925"/>
-          </a:xfrm>
-        </p:spPr>
-        <p:txBody>
-          <a:bodyPr>
-            <a:normAutofit fontScale="77500" lnSpcReduction="20000"/>
-          </a:bodyPr>
-          <a:lstStyle/>
-          <a:p>
-            <a:r>
-              <a:rPr lang="en-GB" dirty="0"/>
-              <a:t>Faster</a:t>
-            </a:r>
-          </a:p>
-          <a:p>
-            <a:r>
-              <a:rPr lang="en-GB" dirty="0"/>
-              <a:t>Can send classes etc which may be useful later down the line to have more flexibility don’t want to import this and json</a:t>
-            </a:r>
-          </a:p>
-          <a:p>
-            <a:r>
-              <a:rPr lang="en-GB" dirty="0"/>
-              <a:t>Allows for data serialization of more data types and better support for pythonic use cases</a:t>
-            </a:r>
-          </a:p>
-          <a:p>
-            <a:r>
-              <a:rPr lang="en-GB" dirty="0"/>
-              <a:t>Could be faster using </a:t>
-            </a:r>
-            <a:r>
-              <a:rPr lang="en-GB" dirty="0" err="1"/>
-              <a:t>cpickle</a:t>
-            </a:r>
-            <a:r>
-              <a:rPr lang="en-GB" dirty="0"/>
-              <a:t> but this is not supported in python 3.x yet</a:t>
-            </a:r>
-          </a:p>
-        </p:txBody>
-      </p:sp>
-      <p:sp>
-        <p:nvSpPr>
-          <p:cNvPr id="2" name="TextBox 1">
-            <a:extLst>
-              <a:ext uri="{FF2B5EF4-FFF2-40B4-BE49-F238E27FC236}">
-                <a16:creationId xmlns:a16="http://schemas.microsoft.com/office/drawing/2014/main" id="{A12778BE-AF43-4579-82D8-5CB2F5D50C53}"/>
-              </a:ext>
-            </a:extLst>
-          </p:cNvPr>
-          <p:cNvSpPr txBox="1"/>
-          <p:nvPr/>
-        </p:nvSpPr>
-        <p:spPr>
-          <a:xfrm>
-            <a:off x="700881" y="5538768"/>
-            <a:ext cx="10790237" cy="954107"/>
-          </a:xfrm>
-          <a:prstGeom prst="rect">
-            <a:avLst/>
-          </a:prstGeom>
-          <a:noFill/>
-        </p:spPr>
-        <p:txBody>
-          <a:bodyPr wrap="square" rtlCol="0">
-            <a:spAutoFit/>
-          </a:bodyPr>
-          <a:lstStyle/>
-          <a:p>
-            <a:r>
-              <a:rPr lang="en-GB" sz="2800" dirty="0"/>
-              <a:t>Due to the issues with json and the python specific design of pickle I have decided to use pickle.</a:t>
-            </a:r>
           </a:p>
         </p:txBody>
       </p:sp>
     </p:spTree>
     <p:extLst>
       <p:ext uri="{BB962C8B-B14F-4D97-AF65-F5344CB8AC3E}">
-        <p14:creationId xmlns:p14="http://schemas.microsoft.com/office/powerpoint/2010/main" val="743699574"/>
+        <p14:creationId xmlns:p14="http://schemas.microsoft.com/office/powerpoint/2010/main" val="1191071722"/>
       </p:ext>
     </p:extLst>
   </p:cSld>
@@ -5227,7 +5214,7 @@
           <p:cNvPr id="2" name="Title 1">
             <a:extLst>
               <a:ext uri="{FF2B5EF4-FFF2-40B4-BE49-F238E27FC236}">
-                <a16:creationId xmlns:a16="http://schemas.microsoft.com/office/drawing/2014/main" id="{E978F30E-70B8-4C4B-956E-77EA0447200E}"/>
+                <a16:creationId xmlns:a16="http://schemas.microsoft.com/office/drawing/2014/main" id="{76D7B618-33EA-4285-BC95-74EBA3A9CE4B}"/>
               </a:ext>
             </a:extLst>
           </p:cNvPr>
@@ -5245,76 +5232,82 @@
           <a:p>
             <a:r>
               <a:rPr lang="en-GB" dirty="0"/>
-              <a:t>Useful links crypto</a:t>
-            </a:r>
-          </a:p>
-        </p:txBody>
-      </p:sp>
-      <p:sp>
-        <p:nvSpPr>
-          <p:cNvPr id="3" name="Content Placeholder 2">
-            <a:extLst>
-              <a:ext uri="{FF2B5EF4-FFF2-40B4-BE49-F238E27FC236}">
-                <a16:creationId xmlns:a16="http://schemas.microsoft.com/office/drawing/2014/main" id="{04CB57B1-98C8-45E2-AFC8-F27A2A0BE441}"/>
-              </a:ext>
-            </a:extLst>
-          </p:cNvPr>
-          <p:cNvSpPr>
-            <a:spLocks noGrp="1"/>
-          </p:cNvSpPr>
+              <a:t>Serialising arrays for data transfer</a:t>
+            </a:r>
+          </a:p>
+        </p:txBody>
+      </p:sp>
+      <p:pic>
+        <p:nvPicPr>
+          <p:cNvPr id="4" name="Content Placeholder 3">
+            <a:extLst>
+              <a:ext uri="{FF2B5EF4-FFF2-40B4-BE49-F238E27FC236}">
+                <a16:creationId xmlns:a16="http://schemas.microsoft.com/office/drawing/2014/main" id="{1A3286E0-E11A-4FE9-B2E3-7E8C1F2A6689}"/>
+              </a:ext>
+            </a:extLst>
+          </p:cNvPr>
+          <p:cNvPicPr>
+            <a:picLocks noGrp="1" noChangeAspect="1"/>
+          </p:cNvPicPr>
           <p:nvPr>
             <p:ph idx="1"/>
           </p:nvPr>
-        </p:nvSpPr>
-        <p:spPr/>
-        <p:txBody>
-          <a:bodyPr/>
-          <a:lstStyle/>
-          <a:p>
-            <a:r>
-              <a:rPr lang="en-GB" dirty="0">
-                <a:hlinkClick r:id="rId2"/>
-              </a:rPr>
-              <a:t>https://en.wikipedia.org/wiki/RSA_(cryptosystem)#Key_generation</a:t>
-            </a:r>
-            <a:endParaRPr lang="en-GB" dirty="0"/>
-          </a:p>
-          <a:p>
-            <a:r>
-              <a:rPr lang="en-GB" dirty="0">
-                <a:hlinkClick r:id="rId3"/>
-              </a:rPr>
-              <a:t>https://cryptography.io/en/latest/hazmat/primitives/asymmetric/rsa/</a:t>
-            </a:r>
-            <a:endParaRPr lang="en-GB" dirty="0"/>
-          </a:p>
-          <a:p>
-            <a:r>
-              <a:rPr lang="en-GB" dirty="0">
-                <a:hlinkClick r:id="rId4"/>
-              </a:rPr>
-              <a:t>https://cryptography.io/en/latest/hazmat/primitives/asymmetric/</a:t>
-            </a:r>
-            <a:endParaRPr lang="en-GB" dirty="0"/>
-          </a:p>
-          <a:p>
-            <a:r>
-              <a:rPr lang="en-GB" dirty="0">
-                <a:hlinkClick r:id="rId5"/>
-              </a:rPr>
-              <a:t>https://security.stackexchange.com/questions/5096/rsa-vs-dsa-for-ssh-authentication-keys</a:t>
-            </a:r>
-            <a:endParaRPr lang="en-GB" dirty="0"/>
-          </a:p>
-          <a:p>
-            <a:endParaRPr lang="en-GB" dirty="0"/>
+        </p:nvPicPr>
+        <p:blipFill>
+          <a:blip r:embed="rId2"/>
+          <a:stretch>
+            <a:fillRect/>
+          </a:stretch>
+        </p:blipFill>
+        <p:spPr>
+          <a:xfrm>
+            <a:off x="718706" y="1690688"/>
+            <a:ext cx="6182588" cy="1914792"/>
+          </a:xfrm>
+          <a:prstGeom prst="rect">
+            <a:avLst/>
+          </a:prstGeom>
+        </p:spPr>
+      </p:pic>
+      <p:sp>
+        <p:nvSpPr>
+          <p:cNvPr id="5" name="TextBox 4">
+            <a:extLst>
+              <a:ext uri="{FF2B5EF4-FFF2-40B4-BE49-F238E27FC236}">
+                <a16:creationId xmlns:a16="http://schemas.microsoft.com/office/drawing/2014/main" id="{BC3B7363-8C1F-46B9-814C-93393E0B8081}"/>
+              </a:ext>
+            </a:extLst>
+          </p:cNvPr>
+          <p:cNvSpPr txBox="1"/>
+          <p:nvPr/>
+        </p:nvSpPr>
+        <p:spPr>
+          <a:xfrm>
+            <a:off x="7458075" y="1690688"/>
+            <a:ext cx="4371975" cy="1754326"/>
+          </a:xfrm>
+          <a:prstGeom prst="rect">
+            <a:avLst/>
+          </a:prstGeom>
+          <a:noFill/>
+        </p:spPr>
+        <p:txBody>
+          <a:bodyPr wrap="square" rtlCol="0">
+            <a:spAutoFit/>
+          </a:bodyPr>
+          <a:lstStyle/>
+          <a:p>
+            <a:r>
+              <a:rPr lang="en-GB" dirty="0"/>
+              <a:t>When attempting to send database tables across the network as python lists, I ran into a problem where I couldn’t encode the array to send it via socket. To fix this I will need to use some form of serialisation, this meant I needed to decide between pickle and json</a:t>
+            </a:r>
           </a:p>
         </p:txBody>
       </p:sp>
     </p:spTree>
     <p:extLst>
       <p:ext uri="{BB962C8B-B14F-4D97-AF65-F5344CB8AC3E}">
-        <p14:creationId xmlns:p14="http://schemas.microsoft.com/office/powerpoint/2010/main" val="3309908080"/>
+        <p14:creationId xmlns:p14="http://schemas.microsoft.com/office/powerpoint/2010/main" val="1795613777"/>
       </p:ext>
     </p:extLst>
   </p:cSld>
@@ -5343,10 +5336,10 @@
       </p:grpSpPr>
       <p:sp>
         <p:nvSpPr>
-          <p:cNvPr id="2" name="Title 1">
-            <a:extLst>
-              <a:ext uri="{FF2B5EF4-FFF2-40B4-BE49-F238E27FC236}">
-                <a16:creationId xmlns:a16="http://schemas.microsoft.com/office/drawing/2014/main" id="{76B61AC1-EA1A-43B0-BF64-56FF385255B4}"/>
+          <p:cNvPr id="4" name="Title 3">
+            <a:extLst>
+              <a:ext uri="{FF2B5EF4-FFF2-40B4-BE49-F238E27FC236}">
+                <a16:creationId xmlns:a16="http://schemas.microsoft.com/office/drawing/2014/main" id="{9A0C13EF-555C-49BA-8A54-6EF26B900BA7}"/>
               </a:ext>
             </a:extLst>
           </p:cNvPr>
@@ -5364,67 +5357,247 @@
           <a:p>
             <a:r>
               <a:rPr lang="en-GB" dirty="0"/>
-              <a:t>Useful links networking</a:t>
-            </a:r>
-          </a:p>
-        </p:txBody>
-      </p:sp>
-      <p:sp>
-        <p:nvSpPr>
-          <p:cNvPr id="3" name="Content Placeholder 2">
-            <a:extLst>
-              <a:ext uri="{FF2B5EF4-FFF2-40B4-BE49-F238E27FC236}">
-                <a16:creationId xmlns:a16="http://schemas.microsoft.com/office/drawing/2014/main" id="{DD2AB15A-FBF2-4686-A1B3-E5CBB3E3ABFC}"/>
-              </a:ext>
-            </a:extLst>
-          </p:cNvPr>
-          <p:cNvSpPr>
-            <a:spLocks noGrp="1"/>
-          </p:cNvSpPr>
-          <p:nvPr>
-            <p:ph idx="1"/>
-          </p:nvPr>
-        </p:nvSpPr>
-        <p:spPr/>
-        <p:txBody>
-          <a:bodyPr/>
-          <a:lstStyle/>
-          <a:p>
-            <a:r>
-              <a:rPr lang="en-GB" dirty="0">
-                <a:hlinkClick r:id="rId2"/>
-              </a:rPr>
-              <a:t>https://www.tutorialspoint.com/python/python_networking.htm</a:t>
-            </a:r>
+              <a:t>Serialisation comparison</a:t>
+            </a:r>
+          </a:p>
+        </p:txBody>
+      </p:sp>
+      <p:sp>
+        <p:nvSpPr>
+          <p:cNvPr id="5" name="Text Placeholder 4">
+            <a:extLst>
+              <a:ext uri="{FF2B5EF4-FFF2-40B4-BE49-F238E27FC236}">
+                <a16:creationId xmlns:a16="http://schemas.microsoft.com/office/drawing/2014/main" id="{212CED7E-A6E7-4335-BA7C-50C64F0157BE}"/>
+              </a:ext>
+            </a:extLst>
+          </p:cNvPr>
+          <p:cNvSpPr>
+            <a:spLocks noGrp="1"/>
+          </p:cNvSpPr>
+          <p:nvPr>
+            <p:ph type="body" idx="1"/>
+          </p:nvPr>
+        </p:nvSpPr>
+        <p:spPr>
+          <a:xfrm>
+            <a:off x="836612" y="1223486"/>
+            <a:ext cx="5157787" cy="823912"/>
+          </a:xfrm>
+        </p:spPr>
+        <p:txBody>
+          <a:bodyPr/>
+          <a:lstStyle/>
+          <a:p>
+            <a:r>
+              <a:rPr lang="en-GB" dirty="0"/>
+              <a:t>JSON</a:t>
+            </a:r>
+          </a:p>
+        </p:txBody>
+      </p:sp>
+      <p:sp>
+        <p:nvSpPr>
+          <p:cNvPr id="6" name="Content Placeholder 5">
+            <a:extLst>
+              <a:ext uri="{FF2B5EF4-FFF2-40B4-BE49-F238E27FC236}">
+                <a16:creationId xmlns:a16="http://schemas.microsoft.com/office/drawing/2014/main" id="{611325CE-52BE-4D7F-A26F-8F7FB9C3FF44}"/>
+              </a:ext>
+            </a:extLst>
+          </p:cNvPr>
+          <p:cNvSpPr>
+            <a:spLocks noGrp="1"/>
+          </p:cNvSpPr>
+          <p:nvPr>
+            <p:ph sz="half" idx="2"/>
+          </p:nvPr>
+        </p:nvSpPr>
+        <p:spPr>
+          <a:xfrm>
+            <a:off x="836612" y="2109310"/>
+            <a:ext cx="5157787" cy="3662840"/>
+          </a:xfrm>
+        </p:spPr>
+        <p:txBody>
+          <a:bodyPr>
+            <a:normAutofit fontScale="77500" lnSpcReduction="20000"/>
+          </a:bodyPr>
+          <a:lstStyle/>
+          <a:p>
+            <a:r>
+              <a:rPr lang="en-GB" dirty="0"/>
+              <a:t>Human readable</a:t>
+            </a:r>
+          </a:p>
+          <a:p>
+            <a:r>
+              <a:rPr lang="en-GB" dirty="0"/>
+              <a:t>Cross language, don’t plan on using multiple</a:t>
+            </a:r>
+          </a:p>
+          <a:p>
+            <a:r>
+              <a:rPr lang="en-GB" dirty="0"/>
+              <a:t>Industry standard, better documented and supported</a:t>
+            </a:r>
+          </a:p>
+          <a:p>
+            <a:r>
+              <a:rPr lang="en-GB" dirty="0"/>
+              <a:t>Much more safe, as I’m passing </a:t>
+            </a:r>
+            <a:r>
+              <a:rPr lang="en-GB" dirty="0" err="1"/>
+              <a:t>ip</a:t>
+            </a:r>
+            <a:r>
+              <a:rPr lang="en-GB" dirty="0"/>
+              <a:t> addresses etc may be an advantage</a:t>
+            </a:r>
+          </a:p>
+          <a:p>
+            <a:r>
+              <a:rPr lang="en-GB" dirty="0"/>
+              <a:t>Cant deal with tuples etc and makes non string keys in dictionaries into strings, this causes issues with my mainloop.py using integer keys on a dictionary</a:t>
+            </a:r>
+          </a:p>
+          <a:p>
             <a:endParaRPr lang="en-GB" dirty="0"/>
           </a:p>
-          <a:p>
-            <a:r>
-              <a:rPr lang="en-GB" dirty="0">
-                <a:hlinkClick r:id="rId3"/>
-              </a:rPr>
-              <a:t>https://www.w3schools.in/python-tutorial/network-programming/</a:t>
-            </a:r>
-            <a:endParaRPr lang="en-GB" dirty="0"/>
-          </a:p>
-          <a:p>
-            <a:r>
-              <a:rPr lang="en-GB" dirty="0">
-                <a:hlinkClick r:id="rId4"/>
-              </a:rPr>
-              <a:t>https://stackoverflow.com/questions/34653875/python-how-to-send-data-over-tcp</a:t>
-            </a:r>
-            <a:endParaRPr lang="en-GB" dirty="0"/>
-          </a:p>
-          <a:p>
-            <a:endParaRPr lang="en-GB" dirty="0"/>
+        </p:txBody>
+      </p:sp>
+      <p:sp>
+        <p:nvSpPr>
+          <p:cNvPr id="7" name="Text Placeholder 6">
+            <a:extLst>
+              <a:ext uri="{FF2B5EF4-FFF2-40B4-BE49-F238E27FC236}">
+                <a16:creationId xmlns:a16="http://schemas.microsoft.com/office/drawing/2014/main" id="{DC1B5B73-6C08-4506-BB0E-0EBC69919EB2}"/>
+              </a:ext>
+            </a:extLst>
+          </p:cNvPr>
+          <p:cNvSpPr>
+            <a:spLocks noGrp="1"/>
+          </p:cNvSpPr>
+          <p:nvPr>
+            <p:ph type="body" sz="quarter" idx="3"/>
+          </p:nvPr>
+        </p:nvSpPr>
+        <p:spPr>
+          <a:xfrm>
+            <a:off x="6169024" y="1223486"/>
+            <a:ext cx="5183188" cy="823912"/>
+          </a:xfrm>
+        </p:spPr>
+        <p:txBody>
+          <a:bodyPr/>
+          <a:lstStyle/>
+          <a:p>
+            <a:r>
+              <a:rPr lang="en-GB" dirty="0"/>
+              <a:t>Pickle</a:t>
+            </a:r>
+          </a:p>
+        </p:txBody>
+      </p:sp>
+      <p:sp>
+        <p:nvSpPr>
+          <p:cNvPr id="8" name="Content Placeholder 7">
+            <a:extLst>
+              <a:ext uri="{FF2B5EF4-FFF2-40B4-BE49-F238E27FC236}">
+                <a16:creationId xmlns:a16="http://schemas.microsoft.com/office/drawing/2014/main" id="{A01C3724-C00E-4D83-8E7C-E0A80D306A2E}"/>
+              </a:ext>
+            </a:extLst>
+          </p:cNvPr>
+          <p:cNvSpPr>
+            <a:spLocks noGrp="1"/>
+          </p:cNvSpPr>
+          <p:nvPr>
+            <p:ph sz="quarter" idx="4"/>
+          </p:nvPr>
+        </p:nvSpPr>
+        <p:spPr>
+          <a:xfrm>
+            <a:off x="6169024" y="2047398"/>
+            <a:ext cx="5183188" cy="3209925"/>
+          </a:xfrm>
+        </p:spPr>
+        <p:txBody>
+          <a:bodyPr>
+            <a:normAutofit fontScale="77500" lnSpcReduction="20000"/>
+          </a:bodyPr>
+          <a:lstStyle/>
+          <a:p>
+            <a:r>
+              <a:rPr lang="en-GB" dirty="0"/>
+              <a:t>Faster</a:t>
+            </a:r>
+          </a:p>
+          <a:p>
+            <a:r>
+              <a:rPr lang="en-GB" dirty="0"/>
+              <a:t>Can send classes etc which may be useful later down the line to have more flexibility don’t want to import this and json</a:t>
+            </a:r>
+          </a:p>
+          <a:p>
+            <a:r>
+              <a:rPr lang="en-GB" dirty="0"/>
+              <a:t>Allows for data serialization of more data types and better support for pythonic use cases</a:t>
+            </a:r>
+          </a:p>
+          <a:p>
+            <a:r>
+              <a:rPr lang="en-GB" dirty="0"/>
+              <a:t>Could be faster using </a:t>
+            </a:r>
+            <a:r>
+              <a:rPr lang="en-GB" dirty="0" err="1"/>
+              <a:t>cpickle</a:t>
+            </a:r>
+            <a:r>
+              <a:rPr lang="en-GB" dirty="0"/>
+              <a:t> but this is not supported in python 3.x yet</a:t>
+            </a:r>
+          </a:p>
+        </p:txBody>
+      </p:sp>
+      <p:sp>
+        <p:nvSpPr>
+          <p:cNvPr id="2" name="TextBox 1">
+            <a:extLst>
+              <a:ext uri="{FF2B5EF4-FFF2-40B4-BE49-F238E27FC236}">
+                <a16:creationId xmlns:a16="http://schemas.microsoft.com/office/drawing/2014/main" id="{A12778BE-AF43-4579-82D8-5CB2F5D50C53}"/>
+              </a:ext>
+            </a:extLst>
+          </p:cNvPr>
+          <p:cNvSpPr txBox="1"/>
+          <p:nvPr/>
+        </p:nvSpPr>
+        <p:spPr>
+          <a:xfrm>
+            <a:off x="700881" y="5538768"/>
+            <a:ext cx="10790237" cy="954107"/>
+          </a:xfrm>
+          <a:prstGeom prst="rect">
+            <a:avLst/>
+          </a:prstGeom>
+          <a:noFill/>
+        </p:spPr>
+        <p:txBody>
+          <a:bodyPr wrap="square" rtlCol="0">
+            <a:spAutoFit/>
+          </a:bodyPr>
+          <a:lstStyle/>
+          <a:p>
+            <a:r>
+              <a:rPr lang="en-GB" sz="2800" dirty="0"/>
+              <a:t>Due to the issues with json and the python specific design of pickle I have decided to use pickle.</a:t>
+            </a:r>
           </a:p>
         </p:txBody>
       </p:sp>
     </p:spTree>
     <p:extLst>
       <p:ext uri="{BB962C8B-B14F-4D97-AF65-F5344CB8AC3E}">
-        <p14:creationId xmlns:p14="http://schemas.microsoft.com/office/powerpoint/2010/main" val="4186440119"/>
+        <p14:creationId xmlns:p14="http://schemas.microsoft.com/office/powerpoint/2010/main" val="743699574"/>
       </p:ext>
     </p:extLst>
   </p:cSld>
@@ -5456,7 +5629,7 @@
           <p:cNvPr id="2" name="Title 1">
             <a:extLst>
               <a:ext uri="{FF2B5EF4-FFF2-40B4-BE49-F238E27FC236}">
-                <a16:creationId xmlns:a16="http://schemas.microsoft.com/office/drawing/2014/main" id="{103886FA-BC70-43F1-8492-3D2BD6D73654}"/>
+                <a16:creationId xmlns:a16="http://schemas.microsoft.com/office/drawing/2014/main" id="{E978F30E-70B8-4C4B-956E-77EA0447200E}"/>
               </a:ext>
             </a:extLst>
           </p:cNvPr>
@@ -5474,7 +5647,7 @@
           <a:p>
             <a:r>
               <a:rPr lang="en-GB" dirty="0"/>
-              <a:t>notes</a:t>
+              <a:t>Useful links crypto</a:t>
             </a:r>
           </a:p>
         </p:txBody>
@@ -5484,7 +5657,7 @@
           <p:cNvPr id="3" name="Content Placeholder 2">
             <a:extLst>
               <a:ext uri="{FF2B5EF4-FFF2-40B4-BE49-F238E27FC236}">
-                <a16:creationId xmlns:a16="http://schemas.microsoft.com/office/drawing/2014/main" id="{5A02EDD2-E34D-4469-BDA7-CE646653E7DE}"/>
+                <a16:creationId xmlns:a16="http://schemas.microsoft.com/office/drawing/2014/main" id="{04CB57B1-98C8-45E2-AFC8-F27A2A0BE441}"/>
               </a:ext>
             </a:extLst>
           </p:cNvPr>
@@ -5501,19 +5674,39 @@
           <a:lstStyle/>
           <a:p>
             <a:r>
-              <a:rPr lang="en-GB" dirty="0" err="1"/>
-              <a:t>ip</a:t>
-            </a:r>
-            <a:r>
-              <a:rPr lang="en-GB" dirty="0"/>
-              <a:t> is allocated to username for 24 hours or until the account is logged out of,</a:t>
-            </a:r>
-          </a:p>
-          <a:p>
-            <a:r>
-              <a:rPr lang="en-GB" dirty="0"/>
-              <a:t>Classes = UI, client, manager</a:t>
-            </a:r>
+              <a:rPr lang="en-GB" dirty="0">
+                <a:hlinkClick r:id="rId2"/>
+              </a:rPr>
+              <a:t>https://en.wikipedia.org/wiki/RSA_(cryptosystem)#Key_generation</a:t>
+            </a:r>
+            <a:endParaRPr lang="en-GB" dirty="0"/>
+          </a:p>
+          <a:p>
+            <a:r>
+              <a:rPr lang="en-GB" dirty="0">
+                <a:hlinkClick r:id="rId3"/>
+              </a:rPr>
+              <a:t>https://cryptography.io/en/latest/hazmat/primitives/asymmetric/rsa/</a:t>
+            </a:r>
+            <a:endParaRPr lang="en-GB" dirty="0"/>
+          </a:p>
+          <a:p>
+            <a:r>
+              <a:rPr lang="en-GB" dirty="0">
+                <a:hlinkClick r:id="rId4"/>
+              </a:rPr>
+              <a:t>https://cryptography.io/en/latest/hazmat/primitives/asymmetric/</a:t>
+            </a:r>
+            <a:endParaRPr lang="en-GB" dirty="0"/>
+          </a:p>
+          <a:p>
+            <a:r>
+              <a:rPr lang="en-GB" dirty="0">
+                <a:hlinkClick r:id="rId5"/>
+              </a:rPr>
+              <a:t>https://security.stackexchange.com/questions/5096/rsa-vs-dsa-for-ssh-authentication-keys</a:t>
+            </a:r>
+            <a:endParaRPr lang="en-GB" dirty="0"/>
           </a:p>
           <a:p>
             <a:endParaRPr lang="en-GB" dirty="0"/>
@@ -5523,7 +5716,7 @@
     </p:spTree>
     <p:extLst>
       <p:ext uri="{BB962C8B-B14F-4D97-AF65-F5344CB8AC3E}">
-        <p14:creationId xmlns:p14="http://schemas.microsoft.com/office/powerpoint/2010/main" val="2517001702"/>
+        <p14:creationId xmlns:p14="http://schemas.microsoft.com/office/powerpoint/2010/main" val="3309908080"/>
       </p:ext>
     </p:extLst>
   </p:cSld>
@@ -5555,6 +5748,215 @@
           <p:cNvPr id="2" name="Title 1">
             <a:extLst>
               <a:ext uri="{FF2B5EF4-FFF2-40B4-BE49-F238E27FC236}">
+                <a16:creationId xmlns:a16="http://schemas.microsoft.com/office/drawing/2014/main" id="{76B61AC1-EA1A-43B0-BF64-56FF385255B4}"/>
+              </a:ext>
+            </a:extLst>
+          </p:cNvPr>
+          <p:cNvSpPr>
+            <a:spLocks noGrp="1"/>
+          </p:cNvSpPr>
+          <p:nvPr>
+            <p:ph type="title"/>
+          </p:nvPr>
+        </p:nvSpPr>
+        <p:spPr/>
+        <p:txBody>
+          <a:bodyPr/>
+          <a:lstStyle/>
+          <a:p>
+            <a:r>
+              <a:rPr lang="en-GB" dirty="0"/>
+              <a:t>Useful links networking</a:t>
+            </a:r>
+          </a:p>
+        </p:txBody>
+      </p:sp>
+      <p:sp>
+        <p:nvSpPr>
+          <p:cNvPr id="3" name="Content Placeholder 2">
+            <a:extLst>
+              <a:ext uri="{FF2B5EF4-FFF2-40B4-BE49-F238E27FC236}">
+                <a16:creationId xmlns:a16="http://schemas.microsoft.com/office/drawing/2014/main" id="{DD2AB15A-FBF2-4686-A1B3-E5CBB3E3ABFC}"/>
+              </a:ext>
+            </a:extLst>
+          </p:cNvPr>
+          <p:cNvSpPr>
+            <a:spLocks noGrp="1"/>
+          </p:cNvSpPr>
+          <p:nvPr>
+            <p:ph idx="1"/>
+          </p:nvPr>
+        </p:nvSpPr>
+        <p:spPr/>
+        <p:txBody>
+          <a:bodyPr/>
+          <a:lstStyle/>
+          <a:p>
+            <a:r>
+              <a:rPr lang="en-GB" dirty="0">
+                <a:hlinkClick r:id="rId2"/>
+              </a:rPr>
+              <a:t>https://www.tutorialspoint.com/python/python_networking.htm</a:t>
+            </a:r>
+            <a:endParaRPr lang="en-GB" dirty="0"/>
+          </a:p>
+          <a:p>
+            <a:r>
+              <a:rPr lang="en-GB" dirty="0">
+                <a:hlinkClick r:id="rId3"/>
+              </a:rPr>
+              <a:t>https://www.w3schools.in/python-tutorial/network-programming/</a:t>
+            </a:r>
+            <a:endParaRPr lang="en-GB" dirty="0"/>
+          </a:p>
+          <a:p>
+            <a:r>
+              <a:rPr lang="en-GB" dirty="0">
+                <a:hlinkClick r:id="rId4"/>
+              </a:rPr>
+              <a:t>https://stackoverflow.com/questions/34653875/python-how-to-send-data-over-tcp</a:t>
+            </a:r>
+            <a:endParaRPr lang="en-GB" dirty="0"/>
+          </a:p>
+          <a:p>
+            <a:endParaRPr lang="en-GB" dirty="0"/>
+          </a:p>
+        </p:txBody>
+      </p:sp>
+    </p:spTree>
+    <p:extLst>
+      <p:ext uri="{BB962C8B-B14F-4D97-AF65-F5344CB8AC3E}">
+        <p14:creationId xmlns:p14="http://schemas.microsoft.com/office/powerpoint/2010/main" val="4186440119"/>
+      </p:ext>
+    </p:extLst>
+  </p:cSld>
+  <p:clrMapOvr>
+    <a:masterClrMapping/>
+  </p:clrMapOvr>
+</p:sld>
+</file>
+
+<file path=ppt/slides/slide26.xml><?xml version="1.0" encoding="utf-8"?>
+<p:sld xmlns:a="http://schemas.openxmlformats.org/drawingml/2006/main" xmlns:r="http://schemas.openxmlformats.org/officeDocument/2006/relationships" xmlns:p="http://schemas.openxmlformats.org/presentationml/2006/main">
+  <p:cSld>
+    <p:spTree>
+      <p:nvGrpSpPr>
+        <p:cNvPr id="1" name=""/>
+        <p:cNvGrpSpPr/>
+        <p:nvPr/>
+      </p:nvGrpSpPr>
+      <p:grpSpPr>
+        <a:xfrm>
+          <a:off x="0" y="0"/>
+          <a:ext cx="0" cy="0"/>
+          <a:chOff x="0" y="0"/>
+          <a:chExt cx="0" cy="0"/>
+        </a:xfrm>
+      </p:grpSpPr>
+      <p:sp>
+        <p:nvSpPr>
+          <p:cNvPr id="2" name="Title 1">
+            <a:extLst>
+              <a:ext uri="{FF2B5EF4-FFF2-40B4-BE49-F238E27FC236}">
+                <a16:creationId xmlns:a16="http://schemas.microsoft.com/office/drawing/2014/main" id="{103886FA-BC70-43F1-8492-3D2BD6D73654}"/>
+              </a:ext>
+            </a:extLst>
+          </p:cNvPr>
+          <p:cNvSpPr>
+            <a:spLocks noGrp="1"/>
+          </p:cNvSpPr>
+          <p:nvPr>
+            <p:ph type="title"/>
+          </p:nvPr>
+        </p:nvSpPr>
+        <p:spPr/>
+        <p:txBody>
+          <a:bodyPr/>
+          <a:lstStyle/>
+          <a:p>
+            <a:r>
+              <a:rPr lang="en-GB" dirty="0"/>
+              <a:t>notes</a:t>
+            </a:r>
+          </a:p>
+        </p:txBody>
+      </p:sp>
+      <p:sp>
+        <p:nvSpPr>
+          <p:cNvPr id="3" name="Content Placeholder 2">
+            <a:extLst>
+              <a:ext uri="{FF2B5EF4-FFF2-40B4-BE49-F238E27FC236}">
+                <a16:creationId xmlns:a16="http://schemas.microsoft.com/office/drawing/2014/main" id="{5A02EDD2-E34D-4469-BDA7-CE646653E7DE}"/>
+              </a:ext>
+            </a:extLst>
+          </p:cNvPr>
+          <p:cNvSpPr>
+            <a:spLocks noGrp="1"/>
+          </p:cNvSpPr>
+          <p:nvPr>
+            <p:ph idx="1"/>
+          </p:nvPr>
+        </p:nvSpPr>
+        <p:spPr/>
+        <p:txBody>
+          <a:bodyPr/>
+          <a:lstStyle/>
+          <a:p>
+            <a:r>
+              <a:rPr lang="en-GB" dirty="0" err="1"/>
+              <a:t>ip</a:t>
+            </a:r>
+            <a:r>
+              <a:rPr lang="en-GB" dirty="0"/>
+              <a:t> is allocated to username for 24 hours or until the account is logged out of,</a:t>
+            </a:r>
+          </a:p>
+          <a:p>
+            <a:r>
+              <a:rPr lang="en-GB" dirty="0"/>
+              <a:t>Classes = UI, client, manager</a:t>
+            </a:r>
+          </a:p>
+          <a:p>
+            <a:endParaRPr lang="en-GB" dirty="0"/>
+          </a:p>
+        </p:txBody>
+      </p:sp>
+    </p:spTree>
+    <p:extLst>
+      <p:ext uri="{BB962C8B-B14F-4D97-AF65-F5344CB8AC3E}">
+        <p14:creationId xmlns:p14="http://schemas.microsoft.com/office/powerpoint/2010/main" val="2517001702"/>
+      </p:ext>
+    </p:extLst>
+  </p:cSld>
+  <p:clrMapOvr>
+    <a:masterClrMapping/>
+  </p:clrMapOvr>
+</p:sld>
+</file>
+
+<file path=ppt/slides/slide27.xml><?xml version="1.0" encoding="utf-8"?>
+<p:sld xmlns:a="http://schemas.openxmlformats.org/drawingml/2006/main" xmlns:r="http://schemas.openxmlformats.org/officeDocument/2006/relationships" xmlns:p="http://schemas.openxmlformats.org/presentationml/2006/main">
+  <p:cSld>
+    <p:spTree>
+      <p:nvGrpSpPr>
+        <p:cNvPr id="1" name=""/>
+        <p:cNvGrpSpPr/>
+        <p:nvPr/>
+      </p:nvGrpSpPr>
+      <p:grpSpPr>
+        <a:xfrm>
+          <a:off x="0" y="0"/>
+          <a:ext cx="0" cy="0"/>
+          <a:chOff x="0" y="0"/>
+          <a:chExt cx="0" cy="0"/>
+        </a:xfrm>
+      </p:grpSpPr>
+      <p:sp>
+        <p:nvSpPr>
+          <p:cNvPr id="2" name="Title 1">
+            <a:extLst>
+              <a:ext uri="{FF2B5EF4-FFF2-40B4-BE49-F238E27FC236}">
                 <a16:creationId xmlns:a16="http://schemas.microsoft.com/office/drawing/2014/main" id="{376C1C6D-BF07-4179-85B6-5EE59A4476C2}"/>
               </a:ext>
             </a:extLst>
@@ -5635,7 +6037,7 @@
 </p:sld>
 </file>
 
-<file path=ppt/slides/slide26.xml><?xml version="1.0" encoding="utf-8"?>
+<file path=ppt/slides/slide28.xml><?xml version="1.0" encoding="utf-8"?>
 <p:sld xmlns:a="http://schemas.openxmlformats.org/drawingml/2006/main" xmlns:r="http://schemas.openxmlformats.org/officeDocument/2006/relationships" xmlns:p="http://schemas.openxmlformats.org/presentationml/2006/main">
   <p:cSld>
     <p:spTree>
@@ -6014,7 +6416,7 @@
 </p:sld>
 </file>
 
-<file path=ppt/slides/slide27.xml><?xml version="1.0" encoding="utf-8"?>
+<file path=ppt/slides/slide29.xml><?xml version="1.0" encoding="utf-8"?>
 <p:sld xmlns:a="http://schemas.openxmlformats.org/drawingml/2006/main" xmlns:r="http://schemas.openxmlformats.org/officeDocument/2006/relationships" xmlns:p="http://schemas.openxmlformats.org/presentationml/2006/main">
   <p:cSld>
     <p:spTree>
@@ -6192,7 +6594,111 @@
 </p:sld>
 </file>
 
-<file path=ppt/slides/slide28.xml><?xml version="1.0" encoding="utf-8"?>
+<file path=ppt/slides/slide3.xml><?xml version="1.0" encoding="utf-8"?>
+<p:sld xmlns:a="http://schemas.openxmlformats.org/drawingml/2006/main" xmlns:r="http://schemas.openxmlformats.org/officeDocument/2006/relationships" xmlns:p="http://schemas.openxmlformats.org/presentationml/2006/main">
+  <p:cSld>
+    <p:spTree>
+      <p:nvGrpSpPr>
+        <p:cNvPr id="1" name=""/>
+        <p:cNvGrpSpPr/>
+        <p:nvPr/>
+      </p:nvGrpSpPr>
+      <p:grpSpPr>
+        <a:xfrm>
+          <a:off x="0" y="0"/>
+          <a:ext cx="0" cy="0"/>
+          <a:chOff x="0" y="0"/>
+          <a:chExt cx="0" cy="0"/>
+        </a:xfrm>
+      </p:grpSpPr>
+      <p:sp>
+        <p:nvSpPr>
+          <p:cNvPr id="2" name="Title 1">
+            <a:extLst>
+              <a:ext uri="{FF2B5EF4-FFF2-40B4-BE49-F238E27FC236}">
+                <a16:creationId xmlns:a16="http://schemas.microsoft.com/office/drawing/2014/main" id="{5B300700-0880-4077-B80F-475798E36F00}"/>
+              </a:ext>
+            </a:extLst>
+          </p:cNvPr>
+          <p:cNvSpPr>
+            <a:spLocks noGrp="1"/>
+          </p:cNvSpPr>
+          <p:nvPr>
+            <p:ph type="title"/>
+          </p:nvPr>
+        </p:nvSpPr>
+        <p:spPr/>
+        <p:txBody>
+          <a:bodyPr/>
+          <a:lstStyle/>
+          <a:p>
+            <a:r>
+              <a:rPr lang="en-GB" dirty="0"/>
+              <a:t>Necessary sql functions</a:t>
+            </a:r>
+          </a:p>
+        </p:txBody>
+      </p:sp>
+      <p:sp>
+        <p:nvSpPr>
+          <p:cNvPr id="3" name="Content Placeholder 2">
+            <a:extLst>
+              <a:ext uri="{FF2B5EF4-FFF2-40B4-BE49-F238E27FC236}">
+                <a16:creationId xmlns:a16="http://schemas.microsoft.com/office/drawing/2014/main" id="{5A5C7EDF-33B9-4F78-A9D2-E5948F942BD3}"/>
+              </a:ext>
+            </a:extLst>
+          </p:cNvPr>
+          <p:cNvSpPr>
+            <a:spLocks noGrp="1"/>
+          </p:cNvSpPr>
+          <p:nvPr>
+            <p:ph idx="1"/>
+          </p:nvPr>
+        </p:nvSpPr>
+        <p:spPr/>
+        <p:txBody>
+          <a:bodyPr/>
+          <a:lstStyle/>
+          <a:p>
+            <a:r>
+              <a:rPr lang="en-GB" dirty="0"/>
+              <a:t>Append a new value/record to the database as a tuple to prevent sql injection</a:t>
+            </a:r>
+          </a:p>
+          <a:p>
+            <a:r>
+              <a:rPr lang="en-GB" dirty="0"/>
+              <a:t>Replace/overwrite entries when given the new value and the one to be replaced</a:t>
+            </a:r>
+          </a:p>
+          <a:p>
+            <a:r>
+              <a:rPr lang="en-GB" dirty="0"/>
+              <a:t>Read and return a set of records as a 2d array when given the sql code to be executed</a:t>
+            </a:r>
+          </a:p>
+          <a:p>
+            <a:r>
+              <a:rPr lang="en-GB" dirty="0"/>
+              <a:t>Read and write encrypted entries for password security using asymmetrical encryption where a single server has access to the private key</a:t>
+            </a:r>
+          </a:p>
+        </p:txBody>
+      </p:sp>
+    </p:spTree>
+    <p:extLst>
+      <p:ext uri="{BB962C8B-B14F-4D97-AF65-F5344CB8AC3E}">
+        <p14:creationId xmlns:p14="http://schemas.microsoft.com/office/powerpoint/2010/main" val="515096534"/>
+      </p:ext>
+    </p:extLst>
+  </p:cSld>
+  <p:clrMapOvr>
+    <a:masterClrMapping/>
+  </p:clrMapOvr>
+</p:sld>
+</file>
+
+<file path=ppt/slides/slide30.xml><?xml version="1.0" encoding="utf-8"?>
 <p:sld xmlns:a="http://schemas.openxmlformats.org/drawingml/2006/main" xmlns:r="http://schemas.openxmlformats.org/officeDocument/2006/relationships" xmlns:p="http://schemas.openxmlformats.org/presentationml/2006/main">
   <p:cSld>
     <p:bg>
@@ -6452,7 +6958,7 @@
 </p:sld>
 </file>
 
-<file path=ppt/slides/slide29.xml><?xml version="1.0" encoding="utf-8"?>
+<file path=ppt/slides/slide31.xml><?xml version="1.0" encoding="utf-8"?>
 <p:sld xmlns:a="http://schemas.openxmlformats.org/drawingml/2006/main" xmlns:r="http://schemas.openxmlformats.org/officeDocument/2006/relationships" xmlns:p="http://schemas.openxmlformats.org/presentationml/2006/main">
   <p:cSld>
     <p:spTree>
@@ -6572,111 +7078,7 @@
 </p:sld>
 </file>
 
-<file path=ppt/slides/slide3.xml><?xml version="1.0" encoding="utf-8"?>
-<p:sld xmlns:a="http://schemas.openxmlformats.org/drawingml/2006/main" xmlns:r="http://schemas.openxmlformats.org/officeDocument/2006/relationships" xmlns:p="http://schemas.openxmlformats.org/presentationml/2006/main">
-  <p:cSld>
-    <p:spTree>
-      <p:nvGrpSpPr>
-        <p:cNvPr id="1" name=""/>
-        <p:cNvGrpSpPr/>
-        <p:nvPr/>
-      </p:nvGrpSpPr>
-      <p:grpSpPr>
-        <a:xfrm>
-          <a:off x="0" y="0"/>
-          <a:ext cx="0" cy="0"/>
-          <a:chOff x="0" y="0"/>
-          <a:chExt cx="0" cy="0"/>
-        </a:xfrm>
-      </p:grpSpPr>
-      <p:sp>
-        <p:nvSpPr>
-          <p:cNvPr id="2" name="Title 1">
-            <a:extLst>
-              <a:ext uri="{FF2B5EF4-FFF2-40B4-BE49-F238E27FC236}">
-                <a16:creationId xmlns:a16="http://schemas.microsoft.com/office/drawing/2014/main" id="{5B300700-0880-4077-B80F-475798E36F00}"/>
-              </a:ext>
-            </a:extLst>
-          </p:cNvPr>
-          <p:cNvSpPr>
-            <a:spLocks noGrp="1"/>
-          </p:cNvSpPr>
-          <p:nvPr>
-            <p:ph type="title"/>
-          </p:nvPr>
-        </p:nvSpPr>
-        <p:spPr/>
-        <p:txBody>
-          <a:bodyPr/>
-          <a:lstStyle/>
-          <a:p>
-            <a:r>
-              <a:rPr lang="en-GB" dirty="0"/>
-              <a:t>Necessary sql functions</a:t>
-            </a:r>
-          </a:p>
-        </p:txBody>
-      </p:sp>
-      <p:sp>
-        <p:nvSpPr>
-          <p:cNvPr id="3" name="Content Placeholder 2">
-            <a:extLst>
-              <a:ext uri="{FF2B5EF4-FFF2-40B4-BE49-F238E27FC236}">
-                <a16:creationId xmlns:a16="http://schemas.microsoft.com/office/drawing/2014/main" id="{5A5C7EDF-33B9-4F78-A9D2-E5948F942BD3}"/>
-              </a:ext>
-            </a:extLst>
-          </p:cNvPr>
-          <p:cNvSpPr>
-            <a:spLocks noGrp="1"/>
-          </p:cNvSpPr>
-          <p:nvPr>
-            <p:ph idx="1"/>
-          </p:nvPr>
-        </p:nvSpPr>
-        <p:spPr/>
-        <p:txBody>
-          <a:bodyPr/>
-          <a:lstStyle/>
-          <a:p>
-            <a:r>
-              <a:rPr lang="en-GB" dirty="0"/>
-              <a:t>Append a new value/record to the database as a tuple to prevent sql injection</a:t>
-            </a:r>
-          </a:p>
-          <a:p>
-            <a:r>
-              <a:rPr lang="en-GB" dirty="0"/>
-              <a:t>Replace/overwrite entries when given the new value and the one to be replaced</a:t>
-            </a:r>
-          </a:p>
-          <a:p>
-            <a:r>
-              <a:rPr lang="en-GB" dirty="0"/>
-              <a:t>Read and return a set of records as a 2d array when given the sql code to be executed</a:t>
-            </a:r>
-          </a:p>
-          <a:p>
-            <a:r>
-              <a:rPr lang="en-GB" dirty="0"/>
-              <a:t>Read and write encrypted entries for password security using asymmetrical encryption where a single server has access to the private key</a:t>
-            </a:r>
-          </a:p>
-        </p:txBody>
-      </p:sp>
-    </p:spTree>
-    <p:extLst>
-      <p:ext uri="{BB962C8B-B14F-4D97-AF65-F5344CB8AC3E}">
-        <p14:creationId xmlns:p14="http://schemas.microsoft.com/office/powerpoint/2010/main" val="515096534"/>
-      </p:ext>
-    </p:extLst>
-  </p:cSld>
-  <p:clrMapOvr>
-    <a:masterClrMapping/>
-  </p:clrMapOvr>
-</p:sld>
-</file>
-
-<file path=ppt/slides/slide30.xml><?xml version="1.0" encoding="utf-8"?>
+<file path=ppt/slides/slide32.xml><?xml version="1.0" encoding="utf-8"?>
 <p:sld xmlns:a="http://schemas.openxmlformats.org/drawingml/2006/main" xmlns:r="http://schemas.openxmlformats.org/officeDocument/2006/relationships" xmlns:p="http://schemas.openxmlformats.org/presentationml/2006/main">
   <p:cSld>
     <p:spTree>
@@ -6856,7 +7258,7 @@
 </p:sld>
 </file>
 
-<file path=ppt/slides/slide31.xml><?xml version="1.0" encoding="utf-8"?>
+<file path=ppt/slides/slide33.xml><?xml version="1.0" encoding="utf-8"?>
 <p:sld xmlns:a="http://schemas.openxmlformats.org/drawingml/2006/main" xmlns:r="http://schemas.openxmlformats.org/officeDocument/2006/relationships" xmlns:p="http://schemas.openxmlformats.org/presentationml/2006/main">
   <p:cSld>
     <p:spTree>
@@ -6974,7 +7376,7 @@
 </p:sld>
 </file>
 
-<file path=ppt/slides/slide32.xml><?xml version="1.0" encoding="utf-8"?>
+<file path=ppt/slides/slide34.xml><?xml version="1.0" encoding="utf-8"?>
 <p:sld xmlns:a="http://schemas.openxmlformats.org/drawingml/2006/main" xmlns:r="http://schemas.openxmlformats.org/officeDocument/2006/relationships" xmlns:p="http://schemas.openxmlformats.org/presentationml/2006/main">
   <p:cSld>
     <p:spTree>
@@ -7093,7 +7495,7 @@
 </p:sld>
 </file>
 
-<file path=ppt/slides/slide33.xml><?xml version="1.0" encoding="utf-8"?>
+<file path=ppt/slides/slide35.xml><?xml version="1.0" encoding="utf-8"?>
 <p:sld xmlns:a="http://schemas.openxmlformats.org/drawingml/2006/main" xmlns:r="http://schemas.openxmlformats.org/officeDocument/2006/relationships" xmlns:p="http://schemas.openxmlformats.org/presentationml/2006/main">
   <p:cSld>
     <p:spTree>
@@ -7273,7 +7675,7 @@
 </p:sld>
 </file>
 
-<file path=ppt/slides/slide34.xml><?xml version="1.0" encoding="utf-8"?>
+<file path=ppt/slides/slide36.xml><?xml version="1.0" encoding="utf-8"?>
 <p:sld xmlns:a="http://schemas.openxmlformats.org/drawingml/2006/main" xmlns:r="http://schemas.openxmlformats.org/officeDocument/2006/relationships" xmlns:p="http://schemas.openxmlformats.org/presentationml/2006/main">
   <p:cSld>
     <p:spTree>
@@ -7423,7 +7825,7 @@
 </p:sld>
 </file>
 
-<file path=ppt/slides/slide35.xml><?xml version="1.0" encoding="utf-8"?>
+<file path=ppt/slides/slide37.xml><?xml version="1.0" encoding="utf-8"?>
 <p:sld xmlns:a="http://schemas.openxmlformats.org/drawingml/2006/main" xmlns:r="http://schemas.openxmlformats.org/officeDocument/2006/relationships" xmlns:p="http://schemas.openxmlformats.org/presentationml/2006/main">
   <p:cSld>
     <p:spTree>
@@ -7543,7 +7945,7 @@
 </p:sld>
 </file>
 
-<file path=ppt/slides/slide36.xml><?xml version="1.0" encoding="utf-8"?>
+<file path=ppt/slides/slide38.xml><?xml version="1.0" encoding="utf-8"?>
 <p:sld xmlns:a="http://schemas.openxmlformats.org/drawingml/2006/main" xmlns:r="http://schemas.openxmlformats.org/officeDocument/2006/relationships" xmlns:p="http://schemas.openxmlformats.org/presentationml/2006/main">
   <p:cSld>
     <p:spTree>
@@ -7693,7 +8095,7 @@
 </p:sld>
 </file>
 
-<file path=ppt/slides/slide37.xml><?xml version="1.0" encoding="utf-8"?>
+<file path=ppt/slides/slide39.xml><?xml version="1.0" encoding="utf-8"?>
 <p:sld xmlns:a="http://schemas.openxmlformats.org/drawingml/2006/main" xmlns:r="http://schemas.openxmlformats.org/officeDocument/2006/relationships" xmlns:p="http://schemas.openxmlformats.org/presentationml/2006/main">
   <p:cSld>
     <p:spTree>
@@ -7834,7 +8236,135 @@
 </p:sld>
 </file>
 
-<file path=ppt/slides/slide38.xml><?xml version="1.0" encoding="utf-8"?>
+<file path=ppt/slides/slide4.xml><?xml version="1.0" encoding="utf-8"?>
+<p:sld xmlns:a="http://schemas.openxmlformats.org/drawingml/2006/main" xmlns:r="http://schemas.openxmlformats.org/officeDocument/2006/relationships" xmlns:p="http://schemas.openxmlformats.org/presentationml/2006/main">
+  <p:cSld>
+    <p:spTree>
+      <p:nvGrpSpPr>
+        <p:cNvPr id="1" name=""/>
+        <p:cNvGrpSpPr/>
+        <p:nvPr/>
+      </p:nvGrpSpPr>
+      <p:grpSpPr>
+        <a:xfrm>
+          <a:off x="0" y="0"/>
+          <a:ext cx="0" cy="0"/>
+          <a:chOff x="0" y="0"/>
+          <a:chExt cx="0" cy="0"/>
+        </a:xfrm>
+      </p:grpSpPr>
+      <p:sp>
+        <p:nvSpPr>
+          <p:cNvPr id="2" name="Title 1">
+            <a:extLst>
+              <a:ext uri="{FF2B5EF4-FFF2-40B4-BE49-F238E27FC236}">
+                <a16:creationId xmlns:a16="http://schemas.microsoft.com/office/drawing/2014/main" id="{F65347C2-9724-4848-A002-BED96524157E}"/>
+              </a:ext>
+            </a:extLst>
+          </p:cNvPr>
+          <p:cNvSpPr>
+            <a:spLocks noGrp="1"/>
+          </p:cNvSpPr>
+          <p:nvPr>
+            <p:ph type="title"/>
+          </p:nvPr>
+        </p:nvSpPr>
+        <p:spPr/>
+        <p:txBody>
+          <a:bodyPr/>
+          <a:lstStyle/>
+          <a:p>
+            <a:r>
+              <a:rPr lang="en-GB" dirty="0"/>
+              <a:t>Sequence of events in logins</a:t>
+            </a:r>
+          </a:p>
+        </p:txBody>
+      </p:sp>
+      <p:sp>
+        <p:nvSpPr>
+          <p:cNvPr id="3" name="Content Placeholder 2">
+            <a:extLst>
+              <a:ext uri="{FF2B5EF4-FFF2-40B4-BE49-F238E27FC236}">
+                <a16:creationId xmlns:a16="http://schemas.microsoft.com/office/drawing/2014/main" id="{D0016B4E-90BD-4C07-AD8B-FF6583DEB000}"/>
+              </a:ext>
+            </a:extLst>
+          </p:cNvPr>
+          <p:cNvSpPr>
+            <a:spLocks noGrp="1"/>
+          </p:cNvSpPr>
+          <p:nvPr>
+            <p:ph idx="1"/>
+          </p:nvPr>
+        </p:nvSpPr>
+        <p:spPr/>
+        <p:txBody>
+          <a:bodyPr/>
+          <a:lstStyle/>
+          <a:p>
+            <a:r>
+              <a:rPr lang="en-GB" dirty="0"/>
+              <a:t>User enters username + password in plain text</a:t>
+            </a:r>
+          </a:p>
+          <a:p>
+            <a:r>
+              <a:rPr lang="en-GB" dirty="0"/>
+              <a:t>Both are encrypted using the public key</a:t>
+            </a:r>
+          </a:p>
+          <a:p>
+            <a:r>
+              <a:rPr lang="en-GB" dirty="0"/>
+              <a:t>Sent to server</a:t>
+            </a:r>
+          </a:p>
+          <a:p>
+            <a:r>
+              <a:rPr lang="en-GB" dirty="0"/>
+              <a:t>Received by server</a:t>
+            </a:r>
+          </a:p>
+          <a:p>
+            <a:r>
+              <a:rPr lang="en-GB" dirty="0"/>
+              <a:t>Hashed to receiver unique id</a:t>
+            </a:r>
+          </a:p>
+          <a:p>
+            <a:r>
+              <a:rPr lang="en-GB" dirty="0"/>
+              <a:t>details authenticated in server database</a:t>
+            </a:r>
+          </a:p>
+          <a:p>
+            <a:r>
+              <a:rPr lang="en-GB" dirty="0"/>
+              <a:t>Ip is associated to username for 24 hours or until logged out</a:t>
+            </a:r>
+          </a:p>
+          <a:p>
+            <a:r>
+              <a:rPr lang="en-GB" dirty="0"/>
+              <a:t>User is “logged in”</a:t>
+            </a:r>
+          </a:p>
+        </p:txBody>
+      </p:sp>
+    </p:spTree>
+    <p:extLst>
+      <p:ext uri="{BB962C8B-B14F-4D97-AF65-F5344CB8AC3E}">
+        <p14:creationId xmlns:p14="http://schemas.microsoft.com/office/powerpoint/2010/main" val="1878751788"/>
+      </p:ext>
+    </p:extLst>
+  </p:cSld>
+  <p:clrMapOvr>
+    <a:masterClrMapping/>
+  </p:clrMapOvr>
+</p:sld>
+</file>
+
+<file path=ppt/slides/slide40.xml><?xml version="1.0" encoding="utf-8"?>
 <p:sld xmlns:a="http://schemas.openxmlformats.org/drawingml/2006/main" xmlns:r="http://schemas.openxmlformats.org/officeDocument/2006/relationships" xmlns:p="http://schemas.openxmlformats.org/presentationml/2006/main">
   <p:cSld>
     <p:spTree>
@@ -8073,7 +8603,7 @@
 </p:sld>
 </file>
 
-<file path=ppt/slides/slide39.xml><?xml version="1.0" encoding="utf-8"?>
+<file path=ppt/slides/slide41.xml><?xml version="1.0" encoding="utf-8"?>
 <p:sld xmlns:a="http://schemas.openxmlformats.org/drawingml/2006/main" xmlns:r="http://schemas.openxmlformats.org/officeDocument/2006/relationships" xmlns:p="http://schemas.openxmlformats.org/presentationml/2006/main">
   <p:cSld>
     <p:spTree>
@@ -8296,135 +8826,7 @@
 </p:sld>
 </file>
 
-<file path=ppt/slides/slide4.xml><?xml version="1.0" encoding="utf-8"?>
-<p:sld xmlns:a="http://schemas.openxmlformats.org/drawingml/2006/main" xmlns:r="http://schemas.openxmlformats.org/officeDocument/2006/relationships" xmlns:p="http://schemas.openxmlformats.org/presentationml/2006/main">
-  <p:cSld>
-    <p:spTree>
-      <p:nvGrpSpPr>
-        <p:cNvPr id="1" name=""/>
-        <p:cNvGrpSpPr/>
-        <p:nvPr/>
-      </p:nvGrpSpPr>
-      <p:grpSpPr>
-        <a:xfrm>
-          <a:off x="0" y="0"/>
-          <a:ext cx="0" cy="0"/>
-          <a:chOff x="0" y="0"/>
-          <a:chExt cx="0" cy="0"/>
-        </a:xfrm>
-      </p:grpSpPr>
-      <p:sp>
-        <p:nvSpPr>
-          <p:cNvPr id="2" name="Title 1">
-            <a:extLst>
-              <a:ext uri="{FF2B5EF4-FFF2-40B4-BE49-F238E27FC236}">
-                <a16:creationId xmlns:a16="http://schemas.microsoft.com/office/drawing/2014/main" id="{F65347C2-9724-4848-A002-BED96524157E}"/>
-              </a:ext>
-            </a:extLst>
-          </p:cNvPr>
-          <p:cNvSpPr>
-            <a:spLocks noGrp="1"/>
-          </p:cNvSpPr>
-          <p:nvPr>
-            <p:ph type="title"/>
-          </p:nvPr>
-        </p:nvSpPr>
-        <p:spPr/>
-        <p:txBody>
-          <a:bodyPr/>
-          <a:lstStyle/>
-          <a:p>
-            <a:r>
-              <a:rPr lang="en-GB" dirty="0"/>
-              <a:t>Sequence of events in logins</a:t>
-            </a:r>
-          </a:p>
-        </p:txBody>
-      </p:sp>
-      <p:sp>
-        <p:nvSpPr>
-          <p:cNvPr id="3" name="Content Placeholder 2">
-            <a:extLst>
-              <a:ext uri="{FF2B5EF4-FFF2-40B4-BE49-F238E27FC236}">
-                <a16:creationId xmlns:a16="http://schemas.microsoft.com/office/drawing/2014/main" id="{D0016B4E-90BD-4C07-AD8B-FF6583DEB000}"/>
-              </a:ext>
-            </a:extLst>
-          </p:cNvPr>
-          <p:cNvSpPr>
-            <a:spLocks noGrp="1"/>
-          </p:cNvSpPr>
-          <p:nvPr>
-            <p:ph idx="1"/>
-          </p:nvPr>
-        </p:nvSpPr>
-        <p:spPr/>
-        <p:txBody>
-          <a:bodyPr/>
-          <a:lstStyle/>
-          <a:p>
-            <a:r>
-              <a:rPr lang="en-GB" dirty="0"/>
-              <a:t>User enters username + password in plain text</a:t>
-            </a:r>
-          </a:p>
-          <a:p>
-            <a:r>
-              <a:rPr lang="en-GB" dirty="0"/>
-              <a:t>Both are encrypted using the public key</a:t>
-            </a:r>
-          </a:p>
-          <a:p>
-            <a:r>
-              <a:rPr lang="en-GB" dirty="0"/>
-              <a:t>Sent to server</a:t>
-            </a:r>
-          </a:p>
-          <a:p>
-            <a:r>
-              <a:rPr lang="en-GB" dirty="0"/>
-              <a:t>Received by server</a:t>
-            </a:r>
-          </a:p>
-          <a:p>
-            <a:r>
-              <a:rPr lang="en-GB" dirty="0"/>
-              <a:t>Hashed to receiver unique id</a:t>
-            </a:r>
-          </a:p>
-          <a:p>
-            <a:r>
-              <a:rPr lang="en-GB" dirty="0"/>
-              <a:t>details authenticated in server database</a:t>
-            </a:r>
-          </a:p>
-          <a:p>
-            <a:r>
-              <a:rPr lang="en-GB" dirty="0"/>
-              <a:t>Ip is associated to username for 24 hours or until logged out</a:t>
-            </a:r>
-          </a:p>
-          <a:p>
-            <a:r>
-              <a:rPr lang="en-GB" dirty="0"/>
-              <a:t>User is “logged in”</a:t>
-            </a:r>
-          </a:p>
-        </p:txBody>
-      </p:sp>
-    </p:spTree>
-    <p:extLst>
-      <p:ext uri="{BB962C8B-B14F-4D97-AF65-F5344CB8AC3E}">
-        <p14:creationId xmlns:p14="http://schemas.microsoft.com/office/powerpoint/2010/main" val="1878751788"/>
-      </p:ext>
-    </p:extLst>
-  </p:cSld>
-  <p:clrMapOvr>
-    <a:masterClrMapping/>
-  </p:clrMapOvr>
-</p:sld>
-</file>
-
-<file path=ppt/slides/slide40.xml><?xml version="1.0" encoding="utf-8"?>
+<file path=ppt/slides/slide42.xml><?xml version="1.0" encoding="utf-8"?>
 <p:sld xmlns:a="http://schemas.openxmlformats.org/drawingml/2006/main" xmlns:r="http://schemas.openxmlformats.org/officeDocument/2006/relationships" xmlns:p="http://schemas.openxmlformats.org/presentationml/2006/main">
   <p:cSld>
     <p:spTree>

</xml_diff>

<commit_message>
updated dev log w/ network plans
</commit_message>
<xml_diff>
--- a/dev log.pptx
+++ b/dev log.pptx
@@ -23,30 +23,31 @@
     <p:sldId id="296" r:id="rId17"/>
     <p:sldId id="297" r:id="rId18"/>
     <p:sldId id="298" r:id="rId19"/>
-    <p:sldId id="261" r:id="rId20"/>
-    <p:sldId id="262" r:id="rId21"/>
-    <p:sldId id="272" r:id="rId22"/>
-    <p:sldId id="284" r:id="rId23"/>
-    <p:sldId id="285" r:id="rId24"/>
-    <p:sldId id="266" r:id="rId25"/>
-    <p:sldId id="268" r:id="rId26"/>
-    <p:sldId id="269" r:id="rId27"/>
-    <p:sldId id="270" r:id="rId28"/>
-    <p:sldId id="271" r:id="rId29"/>
-    <p:sldId id="273" r:id="rId30"/>
-    <p:sldId id="274" r:id="rId31"/>
-    <p:sldId id="275" r:id="rId32"/>
-    <p:sldId id="276" r:id="rId33"/>
-    <p:sldId id="277" r:id="rId34"/>
-    <p:sldId id="278" r:id="rId35"/>
-    <p:sldId id="279" r:id="rId36"/>
-    <p:sldId id="280" r:id="rId37"/>
-    <p:sldId id="281" r:id="rId38"/>
-    <p:sldId id="282" r:id="rId39"/>
-    <p:sldId id="283" r:id="rId40"/>
-    <p:sldId id="287" r:id="rId41"/>
-    <p:sldId id="290" r:id="rId42"/>
-    <p:sldId id="289" r:id="rId43"/>
+    <p:sldId id="299" r:id="rId20"/>
+    <p:sldId id="261" r:id="rId21"/>
+    <p:sldId id="262" r:id="rId22"/>
+    <p:sldId id="272" r:id="rId23"/>
+    <p:sldId id="284" r:id="rId24"/>
+    <p:sldId id="285" r:id="rId25"/>
+    <p:sldId id="266" r:id="rId26"/>
+    <p:sldId id="268" r:id="rId27"/>
+    <p:sldId id="269" r:id="rId28"/>
+    <p:sldId id="270" r:id="rId29"/>
+    <p:sldId id="271" r:id="rId30"/>
+    <p:sldId id="273" r:id="rId31"/>
+    <p:sldId id="274" r:id="rId32"/>
+    <p:sldId id="275" r:id="rId33"/>
+    <p:sldId id="276" r:id="rId34"/>
+    <p:sldId id="277" r:id="rId35"/>
+    <p:sldId id="278" r:id="rId36"/>
+    <p:sldId id="279" r:id="rId37"/>
+    <p:sldId id="280" r:id="rId38"/>
+    <p:sldId id="281" r:id="rId39"/>
+    <p:sldId id="282" r:id="rId40"/>
+    <p:sldId id="283" r:id="rId41"/>
+    <p:sldId id="287" r:id="rId42"/>
+    <p:sldId id="290" r:id="rId43"/>
+    <p:sldId id="289" r:id="rId44"/>
   </p:sldIdLst>
   <p:sldSz cx="12192000" cy="6858000"/>
   <p:notesSz cx="6858000" cy="9144000"/>
@@ -176,6 +177,7 @@
             <p14:sldId id="296"/>
             <p14:sldId id="297"/>
             <p14:sldId id="298"/>
+            <p14:sldId id="299"/>
           </p14:sldIdLst>
         </p14:section>
         <p14:section name="User backend" id="{4917E628-EF76-4611-BE58-D69F773E488C}">
@@ -372,7 +374,7 @@
           <a:p>
             <a:fld id="{95BB3272-C847-43E3-AE34-83B2109F1449}" type="datetimeFigureOut">
               <a:rPr lang="en-GB" smtClean="0"/>
-              <a:t>13/05/2020</a:t>
+              <a:t>19/05/2020</a:t>
             </a:fld>
             <a:endParaRPr lang="en-GB"/>
           </a:p>
@@ -572,7 +574,7 @@
           <a:p>
             <a:fld id="{95BB3272-C847-43E3-AE34-83B2109F1449}" type="datetimeFigureOut">
               <a:rPr lang="en-GB" smtClean="0"/>
-              <a:t>13/05/2020</a:t>
+              <a:t>19/05/2020</a:t>
             </a:fld>
             <a:endParaRPr lang="en-GB"/>
           </a:p>
@@ -782,7 +784,7 @@
           <a:p>
             <a:fld id="{95BB3272-C847-43E3-AE34-83B2109F1449}" type="datetimeFigureOut">
               <a:rPr lang="en-GB" smtClean="0"/>
-              <a:t>13/05/2020</a:t>
+              <a:t>19/05/2020</a:t>
             </a:fld>
             <a:endParaRPr lang="en-GB"/>
           </a:p>
@@ -982,7 +984,7 @@
           <a:p>
             <a:fld id="{95BB3272-C847-43E3-AE34-83B2109F1449}" type="datetimeFigureOut">
               <a:rPr lang="en-GB" smtClean="0"/>
-              <a:t>13/05/2020</a:t>
+              <a:t>19/05/2020</a:t>
             </a:fld>
             <a:endParaRPr lang="en-GB"/>
           </a:p>
@@ -1258,7 +1260,7 @@
           <a:p>
             <a:fld id="{95BB3272-C847-43E3-AE34-83B2109F1449}" type="datetimeFigureOut">
               <a:rPr lang="en-GB" smtClean="0"/>
-              <a:t>13/05/2020</a:t>
+              <a:t>19/05/2020</a:t>
             </a:fld>
             <a:endParaRPr lang="en-GB"/>
           </a:p>
@@ -1526,7 +1528,7 @@
           <a:p>
             <a:fld id="{95BB3272-C847-43E3-AE34-83B2109F1449}" type="datetimeFigureOut">
               <a:rPr lang="en-GB" smtClean="0"/>
-              <a:t>13/05/2020</a:t>
+              <a:t>19/05/2020</a:t>
             </a:fld>
             <a:endParaRPr lang="en-GB"/>
           </a:p>
@@ -1941,7 +1943,7 @@
           <a:p>
             <a:fld id="{95BB3272-C847-43E3-AE34-83B2109F1449}" type="datetimeFigureOut">
               <a:rPr lang="en-GB" smtClean="0"/>
-              <a:t>13/05/2020</a:t>
+              <a:t>19/05/2020</a:t>
             </a:fld>
             <a:endParaRPr lang="en-GB"/>
           </a:p>
@@ -2083,7 +2085,7 @@
           <a:p>
             <a:fld id="{95BB3272-C847-43E3-AE34-83B2109F1449}" type="datetimeFigureOut">
               <a:rPr lang="en-GB" smtClean="0"/>
-              <a:t>13/05/2020</a:t>
+              <a:t>19/05/2020</a:t>
             </a:fld>
             <a:endParaRPr lang="en-GB"/>
           </a:p>
@@ -2196,7 +2198,7 @@
           <a:p>
             <a:fld id="{95BB3272-C847-43E3-AE34-83B2109F1449}" type="datetimeFigureOut">
               <a:rPr lang="en-GB" smtClean="0"/>
-              <a:t>13/05/2020</a:t>
+              <a:t>19/05/2020</a:t>
             </a:fld>
             <a:endParaRPr lang="en-GB"/>
           </a:p>
@@ -2509,7 +2511,7 @@
           <a:p>
             <a:fld id="{95BB3272-C847-43E3-AE34-83B2109F1449}" type="datetimeFigureOut">
               <a:rPr lang="en-GB" smtClean="0"/>
-              <a:t>13/05/2020</a:t>
+              <a:t>19/05/2020</a:t>
             </a:fld>
             <a:endParaRPr lang="en-GB"/>
           </a:p>
@@ -2798,7 +2800,7 @@
           <a:p>
             <a:fld id="{95BB3272-C847-43E3-AE34-83B2109F1449}" type="datetimeFigureOut">
               <a:rPr lang="en-GB" smtClean="0"/>
-              <a:t>13/05/2020</a:t>
+              <a:t>19/05/2020</a:t>
             </a:fld>
             <a:endParaRPr lang="en-GB"/>
           </a:p>
@@ -3041,7 +3043,7 @@
           <a:p>
             <a:fld id="{95BB3272-C847-43E3-AE34-83B2109F1449}" type="datetimeFigureOut">
               <a:rPr lang="en-GB" smtClean="0"/>
-              <a:t>13/05/2020</a:t>
+              <a:t>19/05/2020</a:t>
             </a:fld>
             <a:endParaRPr lang="en-GB"/>
           </a:p>
@@ -4836,7 +4838,7 @@
           <p:cNvPr id="2" name="Title 1">
             <a:extLst>
               <a:ext uri="{FF2B5EF4-FFF2-40B4-BE49-F238E27FC236}">
-                <a16:creationId xmlns:a16="http://schemas.microsoft.com/office/drawing/2014/main" id="{7B5EE842-2FDD-4DEC-8C72-6456BF9C5133}"/>
+                <a16:creationId xmlns:a16="http://schemas.microsoft.com/office/drawing/2014/main" id="{C0A46C02-62CE-4828-8332-3E505E363FAF}"/>
               </a:ext>
             </a:extLst>
           </p:cNvPr>
@@ -4849,30 +4851,32 @@
         </p:nvSpPr>
         <p:spPr/>
         <p:txBody>
-          <a:bodyPr/>
-          <a:lstStyle/>
-          <a:p>
-            <a:r>
-              <a:rPr lang="en-GB" dirty="0"/>
-              <a:t>User backend</a:t>
-            </a:r>
-          </a:p>
-        </p:txBody>
-      </p:sp>
-      <p:sp>
-        <p:nvSpPr>
-          <p:cNvPr id="3" name="Text Placeholder 2">
-            <a:extLst>
-              <a:ext uri="{FF2B5EF4-FFF2-40B4-BE49-F238E27FC236}">
-                <a16:creationId xmlns:a16="http://schemas.microsoft.com/office/drawing/2014/main" id="{DE37422E-DFC5-43D8-B903-2CB431F068FC}"/>
-              </a:ext>
-            </a:extLst>
-          </p:cNvPr>
-          <p:cNvSpPr>
-            <a:spLocks noGrp="1"/>
-          </p:cNvSpPr>
-          <p:nvPr>
-            <p:ph type="body" idx="1"/>
+          <a:bodyPr>
+            <a:normAutofit/>
+          </a:bodyPr>
+          <a:lstStyle/>
+          <a:p>
+            <a:r>
+              <a:rPr lang="en-GB" dirty="0"/>
+              <a:t>I now need to either find a way of maintaining and managing multiple connections</a:t>
+            </a:r>
+          </a:p>
+        </p:txBody>
+      </p:sp>
+      <p:sp>
+        <p:nvSpPr>
+          <p:cNvPr id="3" name="Content Placeholder 2">
+            <a:extLst>
+              <a:ext uri="{FF2B5EF4-FFF2-40B4-BE49-F238E27FC236}">
+                <a16:creationId xmlns:a16="http://schemas.microsoft.com/office/drawing/2014/main" id="{224DA7B2-83DB-4D3D-A053-FB881B7ACC4C}"/>
+              </a:ext>
+            </a:extLst>
+          </p:cNvPr>
+          <p:cNvSpPr>
+            <a:spLocks noGrp="1"/>
+          </p:cNvSpPr>
+          <p:nvPr>
+            <p:ph idx="1"/>
           </p:nvPr>
         </p:nvSpPr>
         <p:spPr/>
@@ -4882,15 +4886,38 @@
           <a:p>
             <a:r>
               <a:rPr lang="en-GB" dirty="0"/>
-              <a:t>A library that includes all the backend functions accessible when logged in with an account</a:t>
-            </a:r>
+              <a:t>If I can manage multiple socket connections as the “</a:t>
+            </a:r>
+            <a:r>
+              <a:rPr lang="en-GB" dirty="0" err="1"/>
+              <a:t>gamehost</a:t>
+            </a:r>
+            <a:r>
+              <a:rPr lang="en-GB" dirty="0"/>
+              <a:t>” then each transmission will end up going through my server anyway making it less efficient then just using the passthrough method where you have the server contently listening for the </a:t>
+            </a:r>
+            <a:r>
+              <a:rPr lang="en-GB" dirty="0" err="1"/>
+              <a:t>ckient</a:t>
+            </a:r>
+            <a:r>
+              <a:rPr lang="en-GB" dirty="0"/>
+              <a:t> and allowing for easy passthrough.</a:t>
+            </a:r>
+          </a:p>
+          <a:p>
+            <a:r>
+              <a:rPr lang="en-GB"/>
+              <a:t> </a:t>
+            </a:r>
+            <a:endParaRPr lang="en-GB" dirty="0"/>
           </a:p>
         </p:txBody>
       </p:sp>
     </p:spTree>
     <p:extLst>
       <p:ext uri="{BB962C8B-B14F-4D97-AF65-F5344CB8AC3E}">
-        <p14:creationId xmlns:p14="http://schemas.microsoft.com/office/powerpoint/2010/main" val="2287663386"/>
+        <p14:creationId xmlns:p14="http://schemas.microsoft.com/office/powerpoint/2010/main" val="2680335753"/>
       </p:ext>
     </p:extLst>
   </p:cSld>
@@ -5008,7 +5035,7 @@
           <p:cNvPr id="2" name="Title 1">
             <a:extLst>
               <a:ext uri="{FF2B5EF4-FFF2-40B4-BE49-F238E27FC236}">
-                <a16:creationId xmlns:a16="http://schemas.microsoft.com/office/drawing/2014/main" id="{EF8AA7A4-9FDA-42EC-960A-661F68D6C0CC}"/>
+                <a16:creationId xmlns:a16="http://schemas.microsoft.com/office/drawing/2014/main" id="{7B5EE842-2FDD-4DEC-8C72-6456BF9C5133}"/>
               </a:ext>
             </a:extLst>
           </p:cNvPr>
@@ -5026,25 +5053,25 @@
           <a:p>
             <a:r>
               <a:rPr lang="en-GB" dirty="0"/>
-              <a:t>Necessary user functions</a:t>
-            </a:r>
-          </a:p>
-        </p:txBody>
-      </p:sp>
-      <p:sp>
-        <p:nvSpPr>
-          <p:cNvPr id="3" name="Content Placeholder 2">
-            <a:extLst>
-              <a:ext uri="{FF2B5EF4-FFF2-40B4-BE49-F238E27FC236}">
-                <a16:creationId xmlns:a16="http://schemas.microsoft.com/office/drawing/2014/main" id="{F6BB918B-6819-4478-B0CD-ED27E47326ED}"/>
-              </a:ext>
-            </a:extLst>
-          </p:cNvPr>
-          <p:cNvSpPr>
-            <a:spLocks noGrp="1"/>
-          </p:cNvSpPr>
-          <p:nvPr>
-            <p:ph idx="1"/>
+              <a:t>User backend</a:t>
+            </a:r>
+          </a:p>
+        </p:txBody>
+      </p:sp>
+      <p:sp>
+        <p:nvSpPr>
+          <p:cNvPr id="3" name="Text Placeholder 2">
+            <a:extLst>
+              <a:ext uri="{FF2B5EF4-FFF2-40B4-BE49-F238E27FC236}">
+                <a16:creationId xmlns:a16="http://schemas.microsoft.com/office/drawing/2014/main" id="{DE37422E-DFC5-43D8-B903-2CB431F068FC}"/>
+              </a:ext>
+            </a:extLst>
+          </p:cNvPr>
+          <p:cNvSpPr>
+            <a:spLocks noGrp="1"/>
+          </p:cNvSpPr>
+          <p:nvPr>
+            <p:ph type="body" idx="1"/>
           </p:nvPr>
         </p:nvSpPr>
         <p:spPr/>
@@ -5054,37 +5081,7 @@
           <a:p>
             <a:r>
               <a:rPr lang="en-GB" dirty="0"/>
-              <a:t>View past games(maybe replay functionality)</a:t>
-            </a:r>
-          </a:p>
-          <a:p>
-            <a:r>
-              <a:rPr lang="en-GB" dirty="0"/>
-              <a:t>View their lifetime &amp; recent statistics with graphs+ extrapolation</a:t>
-            </a:r>
-          </a:p>
-          <a:p>
-            <a:r>
-              <a:rPr lang="en-GB" dirty="0"/>
-              <a:t>Update payroll</a:t>
-            </a:r>
-          </a:p>
-          <a:p>
-            <a:r>
-              <a:rPr lang="en-GB" dirty="0"/>
-              <a:t>A preliminary test before booking an appointment to get an early diagnosis</a:t>
-            </a:r>
-          </a:p>
-          <a:p>
-            <a:r>
-              <a:rPr lang="en-GB" dirty="0"/>
-              <a:t>Host/join a game</a:t>
-            </a:r>
-          </a:p>
-          <a:p>
-            <a:r>
-              <a:rPr lang="en-GB" dirty="0"/>
-              <a:t>Add friends for easier game access</a:t>
+              <a:t>A library that includes all the backend functions accessible when logged in with an account</a:t>
             </a:r>
           </a:p>
         </p:txBody>
@@ -5092,7 +5089,7 @@
     </p:spTree>
     <p:extLst>
       <p:ext uri="{BB962C8B-B14F-4D97-AF65-F5344CB8AC3E}">
-        <p14:creationId xmlns:p14="http://schemas.microsoft.com/office/powerpoint/2010/main" val="3128323718"/>
+        <p14:creationId xmlns:p14="http://schemas.microsoft.com/office/powerpoint/2010/main" val="2287663386"/>
       </p:ext>
     </p:extLst>
   </p:cSld>
@@ -5124,7 +5121,7 @@
           <p:cNvPr id="2" name="Title 1">
             <a:extLst>
               <a:ext uri="{FF2B5EF4-FFF2-40B4-BE49-F238E27FC236}">
-                <a16:creationId xmlns:a16="http://schemas.microsoft.com/office/drawing/2014/main" id="{790527AB-E460-46A4-B7B4-3C1BFC1DD286}"/>
+                <a16:creationId xmlns:a16="http://schemas.microsoft.com/office/drawing/2014/main" id="{EF8AA7A4-9FDA-42EC-960A-661F68D6C0CC}"/>
               </a:ext>
             </a:extLst>
           </p:cNvPr>
@@ -5142,7 +5139,7 @@
           <a:p>
             <a:r>
               <a:rPr lang="en-GB" dirty="0"/>
-              <a:t>Split pot calculations</a:t>
+              <a:t>Necessary user functions</a:t>
             </a:r>
           </a:p>
         </p:txBody>
@@ -5152,7 +5149,7 @@
           <p:cNvPr id="3" name="Content Placeholder 2">
             <a:extLst>
               <a:ext uri="{FF2B5EF4-FFF2-40B4-BE49-F238E27FC236}">
-                <a16:creationId xmlns:a16="http://schemas.microsoft.com/office/drawing/2014/main" id="{FA08A01C-A3F7-4D41-8FAD-98DF9EA7B96D}"/>
+                <a16:creationId xmlns:a16="http://schemas.microsoft.com/office/drawing/2014/main" id="{F6BB918B-6819-4478-B0CD-ED27E47326ED}"/>
               </a:ext>
             </a:extLst>
           </p:cNvPr>
@@ -5170,19 +5167,45 @@
           <a:p>
             <a:r>
               <a:rPr lang="en-GB" dirty="0"/>
-              <a:t>One challenging part of the game logic will be calculating split pots</a:t>
-            </a:r>
-          </a:p>
-          <a:p>
-            <a:pPr lvl="1"/>
-            <a:endParaRPr lang="en-GB" dirty="0"/>
+              <a:t>View past games(maybe replay functionality)</a:t>
+            </a:r>
+          </a:p>
+          <a:p>
+            <a:r>
+              <a:rPr lang="en-GB" dirty="0"/>
+              <a:t>View their lifetime &amp; recent statistics with graphs+ extrapolation</a:t>
+            </a:r>
+          </a:p>
+          <a:p>
+            <a:r>
+              <a:rPr lang="en-GB" dirty="0"/>
+              <a:t>Update payroll</a:t>
+            </a:r>
+          </a:p>
+          <a:p>
+            <a:r>
+              <a:rPr lang="en-GB" dirty="0"/>
+              <a:t>A preliminary test before booking an appointment to get an early diagnosis</a:t>
+            </a:r>
+          </a:p>
+          <a:p>
+            <a:r>
+              <a:rPr lang="en-GB" dirty="0"/>
+              <a:t>Host/join a game</a:t>
+            </a:r>
+          </a:p>
+          <a:p>
+            <a:r>
+              <a:rPr lang="en-GB" dirty="0"/>
+              <a:t>Add friends for easier game access</a:t>
+            </a:r>
           </a:p>
         </p:txBody>
       </p:sp>
     </p:spTree>
     <p:extLst>
       <p:ext uri="{BB962C8B-B14F-4D97-AF65-F5344CB8AC3E}">
-        <p14:creationId xmlns:p14="http://schemas.microsoft.com/office/powerpoint/2010/main" val="1191071722"/>
+        <p14:creationId xmlns:p14="http://schemas.microsoft.com/office/powerpoint/2010/main" val="3128323718"/>
       </p:ext>
     </p:extLst>
   </p:cSld>
@@ -5214,7 +5237,7 @@
           <p:cNvPr id="2" name="Title 1">
             <a:extLst>
               <a:ext uri="{FF2B5EF4-FFF2-40B4-BE49-F238E27FC236}">
-                <a16:creationId xmlns:a16="http://schemas.microsoft.com/office/drawing/2014/main" id="{76D7B618-33EA-4285-BC95-74EBA3A9CE4B}"/>
+                <a16:creationId xmlns:a16="http://schemas.microsoft.com/office/drawing/2014/main" id="{790527AB-E460-46A4-B7B4-3C1BFC1DD286}"/>
               </a:ext>
             </a:extLst>
           </p:cNvPr>
@@ -5232,82 +5255,47 @@
           <a:p>
             <a:r>
               <a:rPr lang="en-GB" dirty="0"/>
-              <a:t>Serialising arrays for data transfer</a:t>
-            </a:r>
-          </a:p>
-        </p:txBody>
-      </p:sp>
-      <p:pic>
-        <p:nvPicPr>
-          <p:cNvPr id="4" name="Content Placeholder 3">
-            <a:extLst>
-              <a:ext uri="{FF2B5EF4-FFF2-40B4-BE49-F238E27FC236}">
-                <a16:creationId xmlns:a16="http://schemas.microsoft.com/office/drawing/2014/main" id="{1A3286E0-E11A-4FE9-B2E3-7E8C1F2A6689}"/>
-              </a:ext>
-            </a:extLst>
-          </p:cNvPr>
-          <p:cNvPicPr>
-            <a:picLocks noGrp="1" noChangeAspect="1"/>
-          </p:cNvPicPr>
+              <a:t>Split pot calculations</a:t>
+            </a:r>
+          </a:p>
+        </p:txBody>
+      </p:sp>
+      <p:sp>
+        <p:nvSpPr>
+          <p:cNvPr id="3" name="Content Placeholder 2">
+            <a:extLst>
+              <a:ext uri="{FF2B5EF4-FFF2-40B4-BE49-F238E27FC236}">
+                <a16:creationId xmlns:a16="http://schemas.microsoft.com/office/drawing/2014/main" id="{FA08A01C-A3F7-4D41-8FAD-98DF9EA7B96D}"/>
+              </a:ext>
+            </a:extLst>
+          </p:cNvPr>
+          <p:cNvSpPr>
+            <a:spLocks noGrp="1"/>
+          </p:cNvSpPr>
           <p:nvPr>
             <p:ph idx="1"/>
           </p:nvPr>
-        </p:nvPicPr>
-        <p:blipFill>
-          <a:blip r:embed="rId2"/>
-          <a:stretch>
-            <a:fillRect/>
-          </a:stretch>
-        </p:blipFill>
-        <p:spPr>
-          <a:xfrm>
-            <a:off x="718706" y="1690688"/>
-            <a:ext cx="6182588" cy="1914792"/>
-          </a:xfrm>
-          <a:prstGeom prst="rect">
-            <a:avLst/>
-          </a:prstGeom>
-        </p:spPr>
-      </p:pic>
-      <p:sp>
-        <p:nvSpPr>
-          <p:cNvPr id="5" name="TextBox 4">
-            <a:extLst>
-              <a:ext uri="{FF2B5EF4-FFF2-40B4-BE49-F238E27FC236}">
-                <a16:creationId xmlns:a16="http://schemas.microsoft.com/office/drawing/2014/main" id="{BC3B7363-8C1F-46B9-814C-93393E0B8081}"/>
-              </a:ext>
-            </a:extLst>
-          </p:cNvPr>
-          <p:cNvSpPr txBox="1"/>
-          <p:nvPr/>
-        </p:nvSpPr>
-        <p:spPr>
-          <a:xfrm>
-            <a:off x="7458075" y="1690688"/>
-            <a:ext cx="4371975" cy="1754326"/>
-          </a:xfrm>
-          <a:prstGeom prst="rect">
-            <a:avLst/>
-          </a:prstGeom>
-          <a:noFill/>
-        </p:spPr>
-        <p:txBody>
-          <a:bodyPr wrap="square" rtlCol="0">
-            <a:spAutoFit/>
-          </a:bodyPr>
-          <a:lstStyle/>
-          <a:p>
-            <a:r>
-              <a:rPr lang="en-GB" dirty="0"/>
-              <a:t>When attempting to send database tables across the network as python lists, I ran into a problem where I couldn’t encode the array to send it via socket. To fix this I will need to use some form of serialisation, this meant I needed to decide between pickle and json</a:t>
-            </a:r>
+        </p:nvSpPr>
+        <p:spPr/>
+        <p:txBody>
+          <a:bodyPr/>
+          <a:lstStyle/>
+          <a:p>
+            <a:r>
+              <a:rPr lang="en-GB" dirty="0"/>
+              <a:t>One challenging part of the game logic will be calculating split pots</a:t>
+            </a:r>
+          </a:p>
+          <a:p>
+            <a:pPr lvl="1"/>
+            <a:endParaRPr lang="en-GB" dirty="0"/>
           </a:p>
         </p:txBody>
       </p:sp>
     </p:spTree>
     <p:extLst>
       <p:ext uri="{BB962C8B-B14F-4D97-AF65-F5344CB8AC3E}">
-        <p14:creationId xmlns:p14="http://schemas.microsoft.com/office/powerpoint/2010/main" val="1795613777"/>
+        <p14:creationId xmlns:p14="http://schemas.microsoft.com/office/powerpoint/2010/main" val="1191071722"/>
       </p:ext>
     </p:extLst>
   </p:cSld>
@@ -5336,10 +5324,10 @@
       </p:grpSpPr>
       <p:sp>
         <p:nvSpPr>
-          <p:cNvPr id="4" name="Title 3">
-            <a:extLst>
-              <a:ext uri="{FF2B5EF4-FFF2-40B4-BE49-F238E27FC236}">
-                <a16:creationId xmlns:a16="http://schemas.microsoft.com/office/drawing/2014/main" id="{9A0C13EF-555C-49BA-8A54-6EF26B900BA7}"/>
+          <p:cNvPr id="2" name="Title 1">
+            <a:extLst>
+              <a:ext uri="{FF2B5EF4-FFF2-40B4-BE49-F238E27FC236}">
+                <a16:creationId xmlns:a16="http://schemas.microsoft.com/office/drawing/2014/main" id="{76D7B618-33EA-4285-BC95-74EBA3A9CE4B}"/>
               </a:ext>
             </a:extLst>
           </p:cNvPr>
@@ -5357,224 +5345,59 @@
           <a:p>
             <a:r>
               <a:rPr lang="en-GB" dirty="0"/>
-              <a:t>Serialisation comparison</a:t>
-            </a:r>
-          </a:p>
-        </p:txBody>
-      </p:sp>
-      <p:sp>
-        <p:nvSpPr>
-          <p:cNvPr id="5" name="Text Placeholder 4">
-            <a:extLst>
-              <a:ext uri="{FF2B5EF4-FFF2-40B4-BE49-F238E27FC236}">
-                <a16:creationId xmlns:a16="http://schemas.microsoft.com/office/drawing/2014/main" id="{212CED7E-A6E7-4335-BA7C-50C64F0157BE}"/>
-              </a:ext>
-            </a:extLst>
-          </p:cNvPr>
-          <p:cNvSpPr>
-            <a:spLocks noGrp="1"/>
-          </p:cNvSpPr>
-          <p:nvPr>
-            <p:ph type="body" idx="1"/>
-          </p:nvPr>
-        </p:nvSpPr>
+              <a:t>Serialising arrays for data transfer</a:t>
+            </a:r>
+          </a:p>
+        </p:txBody>
+      </p:sp>
+      <p:pic>
+        <p:nvPicPr>
+          <p:cNvPr id="4" name="Content Placeholder 3">
+            <a:extLst>
+              <a:ext uri="{FF2B5EF4-FFF2-40B4-BE49-F238E27FC236}">
+                <a16:creationId xmlns:a16="http://schemas.microsoft.com/office/drawing/2014/main" id="{1A3286E0-E11A-4FE9-B2E3-7E8C1F2A6689}"/>
+              </a:ext>
+            </a:extLst>
+          </p:cNvPr>
+          <p:cNvPicPr>
+            <a:picLocks noGrp="1" noChangeAspect="1"/>
+          </p:cNvPicPr>
+          <p:nvPr>
+            <p:ph idx="1"/>
+          </p:nvPr>
+        </p:nvPicPr>
+        <p:blipFill>
+          <a:blip r:embed="rId2"/>
+          <a:stretch>
+            <a:fillRect/>
+          </a:stretch>
+        </p:blipFill>
         <p:spPr>
           <a:xfrm>
-            <a:off x="836612" y="1223486"/>
-            <a:ext cx="5157787" cy="823912"/>
+            <a:off x="718706" y="1690688"/>
+            <a:ext cx="6182588" cy="1914792"/>
           </a:xfrm>
+          <a:prstGeom prst="rect">
+            <a:avLst/>
+          </a:prstGeom>
         </p:spPr>
-        <p:txBody>
-          <a:bodyPr/>
-          <a:lstStyle/>
-          <a:p>
-            <a:r>
-              <a:rPr lang="en-GB" dirty="0"/>
-              <a:t>JSON</a:t>
-            </a:r>
-          </a:p>
-        </p:txBody>
-      </p:sp>
-      <p:sp>
-        <p:nvSpPr>
-          <p:cNvPr id="6" name="Content Placeholder 5">
-            <a:extLst>
-              <a:ext uri="{FF2B5EF4-FFF2-40B4-BE49-F238E27FC236}">
-                <a16:creationId xmlns:a16="http://schemas.microsoft.com/office/drawing/2014/main" id="{611325CE-52BE-4D7F-A26F-8F7FB9C3FF44}"/>
-              </a:ext>
-            </a:extLst>
-          </p:cNvPr>
-          <p:cNvSpPr>
-            <a:spLocks noGrp="1"/>
-          </p:cNvSpPr>
-          <p:nvPr>
-            <p:ph sz="half" idx="2"/>
-          </p:nvPr>
+      </p:pic>
+      <p:sp>
+        <p:nvSpPr>
+          <p:cNvPr id="5" name="TextBox 4">
+            <a:extLst>
+              <a:ext uri="{FF2B5EF4-FFF2-40B4-BE49-F238E27FC236}">
+                <a16:creationId xmlns:a16="http://schemas.microsoft.com/office/drawing/2014/main" id="{BC3B7363-8C1F-46B9-814C-93393E0B8081}"/>
+              </a:ext>
+            </a:extLst>
+          </p:cNvPr>
+          <p:cNvSpPr txBox="1"/>
+          <p:nvPr/>
         </p:nvSpPr>
         <p:spPr>
           <a:xfrm>
-            <a:off x="836612" y="2109310"/>
-            <a:ext cx="5157787" cy="3662840"/>
-          </a:xfrm>
-        </p:spPr>
-        <p:txBody>
-          <a:bodyPr>
-            <a:normAutofit fontScale="77500" lnSpcReduction="20000"/>
-          </a:bodyPr>
-          <a:lstStyle/>
-          <a:p>
-            <a:r>
-              <a:rPr lang="en-GB" dirty="0"/>
-              <a:t>Human readable</a:t>
-            </a:r>
-          </a:p>
-          <a:p>
-            <a:r>
-              <a:rPr lang="en-GB" dirty="0"/>
-              <a:t>Cross language, don’t plan on using multiple</a:t>
-            </a:r>
-          </a:p>
-          <a:p>
-            <a:r>
-              <a:rPr lang="en-GB" dirty="0"/>
-              <a:t>Industry standard, better documented and supported</a:t>
-            </a:r>
-          </a:p>
-          <a:p>
-            <a:r>
-              <a:rPr lang="en-GB" dirty="0"/>
-              <a:t>Much more safe, as I’m passing </a:t>
-            </a:r>
-            <a:r>
-              <a:rPr lang="en-GB" dirty="0" err="1"/>
-              <a:t>ip</a:t>
-            </a:r>
-            <a:r>
-              <a:rPr lang="en-GB" dirty="0"/>
-              <a:t> addresses etc may be an advantage</a:t>
-            </a:r>
-          </a:p>
-          <a:p>
-            <a:r>
-              <a:rPr lang="en-GB" dirty="0"/>
-              <a:t>Cant deal with tuples etc and makes non string keys in dictionaries into strings, this causes issues with my mainloop.py using integer keys on a dictionary</a:t>
-            </a:r>
-          </a:p>
-          <a:p>
-            <a:endParaRPr lang="en-GB" dirty="0"/>
-          </a:p>
-        </p:txBody>
-      </p:sp>
-      <p:sp>
-        <p:nvSpPr>
-          <p:cNvPr id="7" name="Text Placeholder 6">
-            <a:extLst>
-              <a:ext uri="{FF2B5EF4-FFF2-40B4-BE49-F238E27FC236}">
-                <a16:creationId xmlns:a16="http://schemas.microsoft.com/office/drawing/2014/main" id="{DC1B5B73-6C08-4506-BB0E-0EBC69919EB2}"/>
-              </a:ext>
-            </a:extLst>
-          </p:cNvPr>
-          <p:cNvSpPr>
-            <a:spLocks noGrp="1"/>
-          </p:cNvSpPr>
-          <p:nvPr>
-            <p:ph type="body" sz="quarter" idx="3"/>
-          </p:nvPr>
-        </p:nvSpPr>
-        <p:spPr>
-          <a:xfrm>
-            <a:off x="6169024" y="1223486"/>
-            <a:ext cx="5183188" cy="823912"/>
-          </a:xfrm>
-        </p:spPr>
-        <p:txBody>
-          <a:bodyPr/>
-          <a:lstStyle/>
-          <a:p>
-            <a:r>
-              <a:rPr lang="en-GB" dirty="0"/>
-              <a:t>Pickle</a:t>
-            </a:r>
-          </a:p>
-        </p:txBody>
-      </p:sp>
-      <p:sp>
-        <p:nvSpPr>
-          <p:cNvPr id="8" name="Content Placeholder 7">
-            <a:extLst>
-              <a:ext uri="{FF2B5EF4-FFF2-40B4-BE49-F238E27FC236}">
-                <a16:creationId xmlns:a16="http://schemas.microsoft.com/office/drawing/2014/main" id="{A01C3724-C00E-4D83-8E7C-E0A80D306A2E}"/>
-              </a:ext>
-            </a:extLst>
-          </p:cNvPr>
-          <p:cNvSpPr>
-            <a:spLocks noGrp="1"/>
-          </p:cNvSpPr>
-          <p:nvPr>
-            <p:ph sz="quarter" idx="4"/>
-          </p:nvPr>
-        </p:nvSpPr>
-        <p:spPr>
-          <a:xfrm>
-            <a:off x="6169024" y="2047398"/>
-            <a:ext cx="5183188" cy="3209925"/>
-          </a:xfrm>
-        </p:spPr>
-        <p:txBody>
-          <a:bodyPr>
-            <a:normAutofit fontScale="77500" lnSpcReduction="20000"/>
-          </a:bodyPr>
-          <a:lstStyle/>
-          <a:p>
-            <a:r>
-              <a:rPr lang="en-GB" dirty="0"/>
-              <a:t>Faster</a:t>
-            </a:r>
-          </a:p>
-          <a:p>
-            <a:r>
-              <a:rPr lang="en-GB" dirty="0"/>
-              <a:t>Can send classes etc which may be useful later down the line to have more flexibility don’t want to import this and json</a:t>
-            </a:r>
-          </a:p>
-          <a:p>
-            <a:r>
-              <a:rPr lang="en-GB" dirty="0"/>
-              <a:t>Allows for data serialization of more data types and better support for pythonic use cases</a:t>
-            </a:r>
-          </a:p>
-          <a:p>
-            <a:r>
-              <a:rPr lang="en-GB" dirty="0"/>
-              <a:t>Could be faster using </a:t>
-            </a:r>
-            <a:r>
-              <a:rPr lang="en-GB" dirty="0" err="1"/>
-              <a:t>cpickle</a:t>
-            </a:r>
-            <a:r>
-              <a:rPr lang="en-GB" dirty="0"/>
-              <a:t> but this is not supported in python 3.x yet</a:t>
-            </a:r>
-          </a:p>
-        </p:txBody>
-      </p:sp>
-      <p:sp>
-        <p:nvSpPr>
-          <p:cNvPr id="2" name="TextBox 1">
-            <a:extLst>
-              <a:ext uri="{FF2B5EF4-FFF2-40B4-BE49-F238E27FC236}">
-                <a16:creationId xmlns:a16="http://schemas.microsoft.com/office/drawing/2014/main" id="{A12778BE-AF43-4579-82D8-5CB2F5D50C53}"/>
-              </a:ext>
-            </a:extLst>
-          </p:cNvPr>
-          <p:cNvSpPr txBox="1"/>
-          <p:nvPr/>
-        </p:nvSpPr>
-        <p:spPr>
-          <a:xfrm>
-            <a:off x="700881" y="5538768"/>
-            <a:ext cx="10790237" cy="954107"/>
+            <a:off x="7458075" y="1690688"/>
+            <a:ext cx="4371975" cy="1754326"/>
           </a:xfrm>
           <a:prstGeom prst="rect">
             <a:avLst/>
@@ -5588,8 +5411,8 @@
           <a:lstStyle/>
           <a:p>
             <a:r>
-              <a:rPr lang="en-GB" sz="2800" dirty="0"/>
-              <a:t>Due to the issues with json and the python specific design of pickle I have decided to use pickle.</a:t>
+              <a:rPr lang="en-GB" dirty="0"/>
+              <a:t>When attempting to send database tables across the network as python lists, I ran into a problem where I couldn’t encode the array to send it via socket. To fix this I will need to use some form of serialisation, this meant I needed to decide between pickle and json</a:t>
             </a:r>
           </a:p>
         </p:txBody>
@@ -5597,7 +5420,7 @@
     </p:spTree>
     <p:extLst>
       <p:ext uri="{BB962C8B-B14F-4D97-AF65-F5344CB8AC3E}">
-        <p14:creationId xmlns:p14="http://schemas.microsoft.com/office/powerpoint/2010/main" val="743699574"/>
+        <p14:creationId xmlns:p14="http://schemas.microsoft.com/office/powerpoint/2010/main" val="1795613777"/>
       </p:ext>
     </p:extLst>
   </p:cSld>
@@ -5626,10 +5449,10 @@
       </p:grpSpPr>
       <p:sp>
         <p:nvSpPr>
-          <p:cNvPr id="2" name="Title 1">
-            <a:extLst>
-              <a:ext uri="{FF2B5EF4-FFF2-40B4-BE49-F238E27FC236}">
-                <a16:creationId xmlns:a16="http://schemas.microsoft.com/office/drawing/2014/main" id="{E978F30E-70B8-4C4B-956E-77EA0447200E}"/>
+          <p:cNvPr id="4" name="Title 3">
+            <a:extLst>
+              <a:ext uri="{FF2B5EF4-FFF2-40B4-BE49-F238E27FC236}">
+                <a16:creationId xmlns:a16="http://schemas.microsoft.com/office/drawing/2014/main" id="{9A0C13EF-555C-49BA-8A54-6EF26B900BA7}"/>
               </a:ext>
             </a:extLst>
           </p:cNvPr>
@@ -5647,76 +5470,247 @@
           <a:p>
             <a:r>
               <a:rPr lang="en-GB" dirty="0"/>
-              <a:t>Useful links crypto</a:t>
-            </a:r>
-          </a:p>
-        </p:txBody>
-      </p:sp>
-      <p:sp>
-        <p:nvSpPr>
-          <p:cNvPr id="3" name="Content Placeholder 2">
-            <a:extLst>
-              <a:ext uri="{FF2B5EF4-FFF2-40B4-BE49-F238E27FC236}">
-                <a16:creationId xmlns:a16="http://schemas.microsoft.com/office/drawing/2014/main" id="{04CB57B1-98C8-45E2-AFC8-F27A2A0BE441}"/>
-              </a:ext>
-            </a:extLst>
-          </p:cNvPr>
-          <p:cNvSpPr>
-            <a:spLocks noGrp="1"/>
-          </p:cNvSpPr>
-          <p:nvPr>
-            <p:ph idx="1"/>
-          </p:nvPr>
-        </p:nvSpPr>
-        <p:spPr/>
-        <p:txBody>
-          <a:bodyPr/>
-          <a:lstStyle/>
-          <a:p>
-            <a:r>
-              <a:rPr lang="en-GB" dirty="0">
-                <a:hlinkClick r:id="rId2"/>
-              </a:rPr>
-              <a:t>https://en.wikipedia.org/wiki/RSA_(cryptosystem)#Key_generation</a:t>
-            </a:r>
+              <a:t>Serialisation comparison</a:t>
+            </a:r>
+          </a:p>
+        </p:txBody>
+      </p:sp>
+      <p:sp>
+        <p:nvSpPr>
+          <p:cNvPr id="5" name="Text Placeholder 4">
+            <a:extLst>
+              <a:ext uri="{FF2B5EF4-FFF2-40B4-BE49-F238E27FC236}">
+                <a16:creationId xmlns:a16="http://schemas.microsoft.com/office/drawing/2014/main" id="{212CED7E-A6E7-4335-BA7C-50C64F0157BE}"/>
+              </a:ext>
+            </a:extLst>
+          </p:cNvPr>
+          <p:cNvSpPr>
+            <a:spLocks noGrp="1"/>
+          </p:cNvSpPr>
+          <p:nvPr>
+            <p:ph type="body" idx="1"/>
+          </p:nvPr>
+        </p:nvSpPr>
+        <p:spPr>
+          <a:xfrm>
+            <a:off x="836612" y="1223486"/>
+            <a:ext cx="5157787" cy="823912"/>
+          </a:xfrm>
+        </p:spPr>
+        <p:txBody>
+          <a:bodyPr/>
+          <a:lstStyle/>
+          <a:p>
+            <a:r>
+              <a:rPr lang="en-GB" dirty="0"/>
+              <a:t>JSON</a:t>
+            </a:r>
+          </a:p>
+        </p:txBody>
+      </p:sp>
+      <p:sp>
+        <p:nvSpPr>
+          <p:cNvPr id="6" name="Content Placeholder 5">
+            <a:extLst>
+              <a:ext uri="{FF2B5EF4-FFF2-40B4-BE49-F238E27FC236}">
+                <a16:creationId xmlns:a16="http://schemas.microsoft.com/office/drawing/2014/main" id="{611325CE-52BE-4D7F-A26F-8F7FB9C3FF44}"/>
+              </a:ext>
+            </a:extLst>
+          </p:cNvPr>
+          <p:cNvSpPr>
+            <a:spLocks noGrp="1"/>
+          </p:cNvSpPr>
+          <p:nvPr>
+            <p:ph sz="half" idx="2"/>
+          </p:nvPr>
+        </p:nvSpPr>
+        <p:spPr>
+          <a:xfrm>
+            <a:off x="836612" y="2109310"/>
+            <a:ext cx="5157787" cy="3662840"/>
+          </a:xfrm>
+        </p:spPr>
+        <p:txBody>
+          <a:bodyPr>
+            <a:normAutofit fontScale="77500" lnSpcReduction="20000"/>
+          </a:bodyPr>
+          <a:lstStyle/>
+          <a:p>
+            <a:r>
+              <a:rPr lang="en-GB" dirty="0"/>
+              <a:t>Human readable</a:t>
+            </a:r>
+          </a:p>
+          <a:p>
+            <a:r>
+              <a:rPr lang="en-GB" dirty="0"/>
+              <a:t>Cross language, don’t plan on using multiple</a:t>
+            </a:r>
+          </a:p>
+          <a:p>
+            <a:r>
+              <a:rPr lang="en-GB" dirty="0"/>
+              <a:t>Industry standard, better documented and supported</a:t>
+            </a:r>
+          </a:p>
+          <a:p>
+            <a:r>
+              <a:rPr lang="en-GB" dirty="0"/>
+              <a:t>Much more safe, as I’m passing </a:t>
+            </a:r>
+            <a:r>
+              <a:rPr lang="en-GB" dirty="0" err="1"/>
+              <a:t>ip</a:t>
+            </a:r>
+            <a:r>
+              <a:rPr lang="en-GB" dirty="0"/>
+              <a:t> addresses etc may be an advantage</a:t>
+            </a:r>
+          </a:p>
+          <a:p>
+            <a:r>
+              <a:rPr lang="en-GB" dirty="0"/>
+              <a:t>Cant deal with tuples etc and makes non string keys in dictionaries into strings, this causes issues with my mainloop.py using integer keys on a dictionary</a:t>
+            </a:r>
+          </a:p>
+          <a:p>
             <a:endParaRPr lang="en-GB" dirty="0"/>
           </a:p>
-          <a:p>
-            <a:r>
-              <a:rPr lang="en-GB" dirty="0">
-                <a:hlinkClick r:id="rId3"/>
-              </a:rPr>
-              <a:t>https://cryptography.io/en/latest/hazmat/primitives/asymmetric/rsa/</a:t>
-            </a:r>
-            <a:endParaRPr lang="en-GB" dirty="0"/>
-          </a:p>
-          <a:p>
-            <a:r>
-              <a:rPr lang="en-GB" dirty="0">
-                <a:hlinkClick r:id="rId4"/>
-              </a:rPr>
-              <a:t>https://cryptography.io/en/latest/hazmat/primitives/asymmetric/</a:t>
-            </a:r>
-            <a:endParaRPr lang="en-GB" dirty="0"/>
-          </a:p>
-          <a:p>
-            <a:r>
-              <a:rPr lang="en-GB" dirty="0">
-                <a:hlinkClick r:id="rId5"/>
-              </a:rPr>
-              <a:t>https://security.stackexchange.com/questions/5096/rsa-vs-dsa-for-ssh-authentication-keys</a:t>
-            </a:r>
-            <a:endParaRPr lang="en-GB" dirty="0"/>
-          </a:p>
-          <a:p>
-            <a:endParaRPr lang="en-GB" dirty="0"/>
+        </p:txBody>
+      </p:sp>
+      <p:sp>
+        <p:nvSpPr>
+          <p:cNvPr id="7" name="Text Placeholder 6">
+            <a:extLst>
+              <a:ext uri="{FF2B5EF4-FFF2-40B4-BE49-F238E27FC236}">
+                <a16:creationId xmlns:a16="http://schemas.microsoft.com/office/drawing/2014/main" id="{DC1B5B73-6C08-4506-BB0E-0EBC69919EB2}"/>
+              </a:ext>
+            </a:extLst>
+          </p:cNvPr>
+          <p:cNvSpPr>
+            <a:spLocks noGrp="1"/>
+          </p:cNvSpPr>
+          <p:nvPr>
+            <p:ph type="body" sz="quarter" idx="3"/>
+          </p:nvPr>
+        </p:nvSpPr>
+        <p:spPr>
+          <a:xfrm>
+            <a:off x="6169024" y="1223486"/>
+            <a:ext cx="5183188" cy="823912"/>
+          </a:xfrm>
+        </p:spPr>
+        <p:txBody>
+          <a:bodyPr/>
+          <a:lstStyle/>
+          <a:p>
+            <a:r>
+              <a:rPr lang="en-GB" dirty="0"/>
+              <a:t>Pickle</a:t>
+            </a:r>
+          </a:p>
+        </p:txBody>
+      </p:sp>
+      <p:sp>
+        <p:nvSpPr>
+          <p:cNvPr id="8" name="Content Placeholder 7">
+            <a:extLst>
+              <a:ext uri="{FF2B5EF4-FFF2-40B4-BE49-F238E27FC236}">
+                <a16:creationId xmlns:a16="http://schemas.microsoft.com/office/drawing/2014/main" id="{A01C3724-C00E-4D83-8E7C-E0A80D306A2E}"/>
+              </a:ext>
+            </a:extLst>
+          </p:cNvPr>
+          <p:cNvSpPr>
+            <a:spLocks noGrp="1"/>
+          </p:cNvSpPr>
+          <p:nvPr>
+            <p:ph sz="quarter" idx="4"/>
+          </p:nvPr>
+        </p:nvSpPr>
+        <p:spPr>
+          <a:xfrm>
+            <a:off x="6169024" y="2047398"/>
+            <a:ext cx="5183188" cy="3209925"/>
+          </a:xfrm>
+        </p:spPr>
+        <p:txBody>
+          <a:bodyPr>
+            <a:normAutofit fontScale="77500" lnSpcReduction="20000"/>
+          </a:bodyPr>
+          <a:lstStyle/>
+          <a:p>
+            <a:r>
+              <a:rPr lang="en-GB" dirty="0"/>
+              <a:t>Faster</a:t>
+            </a:r>
+          </a:p>
+          <a:p>
+            <a:r>
+              <a:rPr lang="en-GB" dirty="0"/>
+              <a:t>Can send classes etc which may be useful later down the line to have more flexibility don’t want to import this and json</a:t>
+            </a:r>
+          </a:p>
+          <a:p>
+            <a:r>
+              <a:rPr lang="en-GB" dirty="0"/>
+              <a:t>Allows for data serialization of more data types and better support for pythonic use cases</a:t>
+            </a:r>
+          </a:p>
+          <a:p>
+            <a:r>
+              <a:rPr lang="en-GB" dirty="0"/>
+              <a:t>Could be faster using </a:t>
+            </a:r>
+            <a:r>
+              <a:rPr lang="en-GB" dirty="0" err="1"/>
+              <a:t>cpickle</a:t>
+            </a:r>
+            <a:r>
+              <a:rPr lang="en-GB" dirty="0"/>
+              <a:t> but this is not supported in python 3.x yet</a:t>
+            </a:r>
+          </a:p>
+        </p:txBody>
+      </p:sp>
+      <p:sp>
+        <p:nvSpPr>
+          <p:cNvPr id="2" name="TextBox 1">
+            <a:extLst>
+              <a:ext uri="{FF2B5EF4-FFF2-40B4-BE49-F238E27FC236}">
+                <a16:creationId xmlns:a16="http://schemas.microsoft.com/office/drawing/2014/main" id="{A12778BE-AF43-4579-82D8-5CB2F5D50C53}"/>
+              </a:ext>
+            </a:extLst>
+          </p:cNvPr>
+          <p:cNvSpPr txBox="1"/>
+          <p:nvPr/>
+        </p:nvSpPr>
+        <p:spPr>
+          <a:xfrm>
+            <a:off x="700881" y="5538768"/>
+            <a:ext cx="10790237" cy="954107"/>
+          </a:xfrm>
+          <a:prstGeom prst="rect">
+            <a:avLst/>
+          </a:prstGeom>
+          <a:noFill/>
+        </p:spPr>
+        <p:txBody>
+          <a:bodyPr wrap="square" rtlCol="0">
+            <a:spAutoFit/>
+          </a:bodyPr>
+          <a:lstStyle/>
+          <a:p>
+            <a:r>
+              <a:rPr lang="en-GB" sz="2800" dirty="0"/>
+              <a:t>Due to the issues with json and the python specific design of pickle I have decided to use pickle.</a:t>
+            </a:r>
           </a:p>
         </p:txBody>
       </p:sp>
     </p:spTree>
     <p:extLst>
       <p:ext uri="{BB962C8B-B14F-4D97-AF65-F5344CB8AC3E}">
-        <p14:creationId xmlns:p14="http://schemas.microsoft.com/office/powerpoint/2010/main" val="3309908080"/>
+        <p14:creationId xmlns:p14="http://schemas.microsoft.com/office/powerpoint/2010/main" val="743699574"/>
       </p:ext>
     </p:extLst>
   </p:cSld>
@@ -5748,7 +5742,7 @@
           <p:cNvPr id="2" name="Title 1">
             <a:extLst>
               <a:ext uri="{FF2B5EF4-FFF2-40B4-BE49-F238E27FC236}">
-                <a16:creationId xmlns:a16="http://schemas.microsoft.com/office/drawing/2014/main" id="{76B61AC1-EA1A-43B0-BF64-56FF385255B4}"/>
+                <a16:creationId xmlns:a16="http://schemas.microsoft.com/office/drawing/2014/main" id="{E978F30E-70B8-4C4B-956E-77EA0447200E}"/>
               </a:ext>
             </a:extLst>
           </p:cNvPr>
@@ -5766,7 +5760,7 @@
           <a:p>
             <a:r>
               <a:rPr lang="en-GB" dirty="0"/>
-              <a:t>Useful links networking</a:t>
+              <a:t>Useful links crypto</a:t>
             </a:r>
           </a:p>
         </p:txBody>
@@ -5776,7 +5770,7 @@
           <p:cNvPr id="3" name="Content Placeholder 2">
             <a:extLst>
               <a:ext uri="{FF2B5EF4-FFF2-40B4-BE49-F238E27FC236}">
-                <a16:creationId xmlns:a16="http://schemas.microsoft.com/office/drawing/2014/main" id="{DD2AB15A-FBF2-4686-A1B3-E5CBB3E3ABFC}"/>
+                <a16:creationId xmlns:a16="http://schemas.microsoft.com/office/drawing/2014/main" id="{04CB57B1-98C8-45E2-AFC8-F27A2A0BE441}"/>
               </a:ext>
             </a:extLst>
           </p:cNvPr>
@@ -5796,7 +5790,7 @@
               <a:rPr lang="en-GB" dirty="0">
                 <a:hlinkClick r:id="rId2"/>
               </a:rPr>
-              <a:t>https://www.tutorialspoint.com/python/python_networking.htm</a:t>
+              <a:t>https://en.wikipedia.org/wiki/RSA_(cryptosystem)#Key_generation</a:t>
             </a:r>
             <a:endParaRPr lang="en-GB" dirty="0"/>
           </a:p>
@@ -5805,7 +5799,7 @@
               <a:rPr lang="en-GB" dirty="0">
                 <a:hlinkClick r:id="rId3"/>
               </a:rPr>
-              <a:t>https://www.w3schools.in/python-tutorial/network-programming/</a:t>
+              <a:t>https://cryptography.io/en/latest/hazmat/primitives/asymmetric/rsa/</a:t>
             </a:r>
             <a:endParaRPr lang="en-GB" dirty="0"/>
           </a:p>
@@ -5814,7 +5808,16 @@
               <a:rPr lang="en-GB" dirty="0">
                 <a:hlinkClick r:id="rId4"/>
               </a:rPr>
-              <a:t>https://stackoverflow.com/questions/34653875/python-how-to-send-data-over-tcp</a:t>
+              <a:t>https://cryptography.io/en/latest/hazmat/primitives/asymmetric/</a:t>
+            </a:r>
+            <a:endParaRPr lang="en-GB" dirty="0"/>
+          </a:p>
+          <a:p>
+            <a:r>
+              <a:rPr lang="en-GB" dirty="0">
+                <a:hlinkClick r:id="rId5"/>
+              </a:rPr>
+              <a:t>https://security.stackexchange.com/questions/5096/rsa-vs-dsa-for-ssh-authentication-keys</a:t>
             </a:r>
             <a:endParaRPr lang="en-GB" dirty="0"/>
           </a:p>
@@ -5826,7 +5829,7 @@
     </p:spTree>
     <p:extLst>
       <p:ext uri="{BB962C8B-B14F-4D97-AF65-F5344CB8AC3E}">
-        <p14:creationId xmlns:p14="http://schemas.microsoft.com/office/powerpoint/2010/main" val="4186440119"/>
+        <p14:creationId xmlns:p14="http://schemas.microsoft.com/office/powerpoint/2010/main" val="3309908080"/>
       </p:ext>
     </p:extLst>
   </p:cSld>
@@ -5858,7 +5861,7 @@
           <p:cNvPr id="2" name="Title 1">
             <a:extLst>
               <a:ext uri="{FF2B5EF4-FFF2-40B4-BE49-F238E27FC236}">
-                <a16:creationId xmlns:a16="http://schemas.microsoft.com/office/drawing/2014/main" id="{103886FA-BC70-43F1-8492-3D2BD6D73654}"/>
+                <a16:creationId xmlns:a16="http://schemas.microsoft.com/office/drawing/2014/main" id="{76B61AC1-EA1A-43B0-BF64-56FF385255B4}"/>
               </a:ext>
             </a:extLst>
           </p:cNvPr>
@@ -5876,7 +5879,7 @@
           <a:p>
             <a:r>
               <a:rPr lang="en-GB" dirty="0"/>
-              <a:t>notes</a:t>
+              <a:t>Useful links networking</a:t>
             </a:r>
           </a:p>
         </p:txBody>
@@ -5886,7 +5889,7 @@
           <p:cNvPr id="3" name="Content Placeholder 2">
             <a:extLst>
               <a:ext uri="{FF2B5EF4-FFF2-40B4-BE49-F238E27FC236}">
-                <a16:creationId xmlns:a16="http://schemas.microsoft.com/office/drawing/2014/main" id="{5A02EDD2-E34D-4469-BDA7-CE646653E7DE}"/>
+                <a16:creationId xmlns:a16="http://schemas.microsoft.com/office/drawing/2014/main" id="{DD2AB15A-FBF2-4686-A1B3-E5CBB3E3ABFC}"/>
               </a:ext>
             </a:extLst>
           </p:cNvPr>
@@ -5903,19 +5906,30 @@
           <a:lstStyle/>
           <a:p>
             <a:r>
-              <a:rPr lang="en-GB" dirty="0" err="1"/>
-              <a:t>ip</a:t>
-            </a:r>
-            <a:r>
-              <a:rPr lang="en-GB" dirty="0"/>
-              <a:t> is allocated to username for 24 hours or until the account is logged out of,</a:t>
-            </a:r>
-          </a:p>
-          <a:p>
-            <a:r>
-              <a:rPr lang="en-GB" dirty="0"/>
-              <a:t>Classes = UI, client, manager</a:t>
-            </a:r>
+              <a:rPr lang="en-GB" dirty="0">
+                <a:hlinkClick r:id="rId2"/>
+              </a:rPr>
+              <a:t>https://www.tutorialspoint.com/python/python_networking.htm</a:t>
+            </a:r>
+            <a:endParaRPr lang="en-GB" dirty="0"/>
+          </a:p>
+          <a:p>
+            <a:r>
+              <a:rPr lang="en-GB" dirty="0">
+                <a:hlinkClick r:id="rId3"/>
+              </a:rPr>
+              <a:t>https://www.w3schools.in/python-tutorial/network-programming/</a:t>
+            </a:r>
+            <a:endParaRPr lang="en-GB" dirty="0"/>
+          </a:p>
+          <a:p>
+            <a:r>
+              <a:rPr lang="en-GB" dirty="0">
+                <a:hlinkClick r:id="rId4"/>
+              </a:rPr>
+              <a:t>https://stackoverflow.com/questions/34653875/python-how-to-send-data-over-tcp</a:t>
+            </a:r>
+            <a:endParaRPr lang="en-GB" dirty="0"/>
           </a:p>
           <a:p>
             <a:endParaRPr lang="en-GB" dirty="0"/>
@@ -5925,7 +5939,7 @@
     </p:spTree>
     <p:extLst>
       <p:ext uri="{BB962C8B-B14F-4D97-AF65-F5344CB8AC3E}">
-        <p14:creationId xmlns:p14="http://schemas.microsoft.com/office/powerpoint/2010/main" val="2517001702"/>
+        <p14:creationId xmlns:p14="http://schemas.microsoft.com/office/powerpoint/2010/main" val="4186440119"/>
       </p:ext>
     </p:extLst>
   </p:cSld>
@@ -5957,6 +5971,105 @@
           <p:cNvPr id="2" name="Title 1">
             <a:extLst>
               <a:ext uri="{FF2B5EF4-FFF2-40B4-BE49-F238E27FC236}">
+                <a16:creationId xmlns:a16="http://schemas.microsoft.com/office/drawing/2014/main" id="{103886FA-BC70-43F1-8492-3D2BD6D73654}"/>
+              </a:ext>
+            </a:extLst>
+          </p:cNvPr>
+          <p:cNvSpPr>
+            <a:spLocks noGrp="1"/>
+          </p:cNvSpPr>
+          <p:nvPr>
+            <p:ph type="title"/>
+          </p:nvPr>
+        </p:nvSpPr>
+        <p:spPr/>
+        <p:txBody>
+          <a:bodyPr/>
+          <a:lstStyle/>
+          <a:p>
+            <a:r>
+              <a:rPr lang="en-GB" dirty="0"/>
+              <a:t>notes</a:t>
+            </a:r>
+          </a:p>
+        </p:txBody>
+      </p:sp>
+      <p:sp>
+        <p:nvSpPr>
+          <p:cNvPr id="3" name="Content Placeholder 2">
+            <a:extLst>
+              <a:ext uri="{FF2B5EF4-FFF2-40B4-BE49-F238E27FC236}">
+                <a16:creationId xmlns:a16="http://schemas.microsoft.com/office/drawing/2014/main" id="{5A02EDD2-E34D-4469-BDA7-CE646653E7DE}"/>
+              </a:ext>
+            </a:extLst>
+          </p:cNvPr>
+          <p:cNvSpPr>
+            <a:spLocks noGrp="1"/>
+          </p:cNvSpPr>
+          <p:nvPr>
+            <p:ph idx="1"/>
+          </p:nvPr>
+        </p:nvSpPr>
+        <p:spPr/>
+        <p:txBody>
+          <a:bodyPr/>
+          <a:lstStyle/>
+          <a:p>
+            <a:r>
+              <a:rPr lang="en-GB" dirty="0" err="1"/>
+              <a:t>ip</a:t>
+            </a:r>
+            <a:r>
+              <a:rPr lang="en-GB" dirty="0"/>
+              <a:t> is allocated to username for 24 hours or until the account is logged out of,</a:t>
+            </a:r>
+          </a:p>
+          <a:p>
+            <a:r>
+              <a:rPr lang="en-GB" dirty="0"/>
+              <a:t>Classes = UI, client, manager</a:t>
+            </a:r>
+          </a:p>
+          <a:p>
+            <a:endParaRPr lang="en-GB" dirty="0"/>
+          </a:p>
+        </p:txBody>
+      </p:sp>
+    </p:spTree>
+    <p:extLst>
+      <p:ext uri="{BB962C8B-B14F-4D97-AF65-F5344CB8AC3E}">
+        <p14:creationId xmlns:p14="http://schemas.microsoft.com/office/powerpoint/2010/main" val="2517001702"/>
+      </p:ext>
+    </p:extLst>
+  </p:cSld>
+  <p:clrMapOvr>
+    <a:masterClrMapping/>
+  </p:clrMapOvr>
+</p:sld>
+</file>
+
+<file path=ppt/slides/slide28.xml><?xml version="1.0" encoding="utf-8"?>
+<p:sld xmlns:a="http://schemas.openxmlformats.org/drawingml/2006/main" xmlns:r="http://schemas.openxmlformats.org/officeDocument/2006/relationships" xmlns:p="http://schemas.openxmlformats.org/presentationml/2006/main">
+  <p:cSld>
+    <p:spTree>
+      <p:nvGrpSpPr>
+        <p:cNvPr id="1" name=""/>
+        <p:cNvGrpSpPr/>
+        <p:nvPr/>
+      </p:nvGrpSpPr>
+      <p:grpSpPr>
+        <a:xfrm>
+          <a:off x="0" y="0"/>
+          <a:ext cx="0" cy="0"/>
+          <a:chOff x="0" y="0"/>
+          <a:chExt cx="0" cy="0"/>
+        </a:xfrm>
+      </p:grpSpPr>
+      <p:sp>
+        <p:nvSpPr>
+          <p:cNvPr id="2" name="Title 1">
+            <a:extLst>
+              <a:ext uri="{FF2B5EF4-FFF2-40B4-BE49-F238E27FC236}">
                 <a16:creationId xmlns:a16="http://schemas.microsoft.com/office/drawing/2014/main" id="{376C1C6D-BF07-4179-85B6-5EE59A4476C2}"/>
               </a:ext>
             </a:extLst>
@@ -6037,7 +6150,7 @@
 </p:sld>
 </file>
 
-<file path=ppt/slides/slide28.xml><?xml version="1.0" encoding="utf-8"?>
+<file path=ppt/slides/slide29.xml><?xml version="1.0" encoding="utf-8"?>
 <p:sld xmlns:a="http://schemas.openxmlformats.org/drawingml/2006/main" xmlns:r="http://schemas.openxmlformats.org/officeDocument/2006/relationships" xmlns:p="http://schemas.openxmlformats.org/presentationml/2006/main">
   <p:cSld>
     <p:spTree>
@@ -6416,7 +6529,111 @@
 </p:sld>
 </file>
 
-<file path=ppt/slides/slide29.xml><?xml version="1.0" encoding="utf-8"?>
+<file path=ppt/slides/slide3.xml><?xml version="1.0" encoding="utf-8"?>
+<p:sld xmlns:a="http://schemas.openxmlformats.org/drawingml/2006/main" xmlns:r="http://schemas.openxmlformats.org/officeDocument/2006/relationships" xmlns:p="http://schemas.openxmlformats.org/presentationml/2006/main">
+  <p:cSld>
+    <p:spTree>
+      <p:nvGrpSpPr>
+        <p:cNvPr id="1" name=""/>
+        <p:cNvGrpSpPr/>
+        <p:nvPr/>
+      </p:nvGrpSpPr>
+      <p:grpSpPr>
+        <a:xfrm>
+          <a:off x="0" y="0"/>
+          <a:ext cx="0" cy="0"/>
+          <a:chOff x="0" y="0"/>
+          <a:chExt cx="0" cy="0"/>
+        </a:xfrm>
+      </p:grpSpPr>
+      <p:sp>
+        <p:nvSpPr>
+          <p:cNvPr id="2" name="Title 1">
+            <a:extLst>
+              <a:ext uri="{FF2B5EF4-FFF2-40B4-BE49-F238E27FC236}">
+                <a16:creationId xmlns:a16="http://schemas.microsoft.com/office/drawing/2014/main" id="{5B300700-0880-4077-B80F-475798E36F00}"/>
+              </a:ext>
+            </a:extLst>
+          </p:cNvPr>
+          <p:cNvSpPr>
+            <a:spLocks noGrp="1"/>
+          </p:cNvSpPr>
+          <p:nvPr>
+            <p:ph type="title"/>
+          </p:nvPr>
+        </p:nvSpPr>
+        <p:spPr/>
+        <p:txBody>
+          <a:bodyPr/>
+          <a:lstStyle/>
+          <a:p>
+            <a:r>
+              <a:rPr lang="en-GB" dirty="0"/>
+              <a:t>Necessary sql functions</a:t>
+            </a:r>
+          </a:p>
+        </p:txBody>
+      </p:sp>
+      <p:sp>
+        <p:nvSpPr>
+          <p:cNvPr id="3" name="Content Placeholder 2">
+            <a:extLst>
+              <a:ext uri="{FF2B5EF4-FFF2-40B4-BE49-F238E27FC236}">
+                <a16:creationId xmlns:a16="http://schemas.microsoft.com/office/drawing/2014/main" id="{5A5C7EDF-33B9-4F78-A9D2-E5948F942BD3}"/>
+              </a:ext>
+            </a:extLst>
+          </p:cNvPr>
+          <p:cNvSpPr>
+            <a:spLocks noGrp="1"/>
+          </p:cNvSpPr>
+          <p:nvPr>
+            <p:ph idx="1"/>
+          </p:nvPr>
+        </p:nvSpPr>
+        <p:spPr/>
+        <p:txBody>
+          <a:bodyPr/>
+          <a:lstStyle/>
+          <a:p>
+            <a:r>
+              <a:rPr lang="en-GB" dirty="0"/>
+              <a:t>Append a new value/record to the database as a tuple to prevent sql injection</a:t>
+            </a:r>
+          </a:p>
+          <a:p>
+            <a:r>
+              <a:rPr lang="en-GB" dirty="0"/>
+              <a:t>Replace/overwrite entries when given the new value and the one to be replaced</a:t>
+            </a:r>
+          </a:p>
+          <a:p>
+            <a:r>
+              <a:rPr lang="en-GB" dirty="0"/>
+              <a:t>Read and return a set of records as a 2d array when given the sql code to be executed</a:t>
+            </a:r>
+          </a:p>
+          <a:p>
+            <a:r>
+              <a:rPr lang="en-GB" dirty="0"/>
+              <a:t>Read and write encrypted entries for password security using asymmetrical encryption where a single server has access to the private key</a:t>
+            </a:r>
+          </a:p>
+        </p:txBody>
+      </p:sp>
+    </p:spTree>
+    <p:extLst>
+      <p:ext uri="{BB962C8B-B14F-4D97-AF65-F5344CB8AC3E}">
+        <p14:creationId xmlns:p14="http://schemas.microsoft.com/office/powerpoint/2010/main" val="515096534"/>
+      </p:ext>
+    </p:extLst>
+  </p:cSld>
+  <p:clrMapOvr>
+    <a:masterClrMapping/>
+  </p:clrMapOvr>
+</p:sld>
+</file>
+
+<file path=ppt/slides/slide30.xml><?xml version="1.0" encoding="utf-8"?>
 <p:sld xmlns:a="http://schemas.openxmlformats.org/drawingml/2006/main" xmlns:r="http://schemas.openxmlformats.org/officeDocument/2006/relationships" xmlns:p="http://schemas.openxmlformats.org/presentationml/2006/main">
   <p:cSld>
     <p:spTree>
@@ -6594,111 +6811,7 @@
 </p:sld>
 </file>
 
-<file path=ppt/slides/slide3.xml><?xml version="1.0" encoding="utf-8"?>
-<p:sld xmlns:a="http://schemas.openxmlformats.org/drawingml/2006/main" xmlns:r="http://schemas.openxmlformats.org/officeDocument/2006/relationships" xmlns:p="http://schemas.openxmlformats.org/presentationml/2006/main">
-  <p:cSld>
-    <p:spTree>
-      <p:nvGrpSpPr>
-        <p:cNvPr id="1" name=""/>
-        <p:cNvGrpSpPr/>
-        <p:nvPr/>
-      </p:nvGrpSpPr>
-      <p:grpSpPr>
-        <a:xfrm>
-          <a:off x="0" y="0"/>
-          <a:ext cx="0" cy="0"/>
-          <a:chOff x="0" y="0"/>
-          <a:chExt cx="0" cy="0"/>
-        </a:xfrm>
-      </p:grpSpPr>
-      <p:sp>
-        <p:nvSpPr>
-          <p:cNvPr id="2" name="Title 1">
-            <a:extLst>
-              <a:ext uri="{FF2B5EF4-FFF2-40B4-BE49-F238E27FC236}">
-                <a16:creationId xmlns:a16="http://schemas.microsoft.com/office/drawing/2014/main" id="{5B300700-0880-4077-B80F-475798E36F00}"/>
-              </a:ext>
-            </a:extLst>
-          </p:cNvPr>
-          <p:cNvSpPr>
-            <a:spLocks noGrp="1"/>
-          </p:cNvSpPr>
-          <p:nvPr>
-            <p:ph type="title"/>
-          </p:nvPr>
-        </p:nvSpPr>
-        <p:spPr/>
-        <p:txBody>
-          <a:bodyPr/>
-          <a:lstStyle/>
-          <a:p>
-            <a:r>
-              <a:rPr lang="en-GB" dirty="0"/>
-              <a:t>Necessary sql functions</a:t>
-            </a:r>
-          </a:p>
-        </p:txBody>
-      </p:sp>
-      <p:sp>
-        <p:nvSpPr>
-          <p:cNvPr id="3" name="Content Placeholder 2">
-            <a:extLst>
-              <a:ext uri="{FF2B5EF4-FFF2-40B4-BE49-F238E27FC236}">
-                <a16:creationId xmlns:a16="http://schemas.microsoft.com/office/drawing/2014/main" id="{5A5C7EDF-33B9-4F78-A9D2-E5948F942BD3}"/>
-              </a:ext>
-            </a:extLst>
-          </p:cNvPr>
-          <p:cNvSpPr>
-            <a:spLocks noGrp="1"/>
-          </p:cNvSpPr>
-          <p:nvPr>
-            <p:ph idx="1"/>
-          </p:nvPr>
-        </p:nvSpPr>
-        <p:spPr/>
-        <p:txBody>
-          <a:bodyPr/>
-          <a:lstStyle/>
-          <a:p>
-            <a:r>
-              <a:rPr lang="en-GB" dirty="0"/>
-              <a:t>Append a new value/record to the database as a tuple to prevent sql injection</a:t>
-            </a:r>
-          </a:p>
-          <a:p>
-            <a:r>
-              <a:rPr lang="en-GB" dirty="0"/>
-              <a:t>Replace/overwrite entries when given the new value and the one to be replaced</a:t>
-            </a:r>
-          </a:p>
-          <a:p>
-            <a:r>
-              <a:rPr lang="en-GB" dirty="0"/>
-              <a:t>Read and return a set of records as a 2d array when given the sql code to be executed</a:t>
-            </a:r>
-          </a:p>
-          <a:p>
-            <a:r>
-              <a:rPr lang="en-GB" dirty="0"/>
-              <a:t>Read and write encrypted entries for password security using asymmetrical encryption where a single server has access to the private key</a:t>
-            </a:r>
-          </a:p>
-        </p:txBody>
-      </p:sp>
-    </p:spTree>
-    <p:extLst>
-      <p:ext uri="{BB962C8B-B14F-4D97-AF65-F5344CB8AC3E}">
-        <p14:creationId xmlns:p14="http://schemas.microsoft.com/office/powerpoint/2010/main" val="515096534"/>
-      </p:ext>
-    </p:extLst>
-  </p:cSld>
-  <p:clrMapOvr>
-    <a:masterClrMapping/>
-  </p:clrMapOvr>
-</p:sld>
-</file>
-
-<file path=ppt/slides/slide30.xml><?xml version="1.0" encoding="utf-8"?>
+<file path=ppt/slides/slide31.xml><?xml version="1.0" encoding="utf-8"?>
 <p:sld xmlns:a="http://schemas.openxmlformats.org/drawingml/2006/main" xmlns:r="http://schemas.openxmlformats.org/officeDocument/2006/relationships" xmlns:p="http://schemas.openxmlformats.org/presentationml/2006/main">
   <p:cSld>
     <p:bg>
@@ -6958,7 +7071,7 @@
 </p:sld>
 </file>
 
-<file path=ppt/slides/slide31.xml><?xml version="1.0" encoding="utf-8"?>
+<file path=ppt/slides/slide32.xml><?xml version="1.0" encoding="utf-8"?>
 <p:sld xmlns:a="http://schemas.openxmlformats.org/drawingml/2006/main" xmlns:r="http://schemas.openxmlformats.org/officeDocument/2006/relationships" xmlns:p="http://schemas.openxmlformats.org/presentationml/2006/main">
   <p:cSld>
     <p:spTree>
@@ -7078,7 +7191,7 @@
 </p:sld>
 </file>
 
-<file path=ppt/slides/slide32.xml><?xml version="1.0" encoding="utf-8"?>
+<file path=ppt/slides/slide33.xml><?xml version="1.0" encoding="utf-8"?>
 <p:sld xmlns:a="http://schemas.openxmlformats.org/drawingml/2006/main" xmlns:r="http://schemas.openxmlformats.org/officeDocument/2006/relationships" xmlns:p="http://schemas.openxmlformats.org/presentationml/2006/main">
   <p:cSld>
     <p:spTree>
@@ -7258,7 +7371,7 @@
 </p:sld>
 </file>
 
-<file path=ppt/slides/slide33.xml><?xml version="1.0" encoding="utf-8"?>
+<file path=ppt/slides/slide34.xml><?xml version="1.0" encoding="utf-8"?>
 <p:sld xmlns:a="http://schemas.openxmlformats.org/drawingml/2006/main" xmlns:r="http://schemas.openxmlformats.org/officeDocument/2006/relationships" xmlns:p="http://schemas.openxmlformats.org/presentationml/2006/main">
   <p:cSld>
     <p:spTree>
@@ -7376,7 +7489,7 @@
 </p:sld>
 </file>
 
-<file path=ppt/slides/slide34.xml><?xml version="1.0" encoding="utf-8"?>
+<file path=ppt/slides/slide35.xml><?xml version="1.0" encoding="utf-8"?>
 <p:sld xmlns:a="http://schemas.openxmlformats.org/drawingml/2006/main" xmlns:r="http://schemas.openxmlformats.org/officeDocument/2006/relationships" xmlns:p="http://schemas.openxmlformats.org/presentationml/2006/main">
   <p:cSld>
     <p:spTree>
@@ -7495,7 +7608,7 @@
 </p:sld>
 </file>
 
-<file path=ppt/slides/slide35.xml><?xml version="1.0" encoding="utf-8"?>
+<file path=ppt/slides/slide36.xml><?xml version="1.0" encoding="utf-8"?>
 <p:sld xmlns:a="http://schemas.openxmlformats.org/drawingml/2006/main" xmlns:r="http://schemas.openxmlformats.org/officeDocument/2006/relationships" xmlns:p="http://schemas.openxmlformats.org/presentationml/2006/main">
   <p:cSld>
     <p:spTree>
@@ -7675,7 +7788,7 @@
 </p:sld>
 </file>
 
-<file path=ppt/slides/slide36.xml><?xml version="1.0" encoding="utf-8"?>
+<file path=ppt/slides/slide37.xml><?xml version="1.0" encoding="utf-8"?>
 <p:sld xmlns:a="http://schemas.openxmlformats.org/drawingml/2006/main" xmlns:r="http://schemas.openxmlformats.org/officeDocument/2006/relationships" xmlns:p="http://schemas.openxmlformats.org/presentationml/2006/main">
   <p:cSld>
     <p:spTree>
@@ -7825,7 +7938,7 @@
 </p:sld>
 </file>
 
-<file path=ppt/slides/slide37.xml><?xml version="1.0" encoding="utf-8"?>
+<file path=ppt/slides/slide38.xml><?xml version="1.0" encoding="utf-8"?>
 <p:sld xmlns:a="http://schemas.openxmlformats.org/drawingml/2006/main" xmlns:r="http://schemas.openxmlformats.org/officeDocument/2006/relationships" xmlns:p="http://schemas.openxmlformats.org/presentationml/2006/main">
   <p:cSld>
     <p:spTree>
@@ -7945,7 +8058,7 @@
 </p:sld>
 </file>
 
-<file path=ppt/slides/slide38.xml><?xml version="1.0" encoding="utf-8"?>
+<file path=ppt/slides/slide39.xml><?xml version="1.0" encoding="utf-8"?>
 <p:sld xmlns:a="http://schemas.openxmlformats.org/drawingml/2006/main" xmlns:r="http://schemas.openxmlformats.org/officeDocument/2006/relationships" xmlns:p="http://schemas.openxmlformats.org/presentationml/2006/main">
   <p:cSld>
     <p:spTree>
@@ -8095,147 +8208,6 @@
 </p:sld>
 </file>
 
-<file path=ppt/slides/slide39.xml><?xml version="1.0" encoding="utf-8"?>
-<p:sld xmlns:a="http://schemas.openxmlformats.org/drawingml/2006/main" xmlns:r="http://schemas.openxmlformats.org/officeDocument/2006/relationships" xmlns:p="http://schemas.openxmlformats.org/presentationml/2006/main">
-  <p:cSld>
-    <p:spTree>
-      <p:nvGrpSpPr>
-        <p:cNvPr id="1" name=""/>
-        <p:cNvGrpSpPr/>
-        <p:nvPr/>
-      </p:nvGrpSpPr>
-      <p:grpSpPr>
-        <a:xfrm>
-          <a:off x="0" y="0"/>
-          <a:ext cx="0" cy="0"/>
-          <a:chOff x="0" y="0"/>
-          <a:chExt cx="0" cy="0"/>
-        </a:xfrm>
-      </p:grpSpPr>
-      <p:sp>
-        <p:nvSpPr>
-          <p:cNvPr id="2" name="Title 1">
-            <a:extLst>
-              <a:ext uri="{FF2B5EF4-FFF2-40B4-BE49-F238E27FC236}">
-                <a16:creationId xmlns:a16="http://schemas.microsoft.com/office/drawing/2014/main" id="{3E21E2E2-780A-4009-A152-E722903D8190}"/>
-              </a:ext>
-            </a:extLst>
-          </p:cNvPr>
-          <p:cNvSpPr>
-            <a:spLocks noGrp="1"/>
-          </p:cNvSpPr>
-          <p:nvPr>
-            <p:ph type="title"/>
-          </p:nvPr>
-        </p:nvSpPr>
-        <p:spPr/>
-        <p:txBody>
-          <a:bodyPr/>
-          <a:lstStyle/>
-          <a:p>
-            <a:r>
-              <a:rPr lang="en-GB" dirty="0"/>
-              <a:t>I had several errors in my </a:t>
-            </a:r>
-            <a:r>
-              <a:rPr lang="en-GB" dirty="0" err="1"/>
-              <a:t>sql</a:t>
-            </a:r>
-            <a:r>
-              <a:rPr lang="en-GB" dirty="0"/>
-              <a:t> reader as it turns out you cant use a variable to select a table</a:t>
-            </a:r>
-          </a:p>
-        </p:txBody>
-      </p:sp>
-      <p:pic>
-        <p:nvPicPr>
-          <p:cNvPr id="4" name="Content Placeholder 3">
-            <a:extLst>
-              <a:ext uri="{FF2B5EF4-FFF2-40B4-BE49-F238E27FC236}">
-                <a16:creationId xmlns:a16="http://schemas.microsoft.com/office/drawing/2014/main" id="{BB38A60F-4A70-4AF4-ADBD-DB3EDCAC7966}"/>
-              </a:ext>
-            </a:extLst>
-          </p:cNvPr>
-          <p:cNvPicPr>
-            <a:picLocks noGrp="1" noChangeAspect="1"/>
-          </p:cNvPicPr>
-          <p:nvPr>
-            <p:ph idx="1"/>
-          </p:nvPr>
-        </p:nvPicPr>
-        <p:blipFill>
-          <a:blip r:embed="rId2"/>
-          <a:stretch>
-            <a:fillRect/>
-          </a:stretch>
-        </p:blipFill>
-        <p:spPr>
-          <a:xfrm>
-            <a:off x="201961" y="1690688"/>
-            <a:ext cx="7744583" cy="4351338"/>
-          </a:xfrm>
-          <a:prstGeom prst="rect">
-            <a:avLst/>
-          </a:prstGeom>
-        </p:spPr>
-      </p:pic>
-      <p:sp>
-        <p:nvSpPr>
-          <p:cNvPr id="5" name="TextBox 4">
-            <a:extLst>
-              <a:ext uri="{FF2B5EF4-FFF2-40B4-BE49-F238E27FC236}">
-                <a16:creationId xmlns:a16="http://schemas.microsoft.com/office/drawing/2014/main" id="{8EABAE64-9C80-4C03-930D-291BA86AE544}"/>
-              </a:ext>
-            </a:extLst>
-          </p:cNvPr>
-          <p:cNvSpPr txBox="1"/>
-          <p:nvPr/>
-        </p:nvSpPr>
-        <p:spPr>
-          <a:xfrm>
-            <a:off x="8103765" y="1619075"/>
-            <a:ext cx="3816991" cy="1200329"/>
-          </a:xfrm>
-          <a:prstGeom prst="rect">
-            <a:avLst/>
-          </a:prstGeom>
-          <a:noFill/>
-        </p:spPr>
-        <p:txBody>
-          <a:bodyPr wrap="square" rtlCol="0">
-            <a:spAutoFit/>
-          </a:bodyPr>
-          <a:lstStyle/>
-          <a:p>
-            <a:r>
-              <a:rPr lang="en-GB" dirty="0"/>
-              <a:t>Due to this my current </a:t>
-            </a:r>
-            <a:r>
-              <a:rPr lang="en-GB" dirty="0" err="1"/>
-              <a:t>sql</a:t>
-            </a:r>
-            <a:r>
-              <a:rPr lang="en-GB" dirty="0"/>
-              <a:t> reader based solution may not be worth it as each function must be heavily specialised</a:t>
-            </a:r>
-          </a:p>
-        </p:txBody>
-      </p:sp>
-    </p:spTree>
-    <p:extLst>
-      <p:ext uri="{BB962C8B-B14F-4D97-AF65-F5344CB8AC3E}">
-        <p14:creationId xmlns:p14="http://schemas.microsoft.com/office/powerpoint/2010/main" val="3488845831"/>
-      </p:ext>
-    </p:extLst>
-  </p:cSld>
-  <p:clrMapOvr>
-    <a:masterClrMapping/>
-  </p:clrMapOvr>
-</p:sld>
-</file>
-
 <file path=ppt/slides/slide4.xml><?xml version="1.0" encoding="utf-8"?>
 <p:sld xmlns:a="http://schemas.openxmlformats.org/drawingml/2006/main" xmlns:r="http://schemas.openxmlformats.org/officeDocument/2006/relationships" xmlns:p="http://schemas.openxmlformats.org/presentationml/2006/main">
   <p:cSld>
@@ -8386,6 +8358,147 @@
           <p:cNvPr id="2" name="Title 1">
             <a:extLst>
               <a:ext uri="{FF2B5EF4-FFF2-40B4-BE49-F238E27FC236}">
+                <a16:creationId xmlns:a16="http://schemas.microsoft.com/office/drawing/2014/main" id="{3E21E2E2-780A-4009-A152-E722903D8190}"/>
+              </a:ext>
+            </a:extLst>
+          </p:cNvPr>
+          <p:cNvSpPr>
+            <a:spLocks noGrp="1"/>
+          </p:cNvSpPr>
+          <p:nvPr>
+            <p:ph type="title"/>
+          </p:nvPr>
+        </p:nvSpPr>
+        <p:spPr/>
+        <p:txBody>
+          <a:bodyPr/>
+          <a:lstStyle/>
+          <a:p>
+            <a:r>
+              <a:rPr lang="en-GB" dirty="0"/>
+              <a:t>I had several errors in my </a:t>
+            </a:r>
+            <a:r>
+              <a:rPr lang="en-GB" dirty="0" err="1"/>
+              <a:t>sql</a:t>
+            </a:r>
+            <a:r>
+              <a:rPr lang="en-GB" dirty="0"/>
+              <a:t> reader as it turns out you cant use a variable to select a table</a:t>
+            </a:r>
+          </a:p>
+        </p:txBody>
+      </p:sp>
+      <p:pic>
+        <p:nvPicPr>
+          <p:cNvPr id="4" name="Content Placeholder 3">
+            <a:extLst>
+              <a:ext uri="{FF2B5EF4-FFF2-40B4-BE49-F238E27FC236}">
+                <a16:creationId xmlns:a16="http://schemas.microsoft.com/office/drawing/2014/main" id="{BB38A60F-4A70-4AF4-ADBD-DB3EDCAC7966}"/>
+              </a:ext>
+            </a:extLst>
+          </p:cNvPr>
+          <p:cNvPicPr>
+            <a:picLocks noGrp="1" noChangeAspect="1"/>
+          </p:cNvPicPr>
+          <p:nvPr>
+            <p:ph idx="1"/>
+          </p:nvPr>
+        </p:nvPicPr>
+        <p:blipFill>
+          <a:blip r:embed="rId2"/>
+          <a:stretch>
+            <a:fillRect/>
+          </a:stretch>
+        </p:blipFill>
+        <p:spPr>
+          <a:xfrm>
+            <a:off x="201961" y="1690688"/>
+            <a:ext cx="7744583" cy="4351338"/>
+          </a:xfrm>
+          <a:prstGeom prst="rect">
+            <a:avLst/>
+          </a:prstGeom>
+        </p:spPr>
+      </p:pic>
+      <p:sp>
+        <p:nvSpPr>
+          <p:cNvPr id="5" name="TextBox 4">
+            <a:extLst>
+              <a:ext uri="{FF2B5EF4-FFF2-40B4-BE49-F238E27FC236}">
+                <a16:creationId xmlns:a16="http://schemas.microsoft.com/office/drawing/2014/main" id="{8EABAE64-9C80-4C03-930D-291BA86AE544}"/>
+              </a:ext>
+            </a:extLst>
+          </p:cNvPr>
+          <p:cNvSpPr txBox="1"/>
+          <p:nvPr/>
+        </p:nvSpPr>
+        <p:spPr>
+          <a:xfrm>
+            <a:off x="8103765" y="1619075"/>
+            <a:ext cx="3816991" cy="1200329"/>
+          </a:xfrm>
+          <a:prstGeom prst="rect">
+            <a:avLst/>
+          </a:prstGeom>
+          <a:noFill/>
+        </p:spPr>
+        <p:txBody>
+          <a:bodyPr wrap="square" rtlCol="0">
+            <a:spAutoFit/>
+          </a:bodyPr>
+          <a:lstStyle/>
+          <a:p>
+            <a:r>
+              <a:rPr lang="en-GB" dirty="0"/>
+              <a:t>Due to this my current </a:t>
+            </a:r>
+            <a:r>
+              <a:rPr lang="en-GB" dirty="0" err="1"/>
+              <a:t>sql</a:t>
+            </a:r>
+            <a:r>
+              <a:rPr lang="en-GB" dirty="0"/>
+              <a:t> reader based solution may not be worth it as each function must be heavily specialised</a:t>
+            </a:r>
+          </a:p>
+        </p:txBody>
+      </p:sp>
+    </p:spTree>
+    <p:extLst>
+      <p:ext uri="{BB962C8B-B14F-4D97-AF65-F5344CB8AC3E}">
+        <p14:creationId xmlns:p14="http://schemas.microsoft.com/office/powerpoint/2010/main" val="3488845831"/>
+      </p:ext>
+    </p:extLst>
+  </p:cSld>
+  <p:clrMapOvr>
+    <a:masterClrMapping/>
+  </p:clrMapOvr>
+</p:sld>
+</file>
+
+<file path=ppt/slides/slide41.xml><?xml version="1.0" encoding="utf-8"?>
+<p:sld xmlns:a="http://schemas.openxmlformats.org/drawingml/2006/main" xmlns:r="http://schemas.openxmlformats.org/officeDocument/2006/relationships" xmlns:p="http://schemas.openxmlformats.org/presentationml/2006/main">
+  <p:cSld>
+    <p:spTree>
+      <p:nvGrpSpPr>
+        <p:cNvPr id="1" name=""/>
+        <p:cNvGrpSpPr/>
+        <p:nvPr/>
+      </p:nvGrpSpPr>
+      <p:grpSpPr>
+        <a:xfrm>
+          <a:off x="0" y="0"/>
+          <a:ext cx="0" cy="0"/>
+          <a:chOff x="0" y="0"/>
+          <a:chExt cx="0" cy="0"/>
+        </a:xfrm>
+      </p:grpSpPr>
+      <p:sp>
+        <p:nvSpPr>
+          <p:cNvPr id="2" name="Title 1">
+            <a:extLst>
+              <a:ext uri="{FF2B5EF4-FFF2-40B4-BE49-F238E27FC236}">
                 <a16:creationId xmlns:a16="http://schemas.microsoft.com/office/drawing/2014/main" id="{63C97884-30CD-49BC-9C29-214CA981A2D8}"/>
               </a:ext>
             </a:extLst>
@@ -8603,7 +8716,7 @@
 </p:sld>
 </file>
 
-<file path=ppt/slides/slide41.xml><?xml version="1.0" encoding="utf-8"?>
+<file path=ppt/slides/slide42.xml><?xml version="1.0" encoding="utf-8"?>
 <p:sld xmlns:a="http://schemas.openxmlformats.org/drawingml/2006/main" xmlns:r="http://schemas.openxmlformats.org/officeDocument/2006/relationships" xmlns:p="http://schemas.openxmlformats.org/presentationml/2006/main">
   <p:cSld>
     <p:spTree>
@@ -8826,7 +8939,7 @@
 </p:sld>
 </file>
 
-<file path=ppt/slides/slide42.xml><?xml version="1.0" encoding="utf-8"?>
+<file path=ppt/slides/slide43.xml><?xml version="1.0" encoding="utf-8"?>
 <p:sld xmlns:a="http://schemas.openxmlformats.org/drawingml/2006/main" xmlns:r="http://schemas.openxmlformats.org/officeDocument/2006/relationships" xmlns:p="http://schemas.openxmlformats.org/presentationml/2006/main">
   <p:cSld>
     <p:spTree>

</xml_diff>